<commit_message>
2018/12/20 Modify ppt content.
</commit_message>
<xml_diff>
--- a/WindowsDriver/Driver(Windows).pptx
+++ b/WindowsDriver/Driver(Windows).pptx
@@ -5,7 +5,7 @@
     <p:sldMasterId id="2147483648" r:id="rId1"/>
   </p:sldMasterIdLst>
   <p:notesMasterIdLst>
-    <p:notesMasterId r:id="rId21"/>
+    <p:notesMasterId r:id="rId39"/>
   </p:notesMasterIdLst>
   <p:sldIdLst>
     <p:sldId id="256" r:id="rId2"/>
@@ -26,7 +26,25 @@
     <p:sldId id="272" r:id="rId17"/>
     <p:sldId id="270" r:id="rId18"/>
     <p:sldId id="273" r:id="rId19"/>
-    <p:sldId id="274" r:id="rId20"/>
+    <p:sldId id="275" r:id="rId20"/>
+    <p:sldId id="276" r:id="rId21"/>
+    <p:sldId id="277" r:id="rId22"/>
+    <p:sldId id="279" r:id="rId23"/>
+    <p:sldId id="278" r:id="rId24"/>
+    <p:sldId id="280" r:id="rId25"/>
+    <p:sldId id="281" r:id="rId26"/>
+    <p:sldId id="282" r:id="rId27"/>
+    <p:sldId id="284" r:id="rId28"/>
+    <p:sldId id="285" r:id="rId29"/>
+    <p:sldId id="283" r:id="rId30"/>
+    <p:sldId id="292" r:id="rId31"/>
+    <p:sldId id="286" r:id="rId32"/>
+    <p:sldId id="288" r:id="rId33"/>
+    <p:sldId id="289" r:id="rId34"/>
+    <p:sldId id="290" r:id="rId35"/>
+    <p:sldId id="291" r:id="rId36"/>
+    <p:sldId id="293" r:id="rId37"/>
+    <p:sldId id="274" r:id="rId38"/>
   </p:sldIdLst>
   <p:sldSz cx="12192000" cy="6858000"/>
   <p:notesSz cx="6858000" cy="9144000"/>
@@ -226,7 +244,7 @@
           <a:p>
             <a:fld id="{F355FBFC-5F72-40AF-AB81-0E702AE33AA7}" type="datetimeFigureOut">
               <a:rPr lang="zh-TW" altLang="en-US" smtClean="0"/>
-              <a:t>2018/12/7</a:t>
+              <a:t>2018/12/20</a:t>
             </a:fld>
             <a:endParaRPr lang="zh-TW" altLang="en-US"/>
           </a:p>
@@ -709,7 +727,7 @@
           <a:p>
             <a:fld id="{2927ED23-458E-4D99-AAD7-7E25403CBF25}" type="datetimeFigureOut">
               <a:rPr lang="zh-TW" altLang="en-US" smtClean="0"/>
-              <a:t>2018/12/7</a:t>
+              <a:t>2018/12/20</a:t>
             </a:fld>
             <a:endParaRPr lang="zh-TW" altLang="en-US"/>
           </a:p>
@@ -879,7 +897,7 @@
           <a:p>
             <a:fld id="{2927ED23-458E-4D99-AAD7-7E25403CBF25}" type="datetimeFigureOut">
               <a:rPr lang="zh-TW" altLang="en-US" smtClean="0"/>
-              <a:t>2018/12/7</a:t>
+              <a:t>2018/12/20</a:t>
             </a:fld>
             <a:endParaRPr lang="zh-TW" altLang="en-US"/>
           </a:p>
@@ -1059,7 +1077,7 @@
           <a:p>
             <a:fld id="{2927ED23-458E-4D99-AAD7-7E25403CBF25}" type="datetimeFigureOut">
               <a:rPr lang="zh-TW" altLang="en-US" smtClean="0"/>
-              <a:t>2018/12/7</a:t>
+              <a:t>2018/12/20</a:t>
             </a:fld>
             <a:endParaRPr lang="zh-TW" altLang="en-US"/>
           </a:p>
@@ -1229,7 +1247,7 @@
           <a:p>
             <a:fld id="{2927ED23-458E-4D99-AAD7-7E25403CBF25}" type="datetimeFigureOut">
               <a:rPr lang="zh-TW" altLang="en-US" smtClean="0"/>
-              <a:t>2018/12/7</a:t>
+              <a:t>2018/12/20</a:t>
             </a:fld>
             <a:endParaRPr lang="zh-TW" altLang="en-US"/>
           </a:p>
@@ -1475,7 +1493,7 @@
           <a:p>
             <a:fld id="{2927ED23-458E-4D99-AAD7-7E25403CBF25}" type="datetimeFigureOut">
               <a:rPr lang="zh-TW" altLang="en-US" smtClean="0"/>
-              <a:t>2018/12/7</a:t>
+              <a:t>2018/12/20</a:t>
             </a:fld>
             <a:endParaRPr lang="zh-TW" altLang="en-US"/>
           </a:p>
@@ -1707,7 +1725,7 @@
           <a:p>
             <a:fld id="{2927ED23-458E-4D99-AAD7-7E25403CBF25}" type="datetimeFigureOut">
               <a:rPr lang="zh-TW" altLang="en-US" smtClean="0"/>
-              <a:t>2018/12/7</a:t>
+              <a:t>2018/12/20</a:t>
             </a:fld>
             <a:endParaRPr lang="zh-TW" altLang="en-US"/>
           </a:p>
@@ -2074,7 +2092,7 @@
           <a:p>
             <a:fld id="{2927ED23-458E-4D99-AAD7-7E25403CBF25}" type="datetimeFigureOut">
               <a:rPr lang="zh-TW" altLang="en-US" smtClean="0"/>
-              <a:t>2018/12/7</a:t>
+              <a:t>2018/12/20</a:t>
             </a:fld>
             <a:endParaRPr lang="zh-TW" altLang="en-US"/>
           </a:p>
@@ -2192,7 +2210,7 @@
           <a:p>
             <a:fld id="{2927ED23-458E-4D99-AAD7-7E25403CBF25}" type="datetimeFigureOut">
               <a:rPr lang="zh-TW" altLang="en-US" smtClean="0"/>
-              <a:t>2018/12/7</a:t>
+              <a:t>2018/12/20</a:t>
             </a:fld>
             <a:endParaRPr lang="zh-TW" altLang="en-US"/>
           </a:p>
@@ -2287,7 +2305,7 @@
           <a:p>
             <a:fld id="{2927ED23-458E-4D99-AAD7-7E25403CBF25}" type="datetimeFigureOut">
               <a:rPr lang="zh-TW" altLang="en-US" smtClean="0"/>
-              <a:t>2018/12/7</a:t>
+              <a:t>2018/12/20</a:t>
             </a:fld>
             <a:endParaRPr lang="zh-TW" altLang="en-US"/>
           </a:p>
@@ -2564,7 +2582,7 @@
           <a:p>
             <a:fld id="{2927ED23-458E-4D99-AAD7-7E25403CBF25}" type="datetimeFigureOut">
               <a:rPr lang="zh-TW" altLang="en-US" smtClean="0"/>
-              <a:t>2018/12/7</a:t>
+              <a:t>2018/12/20</a:t>
             </a:fld>
             <a:endParaRPr lang="zh-TW" altLang="en-US"/>
           </a:p>
@@ -2817,7 +2835,7 @@
           <a:p>
             <a:fld id="{2927ED23-458E-4D99-AAD7-7E25403CBF25}" type="datetimeFigureOut">
               <a:rPr lang="zh-TW" altLang="en-US" smtClean="0"/>
-              <a:t>2018/12/7</a:t>
+              <a:t>2018/12/20</a:t>
             </a:fld>
             <a:endParaRPr lang="zh-TW" altLang="en-US"/>
           </a:p>
@@ -3030,7 +3048,7 @@
           <a:p>
             <a:fld id="{2927ED23-458E-4D99-AAD7-7E25403CBF25}" type="datetimeFigureOut">
               <a:rPr lang="zh-TW" altLang="en-US" smtClean="0"/>
-              <a:t>2018/12/7</a:t>
+              <a:t>2018/12/20</a:t>
             </a:fld>
             <a:endParaRPr lang="zh-TW" altLang="en-US"/>
           </a:p>
@@ -8774,8 +8792,8 @@
         </p:nvSpPr>
         <p:spPr>
           <a:xfrm>
-            <a:off x="5331460" y="2766218"/>
-            <a:ext cx="1760220" cy="1325563"/>
+            <a:off x="3763918" y="2766218"/>
+            <a:ext cx="4716417" cy="1325563"/>
           </a:xfrm>
         </p:spPr>
         <p:txBody>
@@ -8783,7 +8801,7 @@
           <a:lstStyle/>
           <a:p>
             <a:r>
-              <a:rPr lang="en-US" altLang="zh-TW" b="1" dirty="0" smtClean="0">
+              <a:rPr lang="zh-TW" altLang="en-US" b="1" dirty="0" smtClean="0">
                 <a:effectLst>
                   <a:outerShdw blurRad="38100" dist="38100" dir="2700000" algn="tl">
                     <a:srgbClr val="000000">
@@ -8794,9 +8812,9 @@
                 <a:latin typeface="微軟正黑體" panose="020B0604030504040204" pitchFamily="34" charset="-120"/>
                 <a:ea typeface="微軟正黑體" panose="020B0604030504040204" pitchFamily="34" charset="-120"/>
               </a:rPr>
-              <a:t>Q&amp;A</a:t>
-            </a:r>
-            <a:endParaRPr lang="zh-TW" altLang="en-US" b="1" dirty="0">
+              <a:t>驅動程式基礎架構</a:t>
+            </a:r>
+            <a:endParaRPr lang="en-US" altLang="zh-TW" b="1" dirty="0">
               <a:effectLst>
                 <a:outerShdw blurRad="38100" dist="38100" dir="2700000" algn="tl">
                   <a:srgbClr val="000000">
@@ -8813,7 +8831,7 @@
     </p:spTree>
     <p:extLst>
       <p:ext uri="{BB962C8B-B14F-4D97-AF65-F5344CB8AC3E}">
-        <p14:creationId xmlns:p14="http://schemas.microsoft.com/office/powerpoint/2010/main" val="1531412980"/>
+        <p14:creationId xmlns:p14="http://schemas.microsoft.com/office/powerpoint/2010/main" val="3344255363"/>
       </p:ext>
     </p:extLst>
   </p:cSld>
@@ -8916,7 +8934,40 @@
                 <a:latin typeface="微軟正黑體" panose="020B0604030504040204" pitchFamily="34" charset="-120"/>
                 <a:ea typeface="微軟正黑體" panose="020B0604030504040204" pitchFamily="34" charset="-120"/>
               </a:rPr>
-              <a:t>基礎觀念</a:t>
+              <a:t>基礎</a:t>
+            </a:r>
+            <a:r>
+              <a:rPr lang="zh-TW" altLang="en-US" dirty="0" smtClean="0">
+                <a:latin typeface="微軟正黑體" panose="020B0604030504040204" pitchFamily="34" charset="-120"/>
+                <a:ea typeface="微軟正黑體" panose="020B0604030504040204" pitchFamily="34" charset="-120"/>
+              </a:rPr>
+              <a:t>觀念 </a:t>
+            </a:r>
+            <a:r>
+              <a:rPr lang="en-US" altLang="zh-TW" dirty="0" smtClean="0">
+                <a:solidFill>
+                  <a:srgbClr val="FF0000"/>
+                </a:solidFill>
+                <a:latin typeface="微軟正黑體" panose="020B0604030504040204" pitchFamily="34" charset="-120"/>
+                <a:ea typeface="微軟正黑體" panose="020B0604030504040204" pitchFamily="34" charset="-120"/>
+              </a:rPr>
+              <a:t>(2018/12/11)</a:t>
+            </a:r>
+          </a:p>
+          <a:p>
+            <a:r>
+              <a:rPr lang="zh-TW" altLang="en-US" dirty="0" smtClean="0">
+                <a:latin typeface="微軟正黑體" panose="020B0604030504040204" pitchFamily="34" charset="-120"/>
+                <a:ea typeface="微軟正黑體" panose="020B0604030504040204" pitchFamily="34" charset="-120"/>
+              </a:rPr>
+              <a:t>驅動程式基礎</a:t>
+            </a:r>
+            <a:r>
+              <a:rPr lang="zh-TW" altLang="en-US" dirty="0">
+                <a:latin typeface="微軟正黑體" panose="020B0604030504040204" pitchFamily="34" charset="-120"/>
+                <a:ea typeface="微軟正黑體" panose="020B0604030504040204" pitchFamily="34" charset="-120"/>
+              </a:rPr>
+              <a:t>架構</a:t>
             </a:r>
             <a:endParaRPr lang="zh-TW" altLang="en-US" dirty="0">
               <a:latin typeface="微軟正黑體" panose="020B0604030504040204" pitchFamily="34" charset="-120"/>
@@ -8929,6 +8980,2620 @@
     <p:extLst>
       <p:ext uri="{BB962C8B-B14F-4D97-AF65-F5344CB8AC3E}">
         <p14:creationId xmlns:p14="http://schemas.microsoft.com/office/powerpoint/2010/main" val="1586605813"/>
+      </p:ext>
+    </p:extLst>
+  </p:cSld>
+  <p:clrMapOvr>
+    <a:masterClrMapping/>
+  </p:clrMapOvr>
+  <p:timing>
+    <p:tnLst>
+      <p:par>
+        <p:cTn id="1" dur="indefinite" restart="never" nodeType="tmRoot"/>
+      </p:par>
+    </p:tnLst>
+  </p:timing>
+</p:sld>
+</file>
+
+<file path=ppt/slides/slide20.xml><?xml version="1.0" encoding="utf-8"?>
+<p:sld xmlns:a="http://schemas.openxmlformats.org/drawingml/2006/main" xmlns:r="http://schemas.openxmlformats.org/officeDocument/2006/relationships" xmlns:p="http://schemas.openxmlformats.org/presentationml/2006/main">
+  <p:cSld>
+    <p:spTree>
+      <p:nvGrpSpPr>
+        <p:cNvPr id="1" name=""/>
+        <p:cNvGrpSpPr/>
+        <p:nvPr/>
+      </p:nvGrpSpPr>
+      <p:grpSpPr>
+        <a:xfrm>
+          <a:off x="0" y="0"/>
+          <a:ext cx="0" cy="0"/>
+          <a:chOff x="0" y="0"/>
+          <a:chExt cx="0" cy="0"/>
+        </a:xfrm>
+      </p:grpSpPr>
+      <p:sp>
+        <p:nvSpPr>
+          <p:cNvPr id="4" name="文字方塊 3"/>
+          <p:cNvSpPr txBox="1"/>
+          <p:nvPr/>
+        </p:nvSpPr>
+        <p:spPr>
+          <a:xfrm>
+            <a:off x="9083040" y="6334780"/>
+            <a:ext cx="3108960" cy="523220"/>
+          </a:xfrm>
+          <a:prstGeom prst="rect">
+            <a:avLst/>
+          </a:prstGeom>
+          <a:noFill/>
+        </p:spPr>
+        <p:txBody>
+          <a:bodyPr wrap="square" rtlCol="0">
+            <a:spAutoFit/>
+          </a:bodyPr>
+          <a:lstStyle/>
+          <a:p>
+            <a:r>
+              <a:rPr lang="zh-TW" altLang="en-US" sz="2800" b="1" dirty="0" smtClean="0">
+                <a:effectLst>
+                  <a:outerShdw blurRad="38100" dist="38100" dir="2700000" algn="tl">
+                    <a:srgbClr val="000000">
+                      <a:alpha val="43137"/>
+                    </a:srgbClr>
+                  </a:outerShdw>
+                </a:effectLst>
+                <a:latin typeface="微軟正黑體" panose="020B0604030504040204" pitchFamily="34" charset="-120"/>
+                <a:ea typeface="微軟正黑體" panose="020B0604030504040204" pitchFamily="34" charset="-120"/>
+              </a:rPr>
+              <a:t>驅動程式基礎架構</a:t>
+            </a:r>
+            <a:endParaRPr lang="zh-TW" altLang="en-US" sz="2800" b="1" dirty="0">
+              <a:effectLst>
+                <a:outerShdw blurRad="38100" dist="38100" dir="2700000" algn="tl">
+                  <a:srgbClr val="000000">
+                    <a:alpha val="43137"/>
+                  </a:srgbClr>
+                </a:outerShdw>
+              </a:effectLst>
+              <a:latin typeface="微軟正黑體" panose="020B0604030504040204" pitchFamily="34" charset="-120"/>
+              <a:ea typeface="微軟正黑體" panose="020B0604030504040204" pitchFamily="34" charset="-120"/>
+            </a:endParaRPr>
+          </a:p>
+        </p:txBody>
+      </p:sp>
+      <p:sp>
+        <p:nvSpPr>
+          <p:cNvPr id="5" name="文字方塊 4"/>
+          <p:cNvSpPr txBox="1"/>
+          <p:nvPr/>
+        </p:nvSpPr>
+        <p:spPr>
+          <a:xfrm>
+            <a:off x="3143793" y="2527497"/>
+            <a:ext cx="8290560" cy="1569660"/>
+          </a:xfrm>
+          <a:prstGeom prst="rect">
+            <a:avLst/>
+          </a:prstGeom>
+          <a:noFill/>
+        </p:spPr>
+        <p:txBody>
+          <a:bodyPr wrap="square" rtlCol="0">
+            <a:spAutoFit/>
+          </a:bodyPr>
+          <a:lstStyle/>
+          <a:p>
+            <a:pPr marL="457200" indent="-457200">
+              <a:buFont typeface="Arial" panose="020B0604020202020204" pitchFamily="34" charset="0"/>
+              <a:buChar char="•"/>
+            </a:pPr>
+            <a:r>
+              <a:rPr lang="en-US" altLang="zh-TW" sz="3200" dirty="0" smtClean="0">
+                <a:effectLst>
+                  <a:outerShdw blurRad="38100" dist="38100" dir="2700000" algn="tl">
+                    <a:srgbClr val="000000">
+                      <a:alpha val="43137"/>
+                    </a:srgbClr>
+                  </a:outerShdw>
+                </a:effectLst>
+                <a:latin typeface="微軟正黑體" panose="020B0604030504040204" pitchFamily="34" charset="-120"/>
+                <a:ea typeface="微軟正黑體" panose="020B0604030504040204" pitchFamily="34" charset="-120"/>
+              </a:rPr>
+              <a:t>NT </a:t>
+            </a:r>
+            <a:r>
+              <a:rPr lang="en-US" altLang="zh-TW" sz="3200" dirty="0">
+                <a:effectLst>
+                  <a:outerShdw blurRad="38100" dist="38100" dir="2700000" algn="tl">
+                    <a:srgbClr val="000000">
+                      <a:alpha val="43137"/>
+                    </a:srgbClr>
+                  </a:outerShdw>
+                </a:effectLst>
+                <a:latin typeface="微軟正黑體" panose="020B0604030504040204" pitchFamily="34" charset="-120"/>
+                <a:ea typeface="微軟正黑體" panose="020B0604030504040204" pitchFamily="34" charset="-120"/>
+              </a:rPr>
+              <a:t>(New Technology)</a:t>
+            </a:r>
+            <a:endParaRPr lang="en-US" altLang="zh-TW" sz="3200" dirty="0" smtClean="0">
+              <a:effectLst>
+                <a:outerShdw blurRad="38100" dist="38100" dir="2700000" algn="tl">
+                  <a:srgbClr val="000000">
+                    <a:alpha val="43137"/>
+                  </a:srgbClr>
+                </a:outerShdw>
+              </a:effectLst>
+              <a:latin typeface="微軟正黑體" panose="020B0604030504040204" pitchFamily="34" charset="-120"/>
+              <a:ea typeface="微軟正黑體" panose="020B0604030504040204" pitchFamily="34" charset="-120"/>
+            </a:endParaRPr>
+          </a:p>
+          <a:p>
+            <a:pPr marL="457200" indent="-457200">
+              <a:buFont typeface="Arial" panose="020B0604020202020204" pitchFamily="34" charset="0"/>
+              <a:buChar char="•"/>
+            </a:pPr>
+            <a:r>
+              <a:rPr lang="en-US" altLang="zh-TW" sz="3200" dirty="0" smtClean="0">
+                <a:effectLst>
+                  <a:outerShdw blurRad="38100" dist="38100" dir="2700000" algn="tl">
+                    <a:srgbClr val="000000">
+                      <a:alpha val="43137"/>
+                    </a:srgbClr>
+                  </a:outerShdw>
+                </a:effectLst>
+                <a:latin typeface="微軟正黑體" panose="020B0604030504040204" pitchFamily="34" charset="-120"/>
+                <a:ea typeface="微軟正黑體" panose="020B0604030504040204" pitchFamily="34" charset="-120"/>
+              </a:rPr>
+              <a:t>WDM (Windows Driver Model)</a:t>
+            </a:r>
+          </a:p>
+          <a:p>
+            <a:pPr marL="457200" indent="-457200">
+              <a:buFont typeface="Arial" panose="020B0604020202020204" pitchFamily="34" charset="0"/>
+              <a:buChar char="•"/>
+            </a:pPr>
+            <a:r>
+              <a:rPr lang="en-US" altLang="zh-TW" sz="3200" dirty="0" smtClean="0">
+                <a:effectLst>
+                  <a:outerShdw blurRad="38100" dist="38100" dir="2700000" algn="tl">
+                    <a:srgbClr val="000000">
+                      <a:alpha val="43137"/>
+                    </a:srgbClr>
+                  </a:outerShdw>
+                </a:effectLst>
+                <a:latin typeface="微軟正黑體" panose="020B0604030504040204" pitchFamily="34" charset="-120"/>
+                <a:ea typeface="微軟正黑體" panose="020B0604030504040204" pitchFamily="34" charset="-120"/>
+              </a:rPr>
+              <a:t>WDF (Windows</a:t>
+            </a:r>
+            <a:r>
+              <a:rPr lang="zh-TW" altLang="en-US" sz="3200" dirty="0" smtClean="0">
+                <a:effectLst>
+                  <a:outerShdw blurRad="38100" dist="38100" dir="2700000" algn="tl">
+                    <a:srgbClr val="000000">
+                      <a:alpha val="43137"/>
+                    </a:srgbClr>
+                  </a:outerShdw>
+                </a:effectLst>
+                <a:latin typeface="微軟正黑體" panose="020B0604030504040204" pitchFamily="34" charset="-120"/>
+                <a:ea typeface="微軟正黑體" panose="020B0604030504040204" pitchFamily="34" charset="-120"/>
+              </a:rPr>
+              <a:t> </a:t>
+            </a:r>
+            <a:r>
+              <a:rPr lang="en-US" altLang="zh-TW" sz="3200" dirty="0" smtClean="0">
+                <a:effectLst>
+                  <a:outerShdw blurRad="38100" dist="38100" dir="2700000" algn="tl">
+                    <a:srgbClr val="000000">
+                      <a:alpha val="43137"/>
+                    </a:srgbClr>
+                  </a:outerShdw>
+                </a:effectLst>
+                <a:latin typeface="微軟正黑體" panose="020B0604030504040204" pitchFamily="34" charset="-120"/>
+                <a:ea typeface="微軟正黑體" panose="020B0604030504040204" pitchFamily="34" charset="-120"/>
+              </a:rPr>
+              <a:t>Driver Foundation)</a:t>
+            </a:r>
+          </a:p>
+        </p:txBody>
+      </p:sp>
+    </p:spTree>
+    <p:extLst>
+      <p:ext uri="{BB962C8B-B14F-4D97-AF65-F5344CB8AC3E}">
+        <p14:creationId xmlns:p14="http://schemas.microsoft.com/office/powerpoint/2010/main" val="2102567267"/>
+      </p:ext>
+    </p:extLst>
+  </p:cSld>
+  <p:clrMapOvr>
+    <a:masterClrMapping/>
+  </p:clrMapOvr>
+  <p:timing>
+    <p:tnLst>
+      <p:par>
+        <p:cTn id="1" dur="indefinite" restart="never" nodeType="tmRoot"/>
+      </p:par>
+    </p:tnLst>
+  </p:timing>
+</p:sld>
+</file>
+
+<file path=ppt/slides/slide21.xml><?xml version="1.0" encoding="utf-8"?>
+<p:sld xmlns:a="http://schemas.openxmlformats.org/drawingml/2006/main" xmlns:r="http://schemas.openxmlformats.org/officeDocument/2006/relationships" xmlns:p="http://schemas.openxmlformats.org/presentationml/2006/main">
+  <p:cSld>
+    <p:spTree>
+      <p:nvGrpSpPr>
+        <p:cNvPr id="1" name=""/>
+        <p:cNvGrpSpPr/>
+        <p:nvPr/>
+      </p:nvGrpSpPr>
+      <p:grpSpPr>
+        <a:xfrm>
+          <a:off x="0" y="0"/>
+          <a:ext cx="0" cy="0"/>
+          <a:chOff x="0" y="0"/>
+          <a:chExt cx="0" cy="0"/>
+        </a:xfrm>
+      </p:grpSpPr>
+      <p:sp>
+        <p:nvSpPr>
+          <p:cNvPr id="4" name="文字方塊 3"/>
+          <p:cNvSpPr txBox="1"/>
+          <p:nvPr/>
+        </p:nvSpPr>
+        <p:spPr>
+          <a:xfrm>
+            <a:off x="9083040" y="6334780"/>
+            <a:ext cx="3108960" cy="523220"/>
+          </a:xfrm>
+          <a:prstGeom prst="rect">
+            <a:avLst/>
+          </a:prstGeom>
+          <a:noFill/>
+        </p:spPr>
+        <p:txBody>
+          <a:bodyPr wrap="square" rtlCol="0">
+            <a:spAutoFit/>
+          </a:bodyPr>
+          <a:lstStyle/>
+          <a:p>
+            <a:r>
+              <a:rPr lang="zh-TW" altLang="en-US" sz="2800" b="1" dirty="0" smtClean="0">
+                <a:effectLst>
+                  <a:outerShdw blurRad="38100" dist="38100" dir="2700000" algn="tl">
+                    <a:srgbClr val="000000">
+                      <a:alpha val="43137"/>
+                    </a:srgbClr>
+                  </a:outerShdw>
+                </a:effectLst>
+                <a:latin typeface="微軟正黑體" panose="020B0604030504040204" pitchFamily="34" charset="-120"/>
+                <a:ea typeface="微軟正黑體" panose="020B0604030504040204" pitchFamily="34" charset="-120"/>
+              </a:rPr>
+              <a:t>驅動程式基礎架構</a:t>
+            </a:r>
+            <a:endParaRPr lang="zh-TW" altLang="en-US" sz="2800" b="1" dirty="0">
+              <a:effectLst>
+                <a:outerShdw blurRad="38100" dist="38100" dir="2700000" algn="tl">
+                  <a:srgbClr val="000000">
+                    <a:alpha val="43137"/>
+                  </a:srgbClr>
+                </a:outerShdw>
+              </a:effectLst>
+              <a:latin typeface="微軟正黑體" panose="020B0604030504040204" pitchFamily="34" charset="-120"/>
+              <a:ea typeface="微軟正黑體" panose="020B0604030504040204" pitchFamily="34" charset="-120"/>
+            </a:endParaRPr>
+          </a:p>
+        </p:txBody>
+      </p:sp>
+      <p:sp>
+        <p:nvSpPr>
+          <p:cNvPr id="5" name="文字方塊 4"/>
+          <p:cNvSpPr txBox="1"/>
+          <p:nvPr/>
+        </p:nvSpPr>
+        <p:spPr>
+          <a:xfrm>
+            <a:off x="3143793" y="2527497"/>
+            <a:ext cx="8290560" cy="2554545"/>
+          </a:xfrm>
+          <a:prstGeom prst="rect">
+            <a:avLst/>
+          </a:prstGeom>
+          <a:noFill/>
+        </p:spPr>
+        <p:txBody>
+          <a:bodyPr wrap="square" rtlCol="0">
+            <a:spAutoFit/>
+          </a:bodyPr>
+          <a:lstStyle/>
+          <a:p>
+            <a:pPr marL="457200" indent="-457200">
+              <a:buFont typeface="Arial" panose="020B0604020202020204" pitchFamily="34" charset="0"/>
+              <a:buChar char="•"/>
+            </a:pPr>
+            <a:r>
+              <a:rPr lang="en-US" altLang="zh-TW" sz="3200" dirty="0" smtClean="0">
+                <a:effectLst>
+                  <a:outerShdw blurRad="38100" dist="38100" dir="2700000" algn="tl">
+                    <a:srgbClr val="000000">
+                      <a:alpha val="43137"/>
+                    </a:srgbClr>
+                  </a:outerShdw>
+                </a:effectLst>
+                <a:latin typeface="微軟正黑體" panose="020B0604030504040204" pitchFamily="34" charset="-120"/>
+                <a:ea typeface="微軟正黑體" panose="020B0604030504040204" pitchFamily="34" charset="-120"/>
+              </a:rPr>
+              <a:t>NT (New Technology)</a:t>
+            </a:r>
+          </a:p>
+          <a:p>
+            <a:pPr marL="457200" indent="-457200">
+              <a:buFont typeface="Arial" panose="020B0604020202020204" pitchFamily="34" charset="0"/>
+              <a:buChar char="•"/>
+            </a:pPr>
+            <a:r>
+              <a:rPr lang="en-US" altLang="zh-TW" sz="3200" dirty="0" smtClean="0">
+                <a:effectLst>
+                  <a:outerShdw blurRad="38100" dist="38100" dir="2700000" algn="tl">
+                    <a:srgbClr val="000000">
+                      <a:alpha val="43137"/>
+                    </a:srgbClr>
+                  </a:outerShdw>
+                </a:effectLst>
+                <a:latin typeface="微軟正黑體" panose="020B0604030504040204" pitchFamily="34" charset="-120"/>
+                <a:ea typeface="微軟正黑體" panose="020B0604030504040204" pitchFamily="34" charset="-120"/>
+              </a:rPr>
+              <a:t>WDM </a:t>
+            </a:r>
+            <a:r>
+              <a:rPr lang="en-US" altLang="zh-TW" sz="3200" dirty="0">
+                <a:effectLst>
+                  <a:outerShdw blurRad="38100" dist="38100" dir="2700000" algn="tl">
+                    <a:srgbClr val="000000">
+                      <a:alpha val="43137"/>
+                    </a:srgbClr>
+                  </a:outerShdw>
+                </a:effectLst>
+                <a:latin typeface="微軟正黑體" panose="020B0604030504040204" pitchFamily="34" charset="-120"/>
+                <a:ea typeface="微軟正黑體" panose="020B0604030504040204" pitchFamily="34" charset="-120"/>
+              </a:rPr>
+              <a:t>(Windows Driver Model</a:t>
+            </a:r>
+            <a:r>
+              <a:rPr lang="en-US" altLang="zh-TW" sz="3200" dirty="0" smtClean="0">
+                <a:effectLst>
+                  <a:outerShdw blurRad="38100" dist="38100" dir="2700000" algn="tl">
+                    <a:srgbClr val="000000">
+                      <a:alpha val="43137"/>
+                    </a:srgbClr>
+                  </a:outerShdw>
+                </a:effectLst>
+                <a:latin typeface="微軟正黑體" panose="020B0604030504040204" pitchFamily="34" charset="-120"/>
+                <a:ea typeface="微軟正黑體" panose="020B0604030504040204" pitchFamily="34" charset="-120"/>
+              </a:rPr>
+              <a:t>)</a:t>
+            </a:r>
+          </a:p>
+          <a:p>
+            <a:pPr marL="457200" indent="-457200">
+              <a:buFont typeface="Arial" panose="020B0604020202020204" pitchFamily="34" charset="0"/>
+              <a:buChar char="•"/>
+            </a:pPr>
+            <a:r>
+              <a:rPr lang="en-US" altLang="zh-TW" sz="3200" dirty="0" smtClean="0">
+                <a:effectLst>
+                  <a:outerShdw blurRad="38100" dist="38100" dir="2700000" algn="tl">
+                    <a:srgbClr val="000000">
+                      <a:alpha val="43137"/>
+                    </a:srgbClr>
+                  </a:outerShdw>
+                </a:effectLst>
+                <a:latin typeface="微軟正黑體" panose="020B0604030504040204" pitchFamily="34" charset="-120"/>
+                <a:ea typeface="微軟正黑體" panose="020B0604030504040204" pitchFamily="34" charset="-120"/>
+              </a:rPr>
+              <a:t>WDF (Windows Driver Foundation)</a:t>
+            </a:r>
+          </a:p>
+          <a:p>
+            <a:pPr marL="914400" lvl="1" indent="-457200">
+              <a:buFont typeface="微軟正黑體" panose="020B0604030504040204" pitchFamily="34" charset="-120"/>
+              <a:buChar char="-"/>
+            </a:pPr>
+            <a:r>
+              <a:rPr lang="en-US" altLang="zh-TW" sz="3200" dirty="0" smtClean="0">
+                <a:effectLst>
+                  <a:outerShdw blurRad="38100" dist="38100" dir="2700000" algn="tl">
+                    <a:srgbClr val="000000">
+                      <a:alpha val="43137"/>
+                    </a:srgbClr>
+                  </a:outerShdw>
+                </a:effectLst>
+                <a:latin typeface="微軟正黑體" panose="020B0604030504040204" pitchFamily="34" charset="-120"/>
+                <a:ea typeface="微軟正黑體" panose="020B0604030504040204" pitchFamily="34" charset="-120"/>
+              </a:rPr>
+              <a:t>KMDF (Kernel)</a:t>
+            </a:r>
+          </a:p>
+          <a:p>
+            <a:pPr marL="914400" lvl="1" indent="-457200">
+              <a:buFont typeface="微軟正黑體" panose="020B0604030504040204" pitchFamily="34" charset="-120"/>
+              <a:buChar char="-"/>
+            </a:pPr>
+            <a:r>
+              <a:rPr lang="en-US" altLang="zh-TW" sz="3200" dirty="0" smtClean="0">
+                <a:effectLst>
+                  <a:outerShdw blurRad="38100" dist="38100" dir="2700000" algn="tl">
+                    <a:srgbClr val="000000">
+                      <a:alpha val="43137"/>
+                    </a:srgbClr>
+                  </a:outerShdw>
+                </a:effectLst>
+                <a:latin typeface="微軟正黑體" panose="020B0604030504040204" pitchFamily="34" charset="-120"/>
+                <a:ea typeface="微軟正黑體" panose="020B0604030504040204" pitchFamily="34" charset="-120"/>
+              </a:rPr>
+              <a:t>UMDF (User)</a:t>
+            </a:r>
+          </a:p>
+        </p:txBody>
+      </p:sp>
+    </p:spTree>
+    <p:extLst>
+      <p:ext uri="{BB962C8B-B14F-4D97-AF65-F5344CB8AC3E}">
+        <p14:creationId xmlns:p14="http://schemas.microsoft.com/office/powerpoint/2010/main" val="3261379806"/>
+      </p:ext>
+    </p:extLst>
+  </p:cSld>
+  <p:clrMapOvr>
+    <a:masterClrMapping/>
+  </p:clrMapOvr>
+  <p:timing>
+    <p:tnLst>
+      <p:par>
+        <p:cTn id="1" dur="indefinite" restart="never" nodeType="tmRoot"/>
+      </p:par>
+    </p:tnLst>
+  </p:timing>
+</p:sld>
+</file>
+
+<file path=ppt/slides/slide22.xml><?xml version="1.0" encoding="utf-8"?>
+<p:sld xmlns:a="http://schemas.openxmlformats.org/drawingml/2006/main" xmlns:r="http://schemas.openxmlformats.org/officeDocument/2006/relationships" xmlns:p="http://schemas.openxmlformats.org/presentationml/2006/main">
+  <p:cSld>
+    <p:spTree>
+      <p:nvGrpSpPr>
+        <p:cNvPr id="1" name=""/>
+        <p:cNvGrpSpPr/>
+        <p:nvPr/>
+      </p:nvGrpSpPr>
+      <p:grpSpPr>
+        <a:xfrm>
+          <a:off x="0" y="0"/>
+          <a:ext cx="0" cy="0"/>
+          <a:chOff x="0" y="0"/>
+          <a:chExt cx="0" cy="0"/>
+        </a:xfrm>
+      </p:grpSpPr>
+      <p:sp>
+        <p:nvSpPr>
+          <p:cNvPr id="4" name="文字方塊 3"/>
+          <p:cNvSpPr txBox="1"/>
+          <p:nvPr/>
+        </p:nvSpPr>
+        <p:spPr>
+          <a:xfrm>
+            <a:off x="9083040" y="6334780"/>
+            <a:ext cx="3108960" cy="523220"/>
+          </a:xfrm>
+          <a:prstGeom prst="rect">
+            <a:avLst/>
+          </a:prstGeom>
+          <a:noFill/>
+        </p:spPr>
+        <p:txBody>
+          <a:bodyPr wrap="square" rtlCol="0">
+            <a:spAutoFit/>
+          </a:bodyPr>
+          <a:lstStyle/>
+          <a:p>
+            <a:r>
+              <a:rPr lang="zh-TW" altLang="en-US" sz="2800" b="1" dirty="0" smtClean="0">
+                <a:effectLst>
+                  <a:outerShdw blurRad="38100" dist="38100" dir="2700000" algn="tl">
+                    <a:srgbClr val="000000">
+                      <a:alpha val="43137"/>
+                    </a:srgbClr>
+                  </a:outerShdw>
+                </a:effectLst>
+                <a:latin typeface="微軟正黑體" panose="020B0604030504040204" pitchFamily="34" charset="-120"/>
+                <a:ea typeface="微軟正黑體" panose="020B0604030504040204" pitchFamily="34" charset="-120"/>
+              </a:rPr>
+              <a:t>驅動程式基礎架構</a:t>
+            </a:r>
+            <a:endParaRPr lang="zh-TW" altLang="en-US" sz="2800" b="1" dirty="0">
+              <a:effectLst>
+                <a:outerShdw blurRad="38100" dist="38100" dir="2700000" algn="tl">
+                  <a:srgbClr val="000000">
+                    <a:alpha val="43137"/>
+                  </a:srgbClr>
+                </a:outerShdw>
+              </a:effectLst>
+              <a:latin typeface="微軟正黑體" panose="020B0604030504040204" pitchFamily="34" charset="-120"/>
+              <a:ea typeface="微軟正黑體" panose="020B0604030504040204" pitchFamily="34" charset="-120"/>
+            </a:endParaRPr>
+          </a:p>
+        </p:txBody>
+      </p:sp>
+      <p:sp>
+        <p:nvSpPr>
+          <p:cNvPr id="5" name="文字方塊 4"/>
+          <p:cNvSpPr txBox="1"/>
+          <p:nvPr/>
+        </p:nvSpPr>
+        <p:spPr>
+          <a:xfrm>
+            <a:off x="3143793" y="2527497"/>
+            <a:ext cx="8290560" cy="2554545"/>
+          </a:xfrm>
+          <a:prstGeom prst="rect">
+            <a:avLst/>
+          </a:prstGeom>
+          <a:noFill/>
+        </p:spPr>
+        <p:txBody>
+          <a:bodyPr wrap="square" rtlCol="0">
+            <a:spAutoFit/>
+          </a:bodyPr>
+          <a:lstStyle/>
+          <a:p>
+            <a:pPr marL="457200" indent="-457200">
+              <a:buFont typeface="Arial" panose="020B0604020202020204" pitchFamily="34" charset="0"/>
+              <a:buChar char="•"/>
+            </a:pPr>
+            <a:r>
+              <a:rPr lang="en-US" altLang="zh-TW" sz="3200" dirty="0" smtClean="0">
+                <a:solidFill>
+                  <a:srgbClr val="C00000"/>
+                </a:solidFill>
+                <a:effectLst>
+                  <a:outerShdw blurRad="38100" dist="38100" dir="2700000" algn="tl">
+                    <a:srgbClr val="000000">
+                      <a:alpha val="43137"/>
+                    </a:srgbClr>
+                  </a:outerShdw>
+                </a:effectLst>
+                <a:latin typeface="微軟正黑體" panose="020B0604030504040204" pitchFamily="34" charset="-120"/>
+                <a:ea typeface="微軟正黑體" panose="020B0604030504040204" pitchFamily="34" charset="-120"/>
+              </a:rPr>
+              <a:t>NT (New Technology)</a:t>
+            </a:r>
+          </a:p>
+          <a:p>
+            <a:pPr marL="457200" indent="-457200">
+              <a:buFont typeface="Arial" panose="020B0604020202020204" pitchFamily="34" charset="0"/>
+              <a:buChar char="•"/>
+            </a:pPr>
+            <a:r>
+              <a:rPr lang="en-US" altLang="zh-TW" sz="3200" dirty="0" smtClean="0">
+                <a:solidFill>
+                  <a:srgbClr val="C00000"/>
+                </a:solidFill>
+                <a:effectLst>
+                  <a:outerShdw blurRad="38100" dist="38100" dir="2700000" algn="tl">
+                    <a:srgbClr val="000000">
+                      <a:alpha val="43137"/>
+                    </a:srgbClr>
+                  </a:outerShdw>
+                </a:effectLst>
+                <a:latin typeface="微軟正黑體" panose="020B0604030504040204" pitchFamily="34" charset="-120"/>
+                <a:ea typeface="微軟正黑體" panose="020B0604030504040204" pitchFamily="34" charset="-120"/>
+              </a:rPr>
+              <a:t>WDM </a:t>
+            </a:r>
+            <a:r>
+              <a:rPr lang="en-US" altLang="zh-TW" sz="3200" dirty="0">
+                <a:solidFill>
+                  <a:srgbClr val="C00000"/>
+                </a:solidFill>
+                <a:effectLst>
+                  <a:outerShdw blurRad="38100" dist="38100" dir="2700000" algn="tl">
+                    <a:srgbClr val="000000">
+                      <a:alpha val="43137"/>
+                    </a:srgbClr>
+                  </a:outerShdw>
+                </a:effectLst>
+                <a:latin typeface="微軟正黑體" panose="020B0604030504040204" pitchFamily="34" charset="-120"/>
+                <a:ea typeface="微軟正黑體" panose="020B0604030504040204" pitchFamily="34" charset="-120"/>
+              </a:rPr>
+              <a:t>(Windows Driver Model</a:t>
+            </a:r>
+            <a:r>
+              <a:rPr lang="en-US" altLang="zh-TW" sz="3200" dirty="0" smtClean="0">
+                <a:solidFill>
+                  <a:srgbClr val="C00000"/>
+                </a:solidFill>
+                <a:effectLst>
+                  <a:outerShdw blurRad="38100" dist="38100" dir="2700000" algn="tl">
+                    <a:srgbClr val="000000">
+                      <a:alpha val="43137"/>
+                    </a:srgbClr>
+                  </a:outerShdw>
+                </a:effectLst>
+                <a:latin typeface="微軟正黑體" panose="020B0604030504040204" pitchFamily="34" charset="-120"/>
+                <a:ea typeface="微軟正黑體" panose="020B0604030504040204" pitchFamily="34" charset="-120"/>
+              </a:rPr>
+              <a:t>)</a:t>
+            </a:r>
+          </a:p>
+          <a:p>
+            <a:pPr marL="457200" indent="-457200">
+              <a:buFont typeface="Arial" panose="020B0604020202020204" pitchFamily="34" charset="0"/>
+              <a:buChar char="•"/>
+            </a:pPr>
+            <a:r>
+              <a:rPr lang="en-US" altLang="zh-TW" sz="3200" strike="sngStrike" dirty="0" smtClean="0">
+                <a:effectLst>
+                  <a:outerShdw blurRad="38100" dist="38100" dir="2700000" algn="tl">
+                    <a:srgbClr val="000000">
+                      <a:alpha val="43137"/>
+                    </a:srgbClr>
+                  </a:outerShdw>
+                </a:effectLst>
+                <a:latin typeface="微軟正黑體" panose="020B0604030504040204" pitchFamily="34" charset="-120"/>
+                <a:ea typeface="微軟正黑體" panose="020B0604030504040204" pitchFamily="34" charset="-120"/>
+              </a:rPr>
+              <a:t>WDF (Windows Driver Foundation)</a:t>
+            </a:r>
+          </a:p>
+          <a:p>
+            <a:pPr marL="914400" lvl="1" indent="-457200">
+              <a:buFont typeface="微軟正黑體" panose="020B0604030504040204" pitchFamily="34" charset="-120"/>
+              <a:buChar char="-"/>
+            </a:pPr>
+            <a:r>
+              <a:rPr lang="en-US" altLang="zh-TW" sz="3200" strike="sngStrike" dirty="0" smtClean="0">
+                <a:effectLst>
+                  <a:outerShdw blurRad="38100" dist="38100" dir="2700000" algn="tl">
+                    <a:srgbClr val="000000">
+                      <a:alpha val="43137"/>
+                    </a:srgbClr>
+                  </a:outerShdw>
+                </a:effectLst>
+                <a:latin typeface="微軟正黑體" panose="020B0604030504040204" pitchFamily="34" charset="-120"/>
+                <a:ea typeface="微軟正黑體" panose="020B0604030504040204" pitchFamily="34" charset="-120"/>
+              </a:rPr>
+              <a:t>KMDF (Kernel)</a:t>
+            </a:r>
+          </a:p>
+          <a:p>
+            <a:pPr marL="914400" lvl="1" indent="-457200">
+              <a:buFont typeface="微軟正黑體" panose="020B0604030504040204" pitchFamily="34" charset="-120"/>
+              <a:buChar char="-"/>
+            </a:pPr>
+            <a:r>
+              <a:rPr lang="en-US" altLang="zh-TW" sz="3200" strike="sngStrike" dirty="0" smtClean="0">
+                <a:effectLst>
+                  <a:outerShdw blurRad="38100" dist="38100" dir="2700000" algn="tl">
+                    <a:srgbClr val="000000">
+                      <a:alpha val="43137"/>
+                    </a:srgbClr>
+                  </a:outerShdw>
+                </a:effectLst>
+                <a:latin typeface="微軟正黑體" panose="020B0604030504040204" pitchFamily="34" charset="-120"/>
+                <a:ea typeface="微軟正黑體" panose="020B0604030504040204" pitchFamily="34" charset="-120"/>
+              </a:rPr>
+              <a:t>UMDF (User)</a:t>
+            </a:r>
+          </a:p>
+        </p:txBody>
+      </p:sp>
+    </p:spTree>
+    <p:extLst>
+      <p:ext uri="{BB962C8B-B14F-4D97-AF65-F5344CB8AC3E}">
+        <p14:creationId xmlns:p14="http://schemas.microsoft.com/office/powerpoint/2010/main" val="1414501025"/>
+      </p:ext>
+    </p:extLst>
+  </p:cSld>
+  <p:clrMapOvr>
+    <a:masterClrMapping/>
+  </p:clrMapOvr>
+  <p:timing>
+    <p:tnLst>
+      <p:par>
+        <p:cTn id="1" dur="indefinite" restart="never" nodeType="tmRoot"/>
+      </p:par>
+    </p:tnLst>
+  </p:timing>
+</p:sld>
+</file>
+
+<file path=ppt/slides/slide23.xml><?xml version="1.0" encoding="utf-8"?>
+<p:sld xmlns:a="http://schemas.openxmlformats.org/drawingml/2006/main" xmlns:r="http://schemas.openxmlformats.org/officeDocument/2006/relationships" xmlns:p="http://schemas.openxmlformats.org/presentationml/2006/main">
+  <p:cSld>
+    <p:spTree>
+      <p:nvGrpSpPr>
+        <p:cNvPr id="1" name=""/>
+        <p:cNvGrpSpPr/>
+        <p:nvPr/>
+      </p:nvGrpSpPr>
+      <p:grpSpPr>
+        <a:xfrm>
+          <a:off x="0" y="0"/>
+          <a:ext cx="0" cy="0"/>
+          <a:chOff x="0" y="0"/>
+          <a:chExt cx="0" cy="0"/>
+        </a:xfrm>
+      </p:grpSpPr>
+      <p:sp>
+        <p:nvSpPr>
+          <p:cNvPr id="4" name="文字方塊 3"/>
+          <p:cNvSpPr txBox="1"/>
+          <p:nvPr/>
+        </p:nvSpPr>
+        <p:spPr>
+          <a:xfrm>
+            <a:off x="9083040" y="6334780"/>
+            <a:ext cx="3108960" cy="523220"/>
+          </a:xfrm>
+          <a:prstGeom prst="rect">
+            <a:avLst/>
+          </a:prstGeom>
+          <a:noFill/>
+        </p:spPr>
+        <p:txBody>
+          <a:bodyPr wrap="square" rtlCol="0">
+            <a:spAutoFit/>
+          </a:bodyPr>
+          <a:lstStyle/>
+          <a:p>
+            <a:r>
+              <a:rPr lang="zh-TW" altLang="en-US" sz="2800" b="1" dirty="0" smtClean="0">
+                <a:effectLst>
+                  <a:outerShdw blurRad="38100" dist="38100" dir="2700000" algn="tl">
+                    <a:srgbClr val="000000">
+                      <a:alpha val="43137"/>
+                    </a:srgbClr>
+                  </a:outerShdw>
+                </a:effectLst>
+                <a:latin typeface="微軟正黑體" panose="020B0604030504040204" pitchFamily="34" charset="-120"/>
+                <a:ea typeface="微軟正黑體" panose="020B0604030504040204" pitchFamily="34" charset="-120"/>
+              </a:rPr>
+              <a:t>驅動程式基礎架構</a:t>
+            </a:r>
+            <a:endParaRPr lang="zh-TW" altLang="en-US" sz="2800" b="1" dirty="0">
+              <a:effectLst>
+                <a:outerShdw blurRad="38100" dist="38100" dir="2700000" algn="tl">
+                  <a:srgbClr val="000000">
+                    <a:alpha val="43137"/>
+                  </a:srgbClr>
+                </a:outerShdw>
+              </a:effectLst>
+              <a:latin typeface="微軟正黑體" panose="020B0604030504040204" pitchFamily="34" charset="-120"/>
+              <a:ea typeface="微軟正黑體" panose="020B0604030504040204" pitchFamily="34" charset="-120"/>
+            </a:endParaRPr>
+          </a:p>
+        </p:txBody>
+      </p:sp>
+      <p:sp>
+        <p:nvSpPr>
+          <p:cNvPr id="5" name="文字方塊 4"/>
+          <p:cNvSpPr txBox="1"/>
+          <p:nvPr/>
+        </p:nvSpPr>
+        <p:spPr>
+          <a:xfrm>
+            <a:off x="4998722" y="1142834"/>
+            <a:ext cx="2873827" cy="646331"/>
+          </a:xfrm>
+          <a:prstGeom prst="rect">
+            <a:avLst/>
+          </a:prstGeom>
+          <a:noFill/>
+        </p:spPr>
+        <p:txBody>
+          <a:bodyPr wrap="square" rtlCol="0">
+            <a:spAutoFit/>
+          </a:bodyPr>
+          <a:lstStyle/>
+          <a:p>
+            <a:r>
+              <a:rPr lang="en-US" altLang="zh-TW" sz="3600" dirty="0" smtClean="0">
+                <a:effectLst>
+                  <a:outerShdw blurRad="38100" dist="38100" dir="2700000" algn="tl">
+                    <a:srgbClr val="000000">
+                      <a:alpha val="43137"/>
+                    </a:srgbClr>
+                  </a:outerShdw>
+                </a:effectLst>
+                <a:latin typeface="微軟正黑體" panose="020B0604030504040204" pitchFamily="34" charset="-120"/>
+                <a:ea typeface="微軟正黑體" panose="020B0604030504040204" pitchFamily="34" charset="-120"/>
+              </a:rPr>
+              <a:t>NT &amp; WDM</a:t>
+            </a:r>
+          </a:p>
+        </p:txBody>
+      </p:sp>
+      <p:graphicFrame>
+        <p:nvGraphicFramePr>
+          <p:cNvPr id="3" name="表格 2"/>
+          <p:cNvGraphicFramePr>
+            <a:graphicFrameLocks noGrp="1"/>
+          </p:cNvGraphicFramePr>
+          <p:nvPr>
+            <p:extLst>
+              <p:ext uri="{D42A27DB-BD31-4B8C-83A1-F6EECF244321}">
+                <p14:modId xmlns:p14="http://schemas.microsoft.com/office/powerpoint/2010/main" val="1801849318"/>
+              </p:ext>
+            </p:extLst>
+          </p:nvPr>
+        </p:nvGraphicFramePr>
+        <p:xfrm>
+          <a:off x="2415176" y="2682240"/>
+          <a:ext cx="8127999" cy="1112520"/>
+        </p:xfrm>
+        <a:graphic>
+          <a:graphicData uri="http://schemas.openxmlformats.org/drawingml/2006/table">
+            <a:tbl>
+              <a:tblPr firstRow="1" bandRow="1">
+                <a:tableStyleId>{073A0DAA-6AF3-43AB-8588-CEC1D06C72B9}</a:tableStyleId>
+              </a:tblPr>
+              <a:tblGrid>
+                <a:gridCol w="2709333"/>
+                <a:gridCol w="2709333"/>
+                <a:gridCol w="2709333"/>
+              </a:tblGrid>
+              <a:tr h="370840">
+                <a:tc>
+                  <a:txBody>
+                    <a:bodyPr/>
+                    <a:lstStyle/>
+                    <a:p>
+                      <a:pPr algn="ctr"/>
+                      <a:endParaRPr lang="zh-TW" altLang="en-US" dirty="0">
+                        <a:latin typeface="微軟正黑體" panose="020B0604030504040204" pitchFamily="34" charset="-120"/>
+                        <a:ea typeface="微軟正黑體" panose="020B0604030504040204" pitchFamily="34" charset="-120"/>
+                      </a:endParaRPr>
+                    </a:p>
+                  </a:txBody>
+                  <a:tcPr/>
+                </a:tc>
+                <a:tc>
+                  <a:txBody>
+                    <a:bodyPr/>
+                    <a:lstStyle/>
+                    <a:p>
+                      <a:pPr algn="ctr"/>
+                      <a:r>
+                        <a:rPr lang="en-US" altLang="zh-TW" dirty="0" smtClean="0">
+                          <a:latin typeface="微軟正黑體" panose="020B0604030504040204" pitchFamily="34" charset="-120"/>
+                          <a:ea typeface="微軟正黑體" panose="020B0604030504040204" pitchFamily="34" charset="-120"/>
+                        </a:rPr>
+                        <a:t>NT</a:t>
+                      </a:r>
+                      <a:endParaRPr lang="zh-TW" altLang="en-US" dirty="0">
+                        <a:latin typeface="微軟正黑體" panose="020B0604030504040204" pitchFamily="34" charset="-120"/>
+                        <a:ea typeface="微軟正黑體" panose="020B0604030504040204" pitchFamily="34" charset="-120"/>
+                      </a:endParaRPr>
+                    </a:p>
+                  </a:txBody>
+                  <a:tcPr/>
+                </a:tc>
+                <a:tc>
+                  <a:txBody>
+                    <a:bodyPr/>
+                    <a:lstStyle/>
+                    <a:p>
+                      <a:pPr algn="ctr"/>
+                      <a:r>
+                        <a:rPr lang="en-US" altLang="zh-TW" b="1" dirty="0" smtClean="0">
+                          <a:effectLst/>
+                          <a:latin typeface="微軟正黑體" panose="020B0604030504040204" pitchFamily="34" charset="-120"/>
+                          <a:ea typeface="微軟正黑體" panose="020B0604030504040204" pitchFamily="34" charset="-120"/>
+                        </a:rPr>
+                        <a:t>WDM</a:t>
+                      </a:r>
+                      <a:endParaRPr lang="zh-TW" altLang="en-US" b="1" dirty="0">
+                        <a:effectLst/>
+                        <a:latin typeface="微軟正黑體" panose="020B0604030504040204" pitchFamily="34" charset="-120"/>
+                        <a:ea typeface="微軟正黑體" panose="020B0604030504040204" pitchFamily="34" charset="-120"/>
+                      </a:endParaRPr>
+                    </a:p>
+                  </a:txBody>
+                  <a:tcPr/>
+                </a:tc>
+              </a:tr>
+              <a:tr h="370840">
+                <a:tc>
+                  <a:txBody>
+                    <a:bodyPr/>
+                    <a:lstStyle/>
+                    <a:p>
+                      <a:pPr algn="ctr"/>
+                      <a:r>
+                        <a:rPr lang="en-US" altLang="zh-TW" b="0" dirty="0" smtClean="0">
+                          <a:effectLst>
+                            <a:outerShdw blurRad="38100" dist="38100" dir="2700000" algn="tl">
+                              <a:srgbClr val="000000">
+                                <a:alpha val="43137"/>
+                              </a:srgbClr>
+                            </a:outerShdw>
+                          </a:effectLst>
+                          <a:latin typeface="微軟正黑體" panose="020B0604030504040204" pitchFamily="34" charset="-120"/>
+                          <a:ea typeface="微軟正黑體" panose="020B0604030504040204" pitchFamily="34" charset="-120"/>
+                        </a:rPr>
+                        <a:t>Header</a:t>
+                      </a:r>
+                      <a:endParaRPr lang="zh-TW" altLang="en-US" b="0" dirty="0">
+                        <a:effectLst>
+                          <a:outerShdw blurRad="38100" dist="38100" dir="2700000" algn="tl">
+                            <a:srgbClr val="000000">
+                              <a:alpha val="43137"/>
+                            </a:srgbClr>
+                          </a:outerShdw>
+                        </a:effectLst>
+                        <a:latin typeface="微軟正黑體" panose="020B0604030504040204" pitchFamily="34" charset="-120"/>
+                        <a:ea typeface="微軟正黑體" panose="020B0604030504040204" pitchFamily="34" charset="-120"/>
+                      </a:endParaRPr>
+                    </a:p>
+                  </a:txBody>
+                  <a:tcPr/>
+                </a:tc>
+                <a:tc>
+                  <a:txBody>
+                    <a:bodyPr/>
+                    <a:lstStyle/>
+                    <a:p>
+                      <a:pPr algn="ctr"/>
+                      <a:r>
+                        <a:rPr lang="en-US" altLang="zh-TW" dirty="0" err="1" smtClean="0">
+                          <a:latin typeface="微軟正黑體" panose="020B0604030504040204" pitchFamily="34" charset="-120"/>
+                          <a:ea typeface="微軟正黑體" panose="020B0604030504040204" pitchFamily="34" charset="-120"/>
+                        </a:rPr>
+                        <a:t>ntddk.h</a:t>
+                      </a:r>
+                      <a:endParaRPr lang="zh-TW" altLang="en-US" dirty="0">
+                        <a:latin typeface="微軟正黑體" panose="020B0604030504040204" pitchFamily="34" charset="-120"/>
+                        <a:ea typeface="微軟正黑體" panose="020B0604030504040204" pitchFamily="34" charset="-120"/>
+                      </a:endParaRPr>
+                    </a:p>
+                  </a:txBody>
+                  <a:tcPr/>
+                </a:tc>
+                <a:tc>
+                  <a:txBody>
+                    <a:bodyPr/>
+                    <a:lstStyle/>
+                    <a:p>
+                      <a:pPr algn="ctr"/>
+                      <a:r>
+                        <a:rPr lang="en-US" altLang="zh-TW" dirty="0" err="1" smtClean="0">
+                          <a:latin typeface="微軟正黑體" panose="020B0604030504040204" pitchFamily="34" charset="-120"/>
+                          <a:ea typeface="微軟正黑體" panose="020B0604030504040204" pitchFamily="34" charset="-120"/>
+                        </a:rPr>
+                        <a:t>wdm.h</a:t>
+                      </a:r>
+                      <a:endParaRPr lang="zh-TW" altLang="en-US" dirty="0">
+                        <a:latin typeface="微軟正黑體" panose="020B0604030504040204" pitchFamily="34" charset="-120"/>
+                        <a:ea typeface="微軟正黑體" panose="020B0604030504040204" pitchFamily="34" charset="-120"/>
+                      </a:endParaRPr>
+                    </a:p>
+                  </a:txBody>
+                  <a:tcPr/>
+                </a:tc>
+              </a:tr>
+              <a:tr h="370840">
+                <a:tc>
+                  <a:txBody>
+                    <a:bodyPr/>
+                    <a:lstStyle/>
+                    <a:p>
+                      <a:pPr algn="ctr"/>
+                      <a:r>
+                        <a:rPr lang="en-US" altLang="zh-TW" b="1" dirty="0" smtClean="0">
+                          <a:effectLst/>
+                          <a:latin typeface="微軟正黑體" panose="020B0604030504040204" pitchFamily="34" charset="-120"/>
+                          <a:ea typeface="微軟正黑體" panose="020B0604030504040204" pitchFamily="34" charset="-120"/>
+                        </a:rPr>
+                        <a:t>PnP / Power / WMI</a:t>
+                      </a:r>
+                      <a:endParaRPr lang="zh-TW" altLang="en-US" b="1" dirty="0">
+                        <a:effectLst/>
+                        <a:latin typeface="微軟正黑體" panose="020B0604030504040204" pitchFamily="34" charset="-120"/>
+                        <a:ea typeface="微軟正黑體" panose="020B0604030504040204" pitchFamily="34" charset="-120"/>
+                      </a:endParaRPr>
+                    </a:p>
+                  </a:txBody>
+                  <a:tcPr/>
+                </a:tc>
+                <a:tc>
+                  <a:txBody>
+                    <a:bodyPr/>
+                    <a:lstStyle/>
+                    <a:p>
+                      <a:pPr algn="ctr"/>
+                      <a:r>
+                        <a:rPr lang="en-US" altLang="zh-TW" dirty="0" smtClean="0">
+                          <a:latin typeface="微軟正黑體" panose="020B0604030504040204" pitchFamily="34" charset="-120"/>
+                          <a:ea typeface="微軟正黑體" panose="020B0604030504040204" pitchFamily="34" charset="-120"/>
+                        </a:rPr>
+                        <a:t>X</a:t>
+                      </a:r>
+                      <a:endParaRPr lang="zh-TW" altLang="en-US" dirty="0">
+                        <a:latin typeface="微軟正黑體" panose="020B0604030504040204" pitchFamily="34" charset="-120"/>
+                        <a:ea typeface="微軟正黑體" panose="020B0604030504040204" pitchFamily="34" charset="-120"/>
+                      </a:endParaRPr>
+                    </a:p>
+                  </a:txBody>
+                  <a:tcPr/>
+                </a:tc>
+                <a:tc>
+                  <a:txBody>
+                    <a:bodyPr/>
+                    <a:lstStyle/>
+                    <a:p>
+                      <a:pPr algn="ctr"/>
+                      <a:r>
+                        <a:rPr lang="en-US" altLang="zh-TW" dirty="0" smtClean="0">
+                          <a:latin typeface="微軟正黑體" panose="020B0604030504040204" pitchFamily="34" charset="-120"/>
+                          <a:ea typeface="微軟正黑體" panose="020B0604030504040204" pitchFamily="34" charset="-120"/>
+                        </a:rPr>
+                        <a:t>O</a:t>
+                      </a:r>
+                      <a:endParaRPr lang="zh-TW" altLang="en-US" dirty="0">
+                        <a:latin typeface="微軟正黑體" panose="020B0604030504040204" pitchFamily="34" charset="-120"/>
+                        <a:ea typeface="微軟正黑體" panose="020B0604030504040204" pitchFamily="34" charset="-120"/>
+                      </a:endParaRPr>
+                    </a:p>
+                  </a:txBody>
+                  <a:tcPr/>
+                </a:tc>
+              </a:tr>
+            </a:tbl>
+          </a:graphicData>
+        </a:graphic>
+      </p:graphicFrame>
+    </p:spTree>
+    <p:extLst>
+      <p:ext uri="{BB962C8B-B14F-4D97-AF65-F5344CB8AC3E}">
+        <p14:creationId xmlns:p14="http://schemas.microsoft.com/office/powerpoint/2010/main" val="2754759484"/>
+      </p:ext>
+    </p:extLst>
+  </p:cSld>
+  <p:clrMapOvr>
+    <a:masterClrMapping/>
+  </p:clrMapOvr>
+  <p:timing>
+    <p:tnLst>
+      <p:par>
+        <p:cTn id="1" dur="indefinite" restart="never" nodeType="tmRoot"/>
+      </p:par>
+    </p:tnLst>
+  </p:timing>
+</p:sld>
+</file>
+
+<file path=ppt/slides/slide24.xml><?xml version="1.0" encoding="utf-8"?>
+<p:sld xmlns:a="http://schemas.openxmlformats.org/drawingml/2006/main" xmlns:r="http://schemas.openxmlformats.org/officeDocument/2006/relationships" xmlns:p="http://schemas.openxmlformats.org/presentationml/2006/main">
+  <p:cSld>
+    <p:spTree>
+      <p:nvGrpSpPr>
+        <p:cNvPr id="1" name=""/>
+        <p:cNvGrpSpPr/>
+        <p:nvPr/>
+      </p:nvGrpSpPr>
+      <p:grpSpPr>
+        <a:xfrm>
+          <a:off x="0" y="0"/>
+          <a:ext cx="0" cy="0"/>
+          <a:chOff x="0" y="0"/>
+          <a:chExt cx="0" cy="0"/>
+        </a:xfrm>
+      </p:grpSpPr>
+      <p:sp>
+        <p:nvSpPr>
+          <p:cNvPr id="4" name="文字方塊 3"/>
+          <p:cNvSpPr txBox="1"/>
+          <p:nvPr/>
+        </p:nvSpPr>
+        <p:spPr>
+          <a:xfrm>
+            <a:off x="9083040" y="6334780"/>
+            <a:ext cx="3108960" cy="523220"/>
+          </a:xfrm>
+          <a:prstGeom prst="rect">
+            <a:avLst/>
+          </a:prstGeom>
+          <a:noFill/>
+        </p:spPr>
+        <p:txBody>
+          <a:bodyPr wrap="square" rtlCol="0">
+            <a:spAutoFit/>
+          </a:bodyPr>
+          <a:lstStyle/>
+          <a:p>
+            <a:r>
+              <a:rPr lang="zh-TW" altLang="en-US" sz="2800" b="1" dirty="0" smtClean="0">
+                <a:effectLst>
+                  <a:outerShdw blurRad="38100" dist="38100" dir="2700000" algn="tl">
+                    <a:srgbClr val="000000">
+                      <a:alpha val="43137"/>
+                    </a:srgbClr>
+                  </a:outerShdw>
+                </a:effectLst>
+                <a:latin typeface="微軟正黑體" panose="020B0604030504040204" pitchFamily="34" charset="-120"/>
+                <a:ea typeface="微軟正黑體" panose="020B0604030504040204" pitchFamily="34" charset="-120"/>
+              </a:rPr>
+              <a:t>驅動程式基礎架構</a:t>
+            </a:r>
+            <a:endParaRPr lang="zh-TW" altLang="en-US" sz="2800" b="1" dirty="0">
+              <a:effectLst>
+                <a:outerShdw blurRad="38100" dist="38100" dir="2700000" algn="tl">
+                  <a:srgbClr val="000000">
+                    <a:alpha val="43137"/>
+                  </a:srgbClr>
+                </a:outerShdw>
+              </a:effectLst>
+              <a:latin typeface="微軟正黑體" panose="020B0604030504040204" pitchFamily="34" charset="-120"/>
+              <a:ea typeface="微軟正黑體" panose="020B0604030504040204" pitchFamily="34" charset="-120"/>
+            </a:endParaRPr>
+          </a:p>
+        </p:txBody>
+      </p:sp>
+      <p:sp>
+        <p:nvSpPr>
+          <p:cNvPr id="5" name="文字方塊 4"/>
+          <p:cNvSpPr txBox="1"/>
+          <p:nvPr/>
+        </p:nvSpPr>
+        <p:spPr>
+          <a:xfrm>
+            <a:off x="4998722" y="1142834"/>
+            <a:ext cx="2873827" cy="646331"/>
+          </a:xfrm>
+          <a:prstGeom prst="rect">
+            <a:avLst/>
+          </a:prstGeom>
+          <a:noFill/>
+        </p:spPr>
+        <p:txBody>
+          <a:bodyPr wrap="square" rtlCol="0">
+            <a:spAutoFit/>
+          </a:bodyPr>
+          <a:lstStyle/>
+          <a:p>
+            <a:r>
+              <a:rPr lang="en-US" altLang="zh-TW" sz="3600" dirty="0" smtClean="0">
+                <a:effectLst>
+                  <a:outerShdw blurRad="38100" dist="38100" dir="2700000" algn="tl">
+                    <a:srgbClr val="000000">
+                      <a:alpha val="43137"/>
+                    </a:srgbClr>
+                  </a:outerShdw>
+                </a:effectLst>
+                <a:latin typeface="微軟正黑體" panose="020B0604030504040204" pitchFamily="34" charset="-120"/>
+                <a:ea typeface="微軟正黑體" panose="020B0604030504040204" pitchFamily="34" charset="-120"/>
+              </a:rPr>
+              <a:t>NT &amp; WDM</a:t>
+            </a:r>
+          </a:p>
+        </p:txBody>
+      </p:sp>
+      <p:graphicFrame>
+        <p:nvGraphicFramePr>
+          <p:cNvPr id="3" name="表格 2"/>
+          <p:cNvGraphicFramePr>
+            <a:graphicFrameLocks noGrp="1"/>
+          </p:cNvGraphicFramePr>
+          <p:nvPr/>
+        </p:nvGraphicFramePr>
+        <p:xfrm>
+          <a:off x="2415176" y="2682240"/>
+          <a:ext cx="8127999" cy="1112520"/>
+        </p:xfrm>
+        <a:graphic>
+          <a:graphicData uri="http://schemas.openxmlformats.org/drawingml/2006/table">
+            <a:tbl>
+              <a:tblPr firstRow="1" bandRow="1">
+                <a:tableStyleId>{073A0DAA-6AF3-43AB-8588-CEC1D06C72B9}</a:tableStyleId>
+              </a:tblPr>
+              <a:tblGrid>
+                <a:gridCol w="2709333"/>
+                <a:gridCol w="2709333"/>
+                <a:gridCol w="2709333"/>
+              </a:tblGrid>
+              <a:tr h="370840">
+                <a:tc>
+                  <a:txBody>
+                    <a:bodyPr/>
+                    <a:lstStyle/>
+                    <a:p>
+                      <a:pPr algn="ctr"/>
+                      <a:endParaRPr lang="zh-TW" altLang="en-US" dirty="0">
+                        <a:latin typeface="微軟正黑體" panose="020B0604030504040204" pitchFamily="34" charset="-120"/>
+                        <a:ea typeface="微軟正黑體" panose="020B0604030504040204" pitchFamily="34" charset="-120"/>
+                      </a:endParaRPr>
+                    </a:p>
+                  </a:txBody>
+                  <a:tcPr/>
+                </a:tc>
+                <a:tc>
+                  <a:txBody>
+                    <a:bodyPr/>
+                    <a:lstStyle/>
+                    <a:p>
+                      <a:pPr algn="ctr"/>
+                      <a:r>
+                        <a:rPr lang="en-US" altLang="zh-TW" dirty="0" smtClean="0">
+                          <a:latin typeface="微軟正黑體" panose="020B0604030504040204" pitchFamily="34" charset="-120"/>
+                          <a:ea typeface="微軟正黑體" panose="020B0604030504040204" pitchFamily="34" charset="-120"/>
+                        </a:rPr>
+                        <a:t>NT</a:t>
+                      </a:r>
+                      <a:endParaRPr lang="zh-TW" altLang="en-US" dirty="0">
+                        <a:latin typeface="微軟正黑體" panose="020B0604030504040204" pitchFamily="34" charset="-120"/>
+                        <a:ea typeface="微軟正黑體" panose="020B0604030504040204" pitchFamily="34" charset="-120"/>
+                      </a:endParaRPr>
+                    </a:p>
+                  </a:txBody>
+                  <a:tcPr/>
+                </a:tc>
+                <a:tc>
+                  <a:txBody>
+                    <a:bodyPr/>
+                    <a:lstStyle/>
+                    <a:p>
+                      <a:pPr algn="ctr"/>
+                      <a:r>
+                        <a:rPr lang="en-US" altLang="zh-TW" b="1" dirty="0" smtClean="0">
+                          <a:effectLst/>
+                          <a:latin typeface="微軟正黑體" panose="020B0604030504040204" pitchFamily="34" charset="-120"/>
+                          <a:ea typeface="微軟正黑體" panose="020B0604030504040204" pitchFamily="34" charset="-120"/>
+                        </a:rPr>
+                        <a:t>WDM</a:t>
+                      </a:r>
+                      <a:endParaRPr lang="zh-TW" altLang="en-US" b="1" dirty="0">
+                        <a:effectLst/>
+                        <a:latin typeface="微軟正黑體" panose="020B0604030504040204" pitchFamily="34" charset="-120"/>
+                        <a:ea typeface="微軟正黑體" panose="020B0604030504040204" pitchFamily="34" charset="-120"/>
+                      </a:endParaRPr>
+                    </a:p>
+                  </a:txBody>
+                  <a:tcPr/>
+                </a:tc>
+              </a:tr>
+              <a:tr h="370840">
+                <a:tc>
+                  <a:txBody>
+                    <a:bodyPr/>
+                    <a:lstStyle/>
+                    <a:p>
+                      <a:pPr algn="ctr"/>
+                      <a:r>
+                        <a:rPr lang="en-US" altLang="zh-TW" b="0" dirty="0" smtClean="0">
+                          <a:effectLst>
+                            <a:outerShdw blurRad="38100" dist="38100" dir="2700000" algn="tl">
+                              <a:srgbClr val="000000">
+                                <a:alpha val="43137"/>
+                              </a:srgbClr>
+                            </a:outerShdw>
+                          </a:effectLst>
+                          <a:latin typeface="微軟正黑體" panose="020B0604030504040204" pitchFamily="34" charset="-120"/>
+                          <a:ea typeface="微軟正黑體" panose="020B0604030504040204" pitchFamily="34" charset="-120"/>
+                        </a:rPr>
+                        <a:t>Header</a:t>
+                      </a:r>
+                      <a:endParaRPr lang="zh-TW" altLang="en-US" b="0" dirty="0">
+                        <a:effectLst>
+                          <a:outerShdw blurRad="38100" dist="38100" dir="2700000" algn="tl">
+                            <a:srgbClr val="000000">
+                              <a:alpha val="43137"/>
+                            </a:srgbClr>
+                          </a:outerShdw>
+                        </a:effectLst>
+                        <a:latin typeface="微軟正黑體" panose="020B0604030504040204" pitchFamily="34" charset="-120"/>
+                        <a:ea typeface="微軟正黑體" panose="020B0604030504040204" pitchFamily="34" charset="-120"/>
+                      </a:endParaRPr>
+                    </a:p>
+                  </a:txBody>
+                  <a:tcPr/>
+                </a:tc>
+                <a:tc>
+                  <a:txBody>
+                    <a:bodyPr/>
+                    <a:lstStyle/>
+                    <a:p>
+                      <a:pPr algn="ctr"/>
+                      <a:r>
+                        <a:rPr lang="en-US" altLang="zh-TW" dirty="0" err="1" smtClean="0">
+                          <a:latin typeface="微軟正黑體" panose="020B0604030504040204" pitchFamily="34" charset="-120"/>
+                          <a:ea typeface="微軟正黑體" panose="020B0604030504040204" pitchFamily="34" charset="-120"/>
+                        </a:rPr>
+                        <a:t>ntddk.h</a:t>
+                      </a:r>
+                      <a:endParaRPr lang="zh-TW" altLang="en-US" dirty="0">
+                        <a:latin typeface="微軟正黑體" panose="020B0604030504040204" pitchFamily="34" charset="-120"/>
+                        <a:ea typeface="微軟正黑體" panose="020B0604030504040204" pitchFamily="34" charset="-120"/>
+                      </a:endParaRPr>
+                    </a:p>
+                  </a:txBody>
+                  <a:tcPr/>
+                </a:tc>
+                <a:tc>
+                  <a:txBody>
+                    <a:bodyPr/>
+                    <a:lstStyle/>
+                    <a:p>
+                      <a:pPr algn="ctr"/>
+                      <a:r>
+                        <a:rPr lang="en-US" altLang="zh-TW" dirty="0" err="1" smtClean="0">
+                          <a:latin typeface="微軟正黑體" panose="020B0604030504040204" pitchFamily="34" charset="-120"/>
+                          <a:ea typeface="微軟正黑體" panose="020B0604030504040204" pitchFamily="34" charset="-120"/>
+                        </a:rPr>
+                        <a:t>wdm.h</a:t>
+                      </a:r>
+                      <a:endParaRPr lang="zh-TW" altLang="en-US" dirty="0">
+                        <a:latin typeface="微軟正黑體" panose="020B0604030504040204" pitchFamily="34" charset="-120"/>
+                        <a:ea typeface="微軟正黑體" panose="020B0604030504040204" pitchFamily="34" charset="-120"/>
+                      </a:endParaRPr>
+                    </a:p>
+                  </a:txBody>
+                  <a:tcPr/>
+                </a:tc>
+              </a:tr>
+              <a:tr h="370840">
+                <a:tc>
+                  <a:txBody>
+                    <a:bodyPr/>
+                    <a:lstStyle/>
+                    <a:p>
+                      <a:pPr algn="ctr"/>
+                      <a:r>
+                        <a:rPr lang="en-US" altLang="zh-TW" b="1" dirty="0" smtClean="0">
+                          <a:effectLst/>
+                          <a:latin typeface="微軟正黑體" panose="020B0604030504040204" pitchFamily="34" charset="-120"/>
+                          <a:ea typeface="微軟正黑體" panose="020B0604030504040204" pitchFamily="34" charset="-120"/>
+                        </a:rPr>
+                        <a:t>PnP / Power / WMI</a:t>
+                      </a:r>
+                      <a:endParaRPr lang="zh-TW" altLang="en-US" b="1" dirty="0">
+                        <a:effectLst/>
+                        <a:latin typeface="微軟正黑體" panose="020B0604030504040204" pitchFamily="34" charset="-120"/>
+                        <a:ea typeface="微軟正黑體" panose="020B0604030504040204" pitchFamily="34" charset="-120"/>
+                      </a:endParaRPr>
+                    </a:p>
+                  </a:txBody>
+                  <a:tcPr/>
+                </a:tc>
+                <a:tc>
+                  <a:txBody>
+                    <a:bodyPr/>
+                    <a:lstStyle/>
+                    <a:p>
+                      <a:pPr algn="ctr"/>
+                      <a:r>
+                        <a:rPr lang="en-US" altLang="zh-TW" dirty="0" smtClean="0">
+                          <a:latin typeface="微軟正黑體" panose="020B0604030504040204" pitchFamily="34" charset="-120"/>
+                          <a:ea typeface="微軟正黑體" panose="020B0604030504040204" pitchFamily="34" charset="-120"/>
+                        </a:rPr>
+                        <a:t>X</a:t>
+                      </a:r>
+                      <a:endParaRPr lang="zh-TW" altLang="en-US" dirty="0">
+                        <a:latin typeface="微軟正黑體" panose="020B0604030504040204" pitchFamily="34" charset="-120"/>
+                        <a:ea typeface="微軟正黑體" panose="020B0604030504040204" pitchFamily="34" charset="-120"/>
+                      </a:endParaRPr>
+                    </a:p>
+                  </a:txBody>
+                  <a:tcPr/>
+                </a:tc>
+                <a:tc>
+                  <a:txBody>
+                    <a:bodyPr/>
+                    <a:lstStyle/>
+                    <a:p>
+                      <a:pPr algn="ctr"/>
+                      <a:r>
+                        <a:rPr lang="en-US" altLang="zh-TW" dirty="0" smtClean="0">
+                          <a:latin typeface="微軟正黑體" panose="020B0604030504040204" pitchFamily="34" charset="-120"/>
+                          <a:ea typeface="微軟正黑體" panose="020B0604030504040204" pitchFamily="34" charset="-120"/>
+                        </a:rPr>
+                        <a:t>O</a:t>
+                      </a:r>
+                      <a:endParaRPr lang="zh-TW" altLang="en-US" dirty="0">
+                        <a:latin typeface="微軟正黑體" panose="020B0604030504040204" pitchFamily="34" charset="-120"/>
+                        <a:ea typeface="微軟正黑體" panose="020B0604030504040204" pitchFamily="34" charset="-120"/>
+                      </a:endParaRPr>
+                    </a:p>
+                  </a:txBody>
+                  <a:tcPr/>
+                </a:tc>
+              </a:tr>
+            </a:tbl>
+          </a:graphicData>
+        </a:graphic>
+      </p:graphicFrame>
+      <p:cxnSp>
+        <p:nvCxnSpPr>
+          <p:cNvPr id="6" name="直線單箭頭接點 5"/>
+          <p:cNvCxnSpPr/>
+          <p:nvPr/>
+        </p:nvCxnSpPr>
+        <p:spPr>
+          <a:xfrm>
+            <a:off x="3788229" y="3738880"/>
+            <a:ext cx="513805" cy="670560"/>
+          </a:xfrm>
+          <a:prstGeom prst="straightConnector1">
+            <a:avLst/>
+          </a:prstGeom>
+          <a:ln w="38100">
+            <a:solidFill>
+              <a:srgbClr val="C00000"/>
+            </a:solidFill>
+            <a:tailEnd type="triangle"/>
+          </a:ln>
+        </p:spPr>
+        <p:style>
+          <a:lnRef idx="1">
+            <a:schemeClr val="accent1"/>
+          </a:lnRef>
+          <a:fillRef idx="0">
+            <a:schemeClr val="accent1"/>
+          </a:fillRef>
+          <a:effectRef idx="0">
+            <a:schemeClr val="accent1"/>
+          </a:effectRef>
+          <a:fontRef idx="minor">
+            <a:schemeClr val="tx1"/>
+          </a:fontRef>
+        </p:style>
+      </p:cxnSp>
+      <p:sp>
+        <p:nvSpPr>
+          <p:cNvPr id="8" name="文字方塊 7"/>
+          <p:cNvSpPr txBox="1"/>
+          <p:nvPr/>
+        </p:nvSpPr>
+        <p:spPr>
+          <a:xfrm>
+            <a:off x="3637280" y="4368800"/>
+            <a:ext cx="2458720" cy="923330"/>
+          </a:xfrm>
+          <a:prstGeom prst="rect">
+            <a:avLst/>
+          </a:prstGeom>
+          <a:noFill/>
+        </p:spPr>
+        <p:txBody>
+          <a:bodyPr wrap="square" rtlCol="0">
+            <a:spAutoFit/>
+          </a:bodyPr>
+          <a:lstStyle/>
+          <a:p>
+            <a:r>
+              <a:rPr lang="en-US" altLang="zh-TW" b="1" dirty="0" err="1" smtClean="0">
+                <a:effectLst>
+                  <a:outerShdw blurRad="38100" dist="38100" dir="2700000" algn="tl">
+                    <a:srgbClr val="000000">
+                      <a:alpha val="43137"/>
+                    </a:srgbClr>
+                  </a:outerShdw>
+                </a:effectLst>
+                <a:latin typeface="微軟正黑體" panose="020B0604030504040204" pitchFamily="34" charset="-120"/>
+                <a:ea typeface="微軟正黑體" panose="020B0604030504040204" pitchFamily="34" charset="-120"/>
+              </a:rPr>
+              <a:t>AddDevice</a:t>
+            </a:r>
+            <a:endParaRPr lang="en-US" altLang="zh-TW" b="1" dirty="0" smtClean="0">
+              <a:effectLst>
+                <a:outerShdw blurRad="38100" dist="38100" dir="2700000" algn="tl">
+                  <a:srgbClr val="000000">
+                    <a:alpha val="43137"/>
+                  </a:srgbClr>
+                </a:outerShdw>
+              </a:effectLst>
+              <a:latin typeface="微軟正黑體" panose="020B0604030504040204" pitchFamily="34" charset="-120"/>
+              <a:ea typeface="微軟正黑體" panose="020B0604030504040204" pitchFamily="34" charset="-120"/>
+            </a:endParaRPr>
+          </a:p>
+          <a:p>
+            <a:r>
+              <a:rPr lang="en-US" altLang="zh-TW" b="1" dirty="0" smtClean="0">
+                <a:effectLst>
+                  <a:outerShdw blurRad="38100" dist="38100" dir="2700000" algn="tl">
+                    <a:srgbClr val="000000">
+                      <a:alpha val="43137"/>
+                    </a:srgbClr>
+                  </a:outerShdw>
+                </a:effectLst>
+                <a:latin typeface="微軟正黑體" panose="020B0604030504040204" pitchFamily="34" charset="-120"/>
+                <a:ea typeface="微軟正黑體" panose="020B0604030504040204" pitchFamily="34" charset="-120"/>
+              </a:rPr>
+              <a:t>IRP_MJ_PNP</a:t>
+            </a:r>
+          </a:p>
+          <a:p>
+            <a:endParaRPr lang="en-US" altLang="zh-TW" dirty="0" smtClean="0">
+              <a:latin typeface="微軟正黑體" panose="020B0604030504040204" pitchFamily="34" charset="-120"/>
+              <a:ea typeface="微軟正黑體" panose="020B0604030504040204" pitchFamily="34" charset="-120"/>
+            </a:endParaRPr>
+          </a:p>
+        </p:txBody>
+      </p:sp>
+    </p:spTree>
+    <p:extLst>
+      <p:ext uri="{BB962C8B-B14F-4D97-AF65-F5344CB8AC3E}">
+        <p14:creationId xmlns:p14="http://schemas.microsoft.com/office/powerpoint/2010/main" val="3756799687"/>
+      </p:ext>
+    </p:extLst>
+  </p:cSld>
+  <p:clrMapOvr>
+    <a:masterClrMapping/>
+  </p:clrMapOvr>
+  <p:timing>
+    <p:tnLst>
+      <p:par>
+        <p:cTn id="1" dur="indefinite" restart="never" nodeType="tmRoot"/>
+      </p:par>
+    </p:tnLst>
+  </p:timing>
+</p:sld>
+</file>
+
+<file path=ppt/slides/slide25.xml><?xml version="1.0" encoding="utf-8"?>
+<p:sld xmlns:a="http://schemas.openxmlformats.org/drawingml/2006/main" xmlns:r="http://schemas.openxmlformats.org/officeDocument/2006/relationships" xmlns:p="http://schemas.openxmlformats.org/presentationml/2006/main">
+  <p:cSld>
+    <p:spTree>
+      <p:nvGrpSpPr>
+        <p:cNvPr id="1" name=""/>
+        <p:cNvGrpSpPr/>
+        <p:nvPr/>
+      </p:nvGrpSpPr>
+      <p:grpSpPr>
+        <a:xfrm>
+          <a:off x="0" y="0"/>
+          <a:ext cx="0" cy="0"/>
+          <a:chOff x="0" y="0"/>
+          <a:chExt cx="0" cy="0"/>
+        </a:xfrm>
+      </p:grpSpPr>
+      <p:sp>
+        <p:nvSpPr>
+          <p:cNvPr id="4" name="文字方塊 3"/>
+          <p:cNvSpPr txBox="1"/>
+          <p:nvPr/>
+        </p:nvSpPr>
+        <p:spPr>
+          <a:xfrm>
+            <a:off x="9083040" y="6334780"/>
+            <a:ext cx="3108960" cy="523220"/>
+          </a:xfrm>
+          <a:prstGeom prst="rect">
+            <a:avLst/>
+          </a:prstGeom>
+          <a:noFill/>
+        </p:spPr>
+        <p:txBody>
+          <a:bodyPr wrap="square" rtlCol="0">
+            <a:spAutoFit/>
+          </a:bodyPr>
+          <a:lstStyle/>
+          <a:p>
+            <a:r>
+              <a:rPr lang="zh-TW" altLang="en-US" sz="2800" b="1" dirty="0" smtClean="0">
+                <a:effectLst>
+                  <a:outerShdw blurRad="38100" dist="38100" dir="2700000" algn="tl">
+                    <a:srgbClr val="000000">
+                      <a:alpha val="43137"/>
+                    </a:srgbClr>
+                  </a:outerShdw>
+                </a:effectLst>
+                <a:latin typeface="微軟正黑體" panose="020B0604030504040204" pitchFamily="34" charset="-120"/>
+                <a:ea typeface="微軟正黑體" panose="020B0604030504040204" pitchFamily="34" charset="-120"/>
+              </a:rPr>
+              <a:t>驅動程式基礎架構</a:t>
+            </a:r>
+            <a:endParaRPr lang="zh-TW" altLang="en-US" sz="2800" b="1" dirty="0">
+              <a:effectLst>
+                <a:outerShdw blurRad="38100" dist="38100" dir="2700000" algn="tl">
+                  <a:srgbClr val="000000">
+                    <a:alpha val="43137"/>
+                  </a:srgbClr>
+                </a:outerShdw>
+              </a:effectLst>
+              <a:latin typeface="微軟正黑體" panose="020B0604030504040204" pitchFamily="34" charset="-120"/>
+              <a:ea typeface="微軟正黑體" panose="020B0604030504040204" pitchFamily="34" charset="-120"/>
+            </a:endParaRPr>
+          </a:p>
+        </p:txBody>
+      </p:sp>
+      <p:pic>
+        <p:nvPicPr>
+          <p:cNvPr id="10" name="圖片 9"/>
+          <p:cNvPicPr>
+            <a:picLocks noChangeAspect="1"/>
+          </p:cNvPicPr>
+          <p:nvPr/>
+        </p:nvPicPr>
+        <p:blipFill>
+          <a:blip r:embed="rId2"/>
+          <a:stretch>
+            <a:fillRect/>
+          </a:stretch>
+        </p:blipFill>
+        <p:spPr>
+          <a:xfrm>
+            <a:off x="251142" y="712470"/>
+            <a:ext cx="4029075" cy="1409700"/>
+          </a:xfrm>
+          <a:prstGeom prst="rect">
+            <a:avLst/>
+          </a:prstGeom>
+        </p:spPr>
+      </p:pic>
+      <p:sp>
+        <p:nvSpPr>
+          <p:cNvPr id="11" name="文字方塊 10"/>
+          <p:cNvSpPr txBox="1"/>
+          <p:nvPr/>
+        </p:nvSpPr>
+        <p:spPr>
+          <a:xfrm>
+            <a:off x="182880" y="0"/>
+            <a:ext cx="4155440" cy="646331"/>
+          </a:xfrm>
+          <a:prstGeom prst="rect">
+            <a:avLst/>
+          </a:prstGeom>
+          <a:noFill/>
+        </p:spPr>
+        <p:txBody>
+          <a:bodyPr wrap="square" rtlCol="0">
+            <a:spAutoFit/>
+          </a:bodyPr>
+          <a:lstStyle/>
+          <a:p>
+            <a:r>
+              <a:rPr lang="en-US" altLang="zh-TW" sz="3600" dirty="0" smtClean="0">
+                <a:effectLst>
+                  <a:outerShdw blurRad="38100" dist="38100" dir="2700000" algn="tl">
+                    <a:srgbClr val="000000">
+                      <a:alpha val="43137"/>
+                    </a:srgbClr>
+                  </a:outerShdw>
+                </a:effectLst>
+                <a:latin typeface="微軟正黑體" panose="020B0604030504040204" pitchFamily="34" charset="-120"/>
+                <a:ea typeface="微軟正黑體" panose="020B0604030504040204" pitchFamily="34" charset="-120"/>
+              </a:rPr>
+              <a:t>NT Driver Sample</a:t>
+            </a:r>
+          </a:p>
+        </p:txBody>
+      </p:sp>
+    </p:spTree>
+    <p:extLst>
+      <p:ext uri="{BB962C8B-B14F-4D97-AF65-F5344CB8AC3E}">
+        <p14:creationId xmlns:p14="http://schemas.microsoft.com/office/powerpoint/2010/main" val="687915946"/>
+      </p:ext>
+    </p:extLst>
+  </p:cSld>
+  <p:clrMapOvr>
+    <a:masterClrMapping/>
+  </p:clrMapOvr>
+  <p:timing>
+    <p:tnLst>
+      <p:par>
+        <p:cTn id="1" dur="indefinite" restart="never" nodeType="tmRoot"/>
+      </p:par>
+    </p:tnLst>
+  </p:timing>
+</p:sld>
+</file>
+
+<file path=ppt/slides/slide26.xml><?xml version="1.0" encoding="utf-8"?>
+<p:sld xmlns:a="http://schemas.openxmlformats.org/drawingml/2006/main" xmlns:r="http://schemas.openxmlformats.org/officeDocument/2006/relationships" xmlns:p="http://schemas.openxmlformats.org/presentationml/2006/main">
+  <p:cSld>
+    <p:spTree>
+      <p:nvGrpSpPr>
+        <p:cNvPr id="1" name=""/>
+        <p:cNvGrpSpPr/>
+        <p:nvPr/>
+      </p:nvGrpSpPr>
+      <p:grpSpPr>
+        <a:xfrm>
+          <a:off x="0" y="0"/>
+          <a:ext cx="0" cy="0"/>
+          <a:chOff x="0" y="0"/>
+          <a:chExt cx="0" cy="0"/>
+        </a:xfrm>
+      </p:grpSpPr>
+      <p:sp>
+        <p:nvSpPr>
+          <p:cNvPr id="4" name="文字方塊 3"/>
+          <p:cNvSpPr txBox="1"/>
+          <p:nvPr/>
+        </p:nvSpPr>
+        <p:spPr>
+          <a:xfrm>
+            <a:off x="9083040" y="6334780"/>
+            <a:ext cx="3108960" cy="523220"/>
+          </a:xfrm>
+          <a:prstGeom prst="rect">
+            <a:avLst/>
+          </a:prstGeom>
+          <a:noFill/>
+        </p:spPr>
+        <p:txBody>
+          <a:bodyPr wrap="square" rtlCol="0">
+            <a:spAutoFit/>
+          </a:bodyPr>
+          <a:lstStyle/>
+          <a:p>
+            <a:r>
+              <a:rPr lang="zh-TW" altLang="en-US" sz="2800" b="1" dirty="0" smtClean="0">
+                <a:effectLst>
+                  <a:outerShdw blurRad="38100" dist="38100" dir="2700000" algn="tl">
+                    <a:srgbClr val="000000">
+                      <a:alpha val="43137"/>
+                    </a:srgbClr>
+                  </a:outerShdw>
+                </a:effectLst>
+                <a:latin typeface="微軟正黑體" panose="020B0604030504040204" pitchFamily="34" charset="-120"/>
+                <a:ea typeface="微軟正黑體" panose="020B0604030504040204" pitchFamily="34" charset="-120"/>
+              </a:rPr>
+              <a:t>驅動程式基礎架構</a:t>
+            </a:r>
+            <a:endParaRPr lang="zh-TW" altLang="en-US" sz="2800" b="1" dirty="0">
+              <a:effectLst>
+                <a:outerShdw blurRad="38100" dist="38100" dir="2700000" algn="tl">
+                  <a:srgbClr val="000000">
+                    <a:alpha val="43137"/>
+                  </a:srgbClr>
+                </a:outerShdw>
+              </a:effectLst>
+              <a:latin typeface="微軟正黑體" panose="020B0604030504040204" pitchFamily="34" charset="-120"/>
+              <a:ea typeface="微軟正黑體" panose="020B0604030504040204" pitchFamily="34" charset="-120"/>
+            </a:endParaRPr>
+          </a:p>
+        </p:txBody>
+      </p:sp>
+      <p:sp>
+        <p:nvSpPr>
+          <p:cNvPr id="5" name="文字方塊 4"/>
+          <p:cNvSpPr txBox="1"/>
+          <p:nvPr/>
+        </p:nvSpPr>
+        <p:spPr>
+          <a:xfrm>
+            <a:off x="182880" y="0"/>
+            <a:ext cx="4155440" cy="646331"/>
+          </a:xfrm>
+          <a:prstGeom prst="rect">
+            <a:avLst/>
+          </a:prstGeom>
+          <a:noFill/>
+        </p:spPr>
+        <p:txBody>
+          <a:bodyPr wrap="square" rtlCol="0">
+            <a:spAutoFit/>
+          </a:bodyPr>
+          <a:lstStyle/>
+          <a:p>
+            <a:r>
+              <a:rPr lang="en-US" altLang="zh-TW" sz="3600" dirty="0" smtClean="0">
+                <a:effectLst>
+                  <a:outerShdw blurRad="38100" dist="38100" dir="2700000" algn="tl">
+                    <a:srgbClr val="000000">
+                      <a:alpha val="43137"/>
+                    </a:srgbClr>
+                  </a:outerShdw>
+                </a:effectLst>
+                <a:latin typeface="微軟正黑體" panose="020B0604030504040204" pitchFamily="34" charset="-120"/>
+                <a:ea typeface="微軟正黑體" panose="020B0604030504040204" pitchFamily="34" charset="-120"/>
+              </a:rPr>
+              <a:t>NT Driver Sample</a:t>
+            </a:r>
+          </a:p>
+        </p:txBody>
+      </p:sp>
+      <p:pic>
+        <p:nvPicPr>
+          <p:cNvPr id="9" name="圖片 8"/>
+          <p:cNvPicPr>
+            <a:picLocks noChangeAspect="1"/>
+          </p:cNvPicPr>
+          <p:nvPr/>
+        </p:nvPicPr>
+        <p:blipFill>
+          <a:blip r:embed="rId2"/>
+          <a:stretch>
+            <a:fillRect/>
+          </a:stretch>
+        </p:blipFill>
+        <p:spPr>
+          <a:xfrm>
+            <a:off x="253682" y="2360295"/>
+            <a:ext cx="5324475" cy="3905250"/>
+          </a:xfrm>
+          <a:prstGeom prst="rect">
+            <a:avLst/>
+          </a:prstGeom>
+        </p:spPr>
+      </p:pic>
+      <p:pic>
+        <p:nvPicPr>
+          <p:cNvPr id="10" name="圖片 9"/>
+          <p:cNvPicPr>
+            <a:picLocks noChangeAspect="1"/>
+          </p:cNvPicPr>
+          <p:nvPr/>
+        </p:nvPicPr>
+        <p:blipFill>
+          <a:blip r:embed="rId3"/>
+          <a:stretch>
+            <a:fillRect/>
+          </a:stretch>
+        </p:blipFill>
+        <p:spPr>
+          <a:xfrm>
+            <a:off x="251142" y="712470"/>
+            <a:ext cx="4029075" cy="1409700"/>
+          </a:xfrm>
+          <a:prstGeom prst="rect">
+            <a:avLst/>
+          </a:prstGeom>
+        </p:spPr>
+      </p:pic>
+    </p:spTree>
+    <p:extLst>
+      <p:ext uri="{BB962C8B-B14F-4D97-AF65-F5344CB8AC3E}">
+        <p14:creationId xmlns:p14="http://schemas.microsoft.com/office/powerpoint/2010/main" val="1760620446"/>
+      </p:ext>
+    </p:extLst>
+  </p:cSld>
+  <p:clrMapOvr>
+    <a:masterClrMapping/>
+  </p:clrMapOvr>
+  <p:timing>
+    <p:tnLst>
+      <p:par>
+        <p:cTn id="1" dur="indefinite" restart="never" nodeType="tmRoot"/>
+      </p:par>
+    </p:tnLst>
+  </p:timing>
+</p:sld>
+</file>
+
+<file path=ppt/slides/slide27.xml><?xml version="1.0" encoding="utf-8"?>
+<p:sld xmlns:a="http://schemas.openxmlformats.org/drawingml/2006/main" xmlns:r="http://schemas.openxmlformats.org/officeDocument/2006/relationships" xmlns:p="http://schemas.openxmlformats.org/presentationml/2006/main">
+  <p:cSld>
+    <p:spTree>
+      <p:nvGrpSpPr>
+        <p:cNvPr id="1" name=""/>
+        <p:cNvGrpSpPr/>
+        <p:nvPr/>
+      </p:nvGrpSpPr>
+      <p:grpSpPr>
+        <a:xfrm>
+          <a:off x="0" y="0"/>
+          <a:ext cx="0" cy="0"/>
+          <a:chOff x="0" y="0"/>
+          <a:chExt cx="0" cy="0"/>
+        </a:xfrm>
+      </p:grpSpPr>
+      <p:sp>
+        <p:nvSpPr>
+          <p:cNvPr id="4" name="文字方塊 3"/>
+          <p:cNvSpPr txBox="1"/>
+          <p:nvPr/>
+        </p:nvSpPr>
+        <p:spPr>
+          <a:xfrm>
+            <a:off x="9083040" y="6334780"/>
+            <a:ext cx="3108960" cy="523220"/>
+          </a:xfrm>
+          <a:prstGeom prst="rect">
+            <a:avLst/>
+          </a:prstGeom>
+          <a:noFill/>
+        </p:spPr>
+        <p:txBody>
+          <a:bodyPr wrap="square" rtlCol="0">
+            <a:spAutoFit/>
+          </a:bodyPr>
+          <a:lstStyle/>
+          <a:p>
+            <a:r>
+              <a:rPr lang="zh-TW" altLang="en-US" sz="2800" b="1" dirty="0" smtClean="0">
+                <a:effectLst>
+                  <a:outerShdw blurRad="38100" dist="38100" dir="2700000" algn="tl">
+                    <a:srgbClr val="000000">
+                      <a:alpha val="43137"/>
+                    </a:srgbClr>
+                  </a:outerShdw>
+                </a:effectLst>
+                <a:latin typeface="微軟正黑體" panose="020B0604030504040204" pitchFamily="34" charset="-120"/>
+                <a:ea typeface="微軟正黑體" panose="020B0604030504040204" pitchFamily="34" charset="-120"/>
+              </a:rPr>
+              <a:t>驅動程式基礎架構</a:t>
+            </a:r>
+            <a:endParaRPr lang="zh-TW" altLang="en-US" sz="2800" b="1" dirty="0">
+              <a:effectLst>
+                <a:outerShdw blurRad="38100" dist="38100" dir="2700000" algn="tl">
+                  <a:srgbClr val="000000">
+                    <a:alpha val="43137"/>
+                  </a:srgbClr>
+                </a:outerShdw>
+              </a:effectLst>
+              <a:latin typeface="微軟正黑體" panose="020B0604030504040204" pitchFamily="34" charset="-120"/>
+              <a:ea typeface="微軟正黑體" panose="020B0604030504040204" pitchFamily="34" charset="-120"/>
+            </a:endParaRPr>
+          </a:p>
+        </p:txBody>
+      </p:sp>
+      <p:pic>
+        <p:nvPicPr>
+          <p:cNvPr id="9" name="圖片 8"/>
+          <p:cNvPicPr>
+            <a:picLocks noChangeAspect="1"/>
+          </p:cNvPicPr>
+          <p:nvPr/>
+        </p:nvPicPr>
+        <p:blipFill>
+          <a:blip r:embed="rId2"/>
+          <a:stretch>
+            <a:fillRect/>
+          </a:stretch>
+        </p:blipFill>
+        <p:spPr>
+          <a:xfrm>
+            <a:off x="253682" y="2360295"/>
+            <a:ext cx="5324475" cy="3905250"/>
+          </a:xfrm>
+          <a:prstGeom prst="rect">
+            <a:avLst/>
+          </a:prstGeom>
+        </p:spPr>
+      </p:pic>
+      <p:pic>
+        <p:nvPicPr>
+          <p:cNvPr id="10" name="圖片 9"/>
+          <p:cNvPicPr>
+            <a:picLocks noChangeAspect="1"/>
+          </p:cNvPicPr>
+          <p:nvPr/>
+        </p:nvPicPr>
+        <p:blipFill>
+          <a:blip r:embed="rId3"/>
+          <a:stretch>
+            <a:fillRect/>
+          </a:stretch>
+        </p:blipFill>
+        <p:spPr>
+          <a:xfrm>
+            <a:off x="251142" y="712470"/>
+            <a:ext cx="4029075" cy="1409700"/>
+          </a:xfrm>
+          <a:prstGeom prst="rect">
+            <a:avLst/>
+          </a:prstGeom>
+        </p:spPr>
+      </p:pic>
+      <p:pic>
+        <p:nvPicPr>
+          <p:cNvPr id="2" name="圖片 1"/>
+          <p:cNvPicPr>
+            <a:picLocks noChangeAspect="1"/>
+          </p:cNvPicPr>
+          <p:nvPr/>
+        </p:nvPicPr>
+        <p:blipFill>
+          <a:blip r:embed="rId4"/>
+          <a:stretch>
+            <a:fillRect/>
+          </a:stretch>
+        </p:blipFill>
+        <p:spPr>
+          <a:xfrm>
+            <a:off x="5710364" y="267053"/>
+            <a:ext cx="6390196" cy="1968147"/>
+          </a:xfrm>
+          <a:prstGeom prst="rect">
+            <a:avLst/>
+          </a:prstGeom>
+        </p:spPr>
+      </p:pic>
+      <p:sp>
+        <p:nvSpPr>
+          <p:cNvPr id="6" name="向左箭號 5"/>
+          <p:cNvSpPr/>
+          <p:nvPr/>
+        </p:nvSpPr>
+        <p:spPr>
+          <a:xfrm rot="7257725" flipV="1">
+            <a:off x="2565815" y="2096534"/>
+            <a:ext cx="4121467" cy="82126"/>
+          </a:xfrm>
+          <a:prstGeom prst="leftArrow">
+            <a:avLst>
+              <a:gd name="adj1" fmla="val 50000"/>
+              <a:gd name="adj2" fmla="val 73805"/>
+            </a:avLst>
+          </a:prstGeom>
+          <a:solidFill>
+            <a:srgbClr val="C00000"/>
+          </a:solidFill>
+          <a:ln>
+            <a:solidFill>
+              <a:srgbClr val="C00000"/>
+            </a:solidFill>
+          </a:ln>
+        </p:spPr>
+        <p:style>
+          <a:lnRef idx="2">
+            <a:schemeClr val="accent1">
+              <a:shade val="50000"/>
+            </a:schemeClr>
+          </a:lnRef>
+          <a:fillRef idx="1">
+            <a:schemeClr val="accent1"/>
+          </a:fillRef>
+          <a:effectRef idx="0">
+            <a:schemeClr val="accent1"/>
+          </a:effectRef>
+          <a:fontRef idx="minor">
+            <a:schemeClr val="lt1"/>
+          </a:fontRef>
+        </p:style>
+        <p:txBody>
+          <a:bodyPr rtlCol="0" anchor="ctr"/>
+          <a:lstStyle/>
+          <a:p>
+            <a:pPr algn="ctr"/>
+            <a:endParaRPr lang="zh-TW" altLang="en-US"/>
+          </a:p>
+        </p:txBody>
+      </p:sp>
+      <p:sp>
+        <p:nvSpPr>
+          <p:cNvPr id="8" name="文字方塊 7"/>
+          <p:cNvSpPr txBox="1"/>
+          <p:nvPr/>
+        </p:nvSpPr>
+        <p:spPr>
+          <a:xfrm>
+            <a:off x="182880" y="0"/>
+            <a:ext cx="4155440" cy="646331"/>
+          </a:xfrm>
+          <a:prstGeom prst="rect">
+            <a:avLst/>
+          </a:prstGeom>
+          <a:noFill/>
+        </p:spPr>
+        <p:txBody>
+          <a:bodyPr wrap="square" rtlCol="0">
+            <a:spAutoFit/>
+          </a:bodyPr>
+          <a:lstStyle/>
+          <a:p>
+            <a:r>
+              <a:rPr lang="en-US" altLang="zh-TW" sz="3600" dirty="0" smtClean="0">
+                <a:effectLst>
+                  <a:outerShdw blurRad="38100" dist="38100" dir="2700000" algn="tl">
+                    <a:srgbClr val="000000">
+                      <a:alpha val="43137"/>
+                    </a:srgbClr>
+                  </a:outerShdw>
+                </a:effectLst>
+                <a:latin typeface="微軟正黑體" panose="020B0604030504040204" pitchFamily="34" charset="-120"/>
+                <a:ea typeface="微軟正黑體" panose="020B0604030504040204" pitchFamily="34" charset="-120"/>
+              </a:rPr>
+              <a:t>NT Driver Sample</a:t>
+            </a:r>
+          </a:p>
+        </p:txBody>
+      </p:sp>
+    </p:spTree>
+    <p:extLst>
+      <p:ext uri="{BB962C8B-B14F-4D97-AF65-F5344CB8AC3E}">
+        <p14:creationId xmlns:p14="http://schemas.microsoft.com/office/powerpoint/2010/main" val="914683052"/>
+      </p:ext>
+    </p:extLst>
+  </p:cSld>
+  <p:clrMapOvr>
+    <a:masterClrMapping/>
+  </p:clrMapOvr>
+  <p:timing>
+    <p:tnLst>
+      <p:par>
+        <p:cTn id="1" dur="indefinite" restart="never" nodeType="tmRoot"/>
+      </p:par>
+    </p:tnLst>
+  </p:timing>
+</p:sld>
+</file>
+
+<file path=ppt/slides/slide28.xml><?xml version="1.0" encoding="utf-8"?>
+<p:sld xmlns:a="http://schemas.openxmlformats.org/drawingml/2006/main" xmlns:r="http://schemas.openxmlformats.org/officeDocument/2006/relationships" xmlns:p="http://schemas.openxmlformats.org/presentationml/2006/main">
+  <p:cSld>
+    <p:spTree>
+      <p:nvGrpSpPr>
+        <p:cNvPr id="1" name=""/>
+        <p:cNvGrpSpPr/>
+        <p:nvPr/>
+      </p:nvGrpSpPr>
+      <p:grpSpPr>
+        <a:xfrm>
+          <a:off x="0" y="0"/>
+          <a:ext cx="0" cy="0"/>
+          <a:chOff x="0" y="0"/>
+          <a:chExt cx="0" cy="0"/>
+        </a:xfrm>
+      </p:grpSpPr>
+      <p:sp>
+        <p:nvSpPr>
+          <p:cNvPr id="4" name="文字方塊 3"/>
+          <p:cNvSpPr txBox="1"/>
+          <p:nvPr/>
+        </p:nvSpPr>
+        <p:spPr>
+          <a:xfrm>
+            <a:off x="9083040" y="6334780"/>
+            <a:ext cx="3108960" cy="523220"/>
+          </a:xfrm>
+          <a:prstGeom prst="rect">
+            <a:avLst/>
+          </a:prstGeom>
+          <a:noFill/>
+        </p:spPr>
+        <p:txBody>
+          <a:bodyPr wrap="square" rtlCol="0">
+            <a:spAutoFit/>
+          </a:bodyPr>
+          <a:lstStyle/>
+          <a:p>
+            <a:r>
+              <a:rPr lang="zh-TW" altLang="en-US" sz="2800" b="1" dirty="0" smtClean="0">
+                <a:effectLst>
+                  <a:outerShdw blurRad="38100" dist="38100" dir="2700000" algn="tl">
+                    <a:srgbClr val="000000">
+                      <a:alpha val="43137"/>
+                    </a:srgbClr>
+                  </a:outerShdw>
+                </a:effectLst>
+                <a:latin typeface="微軟正黑體" panose="020B0604030504040204" pitchFamily="34" charset="-120"/>
+                <a:ea typeface="微軟正黑體" panose="020B0604030504040204" pitchFamily="34" charset="-120"/>
+              </a:rPr>
+              <a:t>驅動程式基礎架構</a:t>
+            </a:r>
+            <a:endParaRPr lang="zh-TW" altLang="en-US" sz="2800" b="1" dirty="0">
+              <a:effectLst>
+                <a:outerShdw blurRad="38100" dist="38100" dir="2700000" algn="tl">
+                  <a:srgbClr val="000000">
+                    <a:alpha val="43137"/>
+                  </a:srgbClr>
+                </a:outerShdw>
+              </a:effectLst>
+              <a:latin typeface="微軟正黑體" panose="020B0604030504040204" pitchFamily="34" charset="-120"/>
+              <a:ea typeface="微軟正黑體" panose="020B0604030504040204" pitchFamily="34" charset="-120"/>
+            </a:endParaRPr>
+          </a:p>
+        </p:txBody>
+      </p:sp>
+      <p:pic>
+        <p:nvPicPr>
+          <p:cNvPr id="9" name="圖片 8"/>
+          <p:cNvPicPr>
+            <a:picLocks noChangeAspect="1"/>
+          </p:cNvPicPr>
+          <p:nvPr/>
+        </p:nvPicPr>
+        <p:blipFill>
+          <a:blip r:embed="rId2"/>
+          <a:stretch>
+            <a:fillRect/>
+          </a:stretch>
+        </p:blipFill>
+        <p:spPr>
+          <a:xfrm>
+            <a:off x="253682" y="2360295"/>
+            <a:ext cx="5324475" cy="3905250"/>
+          </a:xfrm>
+          <a:prstGeom prst="rect">
+            <a:avLst/>
+          </a:prstGeom>
+        </p:spPr>
+      </p:pic>
+      <p:pic>
+        <p:nvPicPr>
+          <p:cNvPr id="10" name="圖片 9"/>
+          <p:cNvPicPr>
+            <a:picLocks noChangeAspect="1"/>
+          </p:cNvPicPr>
+          <p:nvPr/>
+        </p:nvPicPr>
+        <p:blipFill>
+          <a:blip r:embed="rId3"/>
+          <a:stretch>
+            <a:fillRect/>
+          </a:stretch>
+        </p:blipFill>
+        <p:spPr>
+          <a:xfrm>
+            <a:off x="251142" y="712470"/>
+            <a:ext cx="4029075" cy="1409700"/>
+          </a:xfrm>
+          <a:prstGeom prst="rect">
+            <a:avLst/>
+          </a:prstGeom>
+        </p:spPr>
+      </p:pic>
+      <p:pic>
+        <p:nvPicPr>
+          <p:cNvPr id="3" name="圖片 2"/>
+          <p:cNvPicPr>
+            <a:picLocks noChangeAspect="1"/>
+          </p:cNvPicPr>
+          <p:nvPr/>
+        </p:nvPicPr>
+        <p:blipFill>
+          <a:blip r:embed="rId4"/>
+          <a:stretch>
+            <a:fillRect/>
+          </a:stretch>
+        </p:blipFill>
+        <p:spPr>
+          <a:xfrm>
+            <a:off x="6690042" y="572452"/>
+            <a:ext cx="4257675" cy="2543175"/>
+          </a:xfrm>
+          <a:prstGeom prst="rect">
+            <a:avLst/>
+          </a:prstGeom>
+        </p:spPr>
+      </p:pic>
+      <p:sp>
+        <p:nvSpPr>
+          <p:cNvPr id="6" name="向左箭號 5"/>
+          <p:cNvSpPr/>
+          <p:nvPr/>
+        </p:nvSpPr>
+        <p:spPr>
+          <a:xfrm rot="6780040" flipV="1">
+            <a:off x="4058355" y="2360236"/>
+            <a:ext cx="3781771" cy="132203"/>
+          </a:xfrm>
+          <a:prstGeom prst="leftArrow">
+            <a:avLst>
+              <a:gd name="adj1" fmla="val 50000"/>
+              <a:gd name="adj2" fmla="val 73805"/>
+            </a:avLst>
+          </a:prstGeom>
+          <a:solidFill>
+            <a:srgbClr val="C00000"/>
+          </a:solidFill>
+          <a:ln>
+            <a:solidFill>
+              <a:srgbClr val="C00000"/>
+            </a:solidFill>
+          </a:ln>
+        </p:spPr>
+        <p:style>
+          <a:lnRef idx="2">
+            <a:schemeClr val="accent1">
+              <a:shade val="50000"/>
+            </a:schemeClr>
+          </a:lnRef>
+          <a:fillRef idx="1">
+            <a:schemeClr val="accent1"/>
+          </a:fillRef>
+          <a:effectRef idx="0">
+            <a:schemeClr val="accent1"/>
+          </a:effectRef>
+          <a:fontRef idx="minor">
+            <a:schemeClr val="lt1"/>
+          </a:fontRef>
+        </p:style>
+        <p:txBody>
+          <a:bodyPr rtlCol="0" anchor="ctr"/>
+          <a:lstStyle/>
+          <a:p>
+            <a:pPr algn="ctr"/>
+            <a:endParaRPr lang="zh-TW" altLang="en-US"/>
+          </a:p>
+        </p:txBody>
+      </p:sp>
+      <p:sp>
+        <p:nvSpPr>
+          <p:cNvPr id="11" name="文字方塊 10"/>
+          <p:cNvSpPr txBox="1"/>
+          <p:nvPr/>
+        </p:nvSpPr>
+        <p:spPr>
+          <a:xfrm>
+            <a:off x="182880" y="0"/>
+            <a:ext cx="4155440" cy="646331"/>
+          </a:xfrm>
+          <a:prstGeom prst="rect">
+            <a:avLst/>
+          </a:prstGeom>
+          <a:noFill/>
+        </p:spPr>
+        <p:txBody>
+          <a:bodyPr wrap="square" rtlCol="0">
+            <a:spAutoFit/>
+          </a:bodyPr>
+          <a:lstStyle/>
+          <a:p>
+            <a:r>
+              <a:rPr lang="en-US" altLang="zh-TW" sz="3600" dirty="0" smtClean="0">
+                <a:effectLst>
+                  <a:outerShdw blurRad="38100" dist="38100" dir="2700000" algn="tl">
+                    <a:srgbClr val="000000">
+                      <a:alpha val="43137"/>
+                    </a:srgbClr>
+                  </a:outerShdw>
+                </a:effectLst>
+                <a:latin typeface="微軟正黑體" panose="020B0604030504040204" pitchFamily="34" charset="-120"/>
+                <a:ea typeface="微軟正黑體" panose="020B0604030504040204" pitchFamily="34" charset="-120"/>
+              </a:rPr>
+              <a:t>NT Driver Sample</a:t>
+            </a:r>
+          </a:p>
+        </p:txBody>
+      </p:sp>
+    </p:spTree>
+    <p:extLst>
+      <p:ext uri="{BB962C8B-B14F-4D97-AF65-F5344CB8AC3E}">
+        <p14:creationId xmlns:p14="http://schemas.microsoft.com/office/powerpoint/2010/main" val="1584672113"/>
+      </p:ext>
+    </p:extLst>
+  </p:cSld>
+  <p:clrMapOvr>
+    <a:masterClrMapping/>
+  </p:clrMapOvr>
+  <p:timing>
+    <p:tnLst>
+      <p:par>
+        <p:cTn id="1" dur="indefinite" restart="never" nodeType="tmRoot"/>
+      </p:par>
+    </p:tnLst>
+  </p:timing>
+</p:sld>
+</file>
+
+<file path=ppt/slides/slide29.xml><?xml version="1.0" encoding="utf-8"?>
+<p:sld xmlns:a="http://schemas.openxmlformats.org/drawingml/2006/main" xmlns:r="http://schemas.openxmlformats.org/officeDocument/2006/relationships" xmlns:p="http://schemas.openxmlformats.org/presentationml/2006/main">
+  <p:cSld>
+    <p:spTree>
+      <p:nvGrpSpPr>
+        <p:cNvPr id="1" name=""/>
+        <p:cNvGrpSpPr/>
+        <p:nvPr/>
+      </p:nvGrpSpPr>
+      <p:grpSpPr>
+        <a:xfrm>
+          <a:off x="0" y="0"/>
+          <a:ext cx="0" cy="0"/>
+          <a:chOff x="0" y="0"/>
+          <a:chExt cx="0" cy="0"/>
+        </a:xfrm>
+      </p:grpSpPr>
+      <p:pic>
+        <p:nvPicPr>
+          <p:cNvPr id="2" name="圖片 1"/>
+          <p:cNvPicPr>
+            <a:picLocks noChangeAspect="1"/>
+          </p:cNvPicPr>
+          <p:nvPr/>
+        </p:nvPicPr>
+        <p:blipFill>
+          <a:blip r:embed="rId2"/>
+          <a:stretch>
+            <a:fillRect/>
+          </a:stretch>
+        </p:blipFill>
+        <p:spPr>
+          <a:xfrm>
+            <a:off x="6317932" y="186690"/>
+            <a:ext cx="4811449" cy="6484620"/>
+          </a:xfrm>
+          <a:prstGeom prst="rect">
+            <a:avLst/>
+          </a:prstGeom>
+        </p:spPr>
+      </p:pic>
+      <p:sp>
+        <p:nvSpPr>
+          <p:cNvPr id="4" name="文字方塊 3"/>
+          <p:cNvSpPr txBox="1"/>
+          <p:nvPr/>
+        </p:nvSpPr>
+        <p:spPr>
+          <a:xfrm>
+            <a:off x="9083040" y="6334780"/>
+            <a:ext cx="3108960" cy="523220"/>
+          </a:xfrm>
+          <a:prstGeom prst="rect">
+            <a:avLst/>
+          </a:prstGeom>
+          <a:noFill/>
+        </p:spPr>
+        <p:txBody>
+          <a:bodyPr wrap="square" rtlCol="0">
+            <a:spAutoFit/>
+          </a:bodyPr>
+          <a:lstStyle/>
+          <a:p>
+            <a:r>
+              <a:rPr lang="zh-TW" altLang="en-US" sz="2800" b="1" dirty="0" smtClean="0">
+                <a:effectLst>
+                  <a:outerShdw blurRad="38100" dist="38100" dir="2700000" algn="tl">
+                    <a:srgbClr val="000000">
+                      <a:alpha val="43137"/>
+                    </a:srgbClr>
+                  </a:outerShdw>
+                </a:effectLst>
+                <a:latin typeface="微軟正黑體" panose="020B0604030504040204" pitchFamily="34" charset="-120"/>
+                <a:ea typeface="微軟正黑體" panose="020B0604030504040204" pitchFamily="34" charset="-120"/>
+              </a:rPr>
+              <a:t>驅動程式基礎架構</a:t>
+            </a:r>
+            <a:endParaRPr lang="zh-TW" altLang="en-US" sz="2800" b="1" dirty="0">
+              <a:effectLst>
+                <a:outerShdw blurRad="38100" dist="38100" dir="2700000" algn="tl">
+                  <a:srgbClr val="000000">
+                    <a:alpha val="43137"/>
+                  </a:srgbClr>
+                </a:outerShdw>
+              </a:effectLst>
+              <a:latin typeface="微軟正黑體" panose="020B0604030504040204" pitchFamily="34" charset="-120"/>
+              <a:ea typeface="微軟正黑體" panose="020B0604030504040204" pitchFamily="34" charset="-120"/>
+            </a:endParaRPr>
+          </a:p>
+        </p:txBody>
+      </p:sp>
+      <p:pic>
+        <p:nvPicPr>
+          <p:cNvPr id="9" name="圖片 8"/>
+          <p:cNvPicPr>
+            <a:picLocks noChangeAspect="1"/>
+          </p:cNvPicPr>
+          <p:nvPr/>
+        </p:nvPicPr>
+        <p:blipFill>
+          <a:blip r:embed="rId3"/>
+          <a:stretch>
+            <a:fillRect/>
+          </a:stretch>
+        </p:blipFill>
+        <p:spPr>
+          <a:xfrm>
+            <a:off x="253682" y="2360295"/>
+            <a:ext cx="5324475" cy="3905250"/>
+          </a:xfrm>
+          <a:prstGeom prst="rect">
+            <a:avLst/>
+          </a:prstGeom>
+        </p:spPr>
+      </p:pic>
+      <p:pic>
+        <p:nvPicPr>
+          <p:cNvPr id="10" name="圖片 9"/>
+          <p:cNvPicPr>
+            <a:picLocks noChangeAspect="1"/>
+          </p:cNvPicPr>
+          <p:nvPr/>
+        </p:nvPicPr>
+        <p:blipFill>
+          <a:blip r:embed="rId4"/>
+          <a:stretch>
+            <a:fillRect/>
+          </a:stretch>
+        </p:blipFill>
+        <p:spPr>
+          <a:xfrm>
+            <a:off x="251142" y="712470"/>
+            <a:ext cx="4029075" cy="1409700"/>
+          </a:xfrm>
+          <a:prstGeom prst="rect">
+            <a:avLst/>
+          </a:prstGeom>
+        </p:spPr>
+      </p:pic>
+      <p:sp>
+        <p:nvSpPr>
+          <p:cNvPr id="3" name="向左箭號 2"/>
+          <p:cNvSpPr/>
+          <p:nvPr/>
+        </p:nvSpPr>
+        <p:spPr>
+          <a:xfrm rot="7705557">
+            <a:off x="1962282" y="2876701"/>
+            <a:ext cx="5805034" cy="127333"/>
+          </a:xfrm>
+          <a:prstGeom prst="leftArrow">
+            <a:avLst>
+              <a:gd name="adj1" fmla="val 50000"/>
+              <a:gd name="adj2" fmla="val 73805"/>
+            </a:avLst>
+          </a:prstGeom>
+          <a:solidFill>
+            <a:srgbClr val="C00000"/>
+          </a:solidFill>
+          <a:ln>
+            <a:solidFill>
+              <a:srgbClr val="C00000"/>
+            </a:solidFill>
+          </a:ln>
+        </p:spPr>
+        <p:style>
+          <a:lnRef idx="2">
+            <a:schemeClr val="accent1">
+              <a:shade val="50000"/>
+            </a:schemeClr>
+          </a:lnRef>
+          <a:fillRef idx="1">
+            <a:schemeClr val="accent1"/>
+          </a:fillRef>
+          <a:effectRef idx="0">
+            <a:schemeClr val="accent1"/>
+          </a:effectRef>
+          <a:fontRef idx="minor">
+            <a:schemeClr val="lt1"/>
+          </a:fontRef>
+        </p:style>
+        <p:txBody>
+          <a:bodyPr rtlCol="0" anchor="ctr"/>
+          <a:lstStyle/>
+          <a:p>
+            <a:pPr algn="ctr"/>
+            <a:endParaRPr lang="zh-TW" altLang="en-US"/>
+          </a:p>
+        </p:txBody>
+      </p:sp>
+      <p:sp>
+        <p:nvSpPr>
+          <p:cNvPr id="8" name="文字方塊 7"/>
+          <p:cNvSpPr txBox="1"/>
+          <p:nvPr/>
+        </p:nvSpPr>
+        <p:spPr>
+          <a:xfrm>
+            <a:off x="182880" y="0"/>
+            <a:ext cx="4155440" cy="646331"/>
+          </a:xfrm>
+          <a:prstGeom prst="rect">
+            <a:avLst/>
+          </a:prstGeom>
+          <a:noFill/>
+        </p:spPr>
+        <p:txBody>
+          <a:bodyPr wrap="square" rtlCol="0">
+            <a:spAutoFit/>
+          </a:bodyPr>
+          <a:lstStyle/>
+          <a:p>
+            <a:r>
+              <a:rPr lang="en-US" altLang="zh-TW" sz="3600" dirty="0" smtClean="0">
+                <a:effectLst>
+                  <a:outerShdw blurRad="38100" dist="38100" dir="2700000" algn="tl">
+                    <a:srgbClr val="000000">
+                      <a:alpha val="43137"/>
+                    </a:srgbClr>
+                  </a:outerShdw>
+                </a:effectLst>
+                <a:latin typeface="微軟正黑體" panose="020B0604030504040204" pitchFamily="34" charset="-120"/>
+                <a:ea typeface="微軟正黑體" panose="020B0604030504040204" pitchFamily="34" charset="-120"/>
+              </a:rPr>
+              <a:t>NT Driver Sample</a:t>
+            </a:r>
+          </a:p>
+        </p:txBody>
+      </p:sp>
+    </p:spTree>
+    <p:extLst>
+      <p:ext uri="{BB962C8B-B14F-4D97-AF65-F5344CB8AC3E}">
+        <p14:creationId xmlns:p14="http://schemas.microsoft.com/office/powerpoint/2010/main" val="1320906957"/>
       </p:ext>
     </p:extLst>
   </p:cSld>
@@ -9142,6 +11807,1353 @@
     <p:extLst>
       <p:ext uri="{BB962C8B-B14F-4D97-AF65-F5344CB8AC3E}">
         <p14:creationId xmlns:p14="http://schemas.microsoft.com/office/powerpoint/2010/main" val="4226723337"/>
+      </p:ext>
+    </p:extLst>
+  </p:cSld>
+  <p:clrMapOvr>
+    <a:masterClrMapping/>
+  </p:clrMapOvr>
+  <p:timing>
+    <p:tnLst>
+      <p:par>
+        <p:cTn id="1" dur="indefinite" restart="never" nodeType="tmRoot"/>
+      </p:par>
+    </p:tnLst>
+  </p:timing>
+</p:sld>
+</file>
+
+<file path=ppt/slides/slide30.xml><?xml version="1.0" encoding="utf-8"?>
+<p:sld xmlns:a="http://schemas.openxmlformats.org/drawingml/2006/main" xmlns:r="http://schemas.openxmlformats.org/officeDocument/2006/relationships" xmlns:p="http://schemas.openxmlformats.org/presentationml/2006/main">
+  <p:cSld>
+    <p:spTree>
+      <p:nvGrpSpPr>
+        <p:cNvPr id="1" name=""/>
+        <p:cNvGrpSpPr/>
+        <p:nvPr/>
+      </p:nvGrpSpPr>
+      <p:grpSpPr>
+        <a:xfrm>
+          <a:off x="0" y="0"/>
+          <a:ext cx="0" cy="0"/>
+          <a:chOff x="0" y="0"/>
+          <a:chExt cx="0" cy="0"/>
+        </a:xfrm>
+      </p:grpSpPr>
+      <p:pic>
+        <p:nvPicPr>
+          <p:cNvPr id="2" name="圖片 1"/>
+          <p:cNvPicPr>
+            <a:picLocks noChangeAspect="1"/>
+          </p:cNvPicPr>
+          <p:nvPr/>
+        </p:nvPicPr>
+        <p:blipFill>
+          <a:blip r:embed="rId2"/>
+          <a:stretch>
+            <a:fillRect/>
+          </a:stretch>
+        </p:blipFill>
+        <p:spPr>
+          <a:xfrm>
+            <a:off x="6317932" y="186690"/>
+            <a:ext cx="4811449" cy="6484620"/>
+          </a:xfrm>
+          <a:prstGeom prst="rect">
+            <a:avLst/>
+          </a:prstGeom>
+        </p:spPr>
+      </p:pic>
+      <p:sp>
+        <p:nvSpPr>
+          <p:cNvPr id="4" name="文字方塊 3"/>
+          <p:cNvSpPr txBox="1"/>
+          <p:nvPr/>
+        </p:nvSpPr>
+        <p:spPr>
+          <a:xfrm>
+            <a:off x="9083040" y="6334780"/>
+            <a:ext cx="3108960" cy="523220"/>
+          </a:xfrm>
+          <a:prstGeom prst="rect">
+            <a:avLst/>
+          </a:prstGeom>
+          <a:noFill/>
+        </p:spPr>
+        <p:txBody>
+          <a:bodyPr wrap="square" rtlCol="0">
+            <a:spAutoFit/>
+          </a:bodyPr>
+          <a:lstStyle/>
+          <a:p>
+            <a:r>
+              <a:rPr lang="zh-TW" altLang="en-US" sz="2800" b="1" dirty="0" smtClean="0">
+                <a:effectLst>
+                  <a:outerShdw blurRad="38100" dist="38100" dir="2700000" algn="tl">
+                    <a:srgbClr val="000000">
+                      <a:alpha val="43137"/>
+                    </a:srgbClr>
+                  </a:outerShdw>
+                </a:effectLst>
+                <a:latin typeface="微軟正黑體" panose="020B0604030504040204" pitchFamily="34" charset="-120"/>
+                <a:ea typeface="微軟正黑體" panose="020B0604030504040204" pitchFamily="34" charset="-120"/>
+              </a:rPr>
+              <a:t>驅動程式基礎架構</a:t>
+            </a:r>
+            <a:endParaRPr lang="zh-TW" altLang="en-US" sz="2800" b="1" dirty="0">
+              <a:effectLst>
+                <a:outerShdw blurRad="38100" dist="38100" dir="2700000" algn="tl">
+                  <a:srgbClr val="000000">
+                    <a:alpha val="43137"/>
+                  </a:srgbClr>
+                </a:outerShdw>
+              </a:effectLst>
+              <a:latin typeface="微軟正黑體" panose="020B0604030504040204" pitchFamily="34" charset="-120"/>
+              <a:ea typeface="微軟正黑體" panose="020B0604030504040204" pitchFamily="34" charset="-120"/>
+            </a:endParaRPr>
+          </a:p>
+        </p:txBody>
+      </p:sp>
+      <p:pic>
+        <p:nvPicPr>
+          <p:cNvPr id="9" name="圖片 8"/>
+          <p:cNvPicPr>
+            <a:picLocks noChangeAspect="1"/>
+          </p:cNvPicPr>
+          <p:nvPr/>
+        </p:nvPicPr>
+        <p:blipFill>
+          <a:blip r:embed="rId3"/>
+          <a:stretch>
+            <a:fillRect/>
+          </a:stretch>
+        </p:blipFill>
+        <p:spPr>
+          <a:xfrm>
+            <a:off x="253682" y="2360295"/>
+            <a:ext cx="5324475" cy="3905250"/>
+          </a:xfrm>
+          <a:prstGeom prst="rect">
+            <a:avLst/>
+          </a:prstGeom>
+        </p:spPr>
+      </p:pic>
+      <p:pic>
+        <p:nvPicPr>
+          <p:cNvPr id="10" name="圖片 9"/>
+          <p:cNvPicPr>
+            <a:picLocks noChangeAspect="1"/>
+          </p:cNvPicPr>
+          <p:nvPr/>
+        </p:nvPicPr>
+        <p:blipFill>
+          <a:blip r:embed="rId4"/>
+          <a:stretch>
+            <a:fillRect/>
+          </a:stretch>
+        </p:blipFill>
+        <p:spPr>
+          <a:xfrm>
+            <a:off x="251142" y="712470"/>
+            <a:ext cx="4029075" cy="1409700"/>
+          </a:xfrm>
+          <a:prstGeom prst="rect">
+            <a:avLst/>
+          </a:prstGeom>
+        </p:spPr>
+      </p:pic>
+      <p:sp>
+        <p:nvSpPr>
+          <p:cNvPr id="3" name="向左箭號 2"/>
+          <p:cNvSpPr/>
+          <p:nvPr/>
+        </p:nvSpPr>
+        <p:spPr>
+          <a:xfrm rot="7705557">
+            <a:off x="1962282" y="2876701"/>
+            <a:ext cx="5805034" cy="127333"/>
+          </a:xfrm>
+          <a:prstGeom prst="leftArrow">
+            <a:avLst>
+              <a:gd name="adj1" fmla="val 50000"/>
+              <a:gd name="adj2" fmla="val 73805"/>
+            </a:avLst>
+          </a:prstGeom>
+          <a:solidFill>
+            <a:srgbClr val="C00000"/>
+          </a:solidFill>
+          <a:ln>
+            <a:solidFill>
+              <a:srgbClr val="C00000"/>
+            </a:solidFill>
+          </a:ln>
+        </p:spPr>
+        <p:style>
+          <a:lnRef idx="2">
+            <a:schemeClr val="accent1">
+              <a:shade val="50000"/>
+            </a:schemeClr>
+          </a:lnRef>
+          <a:fillRef idx="1">
+            <a:schemeClr val="accent1"/>
+          </a:fillRef>
+          <a:effectRef idx="0">
+            <a:schemeClr val="accent1"/>
+          </a:effectRef>
+          <a:fontRef idx="minor">
+            <a:schemeClr val="lt1"/>
+          </a:fontRef>
+        </p:style>
+        <p:txBody>
+          <a:bodyPr rtlCol="0" anchor="ctr"/>
+          <a:lstStyle/>
+          <a:p>
+            <a:pPr algn="ctr"/>
+            <a:endParaRPr lang="zh-TW" altLang="en-US"/>
+          </a:p>
+        </p:txBody>
+      </p:sp>
+      <p:sp>
+        <p:nvSpPr>
+          <p:cNvPr id="8" name="文字方塊 7"/>
+          <p:cNvSpPr txBox="1"/>
+          <p:nvPr/>
+        </p:nvSpPr>
+        <p:spPr>
+          <a:xfrm>
+            <a:off x="182880" y="0"/>
+            <a:ext cx="4155440" cy="646331"/>
+          </a:xfrm>
+          <a:prstGeom prst="rect">
+            <a:avLst/>
+          </a:prstGeom>
+          <a:noFill/>
+        </p:spPr>
+        <p:txBody>
+          <a:bodyPr wrap="square" rtlCol="0">
+            <a:spAutoFit/>
+          </a:bodyPr>
+          <a:lstStyle/>
+          <a:p>
+            <a:r>
+              <a:rPr lang="en-US" altLang="zh-TW" sz="3600" dirty="0" smtClean="0">
+                <a:effectLst>
+                  <a:outerShdw blurRad="38100" dist="38100" dir="2700000" algn="tl">
+                    <a:srgbClr val="000000">
+                      <a:alpha val="43137"/>
+                    </a:srgbClr>
+                  </a:outerShdw>
+                </a:effectLst>
+                <a:latin typeface="微軟正黑體" panose="020B0604030504040204" pitchFamily="34" charset="-120"/>
+                <a:ea typeface="微軟正黑體" panose="020B0604030504040204" pitchFamily="34" charset="-120"/>
+              </a:rPr>
+              <a:t>NT Driver Sample</a:t>
+            </a:r>
+          </a:p>
+        </p:txBody>
+      </p:sp>
+      <p:pic>
+        <p:nvPicPr>
+          <p:cNvPr id="6" name="圖片 5"/>
+          <p:cNvPicPr>
+            <a:picLocks noChangeAspect="1"/>
+          </p:cNvPicPr>
+          <p:nvPr/>
+        </p:nvPicPr>
+        <p:blipFill>
+          <a:blip r:embed="rId5"/>
+          <a:stretch>
+            <a:fillRect/>
+          </a:stretch>
+        </p:blipFill>
+        <p:spPr>
+          <a:xfrm>
+            <a:off x="8519160" y="2256155"/>
+            <a:ext cx="3200400" cy="1085850"/>
+          </a:xfrm>
+          <a:prstGeom prst="rect">
+            <a:avLst/>
+          </a:prstGeom>
+          <a:ln w="38100">
+            <a:solidFill>
+              <a:schemeClr val="accent4">
+                <a:lumMod val="60000"/>
+                <a:lumOff val="40000"/>
+              </a:schemeClr>
+            </a:solidFill>
+          </a:ln>
+          <a:effectLst>
+            <a:softEdge rad="0"/>
+          </a:effectLst>
+        </p:spPr>
+      </p:pic>
+    </p:spTree>
+    <p:extLst>
+      <p:ext uri="{BB962C8B-B14F-4D97-AF65-F5344CB8AC3E}">
+        <p14:creationId xmlns:p14="http://schemas.microsoft.com/office/powerpoint/2010/main" val="2931535322"/>
+      </p:ext>
+    </p:extLst>
+  </p:cSld>
+  <p:clrMapOvr>
+    <a:masterClrMapping/>
+  </p:clrMapOvr>
+  <p:timing>
+    <p:tnLst>
+      <p:par>
+        <p:cTn id="1" dur="indefinite" restart="never" nodeType="tmRoot"/>
+      </p:par>
+    </p:tnLst>
+  </p:timing>
+</p:sld>
+</file>
+
+<file path=ppt/slides/slide31.xml><?xml version="1.0" encoding="utf-8"?>
+<p:sld xmlns:a="http://schemas.openxmlformats.org/drawingml/2006/main" xmlns:r="http://schemas.openxmlformats.org/officeDocument/2006/relationships" xmlns:p="http://schemas.openxmlformats.org/presentationml/2006/main">
+  <p:cSld>
+    <p:spTree>
+      <p:nvGrpSpPr>
+        <p:cNvPr id="1" name=""/>
+        <p:cNvGrpSpPr/>
+        <p:nvPr/>
+      </p:nvGrpSpPr>
+      <p:grpSpPr>
+        <a:xfrm>
+          <a:off x="0" y="0"/>
+          <a:ext cx="0" cy="0"/>
+          <a:chOff x="0" y="0"/>
+          <a:chExt cx="0" cy="0"/>
+        </a:xfrm>
+      </p:grpSpPr>
+      <p:sp>
+        <p:nvSpPr>
+          <p:cNvPr id="4" name="文字方塊 3"/>
+          <p:cNvSpPr txBox="1"/>
+          <p:nvPr/>
+        </p:nvSpPr>
+        <p:spPr>
+          <a:xfrm>
+            <a:off x="9083040" y="6334780"/>
+            <a:ext cx="3108960" cy="523220"/>
+          </a:xfrm>
+          <a:prstGeom prst="rect">
+            <a:avLst/>
+          </a:prstGeom>
+          <a:noFill/>
+        </p:spPr>
+        <p:txBody>
+          <a:bodyPr wrap="square" rtlCol="0">
+            <a:spAutoFit/>
+          </a:bodyPr>
+          <a:lstStyle/>
+          <a:p>
+            <a:r>
+              <a:rPr lang="zh-TW" altLang="en-US" sz="2800" b="1" dirty="0" smtClean="0">
+                <a:effectLst>
+                  <a:outerShdw blurRad="38100" dist="38100" dir="2700000" algn="tl">
+                    <a:srgbClr val="000000">
+                      <a:alpha val="43137"/>
+                    </a:srgbClr>
+                  </a:outerShdw>
+                </a:effectLst>
+                <a:latin typeface="微軟正黑體" panose="020B0604030504040204" pitchFamily="34" charset="-120"/>
+                <a:ea typeface="微軟正黑體" panose="020B0604030504040204" pitchFamily="34" charset="-120"/>
+              </a:rPr>
+              <a:t>驅動程式基礎架構</a:t>
+            </a:r>
+            <a:endParaRPr lang="zh-TW" altLang="en-US" sz="2800" b="1" dirty="0">
+              <a:effectLst>
+                <a:outerShdw blurRad="38100" dist="38100" dir="2700000" algn="tl">
+                  <a:srgbClr val="000000">
+                    <a:alpha val="43137"/>
+                  </a:srgbClr>
+                </a:outerShdw>
+              </a:effectLst>
+              <a:latin typeface="微軟正黑體" panose="020B0604030504040204" pitchFamily="34" charset="-120"/>
+              <a:ea typeface="微軟正黑體" panose="020B0604030504040204" pitchFamily="34" charset="-120"/>
+            </a:endParaRPr>
+          </a:p>
+        </p:txBody>
+      </p:sp>
+      <p:sp>
+        <p:nvSpPr>
+          <p:cNvPr id="8" name="文字方塊 7"/>
+          <p:cNvSpPr txBox="1"/>
+          <p:nvPr/>
+        </p:nvSpPr>
+        <p:spPr>
+          <a:xfrm>
+            <a:off x="182880" y="0"/>
+            <a:ext cx="4155440" cy="646331"/>
+          </a:xfrm>
+          <a:prstGeom prst="rect">
+            <a:avLst/>
+          </a:prstGeom>
+          <a:noFill/>
+        </p:spPr>
+        <p:txBody>
+          <a:bodyPr wrap="square" rtlCol="0">
+            <a:spAutoFit/>
+          </a:bodyPr>
+          <a:lstStyle/>
+          <a:p>
+            <a:r>
+              <a:rPr lang="en-US" altLang="zh-TW" sz="3600" dirty="0" smtClean="0">
+                <a:effectLst>
+                  <a:outerShdw blurRad="38100" dist="38100" dir="2700000" algn="tl">
+                    <a:srgbClr val="000000">
+                      <a:alpha val="43137"/>
+                    </a:srgbClr>
+                  </a:outerShdw>
+                </a:effectLst>
+                <a:latin typeface="微軟正黑體" panose="020B0604030504040204" pitchFamily="34" charset="-120"/>
+                <a:ea typeface="微軟正黑體" panose="020B0604030504040204" pitchFamily="34" charset="-120"/>
+              </a:rPr>
+              <a:t>Install NT Driver</a:t>
+            </a:r>
+          </a:p>
+        </p:txBody>
+      </p:sp>
+      <p:pic>
+        <p:nvPicPr>
+          <p:cNvPr id="5" name="圖片 4"/>
+          <p:cNvPicPr>
+            <a:picLocks noChangeAspect="1"/>
+          </p:cNvPicPr>
+          <p:nvPr/>
+        </p:nvPicPr>
+        <p:blipFill>
+          <a:blip r:embed="rId2"/>
+          <a:stretch>
+            <a:fillRect/>
+          </a:stretch>
+        </p:blipFill>
+        <p:spPr>
+          <a:xfrm>
+            <a:off x="300990" y="600075"/>
+            <a:ext cx="5676900" cy="5962650"/>
+          </a:xfrm>
+          <a:prstGeom prst="rect">
+            <a:avLst/>
+          </a:prstGeom>
+        </p:spPr>
+      </p:pic>
+    </p:spTree>
+    <p:extLst>
+      <p:ext uri="{BB962C8B-B14F-4D97-AF65-F5344CB8AC3E}">
+        <p14:creationId xmlns:p14="http://schemas.microsoft.com/office/powerpoint/2010/main" val="4182236847"/>
+      </p:ext>
+    </p:extLst>
+  </p:cSld>
+  <p:clrMapOvr>
+    <a:masterClrMapping/>
+  </p:clrMapOvr>
+  <p:timing>
+    <p:tnLst>
+      <p:par>
+        <p:cTn id="1" dur="indefinite" restart="never" nodeType="tmRoot"/>
+      </p:par>
+    </p:tnLst>
+  </p:timing>
+</p:sld>
+</file>
+
+<file path=ppt/slides/slide32.xml><?xml version="1.0" encoding="utf-8"?>
+<p:sld xmlns:a="http://schemas.openxmlformats.org/drawingml/2006/main" xmlns:r="http://schemas.openxmlformats.org/officeDocument/2006/relationships" xmlns:p="http://schemas.openxmlformats.org/presentationml/2006/main">
+  <p:cSld>
+    <p:spTree>
+      <p:nvGrpSpPr>
+        <p:cNvPr id="1" name=""/>
+        <p:cNvGrpSpPr/>
+        <p:nvPr/>
+      </p:nvGrpSpPr>
+      <p:grpSpPr>
+        <a:xfrm>
+          <a:off x="0" y="0"/>
+          <a:ext cx="0" cy="0"/>
+          <a:chOff x="0" y="0"/>
+          <a:chExt cx="0" cy="0"/>
+        </a:xfrm>
+      </p:grpSpPr>
+      <p:pic>
+        <p:nvPicPr>
+          <p:cNvPr id="2" name="圖片 1"/>
+          <p:cNvPicPr>
+            <a:picLocks noChangeAspect="1"/>
+          </p:cNvPicPr>
+          <p:nvPr/>
+        </p:nvPicPr>
+        <p:blipFill>
+          <a:blip r:embed="rId2"/>
+          <a:stretch>
+            <a:fillRect/>
+          </a:stretch>
+        </p:blipFill>
+        <p:spPr>
+          <a:xfrm>
+            <a:off x="6443980" y="117269"/>
+            <a:ext cx="4610100" cy="6623461"/>
+          </a:xfrm>
+          <a:prstGeom prst="rect">
+            <a:avLst/>
+          </a:prstGeom>
+        </p:spPr>
+      </p:pic>
+      <p:sp>
+        <p:nvSpPr>
+          <p:cNvPr id="4" name="文字方塊 3"/>
+          <p:cNvSpPr txBox="1"/>
+          <p:nvPr/>
+        </p:nvSpPr>
+        <p:spPr>
+          <a:xfrm>
+            <a:off x="9083040" y="6334780"/>
+            <a:ext cx="3108960" cy="523220"/>
+          </a:xfrm>
+          <a:prstGeom prst="rect">
+            <a:avLst/>
+          </a:prstGeom>
+          <a:noFill/>
+        </p:spPr>
+        <p:txBody>
+          <a:bodyPr wrap="square" rtlCol="0">
+            <a:spAutoFit/>
+          </a:bodyPr>
+          <a:lstStyle/>
+          <a:p>
+            <a:r>
+              <a:rPr lang="zh-TW" altLang="en-US" sz="2800" b="1" dirty="0" smtClean="0">
+                <a:effectLst>
+                  <a:outerShdw blurRad="38100" dist="38100" dir="2700000" algn="tl">
+                    <a:srgbClr val="000000">
+                      <a:alpha val="43137"/>
+                    </a:srgbClr>
+                  </a:outerShdw>
+                </a:effectLst>
+                <a:latin typeface="微軟正黑體" panose="020B0604030504040204" pitchFamily="34" charset="-120"/>
+                <a:ea typeface="微軟正黑體" panose="020B0604030504040204" pitchFamily="34" charset="-120"/>
+              </a:rPr>
+              <a:t>驅動程式基礎架構</a:t>
+            </a:r>
+            <a:endParaRPr lang="zh-TW" altLang="en-US" sz="2800" b="1" dirty="0">
+              <a:effectLst>
+                <a:outerShdw blurRad="38100" dist="38100" dir="2700000" algn="tl">
+                  <a:srgbClr val="000000">
+                    <a:alpha val="43137"/>
+                  </a:srgbClr>
+                </a:outerShdw>
+              </a:effectLst>
+              <a:latin typeface="微軟正黑體" panose="020B0604030504040204" pitchFamily="34" charset="-120"/>
+              <a:ea typeface="微軟正黑體" panose="020B0604030504040204" pitchFamily="34" charset="-120"/>
+            </a:endParaRPr>
+          </a:p>
+        </p:txBody>
+      </p:sp>
+      <p:sp>
+        <p:nvSpPr>
+          <p:cNvPr id="8" name="文字方塊 7"/>
+          <p:cNvSpPr txBox="1"/>
+          <p:nvPr/>
+        </p:nvSpPr>
+        <p:spPr>
+          <a:xfrm>
+            <a:off x="182880" y="0"/>
+            <a:ext cx="4155440" cy="646331"/>
+          </a:xfrm>
+          <a:prstGeom prst="rect">
+            <a:avLst/>
+          </a:prstGeom>
+          <a:noFill/>
+        </p:spPr>
+        <p:txBody>
+          <a:bodyPr wrap="square" rtlCol="0">
+            <a:spAutoFit/>
+          </a:bodyPr>
+          <a:lstStyle/>
+          <a:p>
+            <a:r>
+              <a:rPr lang="en-US" altLang="zh-TW" sz="3600" dirty="0" smtClean="0">
+                <a:effectLst>
+                  <a:outerShdw blurRad="38100" dist="38100" dir="2700000" algn="tl">
+                    <a:srgbClr val="000000">
+                      <a:alpha val="43137"/>
+                    </a:srgbClr>
+                  </a:outerShdw>
+                </a:effectLst>
+                <a:latin typeface="微軟正黑體" panose="020B0604030504040204" pitchFamily="34" charset="-120"/>
+                <a:ea typeface="微軟正黑體" panose="020B0604030504040204" pitchFamily="34" charset="-120"/>
+              </a:rPr>
+              <a:t>Install NT Driver</a:t>
+            </a:r>
+          </a:p>
+        </p:txBody>
+      </p:sp>
+      <p:pic>
+        <p:nvPicPr>
+          <p:cNvPr id="5" name="圖片 4"/>
+          <p:cNvPicPr>
+            <a:picLocks noChangeAspect="1"/>
+          </p:cNvPicPr>
+          <p:nvPr/>
+        </p:nvPicPr>
+        <p:blipFill>
+          <a:blip r:embed="rId3"/>
+          <a:stretch>
+            <a:fillRect/>
+          </a:stretch>
+        </p:blipFill>
+        <p:spPr>
+          <a:xfrm>
+            <a:off x="300990" y="600075"/>
+            <a:ext cx="5676900" cy="5962650"/>
+          </a:xfrm>
+          <a:prstGeom prst="rect">
+            <a:avLst/>
+          </a:prstGeom>
+        </p:spPr>
+      </p:pic>
+    </p:spTree>
+    <p:extLst>
+      <p:ext uri="{BB962C8B-B14F-4D97-AF65-F5344CB8AC3E}">
+        <p14:creationId xmlns:p14="http://schemas.microsoft.com/office/powerpoint/2010/main" val="398484547"/>
+      </p:ext>
+    </p:extLst>
+  </p:cSld>
+  <p:clrMapOvr>
+    <a:masterClrMapping/>
+  </p:clrMapOvr>
+  <p:timing>
+    <p:tnLst>
+      <p:par>
+        <p:cTn id="1" dur="indefinite" restart="never" nodeType="tmRoot"/>
+      </p:par>
+    </p:tnLst>
+  </p:timing>
+</p:sld>
+</file>
+
+<file path=ppt/slides/slide33.xml><?xml version="1.0" encoding="utf-8"?>
+<p:sld xmlns:a="http://schemas.openxmlformats.org/drawingml/2006/main" xmlns:r="http://schemas.openxmlformats.org/officeDocument/2006/relationships" xmlns:p="http://schemas.openxmlformats.org/presentationml/2006/main">
+  <p:cSld>
+    <p:spTree>
+      <p:nvGrpSpPr>
+        <p:cNvPr id="1" name=""/>
+        <p:cNvGrpSpPr/>
+        <p:nvPr/>
+      </p:nvGrpSpPr>
+      <p:grpSpPr>
+        <a:xfrm>
+          <a:off x="0" y="0"/>
+          <a:ext cx="0" cy="0"/>
+          <a:chOff x="0" y="0"/>
+          <a:chExt cx="0" cy="0"/>
+        </a:xfrm>
+      </p:grpSpPr>
+      <p:sp>
+        <p:nvSpPr>
+          <p:cNvPr id="4" name="文字方塊 3"/>
+          <p:cNvSpPr txBox="1"/>
+          <p:nvPr/>
+        </p:nvSpPr>
+        <p:spPr>
+          <a:xfrm>
+            <a:off x="9083040" y="6334780"/>
+            <a:ext cx="3108960" cy="523220"/>
+          </a:xfrm>
+          <a:prstGeom prst="rect">
+            <a:avLst/>
+          </a:prstGeom>
+          <a:noFill/>
+        </p:spPr>
+        <p:txBody>
+          <a:bodyPr wrap="square" rtlCol="0">
+            <a:spAutoFit/>
+          </a:bodyPr>
+          <a:lstStyle/>
+          <a:p>
+            <a:r>
+              <a:rPr lang="zh-TW" altLang="en-US" sz="2800" b="1" dirty="0" smtClean="0">
+                <a:effectLst>
+                  <a:outerShdw blurRad="38100" dist="38100" dir="2700000" algn="tl">
+                    <a:srgbClr val="000000">
+                      <a:alpha val="43137"/>
+                    </a:srgbClr>
+                  </a:outerShdw>
+                </a:effectLst>
+                <a:latin typeface="微軟正黑體" panose="020B0604030504040204" pitchFamily="34" charset="-120"/>
+                <a:ea typeface="微軟正黑體" panose="020B0604030504040204" pitchFamily="34" charset="-120"/>
+              </a:rPr>
+              <a:t>驅動程式基礎架構</a:t>
+            </a:r>
+            <a:endParaRPr lang="zh-TW" altLang="en-US" sz="2800" b="1" dirty="0">
+              <a:effectLst>
+                <a:outerShdw blurRad="38100" dist="38100" dir="2700000" algn="tl">
+                  <a:srgbClr val="000000">
+                    <a:alpha val="43137"/>
+                  </a:srgbClr>
+                </a:outerShdw>
+              </a:effectLst>
+              <a:latin typeface="微軟正黑體" panose="020B0604030504040204" pitchFamily="34" charset="-120"/>
+              <a:ea typeface="微軟正黑體" panose="020B0604030504040204" pitchFamily="34" charset="-120"/>
+            </a:endParaRPr>
+          </a:p>
+        </p:txBody>
+      </p:sp>
+      <p:sp>
+        <p:nvSpPr>
+          <p:cNvPr id="8" name="文字方塊 7"/>
+          <p:cNvSpPr txBox="1"/>
+          <p:nvPr/>
+        </p:nvSpPr>
+        <p:spPr>
+          <a:xfrm>
+            <a:off x="182880" y="0"/>
+            <a:ext cx="4155440" cy="646331"/>
+          </a:xfrm>
+          <a:prstGeom prst="rect">
+            <a:avLst/>
+          </a:prstGeom>
+          <a:noFill/>
+        </p:spPr>
+        <p:txBody>
+          <a:bodyPr wrap="square" rtlCol="0">
+            <a:spAutoFit/>
+          </a:bodyPr>
+          <a:lstStyle/>
+          <a:p>
+            <a:r>
+              <a:rPr lang="en-US" altLang="zh-TW" sz="3600" dirty="0" smtClean="0">
+                <a:effectLst>
+                  <a:outerShdw blurRad="38100" dist="38100" dir="2700000" algn="tl">
+                    <a:srgbClr val="000000">
+                      <a:alpha val="43137"/>
+                    </a:srgbClr>
+                  </a:outerShdw>
+                </a:effectLst>
+                <a:latin typeface="微軟正黑體" panose="020B0604030504040204" pitchFamily="34" charset="-120"/>
+                <a:ea typeface="微軟正黑體" panose="020B0604030504040204" pitchFamily="34" charset="-120"/>
+              </a:rPr>
+              <a:t>Control NT Driver</a:t>
+            </a:r>
+          </a:p>
+        </p:txBody>
+      </p:sp>
+      <p:pic>
+        <p:nvPicPr>
+          <p:cNvPr id="3" name="圖片 2"/>
+          <p:cNvPicPr>
+            <a:picLocks noChangeAspect="1"/>
+          </p:cNvPicPr>
+          <p:nvPr/>
+        </p:nvPicPr>
+        <p:blipFill>
+          <a:blip r:embed="rId2"/>
+          <a:stretch>
+            <a:fillRect/>
+          </a:stretch>
+        </p:blipFill>
+        <p:spPr>
+          <a:xfrm>
+            <a:off x="168592" y="813752"/>
+            <a:ext cx="4600575" cy="4905375"/>
+          </a:xfrm>
+          <a:prstGeom prst="rect">
+            <a:avLst/>
+          </a:prstGeom>
+        </p:spPr>
+      </p:pic>
+    </p:spTree>
+    <p:extLst>
+      <p:ext uri="{BB962C8B-B14F-4D97-AF65-F5344CB8AC3E}">
+        <p14:creationId xmlns:p14="http://schemas.microsoft.com/office/powerpoint/2010/main" val="3219000664"/>
+      </p:ext>
+    </p:extLst>
+  </p:cSld>
+  <p:clrMapOvr>
+    <a:masterClrMapping/>
+  </p:clrMapOvr>
+  <p:timing>
+    <p:tnLst>
+      <p:par>
+        <p:cTn id="1" dur="indefinite" restart="never" nodeType="tmRoot"/>
+      </p:par>
+    </p:tnLst>
+  </p:timing>
+</p:sld>
+</file>
+
+<file path=ppt/slides/slide34.xml><?xml version="1.0" encoding="utf-8"?>
+<p:sld xmlns:a="http://schemas.openxmlformats.org/drawingml/2006/main" xmlns:r="http://schemas.openxmlformats.org/officeDocument/2006/relationships" xmlns:p="http://schemas.openxmlformats.org/presentationml/2006/main">
+  <p:cSld>
+    <p:spTree>
+      <p:nvGrpSpPr>
+        <p:cNvPr id="1" name=""/>
+        <p:cNvGrpSpPr/>
+        <p:nvPr/>
+      </p:nvGrpSpPr>
+      <p:grpSpPr>
+        <a:xfrm>
+          <a:off x="0" y="0"/>
+          <a:ext cx="0" cy="0"/>
+          <a:chOff x="0" y="0"/>
+          <a:chExt cx="0" cy="0"/>
+        </a:xfrm>
+      </p:grpSpPr>
+      <p:sp>
+        <p:nvSpPr>
+          <p:cNvPr id="4" name="文字方塊 3"/>
+          <p:cNvSpPr txBox="1"/>
+          <p:nvPr/>
+        </p:nvSpPr>
+        <p:spPr>
+          <a:xfrm>
+            <a:off x="9083040" y="6334780"/>
+            <a:ext cx="3108960" cy="523220"/>
+          </a:xfrm>
+          <a:prstGeom prst="rect">
+            <a:avLst/>
+          </a:prstGeom>
+          <a:noFill/>
+        </p:spPr>
+        <p:txBody>
+          <a:bodyPr wrap="square" rtlCol="0">
+            <a:spAutoFit/>
+          </a:bodyPr>
+          <a:lstStyle/>
+          <a:p>
+            <a:r>
+              <a:rPr lang="zh-TW" altLang="en-US" sz="2800" b="1" dirty="0" smtClean="0">
+                <a:effectLst>
+                  <a:outerShdw blurRad="38100" dist="38100" dir="2700000" algn="tl">
+                    <a:srgbClr val="000000">
+                      <a:alpha val="43137"/>
+                    </a:srgbClr>
+                  </a:outerShdw>
+                </a:effectLst>
+                <a:latin typeface="微軟正黑體" panose="020B0604030504040204" pitchFamily="34" charset="-120"/>
+                <a:ea typeface="微軟正黑體" panose="020B0604030504040204" pitchFamily="34" charset="-120"/>
+              </a:rPr>
+              <a:t>驅動程式基礎架構</a:t>
+            </a:r>
+            <a:endParaRPr lang="zh-TW" altLang="en-US" sz="2800" b="1" dirty="0">
+              <a:effectLst>
+                <a:outerShdw blurRad="38100" dist="38100" dir="2700000" algn="tl">
+                  <a:srgbClr val="000000">
+                    <a:alpha val="43137"/>
+                  </a:srgbClr>
+                </a:outerShdw>
+              </a:effectLst>
+              <a:latin typeface="微軟正黑體" panose="020B0604030504040204" pitchFamily="34" charset="-120"/>
+              <a:ea typeface="微軟正黑體" panose="020B0604030504040204" pitchFamily="34" charset="-120"/>
+            </a:endParaRPr>
+          </a:p>
+        </p:txBody>
+      </p:sp>
+      <p:sp>
+        <p:nvSpPr>
+          <p:cNvPr id="8" name="文字方塊 7"/>
+          <p:cNvSpPr txBox="1"/>
+          <p:nvPr/>
+        </p:nvSpPr>
+        <p:spPr>
+          <a:xfrm>
+            <a:off x="182880" y="0"/>
+            <a:ext cx="4155440" cy="646331"/>
+          </a:xfrm>
+          <a:prstGeom prst="rect">
+            <a:avLst/>
+          </a:prstGeom>
+          <a:noFill/>
+        </p:spPr>
+        <p:txBody>
+          <a:bodyPr wrap="square" rtlCol="0">
+            <a:spAutoFit/>
+          </a:bodyPr>
+          <a:lstStyle/>
+          <a:p>
+            <a:r>
+              <a:rPr lang="en-US" altLang="zh-TW" sz="3600" dirty="0" smtClean="0">
+                <a:effectLst>
+                  <a:outerShdw blurRad="38100" dist="38100" dir="2700000" algn="tl">
+                    <a:srgbClr val="000000">
+                      <a:alpha val="43137"/>
+                    </a:srgbClr>
+                  </a:outerShdw>
+                </a:effectLst>
+                <a:latin typeface="微軟正黑體" panose="020B0604030504040204" pitchFamily="34" charset="-120"/>
+                <a:ea typeface="微軟正黑體" panose="020B0604030504040204" pitchFamily="34" charset="-120"/>
+              </a:rPr>
+              <a:t>Uninstall Driver</a:t>
+            </a:r>
+          </a:p>
+        </p:txBody>
+      </p:sp>
+      <p:pic>
+        <p:nvPicPr>
+          <p:cNvPr id="2" name="圖片 1"/>
+          <p:cNvPicPr>
+            <a:picLocks noChangeAspect="1"/>
+          </p:cNvPicPr>
+          <p:nvPr/>
+        </p:nvPicPr>
+        <p:blipFill>
+          <a:blip r:embed="rId2"/>
+          <a:stretch>
+            <a:fillRect/>
+          </a:stretch>
+        </p:blipFill>
+        <p:spPr>
+          <a:xfrm>
+            <a:off x="211455" y="758507"/>
+            <a:ext cx="5429250" cy="5686425"/>
+          </a:xfrm>
+          <a:prstGeom prst="rect">
+            <a:avLst/>
+          </a:prstGeom>
+        </p:spPr>
+      </p:pic>
+    </p:spTree>
+    <p:extLst>
+      <p:ext uri="{BB962C8B-B14F-4D97-AF65-F5344CB8AC3E}">
+        <p14:creationId xmlns:p14="http://schemas.microsoft.com/office/powerpoint/2010/main" val="761222271"/>
+      </p:ext>
+    </p:extLst>
+  </p:cSld>
+  <p:clrMapOvr>
+    <a:masterClrMapping/>
+  </p:clrMapOvr>
+  <p:timing>
+    <p:tnLst>
+      <p:par>
+        <p:cTn id="1" dur="indefinite" restart="never" nodeType="tmRoot"/>
+      </p:par>
+    </p:tnLst>
+  </p:timing>
+</p:sld>
+</file>
+
+<file path=ppt/slides/slide35.xml><?xml version="1.0" encoding="utf-8"?>
+<p:sld xmlns:a="http://schemas.openxmlformats.org/drawingml/2006/main" xmlns:r="http://schemas.openxmlformats.org/officeDocument/2006/relationships" xmlns:p="http://schemas.openxmlformats.org/presentationml/2006/main">
+  <p:cSld>
+    <p:spTree>
+      <p:nvGrpSpPr>
+        <p:cNvPr id="1" name=""/>
+        <p:cNvGrpSpPr/>
+        <p:nvPr/>
+      </p:nvGrpSpPr>
+      <p:grpSpPr>
+        <a:xfrm>
+          <a:off x="0" y="0"/>
+          <a:ext cx="0" cy="0"/>
+          <a:chOff x="0" y="0"/>
+          <a:chExt cx="0" cy="0"/>
+        </a:xfrm>
+      </p:grpSpPr>
+      <p:sp>
+        <p:nvSpPr>
+          <p:cNvPr id="4" name="文字方塊 3"/>
+          <p:cNvSpPr txBox="1"/>
+          <p:nvPr/>
+        </p:nvSpPr>
+        <p:spPr>
+          <a:xfrm>
+            <a:off x="9083040" y="6334780"/>
+            <a:ext cx="3108960" cy="523220"/>
+          </a:xfrm>
+          <a:prstGeom prst="rect">
+            <a:avLst/>
+          </a:prstGeom>
+          <a:noFill/>
+        </p:spPr>
+        <p:txBody>
+          <a:bodyPr wrap="square" rtlCol="0">
+            <a:spAutoFit/>
+          </a:bodyPr>
+          <a:lstStyle/>
+          <a:p>
+            <a:r>
+              <a:rPr lang="zh-TW" altLang="en-US" sz="2800" b="1" dirty="0" smtClean="0">
+                <a:effectLst>
+                  <a:outerShdw blurRad="38100" dist="38100" dir="2700000" algn="tl">
+                    <a:srgbClr val="000000">
+                      <a:alpha val="43137"/>
+                    </a:srgbClr>
+                  </a:outerShdw>
+                </a:effectLst>
+                <a:latin typeface="微軟正黑體" panose="020B0604030504040204" pitchFamily="34" charset="-120"/>
+                <a:ea typeface="微軟正黑體" panose="020B0604030504040204" pitchFamily="34" charset="-120"/>
+              </a:rPr>
+              <a:t>驅動程式基礎架構</a:t>
+            </a:r>
+            <a:endParaRPr lang="zh-TW" altLang="en-US" sz="2800" b="1" dirty="0">
+              <a:effectLst>
+                <a:outerShdw blurRad="38100" dist="38100" dir="2700000" algn="tl">
+                  <a:srgbClr val="000000">
+                    <a:alpha val="43137"/>
+                  </a:srgbClr>
+                </a:outerShdw>
+              </a:effectLst>
+              <a:latin typeface="微軟正黑體" panose="020B0604030504040204" pitchFamily="34" charset="-120"/>
+              <a:ea typeface="微軟正黑體" panose="020B0604030504040204" pitchFamily="34" charset="-120"/>
+            </a:endParaRPr>
+          </a:p>
+        </p:txBody>
+      </p:sp>
+      <p:sp>
+        <p:nvSpPr>
+          <p:cNvPr id="8" name="文字方塊 7"/>
+          <p:cNvSpPr txBox="1"/>
+          <p:nvPr/>
+        </p:nvSpPr>
+        <p:spPr>
+          <a:xfrm>
+            <a:off x="182880" y="0"/>
+            <a:ext cx="4155440" cy="646331"/>
+          </a:xfrm>
+          <a:prstGeom prst="rect">
+            <a:avLst/>
+          </a:prstGeom>
+          <a:noFill/>
+        </p:spPr>
+        <p:txBody>
+          <a:bodyPr wrap="square" rtlCol="0">
+            <a:spAutoFit/>
+          </a:bodyPr>
+          <a:lstStyle/>
+          <a:p>
+            <a:r>
+              <a:rPr lang="en-US" altLang="zh-TW" sz="3600" dirty="0" smtClean="0">
+                <a:effectLst>
+                  <a:outerShdw blurRad="38100" dist="38100" dir="2700000" algn="tl">
+                    <a:srgbClr val="000000">
+                      <a:alpha val="43137"/>
+                    </a:srgbClr>
+                  </a:outerShdw>
+                </a:effectLst>
+                <a:latin typeface="微軟正黑體" panose="020B0604030504040204" pitchFamily="34" charset="-120"/>
+                <a:ea typeface="微軟正黑體" panose="020B0604030504040204" pitchFamily="34" charset="-120"/>
+              </a:rPr>
+              <a:t>Uninstall Driver</a:t>
+            </a:r>
+          </a:p>
+        </p:txBody>
+      </p:sp>
+      <p:pic>
+        <p:nvPicPr>
+          <p:cNvPr id="2" name="圖片 1"/>
+          <p:cNvPicPr>
+            <a:picLocks noChangeAspect="1"/>
+          </p:cNvPicPr>
+          <p:nvPr/>
+        </p:nvPicPr>
+        <p:blipFill>
+          <a:blip r:embed="rId2"/>
+          <a:stretch>
+            <a:fillRect/>
+          </a:stretch>
+        </p:blipFill>
+        <p:spPr>
+          <a:xfrm>
+            <a:off x="211455" y="758507"/>
+            <a:ext cx="5429250" cy="5686425"/>
+          </a:xfrm>
+          <a:prstGeom prst="rect">
+            <a:avLst/>
+          </a:prstGeom>
+        </p:spPr>
+      </p:pic>
+      <p:pic>
+        <p:nvPicPr>
+          <p:cNvPr id="3" name="圖片 2"/>
+          <p:cNvPicPr>
+            <a:picLocks noChangeAspect="1"/>
+          </p:cNvPicPr>
+          <p:nvPr/>
+        </p:nvPicPr>
+        <p:blipFill>
+          <a:blip r:embed="rId3"/>
+          <a:stretch>
+            <a:fillRect/>
+          </a:stretch>
+        </p:blipFill>
+        <p:spPr>
+          <a:xfrm>
+            <a:off x="6392545" y="742632"/>
+            <a:ext cx="5238750" cy="1247775"/>
+          </a:xfrm>
+          <a:prstGeom prst="rect">
+            <a:avLst/>
+          </a:prstGeom>
+        </p:spPr>
+      </p:pic>
+    </p:spTree>
+    <p:extLst>
+      <p:ext uri="{BB962C8B-B14F-4D97-AF65-F5344CB8AC3E}">
+        <p14:creationId xmlns:p14="http://schemas.microsoft.com/office/powerpoint/2010/main" val="2097717749"/>
+      </p:ext>
+    </p:extLst>
+  </p:cSld>
+  <p:clrMapOvr>
+    <a:masterClrMapping/>
+  </p:clrMapOvr>
+  <p:timing>
+    <p:tnLst>
+      <p:par>
+        <p:cTn id="1" dur="indefinite" restart="never" nodeType="tmRoot"/>
+      </p:par>
+    </p:tnLst>
+  </p:timing>
+</p:sld>
+</file>
+
+<file path=ppt/slides/slide36.xml><?xml version="1.0" encoding="utf-8"?>
+<p:sld xmlns:a="http://schemas.openxmlformats.org/drawingml/2006/main" xmlns:r="http://schemas.openxmlformats.org/officeDocument/2006/relationships" xmlns:p="http://schemas.openxmlformats.org/presentationml/2006/main">
+  <p:cSld>
+    <p:spTree>
+      <p:nvGrpSpPr>
+        <p:cNvPr id="1" name=""/>
+        <p:cNvGrpSpPr/>
+        <p:nvPr/>
+      </p:nvGrpSpPr>
+      <p:grpSpPr>
+        <a:xfrm>
+          <a:off x="0" y="0"/>
+          <a:ext cx="0" cy="0"/>
+          <a:chOff x="0" y="0"/>
+          <a:chExt cx="0" cy="0"/>
+        </a:xfrm>
+      </p:grpSpPr>
+      <p:pic>
+        <p:nvPicPr>
+          <p:cNvPr id="6" name="圖片 5"/>
+          <p:cNvPicPr>
+            <a:picLocks noChangeAspect="1"/>
+          </p:cNvPicPr>
+          <p:nvPr/>
+        </p:nvPicPr>
+        <p:blipFill>
+          <a:blip r:embed="rId2" cstate="print">
+            <a:extLst>
+              <a:ext uri="{28A0092B-C50C-407E-A947-70E740481C1C}">
+                <a14:useLocalDpi xmlns:a14="http://schemas.microsoft.com/office/drawing/2010/main" val="0"/>
+              </a:ext>
+            </a:extLst>
+          </a:blip>
+          <a:stretch>
+            <a:fillRect/>
+          </a:stretch>
+        </p:blipFill>
+        <p:spPr>
+          <a:xfrm>
+            <a:off x="4318000" y="911860"/>
+            <a:ext cx="7020560" cy="5265420"/>
+          </a:xfrm>
+          <a:prstGeom prst="rect">
+            <a:avLst/>
+          </a:prstGeom>
+        </p:spPr>
+      </p:pic>
+      <p:sp>
+        <p:nvSpPr>
+          <p:cNvPr id="4" name="文字方塊 3"/>
+          <p:cNvSpPr txBox="1"/>
+          <p:nvPr/>
+        </p:nvSpPr>
+        <p:spPr>
+          <a:xfrm>
+            <a:off x="9083040" y="6334780"/>
+            <a:ext cx="3108960" cy="523220"/>
+          </a:xfrm>
+          <a:prstGeom prst="rect">
+            <a:avLst/>
+          </a:prstGeom>
+          <a:noFill/>
+        </p:spPr>
+        <p:txBody>
+          <a:bodyPr wrap="square" rtlCol="0">
+            <a:spAutoFit/>
+          </a:bodyPr>
+          <a:lstStyle/>
+          <a:p>
+            <a:r>
+              <a:rPr lang="zh-TW" altLang="en-US" sz="2800" b="1" dirty="0" smtClean="0">
+                <a:effectLst>
+                  <a:outerShdw blurRad="38100" dist="38100" dir="2700000" algn="tl">
+                    <a:srgbClr val="000000">
+                      <a:alpha val="43137"/>
+                    </a:srgbClr>
+                  </a:outerShdw>
+                </a:effectLst>
+                <a:latin typeface="微軟正黑體" panose="020B0604030504040204" pitchFamily="34" charset="-120"/>
+                <a:ea typeface="微軟正黑體" panose="020B0604030504040204" pitchFamily="34" charset="-120"/>
+              </a:rPr>
+              <a:t>驅動程式基礎架構</a:t>
+            </a:r>
+            <a:endParaRPr lang="zh-TW" altLang="en-US" sz="2800" b="1" dirty="0">
+              <a:effectLst>
+                <a:outerShdw blurRad="38100" dist="38100" dir="2700000" algn="tl">
+                  <a:srgbClr val="000000">
+                    <a:alpha val="43137"/>
+                  </a:srgbClr>
+                </a:outerShdw>
+              </a:effectLst>
+              <a:latin typeface="微軟正黑體" panose="020B0604030504040204" pitchFamily="34" charset="-120"/>
+              <a:ea typeface="微軟正黑體" panose="020B0604030504040204" pitchFamily="34" charset="-120"/>
+            </a:endParaRPr>
+          </a:p>
+        </p:txBody>
+      </p:sp>
+      <p:sp>
+        <p:nvSpPr>
+          <p:cNvPr id="8" name="文字方塊 7"/>
+          <p:cNvSpPr txBox="1"/>
+          <p:nvPr/>
+        </p:nvSpPr>
+        <p:spPr>
+          <a:xfrm>
+            <a:off x="182880" y="0"/>
+            <a:ext cx="4155440" cy="646331"/>
+          </a:xfrm>
+          <a:prstGeom prst="rect">
+            <a:avLst/>
+          </a:prstGeom>
+          <a:noFill/>
+        </p:spPr>
+        <p:txBody>
+          <a:bodyPr wrap="square" rtlCol="0">
+            <a:spAutoFit/>
+          </a:bodyPr>
+          <a:lstStyle/>
+          <a:p>
+            <a:r>
+              <a:rPr lang="en-US" altLang="zh-TW" sz="3600" dirty="0" smtClean="0">
+                <a:effectLst>
+                  <a:outerShdw blurRad="38100" dist="38100" dir="2700000" algn="tl">
+                    <a:srgbClr val="000000">
+                      <a:alpha val="43137"/>
+                    </a:srgbClr>
+                  </a:outerShdw>
+                </a:effectLst>
+                <a:latin typeface="微軟正黑體" panose="020B0604030504040204" pitchFamily="34" charset="-120"/>
+                <a:ea typeface="微軟正黑體" panose="020B0604030504040204" pitchFamily="34" charset="-120"/>
+              </a:rPr>
+              <a:t>Issue</a:t>
+            </a:r>
+          </a:p>
+        </p:txBody>
+      </p:sp>
+      <p:pic>
+        <p:nvPicPr>
+          <p:cNvPr id="5" name="圖片 4"/>
+          <p:cNvPicPr>
+            <a:picLocks noChangeAspect="1"/>
+          </p:cNvPicPr>
+          <p:nvPr/>
+        </p:nvPicPr>
+        <p:blipFill>
+          <a:blip r:embed="rId3"/>
+          <a:stretch>
+            <a:fillRect/>
+          </a:stretch>
+        </p:blipFill>
+        <p:spPr>
+          <a:xfrm>
+            <a:off x="317182" y="881062"/>
+            <a:ext cx="2962275" cy="828675"/>
+          </a:xfrm>
+          <a:prstGeom prst="rect">
+            <a:avLst/>
+          </a:prstGeom>
+        </p:spPr>
+      </p:pic>
+    </p:spTree>
+    <p:extLst>
+      <p:ext uri="{BB962C8B-B14F-4D97-AF65-F5344CB8AC3E}">
+        <p14:creationId xmlns:p14="http://schemas.microsoft.com/office/powerpoint/2010/main" val="2470137147"/>
+      </p:ext>
+    </p:extLst>
+  </p:cSld>
+  <p:clrMapOvr>
+    <a:masterClrMapping/>
+  </p:clrMapOvr>
+  <p:timing>
+    <p:tnLst>
+      <p:par>
+        <p:cTn id="1" dur="indefinite" restart="never" nodeType="tmRoot"/>
+      </p:par>
+    </p:tnLst>
+  </p:timing>
+</p:sld>
+</file>
+
+<file path=ppt/slides/slide37.xml><?xml version="1.0" encoding="utf-8"?>
+<p:sld xmlns:a="http://schemas.openxmlformats.org/drawingml/2006/main" xmlns:r="http://schemas.openxmlformats.org/officeDocument/2006/relationships" xmlns:p="http://schemas.openxmlformats.org/presentationml/2006/main">
+  <p:cSld>
+    <p:spTree>
+      <p:nvGrpSpPr>
+        <p:cNvPr id="1" name=""/>
+        <p:cNvGrpSpPr/>
+        <p:nvPr/>
+      </p:nvGrpSpPr>
+      <p:grpSpPr>
+        <a:xfrm>
+          <a:off x="0" y="0"/>
+          <a:ext cx="0" cy="0"/>
+          <a:chOff x="0" y="0"/>
+          <a:chExt cx="0" cy="0"/>
+        </a:xfrm>
+      </p:grpSpPr>
+      <p:sp>
+        <p:nvSpPr>
+          <p:cNvPr id="2" name="標題 1"/>
+          <p:cNvSpPr>
+            <a:spLocks noGrp="1"/>
+          </p:cNvSpPr>
+          <p:nvPr>
+            <p:ph type="title"/>
+          </p:nvPr>
+        </p:nvSpPr>
+        <p:spPr>
+          <a:xfrm>
+            <a:off x="5331460" y="2766218"/>
+            <a:ext cx="1760220" cy="1325563"/>
+          </a:xfrm>
+        </p:spPr>
+        <p:txBody>
+          <a:bodyPr/>
+          <a:lstStyle/>
+          <a:p>
+            <a:r>
+              <a:rPr lang="en-US" altLang="zh-TW" b="1" dirty="0" smtClean="0">
+                <a:effectLst>
+                  <a:outerShdw blurRad="38100" dist="38100" dir="2700000" algn="tl">
+                    <a:srgbClr val="000000">
+                      <a:alpha val="43137"/>
+                    </a:srgbClr>
+                  </a:outerShdw>
+                </a:effectLst>
+                <a:latin typeface="微軟正黑體" panose="020B0604030504040204" pitchFamily="34" charset="-120"/>
+                <a:ea typeface="微軟正黑體" panose="020B0604030504040204" pitchFamily="34" charset="-120"/>
+              </a:rPr>
+              <a:t>Q&amp;A</a:t>
+            </a:r>
+            <a:endParaRPr lang="zh-TW" altLang="en-US" b="1" dirty="0">
+              <a:effectLst>
+                <a:outerShdw blurRad="38100" dist="38100" dir="2700000" algn="tl">
+                  <a:srgbClr val="000000">
+                    <a:alpha val="43137"/>
+                  </a:srgbClr>
+                </a:outerShdw>
+              </a:effectLst>
+              <a:latin typeface="微軟正黑體" panose="020B0604030504040204" pitchFamily="34" charset="-120"/>
+              <a:ea typeface="微軟正黑體" panose="020B0604030504040204" pitchFamily="34" charset="-120"/>
+            </a:endParaRPr>
+          </a:p>
+        </p:txBody>
+      </p:sp>
+    </p:spTree>
+    <p:extLst>
+      <p:ext uri="{BB962C8B-B14F-4D97-AF65-F5344CB8AC3E}">
+        <p14:creationId xmlns:p14="http://schemas.microsoft.com/office/powerpoint/2010/main" val="1531412980"/>
       </p:ext>
     </p:extLst>
   </p:cSld>

</xml_diff>

<commit_message>
2018/12/27 Modify .ppt content.
</commit_message>
<xml_diff>
--- a/WindowsDriver/Driver(Windows).pptx
+++ b/WindowsDriver/Driver(Windows).pptx
@@ -5,7 +5,7 @@
     <p:sldMasterId id="2147483648" r:id="rId1"/>
   </p:sldMasterIdLst>
   <p:notesMasterIdLst>
-    <p:notesMasterId r:id="rId39"/>
+    <p:notesMasterId r:id="rId50"/>
   </p:notesMasterIdLst>
   <p:sldIdLst>
     <p:sldId id="256" r:id="rId2"/>
@@ -44,7 +44,18 @@
     <p:sldId id="290" r:id="rId35"/>
     <p:sldId id="291" r:id="rId36"/>
     <p:sldId id="293" r:id="rId37"/>
-    <p:sldId id="274" r:id="rId38"/>
+    <p:sldId id="294" r:id="rId38"/>
+    <p:sldId id="295" r:id="rId39"/>
+    <p:sldId id="298" r:id="rId40"/>
+    <p:sldId id="299" r:id="rId41"/>
+    <p:sldId id="297" r:id="rId42"/>
+    <p:sldId id="296" r:id="rId43"/>
+    <p:sldId id="300" r:id="rId44"/>
+    <p:sldId id="301" r:id="rId45"/>
+    <p:sldId id="302" r:id="rId46"/>
+    <p:sldId id="303" r:id="rId47"/>
+    <p:sldId id="304" r:id="rId48"/>
+    <p:sldId id="274" r:id="rId49"/>
   </p:sldIdLst>
   <p:sldSz cx="12192000" cy="6858000"/>
   <p:notesSz cx="6858000" cy="9144000"/>
@@ -244,7 +255,7 @@
           <a:p>
             <a:fld id="{F355FBFC-5F72-40AF-AB81-0E702AE33AA7}" type="datetimeFigureOut">
               <a:rPr lang="zh-TW" altLang="en-US" smtClean="0"/>
-              <a:t>2018/12/20</a:t>
+              <a:t>2018/12/27</a:t>
             </a:fld>
             <a:endParaRPr lang="zh-TW" altLang="en-US"/>
           </a:p>
@@ -727,7 +738,7 @@
           <a:p>
             <a:fld id="{2927ED23-458E-4D99-AAD7-7E25403CBF25}" type="datetimeFigureOut">
               <a:rPr lang="zh-TW" altLang="en-US" smtClean="0"/>
-              <a:t>2018/12/20</a:t>
+              <a:t>2018/12/27</a:t>
             </a:fld>
             <a:endParaRPr lang="zh-TW" altLang="en-US"/>
           </a:p>
@@ -897,7 +908,7 @@
           <a:p>
             <a:fld id="{2927ED23-458E-4D99-AAD7-7E25403CBF25}" type="datetimeFigureOut">
               <a:rPr lang="zh-TW" altLang="en-US" smtClean="0"/>
-              <a:t>2018/12/20</a:t>
+              <a:t>2018/12/27</a:t>
             </a:fld>
             <a:endParaRPr lang="zh-TW" altLang="en-US"/>
           </a:p>
@@ -1077,7 +1088,7 @@
           <a:p>
             <a:fld id="{2927ED23-458E-4D99-AAD7-7E25403CBF25}" type="datetimeFigureOut">
               <a:rPr lang="zh-TW" altLang="en-US" smtClean="0"/>
-              <a:t>2018/12/20</a:t>
+              <a:t>2018/12/27</a:t>
             </a:fld>
             <a:endParaRPr lang="zh-TW" altLang="en-US"/>
           </a:p>
@@ -1247,7 +1258,7 @@
           <a:p>
             <a:fld id="{2927ED23-458E-4D99-AAD7-7E25403CBF25}" type="datetimeFigureOut">
               <a:rPr lang="zh-TW" altLang="en-US" smtClean="0"/>
-              <a:t>2018/12/20</a:t>
+              <a:t>2018/12/27</a:t>
             </a:fld>
             <a:endParaRPr lang="zh-TW" altLang="en-US"/>
           </a:p>
@@ -1493,7 +1504,7 @@
           <a:p>
             <a:fld id="{2927ED23-458E-4D99-AAD7-7E25403CBF25}" type="datetimeFigureOut">
               <a:rPr lang="zh-TW" altLang="en-US" smtClean="0"/>
-              <a:t>2018/12/20</a:t>
+              <a:t>2018/12/27</a:t>
             </a:fld>
             <a:endParaRPr lang="zh-TW" altLang="en-US"/>
           </a:p>
@@ -1725,7 +1736,7 @@
           <a:p>
             <a:fld id="{2927ED23-458E-4D99-AAD7-7E25403CBF25}" type="datetimeFigureOut">
               <a:rPr lang="zh-TW" altLang="en-US" smtClean="0"/>
-              <a:t>2018/12/20</a:t>
+              <a:t>2018/12/27</a:t>
             </a:fld>
             <a:endParaRPr lang="zh-TW" altLang="en-US"/>
           </a:p>
@@ -2092,7 +2103,7 @@
           <a:p>
             <a:fld id="{2927ED23-458E-4D99-AAD7-7E25403CBF25}" type="datetimeFigureOut">
               <a:rPr lang="zh-TW" altLang="en-US" smtClean="0"/>
-              <a:t>2018/12/20</a:t>
+              <a:t>2018/12/27</a:t>
             </a:fld>
             <a:endParaRPr lang="zh-TW" altLang="en-US"/>
           </a:p>
@@ -2210,7 +2221,7 @@
           <a:p>
             <a:fld id="{2927ED23-458E-4D99-AAD7-7E25403CBF25}" type="datetimeFigureOut">
               <a:rPr lang="zh-TW" altLang="en-US" smtClean="0"/>
-              <a:t>2018/12/20</a:t>
+              <a:t>2018/12/27</a:t>
             </a:fld>
             <a:endParaRPr lang="zh-TW" altLang="en-US"/>
           </a:p>
@@ -2305,7 +2316,7 @@
           <a:p>
             <a:fld id="{2927ED23-458E-4D99-AAD7-7E25403CBF25}" type="datetimeFigureOut">
               <a:rPr lang="zh-TW" altLang="en-US" smtClean="0"/>
-              <a:t>2018/12/20</a:t>
+              <a:t>2018/12/27</a:t>
             </a:fld>
             <a:endParaRPr lang="zh-TW" altLang="en-US"/>
           </a:p>
@@ -2582,7 +2593,7 @@
           <a:p>
             <a:fld id="{2927ED23-458E-4D99-AAD7-7E25403CBF25}" type="datetimeFigureOut">
               <a:rPr lang="zh-TW" altLang="en-US" smtClean="0"/>
-              <a:t>2018/12/20</a:t>
+              <a:t>2018/12/27</a:t>
             </a:fld>
             <a:endParaRPr lang="zh-TW" altLang="en-US"/>
           </a:p>
@@ -2835,7 +2846,7 @@
           <a:p>
             <a:fld id="{2927ED23-458E-4D99-AAD7-7E25403CBF25}" type="datetimeFigureOut">
               <a:rPr lang="zh-TW" altLang="en-US" smtClean="0"/>
-              <a:t>2018/12/20</a:t>
+              <a:t>2018/12/27</a:t>
             </a:fld>
             <a:endParaRPr lang="zh-TW" altLang="en-US"/>
           </a:p>
@@ -3048,7 +3059,7 @@
           <a:p>
             <a:fld id="{2927ED23-458E-4D99-AAD7-7E25403CBF25}" type="datetimeFigureOut">
               <a:rPr lang="zh-TW" altLang="en-US" smtClean="0"/>
-              <a:t>2018/12/20</a:t>
+              <a:t>2018/12/27</a:t>
             </a:fld>
             <a:endParaRPr lang="zh-TW" altLang="en-US"/>
           </a:p>
@@ -8934,14 +8945,43 @@
                 <a:latin typeface="微軟正黑體" panose="020B0604030504040204" pitchFamily="34" charset="-120"/>
                 <a:ea typeface="微軟正黑體" panose="020B0604030504040204" pitchFamily="34" charset="-120"/>
               </a:rPr>
-              <a:t>基礎</a:t>
-            </a:r>
+              <a:t>基礎觀念 </a:t>
+            </a:r>
+            <a:r>
+              <a:rPr lang="en-US" altLang="zh-TW" dirty="0" smtClean="0">
+                <a:solidFill>
+                  <a:srgbClr val="FF0000"/>
+                </a:solidFill>
+                <a:latin typeface="微軟正黑體" panose="020B0604030504040204" pitchFamily="34" charset="-120"/>
+                <a:ea typeface="微軟正黑體" panose="020B0604030504040204" pitchFamily="34" charset="-120"/>
+              </a:rPr>
+              <a:t>(2018/12/11)</a:t>
+            </a:r>
+          </a:p>
+          <a:p>
             <a:r>
               <a:rPr lang="zh-TW" altLang="en-US" dirty="0" smtClean="0">
                 <a:latin typeface="微軟正黑體" panose="020B0604030504040204" pitchFamily="34" charset="-120"/>
                 <a:ea typeface="微軟正黑體" panose="020B0604030504040204" pitchFamily="34" charset="-120"/>
               </a:rPr>
-              <a:t>觀念 </a:t>
+              <a:t>驅動程式基礎</a:t>
+            </a:r>
+            <a:r>
+              <a:rPr lang="zh-TW" altLang="en-US" dirty="0" smtClean="0">
+                <a:latin typeface="微軟正黑體" panose="020B0604030504040204" pitchFamily="34" charset="-120"/>
+                <a:ea typeface="微軟正黑體" panose="020B0604030504040204" pitchFamily="34" charset="-120"/>
+              </a:rPr>
+              <a:t>架構 </a:t>
+            </a:r>
+            <a:r>
+              <a:rPr lang="en-US" altLang="zh-TW" dirty="0">
+                <a:solidFill>
+                  <a:srgbClr val="FF0000"/>
+                </a:solidFill>
+                <a:latin typeface="微軟正黑體" panose="020B0604030504040204" pitchFamily="34" charset="-120"/>
+                <a:ea typeface="微軟正黑體" panose="020B0604030504040204" pitchFamily="34" charset="-120"/>
+              </a:rPr>
+              <a:t>(</a:t>
             </a:r>
             <a:r>
               <a:rPr lang="en-US" altLang="zh-TW" dirty="0" smtClean="0">
@@ -8951,23 +8991,34 @@
                 <a:latin typeface="微軟正黑體" panose="020B0604030504040204" pitchFamily="34" charset="-120"/>
                 <a:ea typeface="微軟正黑體" panose="020B0604030504040204" pitchFamily="34" charset="-120"/>
               </a:rPr>
-              <a:t>(2018/12/11)</a:t>
-            </a:r>
-          </a:p>
-          <a:p>
+              <a:t>2018/12/21)</a:t>
+            </a:r>
+            <a:endParaRPr lang="en-US" altLang="zh-TW" dirty="0" smtClean="0">
+              <a:latin typeface="微軟正黑體" panose="020B0604030504040204" pitchFamily="34" charset="-120"/>
+              <a:ea typeface="微軟正黑體" panose="020B0604030504040204" pitchFamily="34" charset="-120"/>
+            </a:endParaRPr>
+          </a:p>
+          <a:p>
+            <a:r>
+              <a:rPr lang="en-US" altLang="zh-TW" dirty="0" smtClean="0">
+                <a:latin typeface="微軟正黑體" panose="020B0604030504040204" pitchFamily="34" charset="-120"/>
+                <a:ea typeface="微軟正黑體" panose="020B0604030504040204" pitchFamily="34" charset="-120"/>
+              </a:rPr>
+              <a:t>Windows</a:t>
+            </a:r>
             <a:r>
               <a:rPr lang="zh-TW" altLang="en-US" dirty="0" smtClean="0">
                 <a:latin typeface="微軟正黑體" panose="020B0604030504040204" pitchFamily="34" charset="-120"/>
                 <a:ea typeface="微軟正黑體" panose="020B0604030504040204" pitchFamily="34" charset="-120"/>
               </a:rPr>
-              <a:t>驅動程式基礎</a:t>
+              <a:t>記憶體</a:t>
             </a:r>
             <a:r>
               <a:rPr lang="zh-TW" altLang="en-US" dirty="0">
                 <a:latin typeface="微軟正黑體" panose="020B0604030504040204" pitchFamily="34" charset="-120"/>
                 <a:ea typeface="微軟正黑體" panose="020B0604030504040204" pitchFamily="34" charset="-120"/>
               </a:rPr>
-              <a:t>架構</a:t>
+              <a:t>管理</a:t>
             </a:r>
             <a:endParaRPr lang="zh-TW" altLang="en-US" dirty="0">
               <a:latin typeface="微軟正黑體" panose="020B0604030504040204" pitchFamily="34" charset="-120"/>
@@ -13114,8 +13165,8 @@
         </p:nvSpPr>
         <p:spPr>
           <a:xfrm>
-            <a:off x="5331460" y="2766218"/>
-            <a:ext cx="1760220" cy="1325563"/>
+            <a:off x="3001917" y="2862012"/>
+            <a:ext cx="6397171" cy="1325563"/>
           </a:xfrm>
         </p:spPr>
         <p:txBody>
@@ -13134,9 +13185,23 @@
                 <a:latin typeface="微軟正黑體" panose="020B0604030504040204" pitchFamily="34" charset="-120"/>
                 <a:ea typeface="微軟正黑體" panose="020B0604030504040204" pitchFamily="34" charset="-120"/>
               </a:rPr>
-              <a:t>Q&amp;A</a:t>
-            </a:r>
-            <a:endParaRPr lang="zh-TW" altLang="en-US" b="1" dirty="0">
+              <a:t>Windows</a:t>
+            </a:r>
+            <a:r>
+              <a:rPr lang="zh-TW" altLang="en-US" b="1" dirty="0" smtClean="0">
+                <a:effectLst>
+                  <a:outerShdw blurRad="38100" dist="38100" dir="2700000" algn="tl">
+                    <a:srgbClr val="000000">
+                      <a:alpha val="43137"/>
+                    </a:srgbClr>
+                  </a:outerShdw>
+                </a:effectLst>
+                <a:latin typeface="微軟正黑體" panose="020B0604030504040204" pitchFamily="34" charset="-120"/>
+                <a:ea typeface="微軟正黑體" panose="020B0604030504040204" pitchFamily="34" charset="-120"/>
+              </a:rPr>
+              <a:t>記憶體管理</a:t>
+            </a:r>
+            <a:endParaRPr lang="en-US" altLang="zh-TW" b="1" dirty="0">
               <a:effectLst>
                 <a:outerShdw blurRad="38100" dist="38100" dir="2700000" algn="tl">
                   <a:srgbClr val="000000">
@@ -13153,7 +13218,695 @@
     </p:spTree>
     <p:extLst>
       <p:ext uri="{BB962C8B-B14F-4D97-AF65-F5344CB8AC3E}">
-        <p14:creationId xmlns:p14="http://schemas.microsoft.com/office/powerpoint/2010/main" val="1531412980"/>
+        <p14:creationId xmlns:p14="http://schemas.microsoft.com/office/powerpoint/2010/main" val="253712101"/>
+      </p:ext>
+    </p:extLst>
+  </p:cSld>
+  <p:clrMapOvr>
+    <a:masterClrMapping/>
+  </p:clrMapOvr>
+  <p:timing>
+    <p:tnLst>
+      <p:par>
+        <p:cTn id="1" dur="indefinite" restart="never" nodeType="tmRoot"/>
+      </p:par>
+    </p:tnLst>
+  </p:timing>
+</p:sld>
+</file>
+
+<file path=ppt/slides/slide38.xml><?xml version="1.0" encoding="utf-8"?>
+<p:sld xmlns:a="http://schemas.openxmlformats.org/drawingml/2006/main" xmlns:r="http://schemas.openxmlformats.org/officeDocument/2006/relationships" xmlns:p="http://schemas.openxmlformats.org/presentationml/2006/main">
+  <p:cSld>
+    <p:spTree>
+      <p:nvGrpSpPr>
+        <p:cNvPr id="1" name=""/>
+        <p:cNvGrpSpPr/>
+        <p:nvPr/>
+      </p:nvGrpSpPr>
+      <p:grpSpPr>
+        <a:xfrm>
+          <a:off x="0" y="0"/>
+          <a:ext cx="0" cy="0"/>
+          <a:chOff x="0" y="0"/>
+          <a:chExt cx="0" cy="0"/>
+        </a:xfrm>
+      </p:grpSpPr>
+      <p:sp>
+        <p:nvSpPr>
+          <p:cNvPr id="4" name="文字方塊 3"/>
+          <p:cNvSpPr txBox="1"/>
+          <p:nvPr/>
+        </p:nvSpPr>
+        <p:spPr>
+          <a:xfrm>
+            <a:off x="8560526" y="6334780"/>
+            <a:ext cx="3631474" cy="523220"/>
+          </a:xfrm>
+          <a:prstGeom prst="rect">
+            <a:avLst/>
+          </a:prstGeom>
+          <a:noFill/>
+        </p:spPr>
+        <p:txBody>
+          <a:bodyPr wrap="square" rtlCol="0">
+            <a:spAutoFit/>
+          </a:bodyPr>
+          <a:lstStyle/>
+          <a:p>
+            <a:r>
+              <a:rPr lang="en-US" altLang="zh-TW" sz="2800" b="1" dirty="0" smtClean="0">
+                <a:effectLst>
+                  <a:outerShdw blurRad="38100" dist="38100" dir="2700000" algn="tl">
+                    <a:srgbClr val="000000">
+                      <a:alpha val="43137"/>
+                    </a:srgbClr>
+                  </a:outerShdw>
+                </a:effectLst>
+                <a:latin typeface="微軟正黑體" panose="020B0604030504040204" pitchFamily="34" charset="-120"/>
+                <a:ea typeface="微軟正黑體" panose="020B0604030504040204" pitchFamily="34" charset="-120"/>
+              </a:rPr>
+              <a:t>Windows</a:t>
+            </a:r>
+            <a:r>
+              <a:rPr lang="zh-TW" altLang="en-US" sz="2800" b="1" dirty="0" smtClean="0">
+                <a:effectLst>
+                  <a:outerShdw blurRad="38100" dist="38100" dir="2700000" algn="tl">
+                    <a:srgbClr val="000000">
+                      <a:alpha val="43137"/>
+                    </a:srgbClr>
+                  </a:outerShdw>
+                </a:effectLst>
+                <a:latin typeface="微軟正黑體" panose="020B0604030504040204" pitchFamily="34" charset="-120"/>
+                <a:ea typeface="微軟正黑體" panose="020B0604030504040204" pitchFamily="34" charset="-120"/>
+              </a:rPr>
+              <a:t>記憶體管理</a:t>
+            </a:r>
+            <a:endParaRPr lang="zh-TW" altLang="en-US" sz="2800" b="1" dirty="0">
+              <a:effectLst>
+                <a:outerShdw blurRad="38100" dist="38100" dir="2700000" algn="tl">
+                  <a:srgbClr val="000000">
+                    <a:alpha val="43137"/>
+                  </a:srgbClr>
+                </a:outerShdw>
+              </a:effectLst>
+              <a:latin typeface="微軟正黑體" panose="020B0604030504040204" pitchFamily="34" charset="-120"/>
+              <a:ea typeface="微軟正黑體" panose="020B0604030504040204" pitchFamily="34" charset="-120"/>
+            </a:endParaRPr>
+          </a:p>
+        </p:txBody>
+      </p:sp>
+      <p:sp>
+        <p:nvSpPr>
+          <p:cNvPr id="8" name="文字方塊 7"/>
+          <p:cNvSpPr txBox="1"/>
+          <p:nvPr/>
+        </p:nvSpPr>
+        <p:spPr>
+          <a:xfrm>
+            <a:off x="182880" y="0"/>
+            <a:ext cx="3169920" cy="646331"/>
+          </a:xfrm>
+          <a:prstGeom prst="rect">
+            <a:avLst/>
+          </a:prstGeom>
+          <a:noFill/>
+        </p:spPr>
+        <p:txBody>
+          <a:bodyPr wrap="square" rtlCol="0">
+            <a:spAutoFit/>
+          </a:bodyPr>
+          <a:lstStyle/>
+          <a:p>
+            <a:r>
+              <a:rPr lang="zh-TW" altLang="en-US" sz="3600" dirty="0" smtClean="0">
+                <a:effectLst>
+                  <a:outerShdw blurRad="38100" dist="38100" dir="2700000" algn="tl">
+                    <a:srgbClr val="000000">
+                      <a:alpha val="43137"/>
+                    </a:srgbClr>
+                  </a:outerShdw>
+                </a:effectLst>
+                <a:latin typeface="微軟正黑體" panose="020B0604030504040204" pitchFamily="34" charset="-120"/>
+                <a:ea typeface="微軟正黑體" panose="020B0604030504040204" pitchFamily="34" charset="-120"/>
+              </a:rPr>
+              <a:t>分頁與非分</a:t>
+            </a:r>
+            <a:r>
+              <a:rPr lang="zh-TW" altLang="en-US" sz="3600" dirty="0">
+                <a:effectLst>
+                  <a:outerShdw blurRad="38100" dist="38100" dir="2700000" algn="tl">
+                    <a:srgbClr val="000000">
+                      <a:alpha val="43137"/>
+                    </a:srgbClr>
+                  </a:outerShdw>
+                </a:effectLst>
+                <a:latin typeface="微軟正黑體" panose="020B0604030504040204" pitchFamily="34" charset="-120"/>
+                <a:ea typeface="微軟正黑體" panose="020B0604030504040204" pitchFamily="34" charset="-120"/>
+              </a:rPr>
+              <a:t>頁</a:t>
+            </a:r>
+            <a:endParaRPr lang="en-US" altLang="zh-TW" sz="3600" dirty="0" smtClean="0">
+              <a:effectLst>
+                <a:outerShdw blurRad="38100" dist="38100" dir="2700000" algn="tl">
+                  <a:srgbClr val="000000">
+                    <a:alpha val="43137"/>
+                  </a:srgbClr>
+                </a:outerShdw>
+              </a:effectLst>
+              <a:latin typeface="微軟正黑體" panose="020B0604030504040204" pitchFamily="34" charset="-120"/>
+              <a:ea typeface="微軟正黑體" panose="020B0604030504040204" pitchFamily="34" charset="-120"/>
+            </a:endParaRPr>
+          </a:p>
+        </p:txBody>
+      </p:sp>
+      <p:sp>
+        <p:nvSpPr>
+          <p:cNvPr id="6" name="文字方塊 5"/>
+          <p:cNvSpPr txBox="1"/>
+          <p:nvPr/>
+        </p:nvSpPr>
+        <p:spPr>
+          <a:xfrm>
+            <a:off x="1027612" y="1358537"/>
+            <a:ext cx="10633165" cy="2677656"/>
+          </a:xfrm>
+          <a:prstGeom prst="rect">
+            <a:avLst/>
+          </a:prstGeom>
+          <a:noFill/>
+        </p:spPr>
+        <p:txBody>
+          <a:bodyPr wrap="square" rtlCol="0">
+            <a:spAutoFit/>
+          </a:bodyPr>
+          <a:lstStyle/>
+          <a:p>
+            <a:pPr marL="285750" indent="-285750">
+              <a:buFont typeface="Arial" panose="020B0604020202020204" pitchFamily="34" charset="0"/>
+              <a:buChar char="•"/>
+            </a:pPr>
+            <a:r>
+              <a:rPr lang="zh-TW" altLang="en-US" sz="2400" b="1" dirty="0" smtClean="0">
+                <a:latin typeface="微軟正黑體" panose="020B0604030504040204" pitchFamily="34" charset="-120"/>
+                <a:ea typeface="微軟正黑體" panose="020B0604030504040204" pitchFamily="34" charset="-120"/>
+              </a:rPr>
+              <a:t>分頁記憶體</a:t>
+            </a:r>
+            <a:endParaRPr lang="en-US" altLang="zh-TW" sz="2400" b="1" dirty="0" smtClean="0">
+              <a:latin typeface="微軟正黑體" panose="020B0604030504040204" pitchFamily="34" charset="-120"/>
+              <a:ea typeface="微軟正黑體" panose="020B0604030504040204" pitchFamily="34" charset="-120"/>
+            </a:endParaRPr>
+          </a:p>
+          <a:p>
+            <a:pPr marL="742950" lvl="1" indent="-285750">
+              <a:buFont typeface="Arial" panose="020B0604020202020204" pitchFamily="34" charset="0"/>
+              <a:buChar char="•"/>
+            </a:pPr>
+            <a:r>
+              <a:rPr lang="zh-TW" altLang="en-US" sz="2400" b="1" dirty="0" smtClean="0">
+                <a:latin typeface="微軟正黑體" panose="020B0604030504040204" pitchFamily="34" charset="-120"/>
+                <a:ea typeface="微軟正黑體" panose="020B0604030504040204" pitchFamily="34" charset="-120"/>
+              </a:rPr>
+              <a:t>可以被交換至檔案中</a:t>
+            </a:r>
+            <a:endParaRPr lang="en-US" altLang="zh-TW" sz="2400" b="1" dirty="0" smtClean="0">
+              <a:latin typeface="微軟正黑體" panose="020B0604030504040204" pitchFamily="34" charset="-120"/>
+              <a:ea typeface="微軟正黑體" panose="020B0604030504040204" pitchFamily="34" charset="-120"/>
+            </a:endParaRPr>
+          </a:p>
+          <a:p>
+            <a:pPr marL="742950" lvl="1" indent="-285750">
+              <a:buFont typeface="Arial" panose="020B0604020202020204" pitchFamily="34" charset="0"/>
+              <a:buChar char="•"/>
+            </a:pPr>
+            <a:r>
+              <a:rPr lang="en-US" altLang="zh-TW" sz="2400" b="1" dirty="0" smtClean="0">
+                <a:solidFill>
+                  <a:srgbClr val="C00000"/>
+                </a:solidFill>
+                <a:latin typeface="微軟正黑體" panose="020B0604030504040204" pitchFamily="34" charset="-120"/>
+                <a:ea typeface="微軟正黑體" panose="020B0604030504040204" pitchFamily="34" charset="-120"/>
+              </a:rPr>
+              <a:t>IRQL</a:t>
+            </a:r>
+            <a:r>
+              <a:rPr lang="zh-TW" altLang="en-US" sz="2400" b="1" dirty="0" smtClean="0">
+                <a:solidFill>
+                  <a:srgbClr val="C00000"/>
+                </a:solidFill>
+                <a:latin typeface="微軟正黑體" panose="020B0604030504040204" pitchFamily="34" charset="-120"/>
+                <a:ea typeface="微軟正黑體" panose="020B0604030504040204" pitchFamily="34" charset="-120"/>
+              </a:rPr>
+              <a:t> </a:t>
+            </a:r>
+            <a:r>
+              <a:rPr lang="en-US" altLang="zh-TW" sz="2400" b="1" dirty="0" smtClean="0">
+                <a:solidFill>
+                  <a:srgbClr val="C00000"/>
+                </a:solidFill>
+                <a:latin typeface="微軟正黑體" panose="020B0604030504040204" pitchFamily="34" charset="-120"/>
+                <a:ea typeface="微軟正黑體" panose="020B0604030504040204" pitchFamily="34" charset="-120"/>
+              </a:rPr>
+              <a:t>&lt;</a:t>
+            </a:r>
+            <a:r>
+              <a:rPr lang="zh-TW" altLang="en-US" sz="2400" b="1" dirty="0" smtClean="0">
+                <a:solidFill>
+                  <a:srgbClr val="C00000"/>
+                </a:solidFill>
+                <a:latin typeface="微軟正黑體" panose="020B0604030504040204" pitchFamily="34" charset="-120"/>
+                <a:ea typeface="微軟正黑體" panose="020B0604030504040204" pitchFamily="34" charset="-120"/>
+              </a:rPr>
+              <a:t> </a:t>
+            </a:r>
+            <a:r>
+              <a:rPr lang="en-US" altLang="zh-TW" sz="2400" b="1" dirty="0" smtClean="0">
+                <a:solidFill>
+                  <a:srgbClr val="C00000"/>
+                </a:solidFill>
+                <a:latin typeface="微軟正黑體" panose="020B0604030504040204" pitchFamily="34" charset="-120"/>
+                <a:ea typeface="微軟正黑體" panose="020B0604030504040204" pitchFamily="34" charset="-120"/>
+              </a:rPr>
+              <a:t>DIPATCH_LEVEL</a:t>
+            </a:r>
+          </a:p>
+          <a:p>
+            <a:pPr lvl="1"/>
+            <a:endParaRPr lang="en-US" altLang="zh-TW" sz="2400" b="1" dirty="0">
+              <a:solidFill>
+                <a:srgbClr val="C00000"/>
+              </a:solidFill>
+              <a:latin typeface="微軟正黑體" panose="020B0604030504040204" pitchFamily="34" charset="-120"/>
+              <a:ea typeface="微軟正黑體" panose="020B0604030504040204" pitchFamily="34" charset="-120"/>
+            </a:endParaRPr>
+          </a:p>
+          <a:p>
+            <a:pPr marL="285750" indent="-285750">
+              <a:buFont typeface="Arial" panose="020B0604020202020204" pitchFamily="34" charset="0"/>
+              <a:buChar char="•"/>
+            </a:pPr>
+            <a:r>
+              <a:rPr lang="zh-TW" altLang="en-US" sz="2400" b="1" dirty="0" smtClean="0">
+                <a:latin typeface="微軟正黑體" panose="020B0604030504040204" pitchFamily="34" charset="-120"/>
+                <a:ea typeface="微軟正黑體" panose="020B0604030504040204" pitchFamily="34" charset="-120"/>
+              </a:rPr>
+              <a:t>非分頁記憶體</a:t>
+            </a:r>
+            <a:endParaRPr lang="en-US" altLang="zh-TW" sz="2400" b="1" dirty="0" smtClean="0">
+              <a:latin typeface="微軟正黑體" panose="020B0604030504040204" pitchFamily="34" charset="-120"/>
+              <a:ea typeface="微軟正黑體" panose="020B0604030504040204" pitchFamily="34" charset="-120"/>
+            </a:endParaRPr>
+          </a:p>
+          <a:p>
+            <a:pPr marL="742950" lvl="1" indent="-285750">
+              <a:buFont typeface="Arial" panose="020B0604020202020204" pitchFamily="34" charset="0"/>
+              <a:buChar char="•"/>
+            </a:pPr>
+            <a:r>
+              <a:rPr lang="zh-TW" altLang="en-US" sz="2400" b="1" dirty="0" smtClean="0">
+                <a:latin typeface="微軟正黑體" panose="020B0604030504040204" pitchFamily="34" charset="-120"/>
+                <a:ea typeface="微軟正黑體" panose="020B0604030504040204" pitchFamily="34" charset="-120"/>
+              </a:rPr>
+              <a:t>不可被交換至檔案中</a:t>
+            </a:r>
+            <a:endParaRPr lang="en-US" altLang="zh-TW" sz="2400" b="1" dirty="0" smtClean="0">
+              <a:latin typeface="微軟正黑體" panose="020B0604030504040204" pitchFamily="34" charset="-120"/>
+              <a:ea typeface="微軟正黑體" panose="020B0604030504040204" pitchFamily="34" charset="-120"/>
+            </a:endParaRPr>
+          </a:p>
+          <a:p>
+            <a:pPr marL="742950" lvl="1" indent="-285750">
+              <a:buFont typeface="Arial" panose="020B0604020202020204" pitchFamily="34" charset="0"/>
+              <a:buChar char="•"/>
+            </a:pPr>
+            <a:endParaRPr lang="zh-TW" altLang="en-US" sz="2400" b="1" dirty="0">
+              <a:latin typeface="微軟正黑體" panose="020B0604030504040204" pitchFamily="34" charset="-120"/>
+              <a:ea typeface="微軟正黑體" panose="020B0604030504040204" pitchFamily="34" charset="-120"/>
+            </a:endParaRPr>
+          </a:p>
+        </p:txBody>
+      </p:sp>
+    </p:spTree>
+    <p:extLst>
+      <p:ext uri="{BB962C8B-B14F-4D97-AF65-F5344CB8AC3E}">
+        <p14:creationId xmlns:p14="http://schemas.microsoft.com/office/powerpoint/2010/main" val="2407617847"/>
+      </p:ext>
+    </p:extLst>
+  </p:cSld>
+  <p:clrMapOvr>
+    <a:masterClrMapping/>
+  </p:clrMapOvr>
+  <p:timing>
+    <p:tnLst>
+      <p:par>
+        <p:cTn id="1" dur="indefinite" restart="never" nodeType="tmRoot"/>
+      </p:par>
+    </p:tnLst>
+  </p:timing>
+</p:sld>
+</file>
+
+<file path=ppt/slides/slide39.xml><?xml version="1.0" encoding="utf-8"?>
+<p:sld xmlns:a="http://schemas.openxmlformats.org/drawingml/2006/main" xmlns:r="http://schemas.openxmlformats.org/officeDocument/2006/relationships" xmlns:p="http://schemas.openxmlformats.org/presentationml/2006/main">
+  <p:cSld>
+    <p:spTree>
+      <p:nvGrpSpPr>
+        <p:cNvPr id="1" name=""/>
+        <p:cNvGrpSpPr/>
+        <p:nvPr/>
+      </p:nvGrpSpPr>
+      <p:grpSpPr>
+        <a:xfrm>
+          <a:off x="0" y="0"/>
+          <a:ext cx="0" cy="0"/>
+          <a:chOff x="0" y="0"/>
+          <a:chExt cx="0" cy="0"/>
+        </a:xfrm>
+      </p:grpSpPr>
+      <p:pic>
+        <p:nvPicPr>
+          <p:cNvPr id="9" name="圖片 8"/>
+          <p:cNvPicPr>
+            <a:picLocks noChangeAspect="1"/>
+          </p:cNvPicPr>
+          <p:nvPr/>
+        </p:nvPicPr>
+        <p:blipFill>
+          <a:blip r:embed="rId2"/>
+          <a:stretch>
+            <a:fillRect/>
+          </a:stretch>
+        </p:blipFill>
+        <p:spPr>
+          <a:xfrm>
+            <a:off x="6522310" y="631655"/>
+            <a:ext cx="4337277" cy="5594689"/>
+          </a:xfrm>
+          <a:prstGeom prst="rect">
+            <a:avLst/>
+          </a:prstGeom>
+        </p:spPr>
+      </p:pic>
+      <p:sp>
+        <p:nvSpPr>
+          <p:cNvPr id="4" name="文字方塊 3"/>
+          <p:cNvSpPr txBox="1"/>
+          <p:nvPr/>
+        </p:nvSpPr>
+        <p:spPr>
+          <a:xfrm>
+            <a:off x="8560526" y="6334780"/>
+            <a:ext cx="3631474" cy="523220"/>
+          </a:xfrm>
+          <a:prstGeom prst="rect">
+            <a:avLst/>
+          </a:prstGeom>
+          <a:noFill/>
+        </p:spPr>
+        <p:txBody>
+          <a:bodyPr wrap="square" rtlCol="0">
+            <a:spAutoFit/>
+          </a:bodyPr>
+          <a:lstStyle/>
+          <a:p>
+            <a:r>
+              <a:rPr lang="en-US" altLang="zh-TW" sz="2800" b="1" dirty="0" smtClean="0">
+                <a:effectLst>
+                  <a:outerShdw blurRad="38100" dist="38100" dir="2700000" algn="tl">
+                    <a:srgbClr val="000000">
+                      <a:alpha val="43137"/>
+                    </a:srgbClr>
+                  </a:outerShdw>
+                </a:effectLst>
+                <a:latin typeface="微軟正黑體" panose="020B0604030504040204" pitchFamily="34" charset="-120"/>
+                <a:ea typeface="微軟正黑體" panose="020B0604030504040204" pitchFamily="34" charset="-120"/>
+              </a:rPr>
+              <a:t>Windows</a:t>
+            </a:r>
+            <a:r>
+              <a:rPr lang="zh-TW" altLang="en-US" sz="2800" b="1" dirty="0" smtClean="0">
+                <a:effectLst>
+                  <a:outerShdw blurRad="38100" dist="38100" dir="2700000" algn="tl">
+                    <a:srgbClr val="000000">
+                      <a:alpha val="43137"/>
+                    </a:srgbClr>
+                  </a:outerShdw>
+                </a:effectLst>
+                <a:latin typeface="微軟正黑體" panose="020B0604030504040204" pitchFamily="34" charset="-120"/>
+                <a:ea typeface="微軟正黑體" panose="020B0604030504040204" pitchFamily="34" charset="-120"/>
+              </a:rPr>
+              <a:t>記憶體管理</a:t>
+            </a:r>
+            <a:endParaRPr lang="zh-TW" altLang="en-US" sz="2800" b="1" dirty="0">
+              <a:effectLst>
+                <a:outerShdw blurRad="38100" dist="38100" dir="2700000" algn="tl">
+                  <a:srgbClr val="000000">
+                    <a:alpha val="43137"/>
+                  </a:srgbClr>
+                </a:outerShdw>
+              </a:effectLst>
+              <a:latin typeface="微軟正黑體" panose="020B0604030504040204" pitchFamily="34" charset="-120"/>
+              <a:ea typeface="微軟正黑體" panose="020B0604030504040204" pitchFamily="34" charset="-120"/>
+            </a:endParaRPr>
+          </a:p>
+        </p:txBody>
+      </p:sp>
+      <p:sp>
+        <p:nvSpPr>
+          <p:cNvPr id="8" name="文字方塊 7"/>
+          <p:cNvSpPr txBox="1"/>
+          <p:nvPr/>
+        </p:nvSpPr>
+        <p:spPr>
+          <a:xfrm>
+            <a:off x="182880" y="0"/>
+            <a:ext cx="3169920" cy="646331"/>
+          </a:xfrm>
+          <a:prstGeom prst="rect">
+            <a:avLst/>
+          </a:prstGeom>
+          <a:noFill/>
+        </p:spPr>
+        <p:txBody>
+          <a:bodyPr wrap="square" rtlCol="0">
+            <a:spAutoFit/>
+          </a:bodyPr>
+          <a:lstStyle/>
+          <a:p>
+            <a:r>
+              <a:rPr lang="zh-TW" altLang="en-US" sz="3600" dirty="0" smtClean="0">
+                <a:effectLst>
+                  <a:outerShdw blurRad="38100" dist="38100" dir="2700000" algn="tl">
+                    <a:srgbClr val="000000">
+                      <a:alpha val="43137"/>
+                    </a:srgbClr>
+                  </a:outerShdw>
+                </a:effectLst>
+                <a:latin typeface="微軟正黑體" panose="020B0604030504040204" pitchFamily="34" charset="-120"/>
+                <a:ea typeface="微軟正黑體" panose="020B0604030504040204" pitchFamily="34" charset="-120"/>
+              </a:rPr>
+              <a:t>分頁與非分</a:t>
+            </a:r>
+            <a:r>
+              <a:rPr lang="zh-TW" altLang="en-US" sz="3600" dirty="0">
+                <a:effectLst>
+                  <a:outerShdw blurRad="38100" dist="38100" dir="2700000" algn="tl">
+                    <a:srgbClr val="000000">
+                      <a:alpha val="43137"/>
+                    </a:srgbClr>
+                  </a:outerShdw>
+                </a:effectLst>
+                <a:latin typeface="微軟正黑體" panose="020B0604030504040204" pitchFamily="34" charset="-120"/>
+                <a:ea typeface="微軟正黑體" panose="020B0604030504040204" pitchFamily="34" charset="-120"/>
+              </a:rPr>
+              <a:t>頁</a:t>
+            </a:r>
+            <a:endParaRPr lang="en-US" altLang="zh-TW" sz="3600" dirty="0" smtClean="0">
+              <a:effectLst>
+                <a:outerShdw blurRad="38100" dist="38100" dir="2700000" algn="tl">
+                  <a:srgbClr val="000000">
+                    <a:alpha val="43137"/>
+                  </a:srgbClr>
+                </a:outerShdw>
+              </a:effectLst>
+              <a:latin typeface="微軟正黑體" panose="020B0604030504040204" pitchFamily="34" charset="-120"/>
+              <a:ea typeface="微軟正黑體" panose="020B0604030504040204" pitchFamily="34" charset="-120"/>
+            </a:endParaRPr>
+          </a:p>
+        </p:txBody>
+      </p:sp>
+      <p:sp>
+        <p:nvSpPr>
+          <p:cNvPr id="6" name="文字方塊 5"/>
+          <p:cNvSpPr txBox="1"/>
+          <p:nvPr/>
+        </p:nvSpPr>
+        <p:spPr>
+          <a:xfrm>
+            <a:off x="1027612" y="1358537"/>
+            <a:ext cx="10633165" cy="2677656"/>
+          </a:xfrm>
+          <a:prstGeom prst="rect">
+            <a:avLst/>
+          </a:prstGeom>
+          <a:noFill/>
+        </p:spPr>
+        <p:txBody>
+          <a:bodyPr wrap="square" rtlCol="0">
+            <a:spAutoFit/>
+          </a:bodyPr>
+          <a:lstStyle/>
+          <a:p>
+            <a:pPr marL="285750" indent="-285750">
+              <a:buFont typeface="Arial" panose="020B0604020202020204" pitchFamily="34" charset="0"/>
+              <a:buChar char="•"/>
+            </a:pPr>
+            <a:r>
+              <a:rPr lang="zh-TW" altLang="en-US" sz="2400" b="1" dirty="0" smtClean="0">
+                <a:latin typeface="微軟正黑體" panose="020B0604030504040204" pitchFamily="34" charset="-120"/>
+                <a:ea typeface="微軟正黑體" panose="020B0604030504040204" pitchFamily="34" charset="-120"/>
+              </a:rPr>
+              <a:t>分頁記憶體</a:t>
+            </a:r>
+            <a:endParaRPr lang="en-US" altLang="zh-TW" sz="2400" b="1" dirty="0" smtClean="0">
+              <a:latin typeface="微軟正黑體" panose="020B0604030504040204" pitchFamily="34" charset="-120"/>
+              <a:ea typeface="微軟正黑體" panose="020B0604030504040204" pitchFamily="34" charset="-120"/>
+            </a:endParaRPr>
+          </a:p>
+          <a:p>
+            <a:pPr marL="742950" lvl="1" indent="-285750">
+              <a:buFont typeface="Arial" panose="020B0604020202020204" pitchFamily="34" charset="0"/>
+              <a:buChar char="•"/>
+            </a:pPr>
+            <a:r>
+              <a:rPr lang="zh-TW" altLang="en-US" sz="2400" b="1" dirty="0" smtClean="0">
+                <a:latin typeface="微軟正黑體" panose="020B0604030504040204" pitchFamily="34" charset="-120"/>
+                <a:ea typeface="微軟正黑體" panose="020B0604030504040204" pitchFamily="34" charset="-120"/>
+              </a:rPr>
+              <a:t>可以被交換至檔案中</a:t>
+            </a:r>
+            <a:endParaRPr lang="en-US" altLang="zh-TW" sz="2400" b="1" dirty="0" smtClean="0">
+              <a:latin typeface="微軟正黑體" panose="020B0604030504040204" pitchFamily="34" charset="-120"/>
+              <a:ea typeface="微軟正黑體" panose="020B0604030504040204" pitchFamily="34" charset="-120"/>
+            </a:endParaRPr>
+          </a:p>
+          <a:p>
+            <a:pPr marL="742950" lvl="1" indent="-285750">
+              <a:buFont typeface="Arial" panose="020B0604020202020204" pitchFamily="34" charset="0"/>
+              <a:buChar char="•"/>
+            </a:pPr>
+            <a:r>
+              <a:rPr lang="en-US" altLang="zh-TW" sz="2400" b="1" dirty="0" smtClean="0">
+                <a:solidFill>
+                  <a:srgbClr val="C00000"/>
+                </a:solidFill>
+                <a:latin typeface="微軟正黑體" panose="020B0604030504040204" pitchFamily="34" charset="-120"/>
+                <a:ea typeface="微軟正黑體" panose="020B0604030504040204" pitchFamily="34" charset="-120"/>
+              </a:rPr>
+              <a:t>IRQL</a:t>
+            </a:r>
+            <a:r>
+              <a:rPr lang="zh-TW" altLang="en-US" sz="2400" b="1" dirty="0" smtClean="0">
+                <a:solidFill>
+                  <a:srgbClr val="C00000"/>
+                </a:solidFill>
+                <a:latin typeface="微軟正黑體" panose="020B0604030504040204" pitchFamily="34" charset="-120"/>
+                <a:ea typeface="微軟正黑體" panose="020B0604030504040204" pitchFamily="34" charset="-120"/>
+              </a:rPr>
+              <a:t> </a:t>
+            </a:r>
+            <a:r>
+              <a:rPr lang="en-US" altLang="zh-TW" sz="2400" b="1" dirty="0" smtClean="0">
+                <a:solidFill>
+                  <a:srgbClr val="C00000"/>
+                </a:solidFill>
+                <a:latin typeface="微軟正黑體" panose="020B0604030504040204" pitchFamily="34" charset="-120"/>
+                <a:ea typeface="微軟正黑體" panose="020B0604030504040204" pitchFamily="34" charset="-120"/>
+              </a:rPr>
+              <a:t>&lt;</a:t>
+            </a:r>
+            <a:r>
+              <a:rPr lang="zh-TW" altLang="en-US" sz="2400" b="1" dirty="0" smtClean="0">
+                <a:solidFill>
+                  <a:srgbClr val="C00000"/>
+                </a:solidFill>
+                <a:latin typeface="微軟正黑體" panose="020B0604030504040204" pitchFamily="34" charset="-120"/>
+                <a:ea typeface="微軟正黑體" panose="020B0604030504040204" pitchFamily="34" charset="-120"/>
+              </a:rPr>
+              <a:t> </a:t>
+            </a:r>
+            <a:r>
+              <a:rPr lang="en-US" altLang="zh-TW" sz="2400" b="1" dirty="0" smtClean="0">
+                <a:solidFill>
+                  <a:srgbClr val="C00000"/>
+                </a:solidFill>
+                <a:latin typeface="微軟正黑體" panose="020B0604030504040204" pitchFamily="34" charset="-120"/>
+                <a:ea typeface="微軟正黑體" panose="020B0604030504040204" pitchFamily="34" charset="-120"/>
+              </a:rPr>
+              <a:t>DIPATCH_LEVEL</a:t>
+            </a:r>
+          </a:p>
+          <a:p>
+            <a:pPr lvl="1"/>
+            <a:endParaRPr lang="en-US" altLang="zh-TW" sz="2400" b="1" dirty="0">
+              <a:solidFill>
+                <a:srgbClr val="C00000"/>
+              </a:solidFill>
+              <a:latin typeface="微軟正黑體" panose="020B0604030504040204" pitchFamily="34" charset="-120"/>
+              <a:ea typeface="微軟正黑體" panose="020B0604030504040204" pitchFamily="34" charset="-120"/>
+            </a:endParaRPr>
+          </a:p>
+          <a:p>
+            <a:pPr marL="285750" indent="-285750">
+              <a:buFont typeface="Arial" panose="020B0604020202020204" pitchFamily="34" charset="0"/>
+              <a:buChar char="•"/>
+            </a:pPr>
+            <a:r>
+              <a:rPr lang="zh-TW" altLang="en-US" sz="2400" b="1" dirty="0" smtClean="0">
+                <a:latin typeface="微軟正黑體" panose="020B0604030504040204" pitchFamily="34" charset="-120"/>
+                <a:ea typeface="微軟正黑體" panose="020B0604030504040204" pitchFamily="34" charset="-120"/>
+              </a:rPr>
+              <a:t>非分頁記憶體</a:t>
+            </a:r>
+            <a:endParaRPr lang="en-US" altLang="zh-TW" sz="2400" b="1" dirty="0" smtClean="0">
+              <a:latin typeface="微軟正黑體" panose="020B0604030504040204" pitchFamily="34" charset="-120"/>
+              <a:ea typeface="微軟正黑體" panose="020B0604030504040204" pitchFamily="34" charset="-120"/>
+            </a:endParaRPr>
+          </a:p>
+          <a:p>
+            <a:pPr marL="742950" lvl="1" indent="-285750">
+              <a:buFont typeface="Arial" panose="020B0604020202020204" pitchFamily="34" charset="0"/>
+              <a:buChar char="•"/>
+            </a:pPr>
+            <a:r>
+              <a:rPr lang="zh-TW" altLang="en-US" sz="2400" b="1" dirty="0" smtClean="0">
+                <a:latin typeface="微軟正黑體" panose="020B0604030504040204" pitchFamily="34" charset="-120"/>
+                <a:ea typeface="微軟正黑體" panose="020B0604030504040204" pitchFamily="34" charset="-120"/>
+              </a:rPr>
+              <a:t>不可被交換至檔案中</a:t>
+            </a:r>
+            <a:endParaRPr lang="en-US" altLang="zh-TW" sz="2400" b="1" dirty="0" smtClean="0">
+              <a:latin typeface="微軟正黑體" panose="020B0604030504040204" pitchFamily="34" charset="-120"/>
+              <a:ea typeface="微軟正黑體" panose="020B0604030504040204" pitchFamily="34" charset="-120"/>
+            </a:endParaRPr>
+          </a:p>
+          <a:p>
+            <a:pPr marL="742950" lvl="1" indent="-285750">
+              <a:buFont typeface="Arial" panose="020B0604020202020204" pitchFamily="34" charset="0"/>
+              <a:buChar char="•"/>
+            </a:pPr>
+            <a:endParaRPr lang="zh-TW" altLang="en-US" sz="2400" b="1" dirty="0">
+              <a:latin typeface="微軟正黑體" panose="020B0604030504040204" pitchFamily="34" charset="-120"/>
+              <a:ea typeface="微軟正黑體" panose="020B0604030504040204" pitchFamily="34" charset="-120"/>
+            </a:endParaRPr>
+          </a:p>
+        </p:txBody>
+      </p:sp>
+    </p:spTree>
+    <p:extLst>
+      <p:ext uri="{BB962C8B-B14F-4D97-AF65-F5344CB8AC3E}">
+        <p14:creationId xmlns:p14="http://schemas.microsoft.com/office/powerpoint/2010/main" val="628409999"/>
       </p:ext>
     </p:extLst>
   </p:cSld>
@@ -13297,6 +14050,4008 @@
     <p:extLst>
       <p:ext uri="{BB962C8B-B14F-4D97-AF65-F5344CB8AC3E}">
         <p14:creationId xmlns:p14="http://schemas.microsoft.com/office/powerpoint/2010/main" val="668597455"/>
+      </p:ext>
+    </p:extLst>
+  </p:cSld>
+  <p:clrMapOvr>
+    <a:masterClrMapping/>
+  </p:clrMapOvr>
+  <p:timing>
+    <p:tnLst>
+      <p:par>
+        <p:cTn id="1" dur="indefinite" restart="never" nodeType="tmRoot"/>
+      </p:par>
+    </p:tnLst>
+  </p:timing>
+</p:sld>
+</file>
+
+<file path=ppt/slides/slide40.xml><?xml version="1.0" encoding="utf-8"?>
+<p:sld xmlns:a="http://schemas.openxmlformats.org/drawingml/2006/main" xmlns:r="http://schemas.openxmlformats.org/officeDocument/2006/relationships" xmlns:p="http://schemas.openxmlformats.org/presentationml/2006/main">
+  <p:cSld>
+    <p:spTree>
+      <p:nvGrpSpPr>
+        <p:cNvPr id="1" name=""/>
+        <p:cNvGrpSpPr/>
+        <p:nvPr/>
+      </p:nvGrpSpPr>
+      <p:grpSpPr>
+        <a:xfrm>
+          <a:off x="0" y="0"/>
+          <a:ext cx="0" cy="0"/>
+          <a:chOff x="0" y="0"/>
+          <a:chExt cx="0" cy="0"/>
+        </a:xfrm>
+      </p:grpSpPr>
+      <p:sp>
+        <p:nvSpPr>
+          <p:cNvPr id="4" name="文字方塊 3"/>
+          <p:cNvSpPr txBox="1"/>
+          <p:nvPr/>
+        </p:nvSpPr>
+        <p:spPr>
+          <a:xfrm>
+            <a:off x="8560526" y="6334780"/>
+            <a:ext cx="3631474" cy="523220"/>
+          </a:xfrm>
+          <a:prstGeom prst="rect">
+            <a:avLst/>
+          </a:prstGeom>
+          <a:noFill/>
+        </p:spPr>
+        <p:txBody>
+          <a:bodyPr wrap="square" rtlCol="0">
+            <a:spAutoFit/>
+          </a:bodyPr>
+          <a:lstStyle/>
+          <a:p>
+            <a:r>
+              <a:rPr lang="en-US" altLang="zh-TW" sz="2800" b="1" dirty="0" smtClean="0">
+                <a:effectLst>
+                  <a:outerShdw blurRad="38100" dist="38100" dir="2700000" algn="tl">
+                    <a:srgbClr val="000000">
+                      <a:alpha val="43137"/>
+                    </a:srgbClr>
+                  </a:outerShdw>
+                </a:effectLst>
+                <a:latin typeface="微軟正黑體" panose="020B0604030504040204" pitchFamily="34" charset="-120"/>
+                <a:ea typeface="微軟正黑體" panose="020B0604030504040204" pitchFamily="34" charset="-120"/>
+              </a:rPr>
+              <a:t>Windows</a:t>
+            </a:r>
+            <a:r>
+              <a:rPr lang="zh-TW" altLang="en-US" sz="2800" b="1" dirty="0" smtClean="0">
+                <a:effectLst>
+                  <a:outerShdw blurRad="38100" dist="38100" dir="2700000" algn="tl">
+                    <a:srgbClr val="000000">
+                      <a:alpha val="43137"/>
+                    </a:srgbClr>
+                  </a:outerShdw>
+                </a:effectLst>
+                <a:latin typeface="微軟正黑體" panose="020B0604030504040204" pitchFamily="34" charset="-120"/>
+                <a:ea typeface="微軟正黑體" panose="020B0604030504040204" pitchFamily="34" charset="-120"/>
+              </a:rPr>
+              <a:t>記憶體管理</a:t>
+            </a:r>
+            <a:endParaRPr lang="zh-TW" altLang="en-US" sz="2800" b="1" dirty="0">
+              <a:effectLst>
+                <a:outerShdw blurRad="38100" dist="38100" dir="2700000" algn="tl">
+                  <a:srgbClr val="000000">
+                    <a:alpha val="43137"/>
+                  </a:srgbClr>
+                </a:outerShdw>
+              </a:effectLst>
+              <a:latin typeface="微軟正黑體" panose="020B0604030504040204" pitchFamily="34" charset="-120"/>
+              <a:ea typeface="微軟正黑體" panose="020B0604030504040204" pitchFamily="34" charset="-120"/>
+            </a:endParaRPr>
+          </a:p>
+        </p:txBody>
+      </p:sp>
+      <p:sp>
+        <p:nvSpPr>
+          <p:cNvPr id="8" name="文字方塊 7"/>
+          <p:cNvSpPr txBox="1"/>
+          <p:nvPr/>
+        </p:nvSpPr>
+        <p:spPr>
+          <a:xfrm>
+            <a:off x="182880" y="0"/>
+            <a:ext cx="3169920" cy="646331"/>
+          </a:xfrm>
+          <a:prstGeom prst="rect">
+            <a:avLst/>
+          </a:prstGeom>
+          <a:noFill/>
+        </p:spPr>
+        <p:txBody>
+          <a:bodyPr wrap="square" rtlCol="0">
+            <a:spAutoFit/>
+          </a:bodyPr>
+          <a:lstStyle/>
+          <a:p>
+            <a:r>
+              <a:rPr lang="zh-TW" altLang="en-US" sz="3600" dirty="0" smtClean="0">
+                <a:effectLst>
+                  <a:outerShdw blurRad="38100" dist="38100" dir="2700000" algn="tl">
+                    <a:srgbClr val="000000">
+                      <a:alpha val="43137"/>
+                    </a:srgbClr>
+                  </a:outerShdw>
+                </a:effectLst>
+                <a:latin typeface="微軟正黑體" panose="020B0604030504040204" pitchFamily="34" charset="-120"/>
+                <a:ea typeface="微軟正黑體" panose="020B0604030504040204" pitchFamily="34" charset="-120"/>
+              </a:rPr>
+              <a:t>分頁與非分</a:t>
+            </a:r>
+            <a:r>
+              <a:rPr lang="zh-TW" altLang="en-US" sz="3600" dirty="0">
+                <a:effectLst>
+                  <a:outerShdw blurRad="38100" dist="38100" dir="2700000" algn="tl">
+                    <a:srgbClr val="000000">
+                      <a:alpha val="43137"/>
+                    </a:srgbClr>
+                  </a:outerShdw>
+                </a:effectLst>
+                <a:latin typeface="微軟正黑體" panose="020B0604030504040204" pitchFamily="34" charset="-120"/>
+                <a:ea typeface="微軟正黑體" panose="020B0604030504040204" pitchFamily="34" charset="-120"/>
+              </a:rPr>
+              <a:t>頁</a:t>
+            </a:r>
+            <a:endParaRPr lang="en-US" altLang="zh-TW" sz="3600" dirty="0" smtClean="0">
+              <a:effectLst>
+                <a:outerShdw blurRad="38100" dist="38100" dir="2700000" algn="tl">
+                  <a:srgbClr val="000000">
+                    <a:alpha val="43137"/>
+                  </a:srgbClr>
+                </a:outerShdw>
+              </a:effectLst>
+              <a:latin typeface="微軟正黑體" panose="020B0604030504040204" pitchFamily="34" charset="-120"/>
+              <a:ea typeface="微軟正黑體" panose="020B0604030504040204" pitchFamily="34" charset="-120"/>
+            </a:endParaRPr>
+          </a:p>
+        </p:txBody>
+      </p:sp>
+      <p:sp>
+        <p:nvSpPr>
+          <p:cNvPr id="3" name="文字方塊 2"/>
+          <p:cNvSpPr txBox="1"/>
+          <p:nvPr/>
+        </p:nvSpPr>
+        <p:spPr>
+          <a:xfrm>
+            <a:off x="827313" y="1506584"/>
+            <a:ext cx="7158446" cy="2585323"/>
+          </a:xfrm>
+          <a:prstGeom prst="rect">
+            <a:avLst/>
+          </a:prstGeom>
+          <a:noFill/>
+        </p:spPr>
+        <p:txBody>
+          <a:bodyPr wrap="square" rtlCol="0">
+            <a:spAutoFit/>
+          </a:bodyPr>
+          <a:lstStyle/>
+          <a:p>
+            <a:r>
+              <a:rPr lang="en-US" altLang="zh-TW" dirty="0">
+                <a:solidFill>
+                  <a:schemeClr val="bg1">
+                    <a:lumMod val="50000"/>
+                  </a:schemeClr>
+                </a:solidFill>
+                <a:latin typeface="Consolas" panose="020B0609020204030204" pitchFamily="49" charset="0"/>
+              </a:rPr>
+              <a:t>#define</a:t>
+            </a:r>
+            <a:r>
+              <a:rPr lang="en-US" altLang="zh-TW" dirty="0">
+                <a:latin typeface="Consolas" panose="020B0609020204030204" pitchFamily="49" charset="0"/>
+              </a:rPr>
+              <a:t> </a:t>
+            </a:r>
+            <a:r>
+              <a:rPr lang="en-US" altLang="zh-TW" dirty="0">
+                <a:solidFill>
+                  <a:srgbClr val="7030A0"/>
+                </a:solidFill>
+                <a:latin typeface="Consolas" panose="020B0609020204030204" pitchFamily="49" charset="0"/>
+              </a:rPr>
+              <a:t>INITCODE</a:t>
+            </a:r>
+            <a:r>
+              <a:rPr lang="en-US" altLang="zh-TW" dirty="0">
+                <a:latin typeface="Consolas" panose="020B0609020204030204" pitchFamily="49" charset="0"/>
+              </a:rPr>
+              <a:t> </a:t>
+            </a:r>
+            <a:r>
+              <a:rPr lang="en-US" altLang="zh-TW" dirty="0" err="1">
+                <a:latin typeface="Consolas" panose="020B0609020204030204" pitchFamily="49" charset="0"/>
+              </a:rPr>
+              <a:t>code_seg</a:t>
+            </a:r>
+            <a:r>
+              <a:rPr lang="en-US" altLang="zh-TW" dirty="0">
+                <a:latin typeface="Consolas" panose="020B0609020204030204" pitchFamily="49" charset="0"/>
+              </a:rPr>
+              <a:t>(</a:t>
+            </a:r>
+            <a:r>
+              <a:rPr lang="en-US" altLang="zh-TW" dirty="0">
+                <a:solidFill>
+                  <a:schemeClr val="accent2">
+                    <a:lumMod val="75000"/>
+                  </a:schemeClr>
+                </a:solidFill>
+                <a:latin typeface="Consolas" panose="020B0609020204030204" pitchFamily="49" charset="0"/>
+              </a:rPr>
+              <a:t>"INIT</a:t>
+            </a:r>
+            <a:r>
+              <a:rPr lang="en-US" altLang="zh-TW" dirty="0" smtClean="0">
+                <a:solidFill>
+                  <a:schemeClr val="accent2">
+                    <a:lumMod val="75000"/>
+                  </a:schemeClr>
+                </a:solidFill>
+                <a:latin typeface="Consolas" panose="020B0609020204030204" pitchFamily="49" charset="0"/>
+              </a:rPr>
+              <a:t>"</a:t>
+            </a:r>
+            <a:r>
+              <a:rPr lang="en-US" altLang="zh-TW" dirty="0" smtClean="0">
+                <a:latin typeface="Consolas" panose="020B0609020204030204" pitchFamily="49" charset="0"/>
+              </a:rPr>
+              <a:t>)</a:t>
+            </a:r>
+          </a:p>
+          <a:p>
+            <a:r>
+              <a:rPr lang="en-US" altLang="zh-TW" dirty="0" smtClean="0">
+                <a:solidFill>
+                  <a:schemeClr val="accent6">
+                    <a:lumMod val="75000"/>
+                  </a:schemeClr>
+                </a:solidFill>
+                <a:latin typeface="微軟正黑體" panose="020B0604030504040204" pitchFamily="34" charset="-120"/>
+                <a:ea typeface="微軟正黑體" panose="020B0604030504040204" pitchFamily="34" charset="-120"/>
+              </a:rPr>
+              <a:t>// </a:t>
+            </a:r>
+            <a:r>
+              <a:rPr lang="zh-TW" altLang="en-US" dirty="0" smtClean="0">
+                <a:solidFill>
+                  <a:schemeClr val="accent6">
+                    <a:lumMod val="75000"/>
+                  </a:schemeClr>
+                </a:solidFill>
+                <a:latin typeface="微軟正黑體" panose="020B0604030504040204" pitchFamily="34" charset="-120"/>
+                <a:ea typeface="微軟正黑體" panose="020B0604030504040204" pitchFamily="34" charset="-120"/>
+              </a:rPr>
+              <a:t>當</a:t>
+            </a:r>
+            <a:r>
+              <a:rPr lang="en-US" altLang="zh-TW" dirty="0" smtClean="0">
+                <a:solidFill>
+                  <a:schemeClr val="accent6">
+                    <a:lumMod val="75000"/>
+                  </a:schemeClr>
+                </a:solidFill>
+                <a:latin typeface="微軟正黑體" panose="020B0604030504040204" pitchFamily="34" charset="-120"/>
+                <a:ea typeface="微軟正黑體" panose="020B0604030504040204" pitchFamily="34" charset="-120"/>
+              </a:rPr>
+              <a:t>Function</a:t>
+            </a:r>
+            <a:r>
+              <a:rPr lang="zh-TW" altLang="en-US" dirty="0" smtClean="0">
+                <a:solidFill>
+                  <a:schemeClr val="accent6">
+                    <a:lumMod val="75000"/>
+                  </a:schemeClr>
+                </a:solidFill>
+                <a:latin typeface="微軟正黑體" panose="020B0604030504040204" pitchFamily="34" charset="-120"/>
+                <a:ea typeface="微軟正黑體" panose="020B0604030504040204" pitchFamily="34" charset="-120"/>
+              </a:rPr>
+              <a:t>執行完後就從記憶體中卸除</a:t>
+            </a:r>
+            <a:endParaRPr lang="en-US" altLang="zh-TW" dirty="0" smtClean="0">
+              <a:solidFill>
+                <a:schemeClr val="accent6">
+                  <a:lumMod val="75000"/>
+                </a:schemeClr>
+              </a:solidFill>
+              <a:latin typeface="微軟正黑體" panose="020B0604030504040204" pitchFamily="34" charset="-120"/>
+              <a:ea typeface="微軟正黑體" panose="020B0604030504040204" pitchFamily="34" charset="-120"/>
+            </a:endParaRPr>
+          </a:p>
+          <a:p>
+            <a:endParaRPr lang="en-US" altLang="zh-TW" dirty="0" smtClean="0">
+              <a:solidFill>
+                <a:schemeClr val="bg1">
+                  <a:lumMod val="50000"/>
+                </a:schemeClr>
+              </a:solidFill>
+              <a:latin typeface="Consolas" panose="020B0609020204030204" pitchFamily="49" charset="0"/>
+            </a:endParaRPr>
+          </a:p>
+          <a:p>
+            <a:r>
+              <a:rPr lang="en-US" altLang="zh-TW" dirty="0" smtClean="0">
+                <a:solidFill>
+                  <a:schemeClr val="bg1">
+                    <a:lumMod val="50000"/>
+                  </a:schemeClr>
+                </a:solidFill>
+                <a:latin typeface="Consolas" panose="020B0609020204030204" pitchFamily="49" charset="0"/>
+              </a:rPr>
+              <a:t>#</a:t>
+            </a:r>
+            <a:r>
+              <a:rPr lang="en-US" altLang="zh-TW" dirty="0">
+                <a:solidFill>
+                  <a:schemeClr val="bg1">
+                    <a:lumMod val="50000"/>
+                  </a:schemeClr>
+                </a:solidFill>
+                <a:latin typeface="Consolas" panose="020B0609020204030204" pitchFamily="49" charset="0"/>
+              </a:rPr>
+              <a:t>define</a:t>
+            </a:r>
+            <a:r>
+              <a:rPr lang="en-US" altLang="zh-TW" dirty="0" smtClean="0">
+                <a:latin typeface="Consolas" panose="020B0609020204030204" pitchFamily="49" charset="0"/>
+              </a:rPr>
+              <a:t> </a:t>
+            </a:r>
+            <a:r>
+              <a:rPr lang="en-US" altLang="zh-TW" dirty="0">
+                <a:solidFill>
+                  <a:srgbClr val="7030A0"/>
+                </a:solidFill>
+                <a:latin typeface="Consolas" panose="020B0609020204030204" pitchFamily="49" charset="0"/>
+              </a:rPr>
+              <a:t>PAGECODE</a:t>
+            </a:r>
+            <a:r>
+              <a:rPr lang="en-US" altLang="zh-TW" dirty="0">
+                <a:latin typeface="Consolas" panose="020B0609020204030204" pitchFamily="49" charset="0"/>
+              </a:rPr>
+              <a:t> </a:t>
+            </a:r>
+            <a:r>
+              <a:rPr lang="en-US" altLang="zh-TW" dirty="0" err="1">
+                <a:latin typeface="Consolas" panose="020B0609020204030204" pitchFamily="49" charset="0"/>
+              </a:rPr>
+              <a:t>code_seg</a:t>
+            </a:r>
+            <a:r>
+              <a:rPr lang="en-US" altLang="zh-TW" dirty="0">
+                <a:latin typeface="Consolas" panose="020B0609020204030204" pitchFamily="49" charset="0"/>
+              </a:rPr>
+              <a:t>(</a:t>
+            </a:r>
+            <a:r>
+              <a:rPr lang="en-US" altLang="zh-TW" dirty="0">
+                <a:solidFill>
+                  <a:schemeClr val="accent2">
+                    <a:lumMod val="75000"/>
+                  </a:schemeClr>
+                </a:solidFill>
+                <a:latin typeface="Consolas" panose="020B0609020204030204" pitchFamily="49" charset="0"/>
+              </a:rPr>
+              <a:t>"PAGE</a:t>
+            </a:r>
+            <a:r>
+              <a:rPr lang="en-US" altLang="zh-TW" dirty="0" smtClean="0">
+                <a:solidFill>
+                  <a:schemeClr val="accent2">
+                    <a:lumMod val="75000"/>
+                  </a:schemeClr>
+                </a:solidFill>
+                <a:latin typeface="Consolas" panose="020B0609020204030204" pitchFamily="49" charset="0"/>
+              </a:rPr>
+              <a:t>"</a:t>
+            </a:r>
+            <a:r>
+              <a:rPr lang="en-US" altLang="zh-TW" dirty="0" smtClean="0">
+                <a:latin typeface="Consolas" panose="020B0609020204030204" pitchFamily="49" charset="0"/>
+              </a:rPr>
+              <a:t>)</a:t>
+            </a:r>
+          </a:p>
+          <a:p>
+            <a:r>
+              <a:rPr lang="en-US" altLang="zh-TW" dirty="0">
+                <a:solidFill>
+                  <a:schemeClr val="accent6">
+                    <a:lumMod val="75000"/>
+                  </a:schemeClr>
+                </a:solidFill>
+                <a:latin typeface="微軟正黑體" panose="020B0604030504040204" pitchFamily="34" charset="-120"/>
+                <a:ea typeface="微軟正黑體" panose="020B0604030504040204" pitchFamily="34" charset="-120"/>
+              </a:rPr>
+              <a:t>// </a:t>
+            </a:r>
+            <a:r>
+              <a:rPr lang="zh-TW" altLang="en-US" dirty="0">
+                <a:solidFill>
+                  <a:schemeClr val="accent6">
+                    <a:lumMod val="75000"/>
+                  </a:schemeClr>
+                </a:solidFill>
+                <a:latin typeface="微軟正黑體" panose="020B0604030504040204" pitchFamily="34" charset="-120"/>
+                <a:ea typeface="微軟正黑體" panose="020B0604030504040204" pitchFamily="34" charset="-120"/>
+              </a:rPr>
+              <a:t>把</a:t>
+            </a:r>
+            <a:r>
+              <a:rPr lang="en-US" altLang="zh-TW" dirty="0" smtClean="0">
+                <a:solidFill>
+                  <a:schemeClr val="accent6">
+                    <a:lumMod val="75000"/>
+                  </a:schemeClr>
+                </a:solidFill>
+                <a:latin typeface="微軟正黑體" panose="020B0604030504040204" pitchFamily="34" charset="-120"/>
+                <a:ea typeface="微軟正黑體" panose="020B0604030504040204" pitchFamily="34" charset="-120"/>
+              </a:rPr>
+              <a:t>Function</a:t>
+            </a:r>
+            <a:r>
+              <a:rPr lang="zh-TW" altLang="en-US" dirty="0" smtClean="0">
+                <a:solidFill>
+                  <a:schemeClr val="accent6">
+                    <a:lumMod val="75000"/>
+                  </a:schemeClr>
+                </a:solidFill>
+                <a:latin typeface="微軟正黑體" panose="020B0604030504040204" pitchFamily="34" charset="-120"/>
+                <a:ea typeface="微軟正黑體" panose="020B0604030504040204" pitchFamily="34" charset="-120"/>
+              </a:rPr>
+              <a:t>載入分頁記憶體中</a:t>
+            </a:r>
+            <a:endParaRPr lang="en-US" altLang="zh-TW" dirty="0">
+              <a:solidFill>
+                <a:schemeClr val="accent6">
+                  <a:lumMod val="75000"/>
+                </a:schemeClr>
+              </a:solidFill>
+              <a:latin typeface="微軟正黑體" panose="020B0604030504040204" pitchFamily="34" charset="-120"/>
+              <a:ea typeface="微軟正黑體" panose="020B0604030504040204" pitchFamily="34" charset="-120"/>
+            </a:endParaRPr>
+          </a:p>
+          <a:p>
+            <a:endParaRPr lang="en-US" altLang="zh-TW" dirty="0" smtClean="0">
+              <a:latin typeface="Consolas" panose="020B0609020204030204" pitchFamily="49" charset="0"/>
+            </a:endParaRPr>
+          </a:p>
+          <a:p>
+            <a:endParaRPr lang="en-US" altLang="zh-TW" dirty="0">
+              <a:latin typeface="Consolas" panose="020B0609020204030204" pitchFamily="49" charset="0"/>
+            </a:endParaRPr>
+          </a:p>
+          <a:p>
+            <a:r>
+              <a:rPr lang="en-US" altLang="zh-TW" dirty="0">
+                <a:solidFill>
+                  <a:schemeClr val="bg1">
+                    <a:lumMod val="50000"/>
+                  </a:schemeClr>
+                </a:solidFill>
+                <a:latin typeface="Consolas" panose="020B0609020204030204" pitchFamily="49" charset="0"/>
+              </a:rPr>
+              <a:t>#define</a:t>
+            </a:r>
+            <a:r>
+              <a:rPr lang="en-US" altLang="zh-TW" dirty="0" smtClean="0">
+                <a:latin typeface="Consolas" panose="020B0609020204030204" pitchFamily="49" charset="0"/>
+              </a:rPr>
+              <a:t> </a:t>
+            </a:r>
+            <a:r>
+              <a:rPr lang="en-US" altLang="zh-TW" dirty="0">
+                <a:solidFill>
+                  <a:srgbClr val="7030A0"/>
+                </a:solidFill>
+                <a:latin typeface="Consolas" panose="020B0609020204030204" pitchFamily="49" charset="0"/>
+              </a:rPr>
+              <a:t>LOCKEDCODE</a:t>
+            </a:r>
+            <a:r>
+              <a:rPr lang="en-US" altLang="zh-TW" dirty="0">
+                <a:latin typeface="Consolas" panose="020B0609020204030204" pitchFamily="49" charset="0"/>
+              </a:rPr>
+              <a:t> </a:t>
+            </a:r>
+            <a:r>
+              <a:rPr lang="en-US" altLang="zh-TW" dirty="0" err="1">
+                <a:latin typeface="Consolas" panose="020B0609020204030204" pitchFamily="49" charset="0"/>
+              </a:rPr>
+              <a:t>code_seg</a:t>
+            </a:r>
+            <a:r>
+              <a:rPr lang="en-US" altLang="zh-TW" dirty="0" smtClean="0">
+                <a:latin typeface="Consolas" panose="020B0609020204030204" pitchFamily="49" charset="0"/>
+              </a:rPr>
+              <a:t>()</a:t>
+            </a:r>
+          </a:p>
+          <a:p>
+            <a:r>
+              <a:rPr lang="en-US" altLang="zh-TW" dirty="0">
+                <a:solidFill>
+                  <a:schemeClr val="accent6">
+                    <a:lumMod val="75000"/>
+                  </a:schemeClr>
+                </a:solidFill>
+                <a:latin typeface="微軟正黑體" panose="020B0604030504040204" pitchFamily="34" charset="-120"/>
+                <a:ea typeface="微軟正黑體" panose="020B0604030504040204" pitchFamily="34" charset="-120"/>
+              </a:rPr>
+              <a:t>// </a:t>
+            </a:r>
+            <a:r>
+              <a:rPr lang="zh-TW" altLang="en-US" dirty="0" smtClean="0">
+                <a:solidFill>
+                  <a:schemeClr val="accent6">
+                    <a:lumMod val="75000"/>
+                  </a:schemeClr>
+                </a:solidFill>
+                <a:latin typeface="微軟正黑體" panose="020B0604030504040204" pitchFamily="34" charset="-120"/>
+                <a:ea typeface="微軟正黑體" panose="020B0604030504040204" pitchFamily="34" charset="-120"/>
+              </a:rPr>
+              <a:t>把</a:t>
+            </a:r>
+            <a:r>
+              <a:rPr lang="en-US" altLang="zh-TW" dirty="0" smtClean="0">
+                <a:solidFill>
+                  <a:schemeClr val="accent6">
+                    <a:lumMod val="75000"/>
+                  </a:schemeClr>
+                </a:solidFill>
+                <a:latin typeface="微軟正黑體" panose="020B0604030504040204" pitchFamily="34" charset="-120"/>
+                <a:ea typeface="微軟正黑體" panose="020B0604030504040204" pitchFamily="34" charset="-120"/>
+              </a:rPr>
+              <a:t>Function</a:t>
+            </a:r>
+            <a:r>
+              <a:rPr lang="zh-TW" altLang="en-US" dirty="0" smtClean="0">
+                <a:solidFill>
+                  <a:schemeClr val="accent6">
+                    <a:lumMod val="75000"/>
+                  </a:schemeClr>
+                </a:solidFill>
+                <a:latin typeface="微軟正黑體" panose="020B0604030504040204" pitchFamily="34" charset="-120"/>
+                <a:ea typeface="微軟正黑體" panose="020B0604030504040204" pitchFamily="34" charset="-120"/>
+              </a:rPr>
+              <a:t>載入非分</a:t>
+            </a:r>
+            <a:r>
+              <a:rPr lang="zh-TW" altLang="en-US" dirty="0">
+                <a:solidFill>
+                  <a:schemeClr val="accent6">
+                    <a:lumMod val="75000"/>
+                  </a:schemeClr>
+                </a:solidFill>
+                <a:latin typeface="微軟正黑體" panose="020B0604030504040204" pitchFamily="34" charset="-120"/>
+                <a:ea typeface="微軟正黑體" panose="020B0604030504040204" pitchFamily="34" charset="-120"/>
+              </a:rPr>
+              <a:t>頁記憶體</a:t>
+            </a:r>
+            <a:r>
+              <a:rPr lang="zh-TW" altLang="en-US" dirty="0" smtClean="0">
+                <a:solidFill>
+                  <a:schemeClr val="accent6">
+                    <a:lumMod val="75000"/>
+                  </a:schemeClr>
+                </a:solidFill>
+                <a:latin typeface="微軟正黑體" panose="020B0604030504040204" pitchFamily="34" charset="-120"/>
+                <a:ea typeface="微軟正黑體" panose="020B0604030504040204" pitchFamily="34" charset="-120"/>
+              </a:rPr>
+              <a:t>中</a:t>
+            </a:r>
+            <a:endParaRPr lang="en-US" altLang="zh-TW" dirty="0">
+              <a:solidFill>
+                <a:schemeClr val="accent6">
+                  <a:lumMod val="75000"/>
+                </a:schemeClr>
+              </a:solidFill>
+              <a:latin typeface="微軟正黑體" panose="020B0604030504040204" pitchFamily="34" charset="-120"/>
+              <a:ea typeface="微軟正黑體" panose="020B0604030504040204" pitchFamily="34" charset="-120"/>
+            </a:endParaRPr>
+          </a:p>
+        </p:txBody>
+      </p:sp>
+    </p:spTree>
+    <p:extLst>
+      <p:ext uri="{BB962C8B-B14F-4D97-AF65-F5344CB8AC3E}">
+        <p14:creationId xmlns:p14="http://schemas.microsoft.com/office/powerpoint/2010/main" val="980204486"/>
+      </p:ext>
+    </p:extLst>
+  </p:cSld>
+  <p:clrMapOvr>
+    <a:masterClrMapping/>
+  </p:clrMapOvr>
+  <p:timing>
+    <p:tnLst>
+      <p:par>
+        <p:cTn id="1" dur="indefinite" restart="never" nodeType="tmRoot"/>
+      </p:par>
+    </p:tnLst>
+  </p:timing>
+</p:sld>
+</file>
+
+<file path=ppt/slides/slide41.xml><?xml version="1.0" encoding="utf-8"?>
+<p:sld xmlns:a="http://schemas.openxmlformats.org/drawingml/2006/main" xmlns:r="http://schemas.openxmlformats.org/officeDocument/2006/relationships" xmlns:p="http://schemas.openxmlformats.org/presentationml/2006/main">
+  <p:cSld>
+    <p:spTree>
+      <p:nvGrpSpPr>
+        <p:cNvPr id="1" name=""/>
+        <p:cNvGrpSpPr/>
+        <p:nvPr/>
+      </p:nvGrpSpPr>
+      <p:grpSpPr>
+        <a:xfrm>
+          <a:off x="0" y="0"/>
+          <a:ext cx="0" cy="0"/>
+          <a:chOff x="0" y="0"/>
+          <a:chExt cx="0" cy="0"/>
+        </a:xfrm>
+      </p:grpSpPr>
+      <p:sp>
+        <p:nvSpPr>
+          <p:cNvPr id="4" name="文字方塊 3"/>
+          <p:cNvSpPr txBox="1"/>
+          <p:nvPr/>
+        </p:nvSpPr>
+        <p:spPr>
+          <a:xfrm>
+            <a:off x="8560526" y="6334780"/>
+            <a:ext cx="3631474" cy="523220"/>
+          </a:xfrm>
+          <a:prstGeom prst="rect">
+            <a:avLst/>
+          </a:prstGeom>
+          <a:noFill/>
+        </p:spPr>
+        <p:txBody>
+          <a:bodyPr wrap="square" rtlCol="0">
+            <a:spAutoFit/>
+          </a:bodyPr>
+          <a:lstStyle/>
+          <a:p>
+            <a:r>
+              <a:rPr lang="en-US" altLang="zh-TW" sz="2800" b="1" dirty="0" smtClean="0">
+                <a:effectLst>
+                  <a:outerShdw blurRad="38100" dist="38100" dir="2700000" algn="tl">
+                    <a:srgbClr val="000000">
+                      <a:alpha val="43137"/>
+                    </a:srgbClr>
+                  </a:outerShdw>
+                </a:effectLst>
+                <a:latin typeface="微軟正黑體" panose="020B0604030504040204" pitchFamily="34" charset="-120"/>
+                <a:ea typeface="微軟正黑體" panose="020B0604030504040204" pitchFamily="34" charset="-120"/>
+              </a:rPr>
+              <a:t>Windows</a:t>
+            </a:r>
+            <a:r>
+              <a:rPr lang="zh-TW" altLang="en-US" sz="2800" b="1" dirty="0" smtClean="0">
+                <a:effectLst>
+                  <a:outerShdw blurRad="38100" dist="38100" dir="2700000" algn="tl">
+                    <a:srgbClr val="000000">
+                      <a:alpha val="43137"/>
+                    </a:srgbClr>
+                  </a:outerShdw>
+                </a:effectLst>
+                <a:latin typeface="微軟正黑體" panose="020B0604030504040204" pitchFamily="34" charset="-120"/>
+                <a:ea typeface="微軟正黑體" panose="020B0604030504040204" pitchFamily="34" charset="-120"/>
+              </a:rPr>
+              <a:t>記憶體管理</a:t>
+            </a:r>
+            <a:endParaRPr lang="zh-TW" altLang="en-US" sz="2800" b="1" dirty="0">
+              <a:effectLst>
+                <a:outerShdw blurRad="38100" dist="38100" dir="2700000" algn="tl">
+                  <a:srgbClr val="000000">
+                    <a:alpha val="43137"/>
+                  </a:srgbClr>
+                </a:outerShdw>
+              </a:effectLst>
+              <a:latin typeface="微軟正黑體" panose="020B0604030504040204" pitchFamily="34" charset="-120"/>
+              <a:ea typeface="微軟正黑體" panose="020B0604030504040204" pitchFamily="34" charset="-120"/>
+            </a:endParaRPr>
+          </a:p>
+        </p:txBody>
+      </p:sp>
+      <p:sp>
+        <p:nvSpPr>
+          <p:cNvPr id="8" name="文字方塊 7"/>
+          <p:cNvSpPr txBox="1"/>
+          <p:nvPr/>
+        </p:nvSpPr>
+        <p:spPr>
+          <a:xfrm>
+            <a:off x="182880" y="0"/>
+            <a:ext cx="2481943" cy="646331"/>
+          </a:xfrm>
+          <a:prstGeom prst="rect">
+            <a:avLst/>
+          </a:prstGeom>
+          <a:noFill/>
+        </p:spPr>
+        <p:txBody>
+          <a:bodyPr wrap="square" rtlCol="0">
+            <a:spAutoFit/>
+          </a:bodyPr>
+          <a:lstStyle/>
+          <a:p>
+            <a:r>
+              <a:rPr lang="zh-TW" altLang="en-US" sz="3600" dirty="0" smtClean="0">
+                <a:effectLst>
+                  <a:outerShdw blurRad="38100" dist="38100" dir="2700000" algn="tl">
+                    <a:srgbClr val="000000">
+                      <a:alpha val="43137"/>
+                    </a:srgbClr>
+                  </a:outerShdw>
+                </a:effectLst>
+                <a:latin typeface="微軟正黑體" panose="020B0604030504040204" pitchFamily="34" charset="-120"/>
+                <a:ea typeface="微軟正黑體" panose="020B0604030504040204" pitchFamily="34" charset="-120"/>
+              </a:rPr>
+              <a:t>配置記憶體</a:t>
+            </a:r>
+            <a:endParaRPr lang="en-US" altLang="zh-TW" sz="3600" dirty="0" smtClean="0">
+              <a:effectLst>
+                <a:outerShdw blurRad="38100" dist="38100" dir="2700000" algn="tl">
+                  <a:srgbClr val="000000">
+                    <a:alpha val="43137"/>
+                  </a:srgbClr>
+                </a:outerShdw>
+              </a:effectLst>
+              <a:latin typeface="微軟正黑體" panose="020B0604030504040204" pitchFamily="34" charset="-120"/>
+              <a:ea typeface="微軟正黑體" panose="020B0604030504040204" pitchFamily="34" charset="-120"/>
+            </a:endParaRPr>
+          </a:p>
+        </p:txBody>
+      </p:sp>
+      <p:sp>
+        <p:nvSpPr>
+          <p:cNvPr id="5" name="文字方塊 4"/>
+          <p:cNvSpPr txBox="1"/>
+          <p:nvPr/>
+        </p:nvSpPr>
+        <p:spPr>
+          <a:xfrm>
+            <a:off x="222068" y="1367246"/>
+            <a:ext cx="11747864" cy="2308324"/>
+          </a:xfrm>
+          <a:prstGeom prst="rect">
+            <a:avLst/>
+          </a:prstGeom>
+          <a:noFill/>
+        </p:spPr>
+        <p:txBody>
+          <a:bodyPr wrap="square" rtlCol="0">
+            <a:spAutoFit/>
+          </a:bodyPr>
+          <a:lstStyle/>
+          <a:p>
+            <a:r>
+              <a:rPr lang="en-US" altLang="zh-TW" sz="2400" dirty="0">
+                <a:solidFill>
+                  <a:srgbClr val="000000"/>
+                </a:solidFill>
+                <a:latin typeface="Consolas" panose="020B0609020204030204" pitchFamily="49" charset="0"/>
+              </a:rPr>
+              <a:t>PVOID </a:t>
+            </a:r>
+            <a:r>
+              <a:rPr lang="en-US" altLang="zh-TW" sz="2400" dirty="0" err="1" smtClean="0">
+                <a:solidFill>
+                  <a:srgbClr val="007D9A"/>
+                </a:solidFill>
+                <a:latin typeface="Consolas" panose="020B0609020204030204" pitchFamily="49" charset="0"/>
+              </a:rPr>
+              <a:t>ExAllocatePool</a:t>
+            </a:r>
+            <a:r>
+              <a:rPr lang="en-US" altLang="zh-TW" sz="2400" dirty="0" smtClean="0">
+                <a:solidFill>
+                  <a:srgbClr val="000000"/>
+                </a:solidFill>
+                <a:latin typeface="Consolas" panose="020B0609020204030204" pitchFamily="49" charset="0"/>
+              </a:rPr>
+              <a:t>(POOL_TYPE </a:t>
+            </a:r>
+            <a:r>
+              <a:rPr lang="en-US" altLang="zh-TW" sz="2400" dirty="0" err="1" smtClean="0">
+                <a:solidFill>
+                  <a:srgbClr val="000000"/>
+                </a:solidFill>
+                <a:latin typeface="Consolas" panose="020B0609020204030204" pitchFamily="49" charset="0"/>
+              </a:rPr>
+              <a:t>PoolType</a:t>
+            </a:r>
+            <a:r>
+              <a:rPr lang="en-US" altLang="zh-TW" sz="2400" dirty="0" smtClean="0">
+                <a:solidFill>
+                  <a:srgbClr val="000000"/>
+                </a:solidFill>
+                <a:latin typeface="Consolas" panose="020B0609020204030204" pitchFamily="49" charset="0"/>
+              </a:rPr>
+              <a:t>, SIZE_T </a:t>
+            </a:r>
+            <a:r>
+              <a:rPr lang="en-US" altLang="zh-TW" sz="2400" dirty="0" err="1" smtClean="0">
+                <a:solidFill>
+                  <a:srgbClr val="000000"/>
+                </a:solidFill>
+                <a:latin typeface="Consolas" panose="020B0609020204030204" pitchFamily="49" charset="0"/>
+              </a:rPr>
+              <a:t>NumberOfBytes</a:t>
+            </a:r>
+            <a:r>
+              <a:rPr lang="en-US" altLang="zh-TW" sz="2400" dirty="0" smtClean="0">
+                <a:solidFill>
+                  <a:srgbClr val="000000"/>
+                </a:solidFill>
+                <a:latin typeface="Consolas" panose="020B0609020204030204" pitchFamily="49" charset="0"/>
+              </a:rPr>
+              <a:t>);</a:t>
+            </a:r>
+          </a:p>
+          <a:p>
+            <a:endParaRPr lang="en-US" altLang="zh-TW" sz="2400" dirty="0" smtClean="0">
+              <a:latin typeface="微軟正黑體" panose="020B0604030504040204" pitchFamily="34" charset="-120"/>
+              <a:ea typeface="微軟正黑體" panose="020B0604030504040204" pitchFamily="34" charset="-120"/>
+            </a:endParaRPr>
+          </a:p>
+          <a:p>
+            <a:r>
+              <a:rPr lang="en-US" altLang="zh-TW" sz="2400" dirty="0">
+                <a:solidFill>
+                  <a:srgbClr val="000000"/>
+                </a:solidFill>
+                <a:latin typeface="Consolas" panose="020B0609020204030204" pitchFamily="49" charset="0"/>
+              </a:rPr>
+              <a:t>PVOID </a:t>
+            </a:r>
+            <a:r>
+              <a:rPr lang="en-US" altLang="zh-TW" sz="2400" dirty="0" err="1" smtClean="0">
+                <a:solidFill>
+                  <a:srgbClr val="007D9A"/>
+                </a:solidFill>
+                <a:latin typeface="Consolas" panose="020B0609020204030204" pitchFamily="49" charset="0"/>
+              </a:rPr>
+              <a:t>ExAllocatePoolWithTag</a:t>
+            </a:r>
+            <a:r>
+              <a:rPr lang="en-US" altLang="zh-TW" sz="2400" dirty="0" smtClean="0">
+                <a:solidFill>
+                  <a:srgbClr val="000000"/>
+                </a:solidFill>
+                <a:latin typeface="Consolas" panose="020B0609020204030204" pitchFamily="49" charset="0"/>
+              </a:rPr>
+              <a:t>(POOL_TYPE </a:t>
+            </a:r>
+            <a:r>
+              <a:rPr lang="en-US" altLang="zh-TW" sz="2400" dirty="0" err="1">
+                <a:solidFill>
+                  <a:srgbClr val="000000"/>
+                </a:solidFill>
+                <a:latin typeface="Consolas" panose="020B0609020204030204" pitchFamily="49" charset="0"/>
+              </a:rPr>
+              <a:t>PoolType</a:t>
+            </a:r>
+            <a:r>
+              <a:rPr lang="en-US" altLang="zh-TW" sz="2400" dirty="0">
+                <a:solidFill>
+                  <a:srgbClr val="000000"/>
+                </a:solidFill>
+                <a:latin typeface="Consolas" panose="020B0609020204030204" pitchFamily="49" charset="0"/>
+              </a:rPr>
+              <a:t>, SIZE_T </a:t>
+            </a:r>
+            <a:r>
+              <a:rPr lang="en-US" altLang="zh-TW" sz="2400" dirty="0" err="1">
+                <a:solidFill>
+                  <a:srgbClr val="000000"/>
+                </a:solidFill>
+                <a:latin typeface="Consolas" panose="020B0609020204030204" pitchFamily="49" charset="0"/>
+              </a:rPr>
+              <a:t>NumberOfBytes</a:t>
+            </a:r>
+            <a:r>
+              <a:rPr lang="en-US" altLang="zh-TW" sz="2400" dirty="0">
+                <a:solidFill>
+                  <a:srgbClr val="000000"/>
+                </a:solidFill>
+                <a:latin typeface="Consolas" panose="020B0609020204030204" pitchFamily="49" charset="0"/>
+              </a:rPr>
+              <a:t>, ULONG Tag </a:t>
+            </a:r>
+            <a:r>
+              <a:rPr lang="en-US" altLang="zh-TW" sz="2400" dirty="0" smtClean="0">
+                <a:solidFill>
+                  <a:srgbClr val="000000"/>
+                </a:solidFill>
+                <a:latin typeface="Consolas" panose="020B0609020204030204" pitchFamily="49" charset="0"/>
+              </a:rPr>
+              <a:t>);</a:t>
+            </a:r>
+          </a:p>
+          <a:p>
+            <a:endParaRPr lang="en-US" altLang="zh-TW" sz="2400" dirty="0">
+              <a:solidFill>
+                <a:srgbClr val="000000"/>
+              </a:solidFill>
+              <a:latin typeface="Consolas" panose="020B0609020204030204" pitchFamily="49" charset="0"/>
+              <a:ea typeface="微軟正黑體" panose="020B0604030504040204" pitchFamily="34" charset="-120"/>
+            </a:endParaRPr>
+          </a:p>
+          <a:p>
+            <a:endParaRPr lang="en-US" altLang="zh-TW" sz="2400" dirty="0" smtClean="0">
+              <a:latin typeface="微軟正黑體" panose="020B0604030504040204" pitchFamily="34" charset="-120"/>
+              <a:ea typeface="微軟正黑體" panose="020B0604030504040204" pitchFamily="34" charset="-120"/>
+            </a:endParaRPr>
+          </a:p>
+        </p:txBody>
+      </p:sp>
+    </p:spTree>
+    <p:extLst>
+      <p:ext uri="{BB962C8B-B14F-4D97-AF65-F5344CB8AC3E}">
+        <p14:creationId xmlns:p14="http://schemas.microsoft.com/office/powerpoint/2010/main" val="2797691251"/>
+      </p:ext>
+    </p:extLst>
+  </p:cSld>
+  <p:clrMapOvr>
+    <a:masterClrMapping/>
+  </p:clrMapOvr>
+  <p:timing>
+    <p:tnLst>
+      <p:par>
+        <p:cTn id="1" dur="indefinite" restart="never" nodeType="tmRoot"/>
+      </p:par>
+    </p:tnLst>
+  </p:timing>
+</p:sld>
+</file>
+
+<file path=ppt/slides/slide42.xml><?xml version="1.0" encoding="utf-8"?>
+<p:sld xmlns:a="http://schemas.openxmlformats.org/drawingml/2006/main" xmlns:r="http://schemas.openxmlformats.org/officeDocument/2006/relationships" xmlns:p="http://schemas.openxmlformats.org/presentationml/2006/main">
+  <p:cSld>
+    <p:spTree>
+      <p:nvGrpSpPr>
+        <p:cNvPr id="1" name=""/>
+        <p:cNvGrpSpPr/>
+        <p:nvPr/>
+      </p:nvGrpSpPr>
+      <p:grpSpPr>
+        <a:xfrm>
+          <a:off x="0" y="0"/>
+          <a:ext cx="0" cy="0"/>
+          <a:chOff x="0" y="0"/>
+          <a:chExt cx="0" cy="0"/>
+        </a:xfrm>
+      </p:grpSpPr>
+      <p:sp>
+        <p:nvSpPr>
+          <p:cNvPr id="4" name="文字方塊 3"/>
+          <p:cNvSpPr txBox="1"/>
+          <p:nvPr/>
+        </p:nvSpPr>
+        <p:spPr>
+          <a:xfrm>
+            <a:off x="8560526" y="6334780"/>
+            <a:ext cx="3631474" cy="523220"/>
+          </a:xfrm>
+          <a:prstGeom prst="rect">
+            <a:avLst/>
+          </a:prstGeom>
+          <a:noFill/>
+        </p:spPr>
+        <p:txBody>
+          <a:bodyPr wrap="square" rtlCol="0">
+            <a:spAutoFit/>
+          </a:bodyPr>
+          <a:lstStyle/>
+          <a:p>
+            <a:r>
+              <a:rPr lang="en-US" altLang="zh-TW" sz="2800" b="1" dirty="0" smtClean="0">
+                <a:effectLst>
+                  <a:outerShdw blurRad="38100" dist="38100" dir="2700000" algn="tl">
+                    <a:srgbClr val="000000">
+                      <a:alpha val="43137"/>
+                    </a:srgbClr>
+                  </a:outerShdw>
+                </a:effectLst>
+                <a:latin typeface="微軟正黑體" panose="020B0604030504040204" pitchFamily="34" charset="-120"/>
+                <a:ea typeface="微軟正黑體" panose="020B0604030504040204" pitchFamily="34" charset="-120"/>
+              </a:rPr>
+              <a:t>Windows</a:t>
+            </a:r>
+            <a:r>
+              <a:rPr lang="zh-TW" altLang="en-US" sz="2800" b="1" dirty="0" smtClean="0">
+                <a:effectLst>
+                  <a:outerShdw blurRad="38100" dist="38100" dir="2700000" algn="tl">
+                    <a:srgbClr val="000000">
+                      <a:alpha val="43137"/>
+                    </a:srgbClr>
+                  </a:outerShdw>
+                </a:effectLst>
+                <a:latin typeface="微軟正黑體" panose="020B0604030504040204" pitchFamily="34" charset="-120"/>
+                <a:ea typeface="微軟正黑體" panose="020B0604030504040204" pitchFamily="34" charset="-120"/>
+              </a:rPr>
+              <a:t>記憶體管理</a:t>
+            </a:r>
+            <a:endParaRPr lang="zh-TW" altLang="en-US" sz="2800" b="1" dirty="0">
+              <a:effectLst>
+                <a:outerShdw blurRad="38100" dist="38100" dir="2700000" algn="tl">
+                  <a:srgbClr val="000000">
+                    <a:alpha val="43137"/>
+                  </a:srgbClr>
+                </a:outerShdw>
+              </a:effectLst>
+              <a:latin typeface="微軟正黑體" panose="020B0604030504040204" pitchFamily="34" charset="-120"/>
+              <a:ea typeface="微軟正黑體" panose="020B0604030504040204" pitchFamily="34" charset="-120"/>
+            </a:endParaRPr>
+          </a:p>
+        </p:txBody>
+      </p:sp>
+      <p:sp>
+        <p:nvSpPr>
+          <p:cNvPr id="8" name="文字方塊 7"/>
+          <p:cNvSpPr txBox="1"/>
+          <p:nvPr/>
+        </p:nvSpPr>
+        <p:spPr>
+          <a:xfrm>
+            <a:off x="182880" y="0"/>
+            <a:ext cx="2481943" cy="646331"/>
+          </a:xfrm>
+          <a:prstGeom prst="rect">
+            <a:avLst/>
+          </a:prstGeom>
+          <a:noFill/>
+        </p:spPr>
+        <p:txBody>
+          <a:bodyPr wrap="square" rtlCol="0">
+            <a:spAutoFit/>
+          </a:bodyPr>
+          <a:lstStyle/>
+          <a:p>
+            <a:r>
+              <a:rPr lang="zh-TW" altLang="en-US" sz="3600" dirty="0" smtClean="0">
+                <a:effectLst>
+                  <a:outerShdw blurRad="38100" dist="38100" dir="2700000" algn="tl">
+                    <a:srgbClr val="000000">
+                      <a:alpha val="43137"/>
+                    </a:srgbClr>
+                  </a:outerShdw>
+                </a:effectLst>
+                <a:latin typeface="微軟正黑體" panose="020B0604030504040204" pitchFamily="34" charset="-120"/>
+                <a:ea typeface="微軟正黑體" panose="020B0604030504040204" pitchFamily="34" charset="-120"/>
+              </a:rPr>
+              <a:t>配置記憶體</a:t>
+            </a:r>
+            <a:endParaRPr lang="en-US" altLang="zh-TW" sz="3600" dirty="0" smtClean="0">
+              <a:effectLst>
+                <a:outerShdw blurRad="38100" dist="38100" dir="2700000" algn="tl">
+                  <a:srgbClr val="000000">
+                    <a:alpha val="43137"/>
+                  </a:srgbClr>
+                </a:outerShdw>
+              </a:effectLst>
+              <a:latin typeface="微軟正黑體" panose="020B0604030504040204" pitchFamily="34" charset="-120"/>
+              <a:ea typeface="微軟正黑體" panose="020B0604030504040204" pitchFamily="34" charset="-120"/>
+            </a:endParaRPr>
+          </a:p>
+        </p:txBody>
+      </p:sp>
+      <p:sp>
+        <p:nvSpPr>
+          <p:cNvPr id="5" name="文字方塊 4"/>
+          <p:cNvSpPr txBox="1"/>
+          <p:nvPr/>
+        </p:nvSpPr>
+        <p:spPr>
+          <a:xfrm>
+            <a:off x="222068" y="1367246"/>
+            <a:ext cx="11747864" cy="2677656"/>
+          </a:xfrm>
+          <a:prstGeom prst="rect">
+            <a:avLst/>
+          </a:prstGeom>
+          <a:noFill/>
+        </p:spPr>
+        <p:txBody>
+          <a:bodyPr wrap="square" rtlCol="0">
+            <a:spAutoFit/>
+          </a:bodyPr>
+          <a:lstStyle/>
+          <a:p>
+            <a:r>
+              <a:rPr lang="en-US" altLang="zh-TW" sz="2400" strike="sngStrike" dirty="0">
+                <a:solidFill>
+                  <a:srgbClr val="000000"/>
+                </a:solidFill>
+                <a:latin typeface="Consolas" panose="020B0609020204030204" pitchFamily="49" charset="0"/>
+              </a:rPr>
+              <a:t>PVOID </a:t>
+            </a:r>
+            <a:r>
+              <a:rPr lang="en-US" altLang="zh-TW" sz="2400" strike="sngStrike" dirty="0" err="1" smtClean="0">
+                <a:solidFill>
+                  <a:srgbClr val="007D9A"/>
+                </a:solidFill>
+                <a:latin typeface="Consolas" panose="020B0609020204030204" pitchFamily="49" charset="0"/>
+              </a:rPr>
+              <a:t>ExAllocatePool</a:t>
+            </a:r>
+            <a:r>
+              <a:rPr lang="en-US" altLang="zh-TW" sz="2400" strike="sngStrike" dirty="0" smtClean="0">
+                <a:solidFill>
+                  <a:srgbClr val="000000"/>
+                </a:solidFill>
+                <a:latin typeface="Consolas" panose="020B0609020204030204" pitchFamily="49" charset="0"/>
+              </a:rPr>
+              <a:t>(POOL_TYPE </a:t>
+            </a:r>
+            <a:r>
+              <a:rPr lang="en-US" altLang="zh-TW" sz="2400" strike="sngStrike" dirty="0" err="1" smtClean="0">
+                <a:solidFill>
+                  <a:srgbClr val="000000"/>
+                </a:solidFill>
+                <a:latin typeface="Consolas" panose="020B0609020204030204" pitchFamily="49" charset="0"/>
+              </a:rPr>
+              <a:t>PoolType</a:t>
+            </a:r>
+            <a:r>
+              <a:rPr lang="en-US" altLang="zh-TW" sz="2400" strike="sngStrike" dirty="0" smtClean="0">
+                <a:solidFill>
+                  <a:srgbClr val="000000"/>
+                </a:solidFill>
+                <a:latin typeface="Consolas" panose="020B0609020204030204" pitchFamily="49" charset="0"/>
+              </a:rPr>
+              <a:t>, SIZE_T </a:t>
+            </a:r>
+            <a:r>
+              <a:rPr lang="en-US" altLang="zh-TW" sz="2400" strike="sngStrike" dirty="0" err="1" smtClean="0">
+                <a:solidFill>
+                  <a:srgbClr val="000000"/>
+                </a:solidFill>
+                <a:latin typeface="Consolas" panose="020B0609020204030204" pitchFamily="49" charset="0"/>
+              </a:rPr>
+              <a:t>NumberOfBytes</a:t>
+            </a:r>
+            <a:r>
+              <a:rPr lang="en-US" altLang="zh-TW" sz="2400" strike="sngStrike" dirty="0" smtClean="0">
+                <a:solidFill>
+                  <a:srgbClr val="000000"/>
+                </a:solidFill>
+                <a:latin typeface="Consolas" panose="020B0609020204030204" pitchFamily="49" charset="0"/>
+              </a:rPr>
+              <a:t>);</a:t>
+            </a:r>
+          </a:p>
+          <a:p>
+            <a:endParaRPr lang="en-US" altLang="zh-TW" sz="2400" dirty="0" smtClean="0">
+              <a:latin typeface="微軟正黑體" panose="020B0604030504040204" pitchFamily="34" charset="-120"/>
+              <a:ea typeface="微軟正黑體" panose="020B0604030504040204" pitchFamily="34" charset="-120"/>
+            </a:endParaRPr>
+          </a:p>
+          <a:p>
+            <a:r>
+              <a:rPr lang="en-US" altLang="zh-TW" sz="2400" dirty="0">
+                <a:solidFill>
+                  <a:srgbClr val="000000"/>
+                </a:solidFill>
+                <a:latin typeface="Consolas" panose="020B0609020204030204" pitchFamily="49" charset="0"/>
+              </a:rPr>
+              <a:t>PVOID </a:t>
+            </a:r>
+            <a:r>
+              <a:rPr lang="en-US" altLang="zh-TW" sz="2400" dirty="0" err="1" smtClean="0">
+                <a:solidFill>
+                  <a:srgbClr val="007D9A"/>
+                </a:solidFill>
+                <a:latin typeface="Consolas" panose="020B0609020204030204" pitchFamily="49" charset="0"/>
+              </a:rPr>
+              <a:t>ExAllocatePoolWithTag</a:t>
+            </a:r>
+            <a:r>
+              <a:rPr lang="en-US" altLang="zh-TW" sz="2400" dirty="0" smtClean="0">
+                <a:solidFill>
+                  <a:srgbClr val="000000"/>
+                </a:solidFill>
+                <a:latin typeface="Consolas" panose="020B0609020204030204" pitchFamily="49" charset="0"/>
+              </a:rPr>
+              <a:t>(POOL_TYPE </a:t>
+            </a:r>
+            <a:r>
+              <a:rPr lang="en-US" altLang="zh-TW" sz="2400" dirty="0" err="1">
+                <a:solidFill>
+                  <a:srgbClr val="000000"/>
+                </a:solidFill>
+                <a:latin typeface="Consolas" panose="020B0609020204030204" pitchFamily="49" charset="0"/>
+              </a:rPr>
+              <a:t>PoolType</a:t>
+            </a:r>
+            <a:r>
+              <a:rPr lang="en-US" altLang="zh-TW" sz="2400" dirty="0">
+                <a:solidFill>
+                  <a:srgbClr val="000000"/>
+                </a:solidFill>
+                <a:latin typeface="Consolas" panose="020B0609020204030204" pitchFamily="49" charset="0"/>
+              </a:rPr>
+              <a:t>, SIZE_T </a:t>
+            </a:r>
+            <a:r>
+              <a:rPr lang="en-US" altLang="zh-TW" sz="2400" dirty="0" err="1">
+                <a:solidFill>
+                  <a:srgbClr val="000000"/>
+                </a:solidFill>
+                <a:latin typeface="Consolas" panose="020B0609020204030204" pitchFamily="49" charset="0"/>
+              </a:rPr>
+              <a:t>NumberOfBytes</a:t>
+            </a:r>
+            <a:r>
+              <a:rPr lang="en-US" altLang="zh-TW" sz="2400" dirty="0">
+                <a:solidFill>
+                  <a:srgbClr val="000000"/>
+                </a:solidFill>
+                <a:latin typeface="Consolas" panose="020B0609020204030204" pitchFamily="49" charset="0"/>
+              </a:rPr>
+              <a:t>, ULONG Tag </a:t>
+            </a:r>
+            <a:r>
+              <a:rPr lang="en-US" altLang="zh-TW" sz="2400" dirty="0" smtClean="0">
+                <a:solidFill>
+                  <a:srgbClr val="000000"/>
+                </a:solidFill>
+                <a:latin typeface="Consolas" panose="020B0609020204030204" pitchFamily="49" charset="0"/>
+              </a:rPr>
+              <a:t>);</a:t>
+            </a:r>
+          </a:p>
+          <a:p>
+            <a:endParaRPr lang="en-US" altLang="zh-TW" sz="2400" dirty="0">
+              <a:solidFill>
+                <a:srgbClr val="000000"/>
+              </a:solidFill>
+              <a:latin typeface="Consolas" panose="020B0609020204030204" pitchFamily="49" charset="0"/>
+              <a:ea typeface="微軟正黑體" panose="020B0604030504040204" pitchFamily="34" charset="-120"/>
+            </a:endParaRPr>
+          </a:p>
+          <a:p>
+            <a:endParaRPr lang="en-US" altLang="zh-TW" sz="2400" dirty="0" smtClean="0">
+              <a:latin typeface="微軟正黑體" panose="020B0604030504040204" pitchFamily="34" charset="-120"/>
+              <a:ea typeface="微軟正黑體" panose="020B0604030504040204" pitchFamily="34" charset="-120"/>
+            </a:endParaRPr>
+          </a:p>
+          <a:p>
+            <a:r>
+              <a:rPr lang="en-US" altLang="zh-TW" sz="2400" dirty="0">
+                <a:solidFill>
+                  <a:srgbClr val="000000"/>
+                </a:solidFill>
+                <a:latin typeface="Consolas" panose="020B0609020204030204" pitchFamily="49" charset="0"/>
+              </a:rPr>
+              <a:t>PVOID </a:t>
+            </a:r>
+            <a:r>
+              <a:rPr lang="en-US" altLang="zh-TW" sz="2400" dirty="0" err="1" smtClean="0">
+                <a:solidFill>
+                  <a:srgbClr val="000000"/>
+                </a:solidFill>
+                <a:latin typeface="Consolas" panose="020B0609020204030204" pitchFamily="49" charset="0"/>
+              </a:rPr>
+              <a:t>ptr</a:t>
+            </a:r>
+            <a:r>
+              <a:rPr lang="en-US" altLang="zh-TW" sz="2400" dirty="0" smtClean="0">
+                <a:solidFill>
+                  <a:srgbClr val="000000"/>
+                </a:solidFill>
+                <a:latin typeface="Consolas" panose="020B0609020204030204" pitchFamily="49" charset="0"/>
+              </a:rPr>
+              <a:t> = </a:t>
+            </a:r>
+            <a:r>
+              <a:rPr lang="en-US" altLang="zh-TW" sz="2400" dirty="0" err="1" smtClean="0">
+                <a:solidFill>
+                  <a:srgbClr val="007D9A"/>
+                </a:solidFill>
+                <a:latin typeface="Consolas" panose="020B0609020204030204" pitchFamily="49" charset="0"/>
+              </a:rPr>
+              <a:t>ExAllocatePoolWithTag</a:t>
+            </a:r>
+            <a:r>
+              <a:rPr lang="en-US" altLang="zh-TW" sz="2400" dirty="0" smtClean="0">
+                <a:solidFill>
+                  <a:srgbClr val="000000"/>
+                </a:solidFill>
+                <a:latin typeface="Consolas" panose="020B0609020204030204" pitchFamily="49" charset="0"/>
+              </a:rPr>
+              <a:t>(</a:t>
+            </a:r>
+            <a:r>
+              <a:rPr lang="en-US" altLang="zh-TW" sz="2400" dirty="0" err="1" smtClean="0">
+                <a:solidFill>
+                  <a:srgbClr val="000000"/>
+                </a:solidFill>
+                <a:latin typeface="Consolas" panose="020B0609020204030204" pitchFamily="49" charset="0"/>
+              </a:rPr>
+              <a:t>PagedPool</a:t>
+            </a:r>
+            <a:r>
+              <a:rPr lang="en-US" altLang="zh-TW" sz="2400" dirty="0" smtClean="0">
+                <a:solidFill>
+                  <a:srgbClr val="000000"/>
+                </a:solidFill>
+                <a:latin typeface="Consolas" panose="020B0609020204030204" pitchFamily="49" charset="0"/>
+              </a:rPr>
+              <a:t>,</a:t>
+            </a:r>
+            <a:r>
+              <a:rPr lang="zh-TW" altLang="en-US" sz="2400" dirty="0" smtClean="0">
+                <a:solidFill>
+                  <a:srgbClr val="000000"/>
+                </a:solidFill>
+                <a:latin typeface="Consolas" panose="020B0609020204030204" pitchFamily="49" charset="0"/>
+              </a:rPr>
+              <a:t> </a:t>
+            </a:r>
+            <a:r>
+              <a:rPr lang="en-US" altLang="zh-TW" sz="2400" dirty="0" smtClean="0">
+                <a:solidFill>
+                  <a:srgbClr val="000000"/>
+                </a:solidFill>
+                <a:latin typeface="Consolas" panose="020B0609020204030204" pitchFamily="49" charset="0"/>
+              </a:rPr>
+              <a:t>1024, </a:t>
+            </a:r>
+            <a:r>
+              <a:rPr lang="en-US" altLang="zh-TW" sz="2400" dirty="0" smtClean="0">
+                <a:solidFill>
+                  <a:schemeClr val="accent2">
+                    <a:lumMod val="75000"/>
+                  </a:schemeClr>
+                </a:solidFill>
+                <a:latin typeface="Consolas" panose="020B0609020204030204" pitchFamily="49" charset="0"/>
+              </a:rPr>
+              <a:t>‘None’</a:t>
+            </a:r>
+            <a:r>
+              <a:rPr lang="en-US" altLang="zh-TW" sz="2400" dirty="0" smtClean="0">
+                <a:solidFill>
+                  <a:srgbClr val="000000"/>
+                </a:solidFill>
+                <a:latin typeface="Consolas" panose="020B0609020204030204" pitchFamily="49" charset="0"/>
+              </a:rPr>
+              <a:t>)</a:t>
+            </a:r>
+            <a:endParaRPr lang="en-US" altLang="zh-TW" sz="2400" dirty="0" smtClean="0">
+              <a:solidFill>
+                <a:schemeClr val="accent2">
+                  <a:lumMod val="75000"/>
+                </a:schemeClr>
+              </a:solidFill>
+              <a:latin typeface="微軟正黑體" panose="020B0604030504040204" pitchFamily="34" charset="-120"/>
+              <a:ea typeface="微軟正黑體" panose="020B0604030504040204" pitchFamily="34" charset="-120"/>
+            </a:endParaRPr>
+          </a:p>
+        </p:txBody>
+      </p:sp>
+    </p:spTree>
+    <p:extLst>
+      <p:ext uri="{BB962C8B-B14F-4D97-AF65-F5344CB8AC3E}">
+        <p14:creationId xmlns:p14="http://schemas.microsoft.com/office/powerpoint/2010/main" val="4242922212"/>
+      </p:ext>
+    </p:extLst>
+  </p:cSld>
+  <p:clrMapOvr>
+    <a:masterClrMapping/>
+  </p:clrMapOvr>
+  <p:timing>
+    <p:tnLst>
+      <p:par>
+        <p:cTn id="1" dur="indefinite" restart="never" nodeType="tmRoot"/>
+      </p:par>
+    </p:tnLst>
+  </p:timing>
+</p:sld>
+</file>
+
+<file path=ppt/slides/slide43.xml><?xml version="1.0" encoding="utf-8"?>
+<p:sld xmlns:a="http://schemas.openxmlformats.org/drawingml/2006/main" xmlns:r="http://schemas.openxmlformats.org/officeDocument/2006/relationships" xmlns:p="http://schemas.openxmlformats.org/presentationml/2006/main">
+  <p:cSld>
+    <p:spTree>
+      <p:nvGrpSpPr>
+        <p:cNvPr id="1" name=""/>
+        <p:cNvGrpSpPr/>
+        <p:nvPr/>
+      </p:nvGrpSpPr>
+      <p:grpSpPr>
+        <a:xfrm>
+          <a:off x="0" y="0"/>
+          <a:ext cx="0" cy="0"/>
+          <a:chOff x="0" y="0"/>
+          <a:chExt cx="0" cy="0"/>
+        </a:xfrm>
+      </p:grpSpPr>
+      <p:sp>
+        <p:nvSpPr>
+          <p:cNvPr id="4" name="文字方塊 3"/>
+          <p:cNvSpPr txBox="1"/>
+          <p:nvPr/>
+        </p:nvSpPr>
+        <p:spPr>
+          <a:xfrm>
+            <a:off x="8560526" y="6334780"/>
+            <a:ext cx="3631474" cy="523220"/>
+          </a:xfrm>
+          <a:prstGeom prst="rect">
+            <a:avLst/>
+          </a:prstGeom>
+          <a:noFill/>
+        </p:spPr>
+        <p:txBody>
+          <a:bodyPr wrap="square" rtlCol="0">
+            <a:spAutoFit/>
+          </a:bodyPr>
+          <a:lstStyle/>
+          <a:p>
+            <a:r>
+              <a:rPr lang="en-US" altLang="zh-TW" sz="2800" b="1" dirty="0" smtClean="0">
+                <a:effectLst>
+                  <a:outerShdw blurRad="38100" dist="38100" dir="2700000" algn="tl">
+                    <a:srgbClr val="000000">
+                      <a:alpha val="43137"/>
+                    </a:srgbClr>
+                  </a:outerShdw>
+                </a:effectLst>
+                <a:latin typeface="微軟正黑體" panose="020B0604030504040204" pitchFamily="34" charset="-120"/>
+                <a:ea typeface="微軟正黑體" panose="020B0604030504040204" pitchFamily="34" charset="-120"/>
+              </a:rPr>
+              <a:t>Windows</a:t>
+            </a:r>
+            <a:r>
+              <a:rPr lang="zh-TW" altLang="en-US" sz="2800" b="1" dirty="0" smtClean="0">
+                <a:effectLst>
+                  <a:outerShdw blurRad="38100" dist="38100" dir="2700000" algn="tl">
+                    <a:srgbClr val="000000">
+                      <a:alpha val="43137"/>
+                    </a:srgbClr>
+                  </a:outerShdw>
+                </a:effectLst>
+                <a:latin typeface="微軟正黑體" panose="020B0604030504040204" pitchFamily="34" charset="-120"/>
+                <a:ea typeface="微軟正黑體" panose="020B0604030504040204" pitchFamily="34" charset="-120"/>
+              </a:rPr>
+              <a:t>記憶體管理</a:t>
+            </a:r>
+            <a:endParaRPr lang="zh-TW" altLang="en-US" sz="2800" b="1" dirty="0">
+              <a:effectLst>
+                <a:outerShdw blurRad="38100" dist="38100" dir="2700000" algn="tl">
+                  <a:srgbClr val="000000">
+                    <a:alpha val="43137"/>
+                  </a:srgbClr>
+                </a:outerShdw>
+              </a:effectLst>
+              <a:latin typeface="微軟正黑體" panose="020B0604030504040204" pitchFamily="34" charset="-120"/>
+              <a:ea typeface="微軟正黑體" panose="020B0604030504040204" pitchFamily="34" charset="-120"/>
+            </a:endParaRPr>
+          </a:p>
+        </p:txBody>
+      </p:sp>
+      <p:sp>
+        <p:nvSpPr>
+          <p:cNvPr id="8" name="文字方塊 7"/>
+          <p:cNvSpPr txBox="1"/>
+          <p:nvPr/>
+        </p:nvSpPr>
+        <p:spPr>
+          <a:xfrm>
+            <a:off x="182880" y="0"/>
+            <a:ext cx="2481943" cy="646331"/>
+          </a:xfrm>
+          <a:prstGeom prst="rect">
+            <a:avLst/>
+          </a:prstGeom>
+          <a:noFill/>
+        </p:spPr>
+        <p:txBody>
+          <a:bodyPr wrap="square" rtlCol="0">
+            <a:spAutoFit/>
+          </a:bodyPr>
+          <a:lstStyle/>
+          <a:p>
+            <a:r>
+              <a:rPr lang="en-US" altLang="zh-TW" sz="3600" dirty="0" smtClean="0">
+                <a:effectLst>
+                  <a:outerShdw blurRad="38100" dist="38100" dir="2700000" algn="tl">
+                    <a:srgbClr val="000000">
+                      <a:alpha val="43137"/>
+                    </a:srgbClr>
+                  </a:outerShdw>
+                </a:effectLst>
+                <a:latin typeface="微軟正黑體" panose="020B0604030504040204" pitchFamily="34" charset="-120"/>
+                <a:ea typeface="微軟正黑體" panose="020B0604030504040204" pitchFamily="34" charset="-120"/>
+              </a:rPr>
+              <a:t>Link List</a:t>
+            </a:r>
+            <a:endParaRPr lang="en-US" altLang="zh-TW" sz="3600" dirty="0" smtClean="0">
+              <a:effectLst>
+                <a:outerShdw blurRad="38100" dist="38100" dir="2700000" algn="tl">
+                  <a:srgbClr val="000000">
+                    <a:alpha val="43137"/>
+                  </a:srgbClr>
+                </a:outerShdw>
+              </a:effectLst>
+              <a:latin typeface="微軟正黑體" panose="020B0604030504040204" pitchFamily="34" charset="-120"/>
+              <a:ea typeface="微軟正黑體" panose="020B0604030504040204" pitchFamily="34" charset="-120"/>
+            </a:endParaRPr>
+          </a:p>
+        </p:txBody>
+      </p:sp>
+      <p:sp>
+        <p:nvSpPr>
+          <p:cNvPr id="5" name="文字方塊 4"/>
+          <p:cNvSpPr txBox="1"/>
+          <p:nvPr/>
+        </p:nvSpPr>
+        <p:spPr>
+          <a:xfrm>
+            <a:off x="161108" y="1097280"/>
+            <a:ext cx="11747864" cy="4524315"/>
+          </a:xfrm>
+          <a:prstGeom prst="rect">
+            <a:avLst/>
+          </a:prstGeom>
+          <a:noFill/>
+        </p:spPr>
+        <p:txBody>
+          <a:bodyPr wrap="square" rtlCol="0">
+            <a:spAutoFit/>
+          </a:bodyPr>
+          <a:lstStyle/>
+          <a:p>
+            <a:r>
+              <a:rPr lang="en-US" altLang="zh-TW" sz="2400" dirty="0" smtClean="0">
+                <a:solidFill>
+                  <a:srgbClr val="0101FD"/>
+                </a:solidFill>
+                <a:latin typeface="Consolas" panose="020B0609020204030204" pitchFamily="49" charset="0"/>
+              </a:rPr>
+              <a:t>void</a:t>
+            </a:r>
+            <a:r>
+              <a:rPr lang="en-US" altLang="zh-TW" sz="2400" dirty="0" smtClean="0">
+                <a:solidFill>
+                  <a:srgbClr val="000000"/>
+                </a:solidFill>
+                <a:latin typeface="Consolas" panose="020B0609020204030204" pitchFamily="49" charset="0"/>
+              </a:rPr>
+              <a:t> </a:t>
+            </a:r>
+            <a:r>
+              <a:rPr lang="en-US" altLang="zh-TW" sz="2400" dirty="0" err="1" smtClean="0">
+                <a:solidFill>
+                  <a:srgbClr val="007D9A"/>
+                </a:solidFill>
+                <a:latin typeface="Consolas" panose="020B0609020204030204" pitchFamily="49" charset="0"/>
+              </a:rPr>
+              <a:t>InitializeListHead</a:t>
+            </a:r>
+            <a:r>
+              <a:rPr lang="en-US" altLang="zh-TW" sz="2400" dirty="0" smtClean="0">
+                <a:solidFill>
+                  <a:srgbClr val="000000"/>
+                </a:solidFill>
+                <a:latin typeface="Consolas" panose="020B0609020204030204" pitchFamily="49" charset="0"/>
+              </a:rPr>
+              <a:t>(PLIST_ENTRY </a:t>
+            </a:r>
+            <a:r>
+              <a:rPr lang="en-US" altLang="zh-TW" sz="2400" dirty="0" err="1">
+                <a:solidFill>
+                  <a:srgbClr val="000000"/>
+                </a:solidFill>
+                <a:latin typeface="Consolas" panose="020B0609020204030204" pitchFamily="49" charset="0"/>
+              </a:rPr>
+              <a:t>ListHead</a:t>
+            </a:r>
+            <a:r>
+              <a:rPr lang="en-US" altLang="zh-TW" sz="2400" dirty="0">
+                <a:solidFill>
+                  <a:srgbClr val="000000"/>
+                </a:solidFill>
+                <a:latin typeface="Consolas" panose="020B0609020204030204" pitchFamily="49" charset="0"/>
+              </a:rPr>
+              <a:t> </a:t>
+            </a:r>
+            <a:r>
+              <a:rPr lang="en-US" altLang="zh-TW" sz="2400" dirty="0" smtClean="0">
+                <a:solidFill>
+                  <a:srgbClr val="000000"/>
+                </a:solidFill>
+                <a:latin typeface="Consolas" panose="020B0609020204030204" pitchFamily="49" charset="0"/>
+              </a:rPr>
+              <a:t>);</a:t>
+            </a:r>
+          </a:p>
+          <a:p>
+            <a:endParaRPr lang="en-US" altLang="zh-TW" sz="2400" dirty="0">
+              <a:solidFill>
+                <a:srgbClr val="000000"/>
+              </a:solidFill>
+              <a:latin typeface="Consolas" panose="020B0609020204030204" pitchFamily="49" charset="0"/>
+              <a:ea typeface="微軟正黑體" panose="020B0604030504040204" pitchFamily="34" charset="-120"/>
+            </a:endParaRPr>
+          </a:p>
+          <a:p>
+            <a:r>
+              <a:rPr lang="en-US" altLang="zh-TW" sz="2400" dirty="0">
+                <a:solidFill>
+                  <a:srgbClr val="0101FD"/>
+                </a:solidFill>
+                <a:latin typeface="Consolas" panose="020B0609020204030204" pitchFamily="49" charset="0"/>
+              </a:rPr>
+              <a:t>void</a:t>
+            </a:r>
+            <a:r>
+              <a:rPr lang="en-US" altLang="zh-TW" sz="2400" dirty="0">
+                <a:solidFill>
+                  <a:srgbClr val="000000"/>
+                </a:solidFill>
+                <a:latin typeface="Consolas" panose="020B0609020204030204" pitchFamily="49" charset="0"/>
+              </a:rPr>
+              <a:t> </a:t>
+            </a:r>
+            <a:r>
+              <a:rPr lang="en-US" altLang="zh-TW" sz="2400" dirty="0" err="1" smtClean="0">
+                <a:solidFill>
+                  <a:srgbClr val="007D9A"/>
+                </a:solidFill>
+                <a:latin typeface="Consolas" panose="020B0609020204030204" pitchFamily="49" charset="0"/>
+              </a:rPr>
+              <a:t>InsertHeadList</a:t>
+            </a:r>
+            <a:r>
+              <a:rPr lang="en-US" altLang="zh-TW" sz="2400" dirty="0" smtClean="0">
+                <a:solidFill>
+                  <a:srgbClr val="000000"/>
+                </a:solidFill>
+                <a:latin typeface="Consolas" panose="020B0609020204030204" pitchFamily="49" charset="0"/>
+              </a:rPr>
+              <a:t>(PLIST_ENTRY </a:t>
+            </a:r>
+            <a:r>
+              <a:rPr lang="en-US" altLang="zh-TW" sz="2400" dirty="0" err="1">
+                <a:solidFill>
+                  <a:srgbClr val="000000"/>
+                </a:solidFill>
+                <a:latin typeface="Consolas" panose="020B0609020204030204" pitchFamily="49" charset="0"/>
+              </a:rPr>
+              <a:t>ListHead</a:t>
+            </a:r>
+            <a:r>
+              <a:rPr lang="en-US" altLang="zh-TW" sz="2400" dirty="0" smtClean="0">
+                <a:solidFill>
+                  <a:srgbClr val="000000"/>
+                </a:solidFill>
+                <a:latin typeface="Consolas" panose="020B0609020204030204" pitchFamily="49" charset="0"/>
+              </a:rPr>
+              <a:t>, </a:t>
+            </a:r>
+            <a:r>
+              <a:rPr lang="en-US" altLang="zh-TW" sz="2400" dirty="0">
+                <a:solidFill>
+                  <a:srgbClr val="000000"/>
+                </a:solidFill>
+                <a:latin typeface="Consolas" panose="020B0609020204030204" pitchFamily="49" charset="0"/>
+              </a:rPr>
+              <a:t>PLIST_ENTRY Entry </a:t>
+            </a:r>
+            <a:r>
+              <a:rPr lang="en-US" altLang="zh-TW" sz="2400" dirty="0" smtClean="0">
+                <a:solidFill>
+                  <a:srgbClr val="000000"/>
+                </a:solidFill>
+                <a:latin typeface="Consolas" panose="020B0609020204030204" pitchFamily="49" charset="0"/>
+              </a:rPr>
+              <a:t>);</a:t>
+            </a:r>
+          </a:p>
+          <a:p>
+            <a:endParaRPr lang="en-US" altLang="zh-TW" sz="2400" dirty="0">
+              <a:solidFill>
+                <a:srgbClr val="000000"/>
+              </a:solidFill>
+              <a:latin typeface="Consolas" panose="020B0609020204030204" pitchFamily="49" charset="0"/>
+              <a:ea typeface="微軟正黑體" panose="020B0604030504040204" pitchFamily="34" charset="-120"/>
+            </a:endParaRPr>
+          </a:p>
+          <a:p>
+            <a:r>
+              <a:rPr lang="en-US" altLang="zh-TW" sz="2400" dirty="0">
+                <a:solidFill>
+                  <a:srgbClr val="0101FD"/>
+                </a:solidFill>
+                <a:latin typeface="Consolas" panose="020B0609020204030204" pitchFamily="49" charset="0"/>
+              </a:rPr>
+              <a:t>void</a:t>
+            </a:r>
+            <a:r>
+              <a:rPr lang="en-US" altLang="zh-TW" sz="2400" dirty="0">
+                <a:solidFill>
+                  <a:srgbClr val="000000"/>
+                </a:solidFill>
+                <a:latin typeface="Consolas" panose="020B0609020204030204" pitchFamily="49" charset="0"/>
+              </a:rPr>
+              <a:t> </a:t>
+            </a:r>
+            <a:r>
+              <a:rPr lang="en-US" altLang="zh-TW" sz="2400" dirty="0" err="1" smtClean="0">
+                <a:solidFill>
+                  <a:srgbClr val="007D9A"/>
+                </a:solidFill>
+                <a:latin typeface="Consolas" panose="020B0609020204030204" pitchFamily="49" charset="0"/>
+              </a:rPr>
+              <a:t>InsertTailList</a:t>
+            </a:r>
+            <a:r>
+              <a:rPr lang="en-US" altLang="zh-TW" sz="2400" dirty="0" smtClean="0">
+                <a:solidFill>
+                  <a:srgbClr val="000000"/>
+                </a:solidFill>
+                <a:latin typeface="Consolas" panose="020B0609020204030204" pitchFamily="49" charset="0"/>
+              </a:rPr>
+              <a:t>(PLIST_ENTRY </a:t>
+            </a:r>
+            <a:r>
+              <a:rPr lang="en-US" altLang="zh-TW" sz="2400" dirty="0" err="1">
+                <a:solidFill>
+                  <a:srgbClr val="000000"/>
+                </a:solidFill>
+                <a:latin typeface="Consolas" panose="020B0609020204030204" pitchFamily="49" charset="0"/>
+              </a:rPr>
+              <a:t>ListHead</a:t>
+            </a:r>
+            <a:r>
+              <a:rPr lang="en-US" altLang="zh-TW" sz="2400" dirty="0">
+                <a:solidFill>
+                  <a:srgbClr val="000000"/>
+                </a:solidFill>
+                <a:latin typeface="Consolas" panose="020B0609020204030204" pitchFamily="49" charset="0"/>
+              </a:rPr>
+              <a:t>, </a:t>
+            </a:r>
+            <a:r>
+              <a:rPr lang="en-US" altLang="zh-TW" sz="2400" dirty="0" smtClean="0">
+                <a:solidFill>
+                  <a:srgbClr val="000000"/>
+                </a:solidFill>
+                <a:latin typeface="Consolas" panose="020B0609020204030204" pitchFamily="49" charset="0"/>
+              </a:rPr>
+              <a:t>PLIST_ENTRY </a:t>
+            </a:r>
+            <a:r>
+              <a:rPr lang="en-US" altLang="zh-TW" sz="2400" dirty="0">
+                <a:solidFill>
+                  <a:srgbClr val="000000"/>
+                </a:solidFill>
+                <a:latin typeface="Consolas" panose="020B0609020204030204" pitchFamily="49" charset="0"/>
+              </a:rPr>
+              <a:t>Entry </a:t>
+            </a:r>
+            <a:r>
+              <a:rPr lang="en-US" altLang="zh-TW" sz="2400" dirty="0" smtClean="0">
+                <a:solidFill>
+                  <a:srgbClr val="000000"/>
+                </a:solidFill>
+                <a:latin typeface="Consolas" panose="020B0609020204030204" pitchFamily="49" charset="0"/>
+              </a:rPr>
+              <a:t>);</a:t>
+            </a:r>
+          </a:p>
+          <a:p>
+            <a:endParaRPr lang="en-US" altLang="zh-TW" sz="2400" dirty="0">
+              <a:solidFill>
+                <a:srgbClr val="000000"/>
+              </a:solidFill>
+              <a:latin typeface="Consolas" panose="020B0609020204030204" pitchFamily="49" charset="0"/>
+            </a:endParaRPr>
+          </a:p>
+          <a:p>
+            <a:r>
+              <a:rPr lang="en-US" altLang="zh-TW" sz="2400" dirty="0">
+                <a:solidFill>
+                  <a:srgbClr val="000000"/>
+                </a:solidFill>
+                <a:latin typeface="Consolas" panose="020B0609020204030204" pitchFamily="49" charset="0"/>
+              </a:rPr>
+              <a:t>PLIST_ENTRY </a:t>
+            </a:r>
+            <a:r>
+              <a:rPr lang="en-US" altLang="zh-TW" sz="2400" dirty="0" err="1">
+                <a:solidFill>
+                  <a:srgbClr val="007D9A"/>
+                </a:solidFill>
+                <a:latin typeface="Consolas" panose="020B0609020204030204" pitchFamily="49" charset="0"/>
+              </a:rPr>
+              <a:t>RemoveHeadList</a:t>
+            </a:r>
+            <a:r>
+              <a:rPr lang="en-US" altLang="zh-TW" sz="2400" dirty="0">
+                <a:solidFill>
+                  <a:srgbClr val="000000"/>
+                </a:solidFill>
+                <a:latin typeface="Consolas" panose="020B0609020204030204" pitchFamily="49" charset="0"/>
+              </a:rPr>
+              <a:t>( PLIST_ENTRY </a:t>
+            </a:r>
+            <a:r>
+              <a:rPr lang="en-US" altLang="zh-TW" sz="2400" dirty="0" err="1">
+                <a:solidFill>
+                  <a:srgbClr val="000000"/>
+                </a:solidFill>
+                <a:latin typeface="Consolas" panose="020B0609020204030204" pitchFamily="49" charset="0"/>
+              </a:rPr>
+              <a:t>ListHead</a:t>
+            </a:r>
+            <a:r>
+              <a:rPr lang="en-US" altLang="zh-TW" sz="2400" dirty="0">
+                <a:solidFill>
+                  <a:srgbClr val="000000"/>
+                </a:solidFill>
+                <a:latin typeface="Consolas" panose="020B0609020204030204" pitchFamily="49" charset="0"/>
+              </a:rPr>
+              <a:t> </a:t>
+            </a:r>
+            <a:r>
+              <a:rPr lang="en-US" altLang="zh-TW" sz="2400" dirty="0" smtClean="0">
+                <a:solidFill>
+                  <a:srgbClr val="000000"/>
+                </a:solidFill>
+                <a:latin typeface="Consolas" panose="020B0609020204030204" pitchFamily="49" charset="0"/>
+              </a:rPr>
+              <a:t>);</a:t>
+            </a:r>
+          </a:p>
+          <a:p>
+            <a:endParaRPr lang="en-US" altLang="zh-TW" sz="2400" dirty="0">
+              <a:solidFill>
+                <a:srgbClr val="000000"/>
+              </a:solidFill>
+              <a:latin typeface="Consolas" panose="020B0609020204030204" pitchFamily="49" charset="0"/>
+            </a:endParaRPr>
+          </a:p>
+          <a:p>
+            <a:r>
+              <a:rPr lang="en-US" altLang="zh-TW" sz="2400" dirty="0">
+                <a:solidFill>
+                  <a:srgbClr val="000000"/>
+                </a:solidFill>
+                <a:latin typeface="Consolas" panose="020B0609020204030204" pitchFamily="49" charset="0"/>
+              </a:rPr>
+              <a:t>PLIST_ENTRY </a:t>
+            </a:r>
+            <a:r>
+              <a:rPr lang="en-US" altLang="zh-TW" sz="2400" dirty="0" err="1">
+                <a:solidFill>
+                  <a:srgbClr val="007D9A"/>
+                </a:solidFill>
+                <a:latin typeface="Consolas" panose="020B0609020204030204" pitchFamily="49" charset="0"/>
+              </a:rPr>
+              <a:t>RemoveTailList</a:t>
+            </a:r>
+            <a:r>
+              <a:rPr lang="en-US" altLang="zh-TW" sz="2400" dirty="0">
+                <a:solidFill>
+                  <a:srgbClr val="000000"/>
+                </a:solidFill>
+                <a:latin typeface="Consolas" panose="020B0609020204030204" pitchFamily="49" charset="0"/>
+              </a:rPr>
+              <a:t>( PLIST_ENTRY </a:t>
+            </a:r>
+            <a:r>
+              <a:rPr lang="en-US" altLang="zh-TW" sz="2400" dirty="0" err="1">
+                <a:solidFill>
+                  <a:srgbClr val="000000"/>
+                </a:solidFill>
+                <a:latin typeface="Consolas" panose="020B0609020204030204" pitchFamily="49" charset="0"/>
+              </a:rPr>
+              <a:t>ListHead</a:t>
+            </a:r>
+            <a:r>
+              <a:rPr lang="en-US" altLang="zh-TW" sz="2400" dirty="0">
+                <a:solidFill>
+                  <a:srgbClr val="000000"/>
+                </a:solidFill>
+                <a:latin typeface="Consolas" panose="020B0609020204030204" pitchFamily="49" charset="0"/>
+              </a:rPr>
+              <a:t> </a:t>
+            </a:r>
+            <a:r>
+              <a:rPr lang="en-US" altLang="zh-TW" sz="2400" dirty="0" smtClean="0">
+                <a:solidFill>
+                  <a:srgbClr val="000000"/>
+                </a:solidFill>
+                <a:latin typeface="Consolas" panose="020B0609020204030204" pitchFamily="49" charset="0"/>
+              </a:rPr>
+              <a:t>);</a:t>
+            </a:r>
+          </a:p>
+          <a:p>
+            <a:endParaRPr lang="en-US" altLang="zh-TW" sz="2400" dirty="0">
+              <a:solidFill>
+                <a:srgbClr val="000000"/>
+              </a:solidFill>
+              <a:latin typeface="Consolas" panose="020B0609020204030204" pitchFamily="49" charset="0"/>
+            </a:endParaRPr>
+          </a:p>
+          <a:p>
+            <a:r>
+              <a:rPr lang="en-US" altLang="zh-TW" sz="2400" dirty="0">
+                <a:solidFill>
+                  <a:srgbClr val="000000"/>
+                </a:solidFill>
+                <a:latin typeface="Consolas" panose="020B0609020204030204" pitchFamily="49" charset="0"/>
+              </a:rPr>
+              <a:t>BOOLEAN </a:t>
+            </a:r>
+            <a:r>
+              <a:rPr lang="en-US" altLang="zh-TW" sz="2400" dirty="0" err="1">
+                <a:solidFill>
+                  <a:srgbClr val="007D9A"/>
+                </a:solidFill>
+                <a:latin typeface="Consolas" panose="020B0609020204030204" pitchFamily="49" charset="0"/>
+              </a:rPr>
+              <a:t>RemoveEntryList</a:t>
+            </a:r>
+            <a:r>
+              <a:rPr lang="en-US" altLang="zh-TW" sz="2400" dirty="0">
+                <a:solidFill>
+                  <a:srgbClr val="000000"/>
+                </a:solidFill>
+                <a:latin typeface="Consolas" panose="020B0609020204030204" pitchFamily="49" charset="0"/>
+              </a:rPr>
+              <a:t>( PLIST_ENTRY Entry </a:t>
+            </a:r>
+            <a:r>
+              <a:rPr lang="en-US" altLang="zh-TW" sz="2400" dirty="0" smtClean="0">
+                <a:solidFill>
+                  <a:srgbClr val="000000"/>
+                </a:solidFill>
+                <a:latin typeface="Consolas" panose="020B0609020204030204" pitchFamily="49" charset="0"/>
+              </a:rPr>
+              <a:t>);</a:t>
+            </a:r>
+            <a:endParaRPr lang="en-US" altLang="zh-TW" sz="2400" dirty="0">
+              <a:solidFill>
+                <a:srgbClr val="000000"/>
+              </a:solidFill>
+              <a:latin typeface="Consolas" panose="020B0609020204030204" pitchFamily="49" charset="0"/>
+              <a:ea typeface="微軟正黑體" panose="020B0604030504040204" pitchFamily="34" charset="-120"/>
+            </a:endParaRPr>
+          </a:p>
+          <a:p>
+            <a:endParaRPr lang="en-US" altLang="zh-TW" sz="2400" dirty="0" smtClean="0">
+              <a:solidFill>
+                <a:schemeClr val="accent2">
+                  <a:lumMod val="75000"/>
+                </a:schemeClr>
+              </a:solidFill>
+              <a:latin typeface="微軟正黑體" panose="020B0604030504040204" pitchFamily="34" charset="-120"/>
+              <a:ea typeface="微軟正黑體" panose="020B0604030504040204" pitchFamily="34" charset="-120"/>
+            </a:endParaRPr>
+          </a:p>
+        </p:txBody>
+      </p:sp>
+    </p:spTree>
+    <p:extLst>
+      <p:ext uri="{BB962C8B-B14F-4D97-AF65-F5344CB8AC3E}">
+        <p14:creationId xmlns:p14="http://schemas.microsoft.com/office/powerpoint/2010/main" val="4142750568"/>
+      </p:ext>
+    </p:extLst>
+  </p:cSld>
+  <p:clrMapOvr>
+    <a:masterClrMapping/>
+  </p:clrMapOvr>
+  <p:timing>
+    <p:tnLst>
+      <p:par>
+        <p:cTn id="1" dur="indefinite" restart="never" nodeType="tmRoot"/>
+      </p:par>
+    </p:tnLst>
+  </p:timing>
+</p:sld>
+</file>
+
+<file path=ppt/slides/slide44.xml><?xml version="1.0" encoding="utf-8"?>
+<p:sld xmlns:a="http://schemas.openxmlformats.org/drawingml/2006/main" xmlns:r="http://schemas.openxmlformats.org/officeDocument/2006/relationships" xmlns:p="http://schemas.openxmlformats.org/presentationml/2006/main">
+  <p:cSld>
+    <p:spTree>
+      <p:nvGrpSpPr>
+        <p:cNvPr id="1" name=""/>
+        <p:cNvGrpSpPr/>
+        <p:nvPr/>
+      </p:nvGrpSpPr>
+      <p:grpSpPr>
+        <a:xfrm>
+          <a:off x="0" y="0"/>
+          <a:ext cx="0" cy="0"/>
+          <a:chOff x="0" y="0"/>
+          <a:chExt cx="0" cy="0"/>
+        </a:xfrm>
+      </p:grpSpPr>
+      <p:sp>
+        <p:nvSpPr>
+          <p:cNvPr id="4" name="文字方塊 3"/>
+          <p:cNvSpPr txBox="1"/>
+          <p:nvPr/>
+        </p:nvSpPr>
+        <p:spPr>
+          <a:xfrm>
+            <a:off x="8560526" y="6334780"/>
+            <a:ext cx="3631474" cy="523220"/>
+          </a:xfrm>
+          <a:prstGeom prst="rect">
+            <a:avLst/>
+          </a:prstGeom>
+          <a:noFill/>
+        </p:spPr>
+        <p:txBody>
+          <a:bodyPr wrap="square" rtlCol="0">
+            <a:spAutoFit/>
+          </a:bodyPr>
+          <a:lstStyle/>
+          <a:p>
+            <a:r>
+              <a:rPr lang="en-US" altLang="zh-TW" sz="2800" b="1" dirty="0" smtClean="0">
+                <a:effectLst>
+                  <a:outerShdw blurRad="38100" dist="38100" dir="2700000" algn="tl">
+                    <a:srgbClr val="000000">
+                      <a:alpha val="43137"/>
+                    </a:srgbClr>
+                  </a:outerShdw>
+                </a:effectLst>
+                <a:latin typeface="微軟正黑體" panose="020B0604030504040204" pitchFamily="34" charset="-120"/>
+                <a:ea typeface="微軟正黑體" panose="020B0604030504040204" pitchFamily="34" charset="-120"/>
+              </a:rPr>
+              <a:t>Windows</a:t>
+            </a:r>
+            <a:r>
+              <a:rPr lang="zh-TW" altLang="en-US" sz="2800" b="1" dirty="0" smtClean="0">
+                <a:effectLst>
+                  <a:outerShdw blurRad="38100" dist="38100" dir="2700000" algn="tl">
+                    <a:srgbClr val="000000">
+                      <a:alpha val="43137"/>
+                    </a:srgbClr>
+                  </a:outerShdw>
+                </a:effectLst>
+                <a:latin typeface="微軟正黑體" panose="020B0604030504040204" pitchFamily="34" charset="-120"/>
+                <a:ea typeface="微軟正黑體" panose="020B0604030504040204" pitchFamily="34" charset="-120"/>
+              </a:rPr>
+              <a:t>記憶體管理</a:t>
+            </a:r>
+            <a:endParaRPr lang="zh-TW" altLang="en-US" sz="2800" b="1" dirty="0">
+              <a:effectLst>
+                <a:outerShdw blurRad="38100" dist="38100" dir="2700000" algn="tl">
+                  <a:srgbClr val="000000">
+                    <a:alpha val="43137"/>
+                  </a:srgbClr>
+                </a:outerShdw>
+              </a:effectLst>
+              <a:latin typeface="微軟正黑體" panose="020B0604030504040204" pitchFamily="34" charset="-120"/>
+              <a:ea typeface="微軟正黑體" panose="020B0604030504040204" pitchFamily="34" charset="-120"/>
+            </a:endParaRPr>
+          </a:p>
+        </p:txBody>
+      </p:sp>
+      <p:sp>
+        <p:nvSpPr>
+          <p:cNvPr id="8" name="文字方塊 7"/>
+          <p:cNvSpPr txBox="1"/>
+          <p:nvPr/>
+        </p:nvSpPr>
+        <p:spPr>
+          <a:xfrm>
+            <a:off x="182880" y="0"/>
+            <a:ext cx="2481943" cy="646331"/>
+          </a:xfrm>
+          <a:prstGeom prst="rect">
+            <a:avLst/>
+          </a:prstGeom>
+          <a:noFill/>
+        </p:spPr>
+        <p:txBody>
+          <a:bodyPr wrap="square" rtlCol="0">
+            <a:spAutoFit/>
+          </a:bodyPr>
+          <a:lstStyle/>
+          <a:p>
+            <a:r>
+              <a:rPr lang="en-US" altLang="zh-TW" sz="3600" dirty="0" smtClean="0">
+                <a:effectLst>
+                  <a:outerShdw blurRad="38100" dist="38100" dir="2700000" algn="tl">
+                    <a:srgbClr val="000000">
+                      <a:alpha val="43137"/>
+                    </a:srgbClr>
+                  </a:outerShdw>
+                </a:effectLst>
+                <a:latin typeface="微軟正黑體" panose="020B0604030504040204" pitchFamily="34" charset="-120"/>
+                <a:ea typeface="微軟正黑體" panose="020B0604030504040204" pitchFamily="34" charset="-120"/>
+              </a:rPr>
+              <a:t>Link List</a:t>
+            </a:r>
+            <a:endParaRPr lang="en-US" altLang="zh-TW" sz="3600" dirty="0" smtClean="0">
+              <a:effectLst>
+                <a:outerShdw blurRad="38100" dist="38100" dir="2700000" algn="tl">
+                  <a:srgbClr val="000000">
+                    <a:alpha val="43137"/>
+                  </a:srgbClr>
+                </a:outerShdw>
+              </a:effectLst>
+              <a:latin typeface="微軟正黑體" panose="020B0604030504040204" pitchFamily="34" charset="-120"/>
+              <a:ea typeface="微軟正黑體" panose="020B0604030504040204" pitchFamily="34" charset="-120"/>
+            </a:endParaRPr>
+          </a:p>
+        </p:txBody>
+      </p:sp>
+      <p:sp>
+        <p:nvSpPr>
+          <p:cNvPr id="5" name="文字方塊 4"/>
+          <p:cNvSpPr txBox="1"/>
+          <p:nvPr/>
+        </p:nvSpPr>
+        <p:spPr>
+          <a:xfrm>
+            <a:off x="161108" y="1097280"/>
+            <a:ext cx="11747864" cy="4524315"/>
+          </a:xfrm>
+          <a:prstGeom prst="rect">
+            <a:avLst/>
+          </a:prstGeom>
+          <a:noFill/>
+        </p:spPr>
+        <p:txBody>
+          <a:bodyPr wrap="square" rtlCol="0">
+            <a:spAutoFit/>
+          </a:bodyPr>
+          <a:lstStyle/>
+          <a:p>
+            <a:r>
+              <a:rPr lang="en-US" altLang="zh-TW" sz="2400" dirty="0" smtClean="0">
+                <a:solidFill>
+                  <a:srgbClr val="0101FD"/>
+                </a:solidFill>
+                <a:latin typeface="Consolas" panose="020B0609020204030204" pitchFamily="49" charset="0"/>
+              </a:rPr>
+              <a:t>void</a:t>
+            </a:r>
+            <a:r>
+              <a:rPr lang="en-US" altLang="zh-TW" sz="2400" dirty="0" smtClean="0">
+                <a:solidFill>
+                  <a:srgbClr val="000000"/>
+                </a:solidFill>
+                <a:latin typeface="Consolas" panose="020B0609020204030204" pitchFamily="49" charset="0"/>
+              </a:rPr>
+              <a:t> </a:t>
+            </a:r>
+            <a:r>
+              <a:rPr lang="en-US" altLang="zh-TW" sz="2400" dirty="0" err="1" smtClean="0">
+                <a:solidFill>
+                  <a:srgbClr val="007D9A"/>
+                </a:solidFill>
+                <a:latin typeface="Consolas" panose="020B0609020204030204" pitchFamily="49" charset="0"/>
+              </a:rPr>
+              <a:t>InitializeListHead</a:t>
+            </a:r>
+            <a:r>
+              <a:rPr lang="en-US" altLang="zh-TW" sz="2400" dirty="0" smtClean="0">
+                <a:solidFill>
+                  <a:srgbClr val="000000"/>
+                </a:solidFill>
+                <a:latin typeface="Consolas" panose="020B0609020204030204" pitchFamily="49" charset="0"/>
+              </a:rPr>
+              <a:t>(PLIST_ENTRY </a:t>
+            </a:r>
+            <a:r>
+              <a:rPr lang="en-US" altLang="zh-TW" sz="2400" dirty="0" err="1">
+                <a:solidFill>
+                  <a:srgbClr val="000000"/>
+                </a:solidFill>
+                <a:latin typeface="Consolas" panose="020B0609020204030204" pitchFamily="49" charset="0"/>
+              </a:rPr>
+              <a:t>ListHead</a:t>
+            </a:r>
+            <a:r>
+              <a:rPr lang="en-US" altLang="zh-TW" sz="2400" dirty="0">
+                <a:solidFill>
+                  <a:srgbClr val="000000"/>
+                </a:solidFill>
+                <a:latin typeface="Consolas" panose="020B0609020204030204" pitchFamily="49" charset="0"/>
+              </a:rPr>
+              <a:t> </a:t>
+            </a:r>
+            <a:r>
+              <a:rPr lang="en-US" altLang="zh-TW" sz="2400" dirty="0" smtClean="0">
+                <a:solidFill>
+                  <a:srgbClr val="000000"/>
+                </a:solidFill>
+                <a:latin typeface="Consolas" panose="020B0609020204030204" pitchFamily="49" charset="0"/>
+              </a:rPr>
+              <a:t>);</a:t>
+            </a:r>
+          </a:p>
+          <a:p>
+            <a:endParaRPr lang="en-US" altLang="zh-TW" sz="2400" dirty="0">
+              <a:solidFill>
+                <a:srgbClr val="000000"/>
+              </a:solidFill>
+              <a:latin typeface="Consolas" panose="020B0609020204030204" pitchFamily="49" charset="0"/>
+              <a:ea typeface="微軟正黑體" panose="020B0604030504040204" pitchFamily="34" charset="-120"/>
+            </a:endParaRPr>
+          </a:p>
+          <a:p>
+            <a:r>
+              <a:rPr lang="en-US" altLang="zh-TW" sz="2400" dirty="0">
+                <a:solidFill>
+                  <a:srgbClr val="0101FD"/>
+                </a:solidFill>
+                <a:latin typeface="Consolas" panose="020B0609020204030204" pitchFamily="49" charset="0"/>
+              </a:rPr>
+              <a:t>void</a:t>
+            </a:r>
+            <a:r>
+              <a:rPr lang="en-US" altLang="zh-TW" sz="2400" dirty="0">
+                <a:solidFill>
+                  <a:srgbClr val="000000"/>
+                </a:solidFill>
+                <a:latin typeface="Consolas" panose="020B0609020204030204" pitchFamily="49" charset="0"/>
+              </a:rPr>
+              <a:t> </a:t>
+            </a:r>
+            <a:r>
+              <a:rPr lang="en-US" altLang="zh-TW" sz="2400" dirty="0" err="1" smtClean="0">
+                <a:solidFill>
+                  <a:srgbClr val="007D9A"/>
+                </a:solidFill>
+                <a:latin typeface="Consolas" panose="020B0609020204030204" pitchFamily="49" charset="0"/>
+              </a:rPr>
+              <a:t>InsertHeadList</a:t>
+            </a:r>
+            <a:r>
+              <a:rPr lang="en-US" altLang="zh-TW" sz="2400" dirty="0" smtClean="0">
+                <a:solidFill>
+                  <a:srgbClr val="000000"/>
+                </a:solidFill>
+                <a:latin typeface="Consolas" panose="020B0609020204030204" pitchFamily="49" charset="0"/>
+              </a:rPr>
+              <a:t>(PLIST_ENTRY </a:t>
+            </a:r>
+            <a:r>
+              <a:rPr lang="en-US" altLang="zh-TW" sz="2400" dirty="0" err="1">
+                <a:solidFill>
+                  <a:srgbClr val="000000"/>
+                </a:solidFill>
+                <a:latin typeface="Consolas" panose="020B0609020204030204" pitchFamily="49" charset="0"/>
+              </a:rPr>
+              <a:t>ListHead</a:t>
+            </a:r>
+            <a:r>
+              <a:rPr lang="en-US" altLang="zh-TW" sz="2400" dirty="0" smtClean="0">
+                <a:solidFill>
+                  <a:srgbClr val="000000"/>
+                </a:solidFill>
+                <a:latin typeface="Consolas" panose="020B0609020204030204" pitchFamily="49" charset="0"/>
+              </a:rPr>
+              <a:t>, </a:t>
+            </a:r>
+            <a:r>
+              <a:rPr lang="en-US" altLang="zh-TW" sz="2400" dirty="0">
+                <a:solidFill>
+                  <a:srgbClr val="000000"/>
+                </a:solidFill>
+                <a:latin typeface="Consolas" panose="020B0609020204030204" pitchFamily="49" charset="0"/>
+              </a:rPr>
+              <a:t>PLIST_ENTRY Entry </a:t>
+            </a:r>
+            <a:r>
+              <a:rPr lang="en-US" altLang="zh-TW" sz="2400" dirty="0" smtClean="0">
+                <a:solidFill>
+                  <a:srgbClr val="000000"/>
+                </a:solidFill>
+                <a:latin typeface="Consolas" panose="020B0609020204030204" pitchFamily="49" charset="0"/>
+              </a:rPr>
+              <a:t>);</a:t>
+            </a:r>
+          </a:p>
+          <a:p>
+            <a:endParaRPr lang="en-US" altLang="zh-TW" sz="2400" dirty="0">
+              <a:solidFill>
+                <a:srgbClr val="000000"/>
+              </a:solidFill>
+              <a:latin typeface="Consolas" panose="020B0609020204030204" pitchFamily="49" charset="0"/>
+              <a:ea typeface="微軟正黑體" panose="020B0604030504040204" pitchFamily="34" charset="-120"/>
+            </a:endParaRPr>
+          </a:p>
+          <a:p>
+            <a:r>
+              <a:rPr lang="en-US" altLang="zh-TW" sz="2400" dirty="0">
+                <a:solidFill>
+                  <a:srgbClr val="0101FD"/>
+                </a:solidFill>
+                <a:latin typeface="Consolas" panose="020B0609020204030204" pitchFamily="49" charset="0"/>
+              </a:rPr>
+              <a:t>void</a:t>
+            </a:r>
+            <a:r>
+              <a:rPr lang="en-US" altLang="zh-TW" sz="2400" dirty="0">
+                <a:solidFill>
+                  <a:srgbClr val="000000"/>
+                </a:solidFill>
+                <a:latin typeface="Consolas" panose="020B0609020204030204" pitchFamily="49" charset="0"/>
+              </a:rPr>
+              <a:t> </a:t>
+            </a:r>
+            <a:r>
+              <a:rPr lang="en-US" altLang="zh-TW" sz="2400" dirty="0" err="1" smtClean="0">
+                <a:solidFill>
+                  <a:srgbClr val="007D9A"/>
+                </a:solidFill>
+                <a:latin typeface="Consolas" panose="020B0609020204030204" pitchFamily="49" charset="0"/>
+              </a:rPr>
+              <a:t>InsertTailList</a:t>
+            </a:r>
+            <a:r>
+              <a:rPr lang="en-US" altLang="zh-TW" sz="2400" dirty="0" smtClean="0">
+                <a:solidFill>
+                  <a:srgbClr val="000000"/>
+                </a:solidFill>
+                <a:latin typeface="Consolas" panose="020B0609020204030204" pitchFamily="49" charset="0"/>
+              </a:rPr>
+              <a:t>(PLIST_ENTRY </a:t>
+            </a:r>
+            <a:r>
+              <a:rPr lang="en-US" altLang="zh-TW" sz="2400" dirty="0" err="1">
+                <a:solidFill>
+                  <a:srgbClr val="000000"/>
+                </a:solidFill>
+                <a:latin typeface="Consolas" panose="020B0609020204030204" pitchFamily="49" charset="0"/>
+              </a:rPr>
+              <a:t>ListHead</a:t>
+            </a:r>
+            <a:r>
+              <a:rPr lang="en-US" altLang="zh-TW" sz="2400" dirty="0">
+                <a:solidFill>
+                  <a:srgbClr val="000000"/>
+                </a:solidFill>
+                <a:latin typeface="Consolas" panose="020B0609020204030204" pitchFamily="49" charset="0"/>
+              </a:rPr>
+              <a:t>, </a:t>
+            </a:r>
+            <a:r>
+              <a:rPr lang="en-US" altLang="zh-TW" sz="2400" dirty="0" smtClean="0">
+                <a:solidFill>
+                  <a:srgbClr val="000000"/>
+                </a:solidFill>
+                <a:latin typeface="Consolas" panose="020B0609020204030204" pitchFamily="49" charset="0"/>
+              </a:rPr>
+              <a:t>PLIST_ENTRY </a:t>
+            </a:r>
+            <a:r>
+              <a:rPr lang="en-US" altLang="zh-TW" sz="2400" dirty="0">
+                <a:solidFill>
+                  <a:srgbClr val="000000"/>
+                </a:solidFill>
+                <a:latin typeface="Consolas" panose="020B0609020204030204" pitchFamily="49" charset="0"/>
+              </a:rPr>
+              <a:t>Entry </a:t>
+            </a:r>
+            <a:r>
+              <a:rPr lang="en-US" altLang="zh-TW" sz="2400" dirty="0" smtClean="0">
+                <a:solidFill>
+                  <a:srgbClr val="000000"/>
+                </a:solidFill>
+                <a:latin typeface="Consolas" panose="020B0609020204030204" pitchFamily="49" charset="0"/>
+              </a:rPr>
+              <a:t>);</a:t>
+            </a:r>
+          </a:p>
+          <a:p>
+            <a:endParaRPr lang="en-US" altLang="zh-TW" sz="2400" dirty="0">
+              <a:solidFill>
+                <a:srgbClr val="000000"/>
+              </a:solidFill>
+              <a:latin typeface="Consolas" panose="020B0609020204030204" pitchFamily="49" charset="0"/>
+            </a:endParaRPr>
+          </a:p>
+          <a:p>
+            <a:r>
+              <a:rPr lang="en-US" altLang="zh-TW" sz="2400" dirty="0">
+                <a:solidFill>
+                  <a:srgbClr val="000000"/>
+                </a:solidFill>
+                <a:latin typeface="Consolas" panose="020B0609020204030204" pitchFamily="49" charset="0"/>
+              </a:rPr>
+              <a:t>PLIST_ENTRY </a:t>
+            </a:r>
+            <a:r>
+              <a:rPr lang="en-US" altLang="zh-TW" sz="2400" dirty="0" err="1">
+                <a:solidFill>
+                  <a:srgbClr val="007D9A"/>
+                </a:solidFill>
+                <a:latin typeface="Consolas" panose="020B0609020204030204" pitchFamily="49" charset="0"/>
+              </a:rPr>
+              <a:t>RemoveHeadList</a:t>
+            </a:r>
+            <a:r>
+              <a:rPr lang="en-US" altLang="zh-TW" sz="2400" dirty="0">
+                <a:solidFill>
+                  <a:srgbClr val="000000"/>
+                </a:solidFill>
+                <a:latin typeface="Consolas" panose="020B0609020204030204" pitchFamily="49" charset="0"/>
+              </a:rPr>
+              <a:t>( PLIST_ENTRY </a:t>
+            </a:r>
+            <a:r>
+              <a:rPr lang="en-US" altLang="zh-TW" sz="2400" dirty="0" err="1">
+                <a:solidFill>
+                  <a:srgbClr val="000000"/>
+                </a:solidFill>
+                <a:latin typeface="Consolas" panose="020B0609020204030204" pitchFamily="49" charset="0"/>
+              </a:rPr>
+              <a:t>ListHead</a:t>
+            </a:r>
+            <a:r>
+              <a:rPr lang="en-US" altLang="zh-TW" sz="2400" dirty="0">
+                <a:solidFill>
+                  <a:srgbClr val="000000"/>
+                </a:solidFill>
+                <a:latin typeface="Consolas" panose="020B0609020204030204" pitchFamily="49" charset="0"/>
+              </a:rPr>
+              <a:t> </a:t>
+            </a:r>
+            <a:r>
+              <a:rPr lang="en-US" altLang="zh-TW" sz="2400" dirty="0" smtClean="0">
+                <a:solidFill>
+                  <a:srgbClr val="000000"/>
+                </a:solidFill>
+                <a:latin typeface="Consolas" panose="020B0609020204030204" pitchFamily="49" charset="0"/>
+              </a:rPr>
+              <a:t>);</a:t>
+            </a:r>
+          </a:p>
+          <a:p>
+            <a:endParaRPr lang="en-US" altLang="zh-TW" sz="2400" dirty="0">
+              <a:solidFill>
+                <a:srgbClr val="000000"/>
+              </a:solidFill>
+              <a:latin typeface="Consolas" panose="020B0609020204030204" pitchFamily="49" charset="0"/>
+            </a:endParaRPr>
+          </a:p>
+          <a:p>
+            <a:r>
+              <a:rPr lang="en-US" altLang="zh-TW" sz="2400" dirty="0">
+                <a:solidFill>
+                  <a:srgbClr val="000000"/>
+                </a:solidFill>
+                <a:latin typeface="Consolas" panose="020B0609020204030204" pitchFamily="49" charset="0"/>
+              </a:rPr>
+              <a:t>PLIST_ENTRY </a:t>
+            </a:r>
+            <a:r>
+              <a:rPr lang="en-US" altLang="zh-TW" sz="2400" dirty="0" err="1">
+                <a:solidFill>
+                  <a:srgbClr val="007D9A"/>
+                </a:solidFill>
+                <a:latin typeface="Consolas" panose="020B0609020204030204" pitchFamily="49" charset="0"/>
+              </a:rPr>
+              <a:t>RemoveTailList</a:t>
+            </a:r>
+            <a:r>
+              <a:rPr lang="en-US" altLang="zh-TW" sz="2400" dirty="0">
+                <a:solidFill>
+                  <a:srgbClr val="000000"/>
+                </a:solidFill>
+                <a:latin typeface="Consolas" panose="020B0609020204030204" pitchFamily="49" charset="0"/>
+              </a:rPr>
+              <a:t>( PLIST_ENTRY </a:t>
+            </a:r>
+            <a:r>
+              <a:rPr lang="en-US" altLang="zh-TW" sz="2400" dirty="0" err="1">
+                <a:solidFill>
+                  <a:srgbClr val="000000"/>
+                </a:solidFill>
+                <a:latin typeface="Consolas" panose="020B0609020204030204" pitchFamily="49" charset="0"/>
+              </a:rPr>
+              <a:t>ListHead</a:t>
+            </a:r>
+            <a:r>
+              <a:rPr lang="en-US" altLang="zh-TW" sz="2400" dirty="0">
+                <a:solidFill>
+                  <a:srgbClr val="000000"/>
+                </a:solidFill>
+                <a:latin typeface="Consolas" panose="020B0609020204030204" pitchFamily="49" charset="0"/>
+              </a:rPr>
+              <a:t> </a:t>
+            </a:r>
+            <a:r>
+              <a:rPr lang="en-US" altLang="zh-TW" sz="2400" dirty="0" smtClean="0">
+                <a:solidFill>
+                  <a:srgbClr val="000000"/>
+                </a:solidFill>
+                <a:latin typeface="Consolas" panose="020B0609020204030204" pitchFamily="49" charset="0"/>
+              </a:rPr>
+              <a:t>);</a:t>
+            </a:r>
+          </a:p>
+          <a:p>
+            <a:endParaRPr lang="en-US" altLang="zh-TW" sz="2400" dirty="0">
+              <a:solidFill>
+                <a:srgbClr val="000000"/>
+              </a:solidFill>
+              <a:latin typeface="Consolas" panose="020B0609020204030204" pitchFamily="49" charset="0"/>
+            </a:endParaRPr>
+          </a:p>
+          <a:p>
+            <a:r>
+              <a:rPr lang="en-US" altLang="zh-TW" sz="2400" dirty="0">
+                <a:solidFill>
+                  <a:srgbClr val="000000"/>
+                </a:solidFill>
+                <a:latin typeface="Consolas" panose="020B0609020204030204" pitchFamily="49" charset="0"/>
+              </a:rPr>
+              <a:t>BOOLEAN </a:t>
+            </a:r>
+            <a:r>
+              <a:rPr lang="en-US" altLang="zh-TW" sz="2400" dirty="0" err="1">
+                <a:solidFill>
+                  <a:srgbClr val="007D9A"/>
+                </a:solidFill>
+                <a:latin typeface="Consolas" panose="020B0609020204030204" pitchFamily="49" charset="0"/>
+              </a:rPr>
+              <a:t>RemoveEntryList</a:t>
+            </a:r>
+            <a:r>
+              <a:rPr lang="en-US" altLang="zh-TW" sz="2400" dirty="0">
+                <a:solidFill>
+                  <a:srgbClr val="000000"/>
+                </a:solidFill>
+                <a:latin typeface="Consolas" panose="020B0609020204030204" pitchFamily="49" charset="0"/>
+              </a:rPr>
+              <a:t>( PLIST_ENTRY Entry </a:t>
+            </a:r>
+            <a:r>
+              <a:rPr lang="en-US" altLang="zh-TW" sz="2400" dirty="0" smtClean="0">
+                <a:solidFill>
+                  <a:srgbClr val="000000"/>
+                </a:solidFill>
+                <a:latin typeface="Consolas" panose="020B0609020204030204" pitchFamily="49" charset="0"/>
+              </a:rPr>
+              <a:t>);</a:t>
+            </a:r>
+            <a:endParaRPr lang="en-US" altLang="zh-TW" sz="2400" dirty="0">
+              <a:solidFill>
+                <a:srgbClr val="000000"/>
+              </a:solidFill>
+              <a:latin typeface="Consolas" panose="020B0609020204030204" pitchFamily="49" charset="0"/>
+              <a:ea typeface="微軟正黑體" panose="020B0604030504040204" pitchFamily="34" charset="-120"/>
+            </a:endParaRPr>
+          </a:p>
+          <a:p>
+            <a:endParaRPr lang="en-US" altLang="zh-TW" sz="2400" dirty="0" smtClean="0">
+              <a:solidFill>
+                <a:schemeClr val="accent2">
+                  <a:lumMod val="75000"/>
+                </a:schemeClr>
+              </a:solidFill>
+              <a:latin typeface="微軟正黑體" panose="020B0604030504040204" pitchFamily="34" charset="-120"/>
+              <a:ea typeface="微軟正黑體" panose="020B0604030504040204" pitchFamily="34" charset="-120"/>
+            </a:endParaRPr>
+          </a:p>
+        </p:txBody>
+      </p:sp>
+      <p:pic>
+        <p:nvPicPr>
+          <p:cNvPr id="2" name="圖片 1"/>
+          <p:cNvPicPr>
+            <a:picLocks noChangeAspect="1"/>
+          </p:cNvPicPr>
+          <p:nvPr/>
+        </p:nvPicPr>
+        <p:blipFill>
+          <a:blip r:embed="rId2"/>
+          <a:stretch>
+            <a:fillRect/>
+          </a:stretch>
+        </p:blipFill>
+        <p:spPr>
+          <a:xfrm>
+            <a:off x="4410256" y="1631225"/>
+            <a:ext cx="3638550" cy="1409700"/>
+          </a:xfrm>
+          <a:prstGeom prst="rect">
+            <a:avLst/>
+          </a:prstGeom>
+          <a:ln w="63500">
+            <a:solidFill>
+              <a:schemeClr val="accent4"/>
+            </a:solidFill>
+          </a:ln>
+        </p:spPr>
+      </p:pic>
+    </p:spTree>
+    <p:extLst>
+      <p:ext uri="{BB962C8B-B14F-4D97-AF65-F5344CB8AC3E}">
+        <p14:creationId xmlns:p14="http://schemas.microsoft.com/office/powerpoint/2010/main" val="2545094955"/>
+      </p:ext>
+    </p:extLst>
+  </p:cSld>
+  <p:clrMapOvr>
+    <a:masterClrMapping/>
+  </p:clrMapOvr>
+  <p:timing>
+    <p:tnLst>
+      <p:par>
+        <p:cTn id="1" dur="indefinite" restart="never" nodeType="tmRoot"/>
+      </p:par>
+    </p:tnLst>
+  </p:timing>
+</p:sld>
+</file>
+
+<file path=ppt/slides/slide45.xml><?xml version="1.0" encoding="utf-8"?>
+<p:sld xmlns:a="http://schemas.openxmlformats.org/drawingml/2006/main" xmlns:r="http://schemas.openxmlformats.org/officeDocument/2006/relationships" xmlns:p="http://schemas.openxmlformats.org/presentationml/2006/main">
+  <p:cSld>
+    <p:spTree>
+      <p:nvGrpSpPr>
+        <p:cNvPr id="1" name=""/>
+        <p:cNvGrpSpPr/>
+        <p:nvPr/>
+      </p:nvGrpSpPr>
+      <p:grpSpPr>
+        <a:xfrm>
+          <a:off x="0" y="0"/>
+          <a:ext cx="0" cy="0"/>
+          <a:chOff x="0" y="0"/>
+          <a:chExt cx="0" cy="0"/>
+        </a:xfrm>
+      </p:grpSpPr>
+      <p:sp>
+        <p:nvSpPr>
+          <p:cNvPr id="4" name="文字方塊 3"/>
+          <p:cNvSpPr txBox="1"/>
+          <p:nvPr/>
+        </p:nvSpPr>
+        <p:spPr>
+          <a:xfrm>
+            <a:off x="8560526" y="6334780"/>
+            <a:ext cx="3631474" cy="523220"/>
+          </a:xfrm>
+          <a:prstGeom prst="rect">
+            <a:avLst/>
+          </a:prstGeom>
+          <a:noFill/>
+        </p:spPr>
+        <p:txBody>
+          <a:bodyPr wrap="square" rtlCol="0">
+            <a:spAutoFit/>
+          </a:bodyPr>
+          <a:lstStyle/>
+          <a:p>
+            <a:r>
+              <a:rPr lang="en-US" altLang="zh-TW" sz="2800" b="1" dirty="0" smtClean="0">
+                <a:effectLst>
+                  <a:outerShdw blurRad="38100" dist="38100" dir="2700000" algn="tl">
+                    <a:srgbClr val="000000">
+                      <a:alpha val="43137"/>
+                    </a:srgbClr>
+                  </a:outerShdw>
+                </a:effectLst>
+                <a:latin typeface="微軟正黑體" panose="020B0604030504040204" pitchFamily="34" charset="-120"/>
+                <a:ea typeface="微軟正黑體" panose="020B0604030504040204" pitchFamily="34" charset="-120"/>
+              </a:rPr>
+              <a:t>Windows</a:t>
+            </a:r>
+            <a:r>
+              <a:rPr lang="zh-TW" altLang="en-US" sz="2800" b="1" dirty="0" smtClean="0">
+                <a:effectLst>
+                  <a:outerShdw blurRad="38100" dist="38100" dir="2700000" algn="tl">
+                    <a:srgbClr val="000000">
+                      <a:alpha val="43137"/>
+                    </a:srgbClr>
+                  </a:outerShdw>
+                </a:effectLst>
+                <a:latin typeface="微軟正黑體" panose="020B0604030504040204" pitchFamily="34" charset="-120"/>
+                <a:ea typeface="微軟正黑體" panose="020B0604030504040204" pitchFamily="34" charset="-120"/>
+              </a:rPr>
+              <a:t>記憶體管理</a:t>
+            </a:r>
+            <a:endParaRPr lang="zh-TW" altLang="en-US" sz="2800" b="1" dirty="0">
+              <a:effectLst>
+                <a:outerShdw blurRad="38100" dist="38100" dir="2700000" algn="tl">
+                  <a:srgbClr val="000000">
+                    <a:alpha val="43137"/>
+                  </a:srgbClr>
+                </a:outerShdw>
+              </a:effectLst>
+              <a:latin typeface="微軟正黑體" panose="020B0604030504040204" pitchFamily="34" charset="-120"/>
+              <a:ea typeface="微軟正黑體" panose="020B0604030504040204" pitchFamily="34" charset="-120"/>
+            </a:endParaRPr>
+          </a:p>
+        </p:txBody>
+      </p:sp>
+      <p:sp>
+        <p:nvSpPr>
+          <p:cNvPr id="8" name="文字方塊 7"/>
+          <p:cNvSpPr txBox="1"/>
+          <p:nvPr/>
+        </p:nvSpPr>
+        <p:spPr>
+          <a:xfrm>
+            <a:off x="182880" y="0"/>
+            <a:ext cx="2481943" cy="646331"/>
+          </a:xfrm>
+          <a:prstGeom prst="rect">
+            <a:avLst/>
+          </a:prstGeom>
+          <a:noFill/>
+        </p:spPr>
+        <p:txBody>
+          <a:bodyPr wrap="square" rtlCol="0">
+            <a:spAutoFit/>
+          </a:bodyPr>
+          <a:lstStyle/>
+          <a:p>
+            <a:r>
+              <a:rPr lang="en-US" altLang="zh-TW" sz="3600" dirty="0" smtClean="0">
+                <a:effectLst>
+                  <a:outerShdw blurRad="38100" dist="38100" dir="2700000" algn="tl">
+                    <a:srgbClr val="000000">
+                      <a:alpha val="43137"/>
+                    </a:srgbClr>
+                  </a:outerShdw>
+                </a:effectLst>
+                <a:latin typeface="微軟正黑體" panose="020B0604030504040204" pitchFamily="34" charset="-120"/>
+                <a:ea typeface="微軟正黑體" panose="020B0604030504040204" pitchFamily="34" charset="-120"/>
+              </a:rPr>
+              <a:t>Lookaside</a:t>
+            </a:r>
+            <a:endParaRPr lang="en-US" altLang="zh-TW" sz="3600" dirty="0" smtClean="0">
+              <a:effectLst>
+                <a:outerShdw blurRad="38100" dist="38100" dir="2700000" algn="tl">
+                  <a:srgbClr val="000000">
+                    <a:alpha val="43137"/>
+                  </a:srgbClr>
+                </a:outerShdw>
+              </a:effectLst>
+              <a:latin typeface="微軟正黑體" panose="020B0604030504040204" pitchFamily="34" charset="-120"/>
+              <a:ea typeface="微軟正黑體" panose="020B0604030504040204" pitchFamily="34" charset="-120"/>
+            </a:endParaRPr>
+          </a:p>
+        </p:txBody>
+      </p:sp>
+      <p:sp>
+        <p:nvSpPr>
+          <p:cNvPr id="3" name="文字方塊 2"/>
+          <p:cNvSpPr txBox="1"/>
+          <p:nvPr/>
+        </p:nvSpPr>
+        <p:spPr>
+          <a:xfrm>
+            <a:off x="254000" y="1366391"/>
+            <a:ext cx="6360160" cy="1077218"/>
+          </a:xfrm>
+          <a:prstGeom prst="rect">
+            <a:avLst/>
+          </a:prstGeom>
+          <a:noFill/>
+        </p:spPr>
+        <p:txBody>
+          <a:bodyPr wrap="square" rtlCol="0">
+            <a:spAutoFit/>
+          </a:bodyPr>
+          <a:lstStyle/>
+          <a:p>
+            <a:pPr marL="285750" indent="-285750">
+              <a:buFont typeface="Arial" panose="020B0604020202020204" pitchFamily="34" charset="0"/>
+              <a:buChar char="•"/>
+            </a:pPr>
+            <a:r>
+              <a:rPr lang="zh-TW" altLang="en-US" sz="3200" b="1" dirty="0" smtClean="0">
+                <a:latin typeface="微軟正黑體" panose="020B0604030504040204" pitchFamily="34" charset="-120"/>
+                <a:ea typeface="微軟正黑體" panose="020B0604030504040204" pitchFamily="34" charset="-120"/>
+              </a:rPr>
+              <a:t>每次申請固定大小的記憶體</a:t>
+            </a:r>
+            <a:endParaRPr lang="en-US" altLang="zh-TW" sz="3200" b="1" dirty="0" smtClean="0">
+              <a:latin typeface="微軟正黑體" panose="020B0604030504040204" pitchFamily="34" charset="-120"/>
+              <a:ea typeface="微軟正黑體" panose="020B0604030504040204" pitchFamily="34" charset="-120"/>
+            </a:endParaRPr>
+          </a:p>
+          <a:p>
+            <a:pPr marL="285750" indent="-285750">
+              <a:buFont typeface="Arial" panose="020B0604020202020204" pitchFamily="34" charset="0"/>
+              <a:buChar char="•"/>
+            </a:pPr>
+            <a:r>
+              <a:rPr lang="zh-TW" altLang="en-US" sz="3200" b="1" dirty="0" smtClean="0">
+                <a:latin typeface="微軟正黑體" panose="020B0604030504040204" pitchFamily="34" charset="-120"/>
+                <a:ea typeface="微軟正黑體" panose="020B0604030504040204" pitchFamily="34" charset="-120"/>
+              </a:rPr>
+              <a:t>申請和回收的操作十分頻繁</a:t>
+            </a:r>
+            <a:endParaRPr lang="zh-TW" altLang="en-US" sz="3200" dirty="0">
+              <a:solidFill>
+                <a:srgbClr val="C00000"/>
+              </a:solidFill>
+              <a:latin typeface="微軟正黑體" panose="020B0604030504040204" pitchFamily="34" charset="-120"/>
+              <a:ea typeface="微軟正黑體" panose="020B0604030504040204" pitchFamily="34" charset="-120"/>
+            </a:endParaRPr>
+          </a:p>
+        </p:txBody>
+      </p:sp>
+    </p:spTree>
+    <p:extLst>
+      <p:ext uri="{BB962C8B-B14F-4D97-AF65-F5344CB8AC3E}">
+        <p14:creationId xmlns:p14="http://schemas.microsoft.com/office/powerpoint/2010/main" val="2418688012"/>
+      </p:ext>
+    </p:extLst>
+  </p:cSld>
+  <p:clrMapOvr>
+    <a:masterClrMapping/>
+  </p:clrMapOvr>
+  <p:timing>
+    <p:tnLst>
+      <p:par>
+        <p:cTn id="1" dur="indefinite" restart="never" nodeType="tmRoot"/>
+      </p:par>
+    </p:tnLst>
+  </p:timing>
+</p:sld>
+</file>
+
+<file path=ppt/slides/slide46.xml><?xml version="1.0" encoding="utf-8"?>
+<p:sld xmlns:a="http://schemas.openxmlformats.org/drawingml/2006/main" xmlns:r="http://schemas.openxmlformats.org/officeDocument/2006/relationships" xmlns:p="http://schemas.openxmlformats.org/presentationml/2006/main">
+  <p:cSld>
+    <p:spTree>
+      <p:nvGrpSpPr>
+        <p:cNvPr id="1" name=""/>
+        <p:cNvGrpSpPr/>
+        <p:nvPr/>
+      </p:nvGrpSpPr>
+      <p:grpSpPr>
+        <a:xfrm>
+          <a:off x="0" y="0"/>
+          <a:ext cx="0" cy="0"/>
+          <a:chOff x="0" y="0"/>
+          <a:chExt cx="0" cy="0"/>
+        </a:xfrm>
+      </p:grpSpPr>
+      <p:sp>
+        <p:nvSpPr>
+          <p:cNvPr id="4" name="文字方塊 3"/>
+          <p:cNvSpPr txBox="1"/>
+          <p:nvPr/>
+        </p:nvSpPr>
+        <p:spPr>
+          <a:xfrm>
+            <a:off x="8560526" y="6334780"/>
+            <a:ext cx="3631474" cy="523220"/>
+          </a:xfrm>
+          <a:prstGeom prst="rect">
+            <a:avLst/>
+          </a:prstGeom>
+          <a:noFill/>
+        </p:spPr>
+        <p:txBody>
+          <a:bodyPr wrap="square" rtlCol="0">
+            <a:spAutoFit/>
+          </a:bodyPr>
+          <a:lstStyle/>
+          <a:p>
+            <a:r>
+              <a:rPr lang="en-US" altLang="zh-TW" sz="2800" b="1" dirty="0" smtClean="0">
+                <a:effectLst>
+                  <a:outerShdw blurRad="38100" dist="38100" dir="2700000" algn="tl">
+                    <a:srgbClr val="000000">
+                      <a:alpha val="43137"/>
+                    </a:srgbClr>
+                  </a:outerShdw>
+                </a:effectLst>
+                <a:latin typeface="微軟正黑體" panose="020B0604030504040204" pitchFamily="34" charset="-120"/>
+                <a:ea typeface="微軟正黑體" panose="020B0604030504040204" pitchFamily="34" charset="-120"/>
+              </a:rPr>
+              <a:t>Windows</a:t>
+            </a:r>
+            <a:r>
+              <a:rPr lang="zh-TW" altLang="en-US" sz="2800" b="1" dirty="0" smtClean="0">
+                <a:effectLst>
+                  <a:outerShdw blurRad="38100" dist="38100" dir="2700000" algn="tl">
+                    <a:srgbClr val="000000">
+                      <a:alpha val="43137"/>
+                    </a:srgbClr>
+                  </a:outerShdw>
+                </a:effectLst>
+                <a:latin typeface="微軟正黑體" panose="020B0604030504040204" pitchFamily="34" charset="-120"/>
+                <a:ea typeface="微軟正黑體" panose="020B0604030504040204" pitchFamily="34" charset="-120"/>
+              </a:rPr>
+              <a:t>記憶體管理</a:t>
+            </a:r>
+            <a:endParaRPr lang="zh-TW" altLang="en-US" sz="2800" b="1" dirty="0">
+              <a:effectLst>
+                <a:outerShdw blurRad="38100" dist="38100" dir="2700000" algn="tl">
+                  <a:srgbClr val="000000">
+                    <a:alpha val="43137"/>
+                  </a:srgbClr>
+                </a:outerShdw>
+              </a:effectLst>
+              <a:latin typeface="微軟正黑體" panose="020B0604030504040204" pitchFamily="34" charset="-120"/>
+              <a:ea typeface="微軟正黑體" panose="020B0604030504040204" pitchFamily="34" charset="-120"/>
+            </a:endParaRPr>
+          </a:p>
+        </p:txBody>
+      </p:sp>
+      <p:sp>
+        <p:nvSpPr>
+          <p:cNvPr id="8" name="文字方塊 7"/>
+          <p:cNvSpPr txBox="1"/>
+          <p:nvPr/>
+        </p:nvSpPr>
+        <p:spPr>
+          <a:xfrm>
+            <a:off x="182880" y="0"/>
+            <a:ext cx="2481943" cy="646331"/>
+          </a:xfrm>
+          <a:prstGeom prst="rect">
+            <a:avLst/>
+          </a:prstGeom>
+          <a:noFill/>
+        </p:spPr>
+        <p:txBody>
+          <a:bodyPr wrap="square" rtlCol="0">
+            <a:spAutoFit/>
+          </a:bodyPr>
+          <a:lstStyle/>
+          <a:p>
+            <a:r>
+              <a:rPr lang="en-US" altLang="zh-TW" sz="3600" dirty="0" smtClean="0">
+                <a:effectLst>
+                  <a:outerShdw blurRad="38100" dist="38100" dir="2700000" algn="tl">
+                    <a:srgbClr val="000000">
+                      <a:alpha val="43137"/>
+                    </a:srgbClr>
+                  </a:outerShdw>
+                </a:effectLst>
+                <a:latin typeface="微軟正黑體" panose="020B0604030504040204" pitchFamily="34" charset="-120"/>
+                <a:ea typeface="微軟正黑體" panose="020B0604030504040204" pitchFamily="34" charset="-120"/>
+              </a:rPr>
+              <a:t>Lookaside</a:t>
+            </a:r>
+            <a:endParaRPr lang="en-US" altLang="zh-TW" sz="3600" dirty="0" smtClean="0">
+              <a:effectLst>
+                <a:outerShdw blurRad="38100" dist="38100" dir="2700000" algn="tl">
+                  <a:srgbClr val="000000">
+                    <a:alpha val="43137"/>
+                  </a:srgbClr>
+                </a:outerShdw>
+              </a:effectLst>
+              <a:latin typeface="微軟正黑體" panose="020B0604030504040204" pitchFamily="34" charset="-120"/>
+              <a:ea typeface="微軟正黑體" panose="020B0604030504040204" pitchFamily="34" charset="-120"/>
+            </a:endParaRPr>
+          </a:p>
+        </p:txBody>
+      </p:sp>
+      <p:sp>
+        <p:nvSpPr>
+          <p:cNvPr id="6" name="文字方塊 5"/>
+          <p:cNvSpPr txBox="1"/>
+          <p:nvPr/>
+        </p:nvSpPr>
+        <p:spPr>
+          <a:xfrm>
+            <a:off x="161108" y="1097280"/>
+            <a:ext cx="11747864" cy="4524315"/>
+          </a:xfrm>
+          <a:prstGeom prst="rect">
+            <a:avLst/>
+          </a:prstGeom>
+          <a:noFill/>
+        </p:spPr>
+        <p:txBody>
+          <a:bodyPr wrap="square" rtlCol="0">
+            <a:spAutoFit/>
+          </a:bodyPr>
+          <a:lstStyle/>
+          <a:p>
+            <a:r>
+              <a:rPr lang="en-US" altLang="zh-TW" sz="1600" dirty="0">
+                <a:solidFill>
+                  <a:srgbClr val="0101FD"/>
+                </a:solidFill>
+                <a:latin typeface="Consolas" panose="020B0609020204030204" pitchFamily="49" charset="0"/>
+              </a:rPr>
+              <a:t>void</a:t>
+            </a:r>
+            <a:r>
+              <a:rPr lang="en-US" altLang="zh-TW" sz="1600" dirty="0">
+                <a:solidFill>
+                  <a:srgbClr val="000000"/>
+                </a:solidFill>
+                <a:latin typeface="Consolas" panose="020B0609020204030204" pitchFamily="49" charset="0"/>
+              </a:rPr>
+              <a:t> </a:t>
+            </a:r>
+            <a:r>
+              <a:rPr lang="en-US" altLang="zh-TW" sz="1600" dirty="0" err="1">
+                <a:solidFill>
+                  <a:srgbClr val="007D9A"/>
+                </a:solidFill>
+                <a:latin typeface="Consolas" panose="020B0609020204030204" pitchFamily="49" charset="0"/>
+              </a:rPr>
+              <a:t>ExInitializePagedLookasideList</a:t>
+            </a:r>
+            <a:r>
+              <a:rPr lang="en-US" altLang="zh-TW" sz="1600" dirty="0">
+                <a:solidFill>
+                  <a:srgbClr val="000000"/>
+                </a:solidFill>
+                <a:latin typeface="Consolas" panose="020B0609020204030204" pitchFamily="49" charset="0"/>
+              </a:rPr>
+              <a:t>( PPAGED_LOOKASIDE_LIST Lookaside, PALLOCATE_FUNCTION Allocate, PFREE_FUNCTION Free, ULONG Flags, SIZE_T Size, ULONG Tag, USHORT Depth );</a:t>
+            </a:r>
+            <a:endParaRPr lang="en-US" altLang="zh-TW" sz="1600" dirty="0" smtClean="0">
+              <a:solidFill>
+                <a:srgbClr val="0101FD"/>
+              </a:solidFill>
+              <a:latin typeface="Consolas" panose="020B0609020204030204" pitchFamily="49" charset="0"/>
+            </a:endParaRPr>
+          </a:p>
+          <a:p>
+            <a:endParaRPr lang="en-US" altLang="zh-TW" sz="1600" dirty="0" smtClean="0">
+              <a:solidFill>
+                <a:srgbClr val="0101FD"/>
+              </a:solidFill>
+              <a:latin typeface="Consolas" panose="020B0609020204030204" pitchFamily="49" charset="0"/>
+            </a:endParaRPr>
+          </a:p>
+          <a:p>
+            <a:r>
+              <a:rPr lang="en-US" altLang="zh-TW" sz="1600" dirty="0" smtClean="0">
+                <a:solidFill>
+                  <a:srgbClr val="0101FD"/>
+                </a:solidFill>
+                <a:latin typeface="Consolas" panose="020B0609020204030204" pitchFamily="49" charset="0"/>
+              </a:rPr>
+              <a:t>void</a:t>
+            </a:r>
+            <a:r>
+              <a:rPr lang="en-US" altLang="zh-TW" sz="1600" dirty="0" smtClean="0">
+                <a:solidFill>
+                  <a:srgbClr val="000000"/>
+                </a:solidFill>
+                <a:latin typeface="Consolas" panose="020B0609020204030204" pitchFamily="49" charset="0"/>
+              </a:rPr>
+              <a:t> </a:t>
+            </a:r>
+            <a:r>
+              <a:rPr lang="en-US" altLang="zh-TW" sz="1600" dirty="0" err="1">
+                <a:solidFill>
+                  <a:srgbClr val="007D9A"/>
+                </a:solidFill>
+                <a:latin typeface="Consolas" panose="020B0609020204030204" pitchFamily="49" charset="0"/>
+              </a:rPr>
+              <a:t>ExInitializeNPagedLookasideList</a:t>
+            </a:r>
+            <a:r>
+              <a:rPr lang="en-US" altLang="zh-TW" sz="1600" dirty="0">
+                <a:solidFill>
+                  <a:srgbClr val="000000"/>
+                </a:solidFill>
+                <a:latin typeface="Consolas" panose="020B0609020204030204" pitchFamily="49" charset="0"/>
+              </a:rPr>
+              <a:t>( PNPAGED_LOOKASIDE_LIST Lookaside, PALLOCATE_FUNCTION Allocate, PFREE_FUNCTION Free, ULONG Flags, SIZE_T Size, ULONG Tag, USHORT Depth </a:t>
+            </a:r>
+            <a:r>
+              <a:rPr lang="en-US" altLang="zh-TW" sz="1600" dirty="0" smtClean="0">
+                <a:solidFill>
+                  <a:srgbClr val="000000"/>
+                </a:solidFill>
+                <a:latin typeface="Consolas" panose="020B0609020204030204" pitchFamily="49" charset="0"/>
+              </a:rPr>
+              <a:t>);</a:t>
+            </a:r>
+          </a:p>
+          <a:p>
+            <a:endParaRPr lang="en-US" altLang="zh-TW" sz="1600" dirty="0">
+              <a:solidFill>
+                <a:srgbClr val="000000"/>
+              </a:solidFill>
+              <a:latin typeface="Consolas" panose="020B0609020204030204" pitchFamily="49" charset="0"/>
+              <a:ea typeface="微軟正黑體" panose="020B0604030504040204" pitchFamily="34" charset="-120"/>
+            </a:endParaRPr>
+          </a:p>
+          <a:p>
+            <a:r>
+              <a:rPr lang="en-US" altLang="zh-TW" sz="1600" dirty="0">
+                <a:solidFill>
+                  <a:srgbClr val="000000"/>
+                </a:solidFill>
+                <a:latin typeface="Consolas" panose="020B0609020204030204" pitchFamily="49" charset="0"/>
+              </a:rPr>
+              <a:t>PVOID </a:t>
+            </a:r>
+            <a:r>
+              <a:rPr lang="en-US" altLang="zh-TW" sz="1600" dirty="0" err="1">
+                <a:solidFill>
+                  <a:srgbClr val="007D9A"/>
+                </a:solidFill>
+                <a:latin typeface="Consolas" panose="020B0609020204030204" pitchFamily="49" charset="0"/>
+              </a:rPr>
+              <a:t>ExAllocateFromPagedLookasideList</a:t>
+            </a:r>
+            <a:r>
+              <a:rPr lang="en-US" altLang="zh-TW" sz="1600" dirty="0">
+                <a:solidFill>
+                  <a:srgbClr val="000000"/>
+                </a:solidFill>
+                <a:latin typeface="Consolas" panose="020B0609020204030204" pitchFamily="49" charset="0"/>
+              </a:rPr>
+              <a:t>( PPAGED_LOOKASIDE_LIST Lookaside </a:t>
+            </a:r>
+            <a:r>
+              <a:rPr lang="en-US" altLang="zh-TW" sz="1600" dirty="0" smtClean="0">
+                <a:solidFill>
+                  <a:srgbClr val="000000"/>
+                </a:solidFill>
+                <a:latin typeface="Consolas" panose="020B0609020204030204" pitchFamily="49" charset="0"/>
+              </a:rPr>
+              <a:t>);</a:t>
+            </a:r>
+          </a:p>
+          <a:p>
+            <a:endParaRPr lang="en-US" altLang="zh-TW" sz="1600" dirty="0">
+              <a:solidFill>
+                <a:srgbClr val="000000"/>
+              </a:solidFill>
+              <a:latin typeface="Consolas" panose="020B0609020204030204" pitchFamily="49" charset="0"/>
+              <a:ea typeface="微軟正黑體" panose="020B0604030504040204" pitchFamily="34" charset="-120"/>
+            </a:endParaRPr>
+          </a:p>
+          <a:p>
+            <a:r>
+              <a:rPr lang="en-US" altLang="zh-TW" sz="1600" dirty="0">
+                <a:solidFill>
+                  <a:srgbClr val="000000"/>
+                </a:solidFill>
+                <a:latin typeface="Consolas" panose="020B0609020204030204" pitchFamily="49" charset="0"/>
+              </a:rPr>
+              <a:t>PVOID </a:t>
+            </a:r>
+            <a:r>
+              <a:rPr lang="en-US" altLang="zh-TW" sz="1600" dirty="0" err="1">
+                <a:solidFill>
+                  <a:srgbClr val="007D9A"/>
+                </a:solidFill>
+                <a:latin typeface="Consolas" panose="020B0609020204030204" pitchFamily="49" charset="0"/>
+              </a:rPr>
+              <a:t>ExAllocateFromNPagedLookasideList</a:t>
+            </a:r>
+            <a:r>
+              <a:rPr lang="en-US" altLang="zh-TW" sz="1600" dirty="0">
+                <a:solidFill>
+                  <a:srgbClr val="000000"/>
+                </a:solidFill>
+                <a:latin typeface="Consolas" panose="020B0609020204030204" pitchFamily="49" charset="0"/>
+              </a:rPr>
+              <a:t>( PNPAGED_LOOKASIDE_LIST Lookaside </a:t>
+            </a:r>
+            <a:r>
+              <a:rPr lang="en-US" altLang="zh-TW" sz="1600" dirty="0" smtClean="0">
+                <a:solidFill>
+                  <a:srgbClr val="000000"/>
+                </a:solidFill>
+                <a:latin typeface="Consolas" panose="020B0609020204030204" pitchFamily="49" charset="0"/>
+              </a:rPr>
+              <a:t>);</a:t>
+            </a:r>
+          </a:p>
+          <a:p>
+            <a:endParaRPr lang="en-US" altLang="zh-TW" sz="1600" dirty="0">
+              <a:solidFill>
+                <a:srgbClr val="000000"/>
+              </a:solidFill>
+              <a:latin typeface="Consolas" panose="020B0609020204030204" pitchFamily="49" charset="0"/>
+              <a:ea typeface="微軟正黑體" panose="020B0604030504040204" pitchFamily="34" charset="-120"/>
+            </a:endParaRPr>
+          </a:p>
+          <a:p>
+            <a:r>
+              <a:rPr lang="en-US" altLang="zh-TW" sz="1600" dirty="0">
+                <a:solidFill>
+                  <a:srgbClr val="0101FD"/>
+                </a:solidFill>
+                <a:latin typeface="Consolas" panose="020B0609020204030204" pitchFamily="49" charset="0"/>
+              </a:rPr>
+              <a:t>void</a:t>
+            </a:r>
+            <a:r>
+              <a:rPr lang="en-US" altLang="zh-TW" sz="1600" dirty="0">
+                <a:solidFill>
+                  <a:srgbClr val="000000"/>
+                </a:solidFill>
+                <a:latin typeface="Consolas" panose="020B0609020204030204" pitchFamily="49" charset="0"/>
+              </a:rPr>
+              <a:t> </a:t>
+            </a:r>
+            <a:r>
+              <a:rPr lang="en-US" altLang="zh-TW" sz="1600" dirty="0" err="1">
+                <a:solidFill>
+                  <a:srgbClr val="007D9A"/>
+                </a:solidFill>
+                <a:latin typeface="Consolas" panose="020B0609020204030204" pitchFamily="49" charset="0"/>
+              </a:rPr>
+              <a:t>ExFreeToPagedLookasideList</a:t>
+            </a:r>
+            <a:r>
+              <a:rPr lang="en-US" altLang="zh-TW" sz="1600" dirty="0">
+                <a:solidFill>
+                  <a:srgbClr val="000000"/>
+                </a:solidFill>
+                <a:latin typeface="Consolas" panose="020B0609020204030204" pitchFamily="49" charset="0"/>
+              </a:rPr>
+              <a:t>( PPAGED_LOOKASIDE_LIST Lookaside, PVOID Entry </a:t>
+            </a:r>
+            <a:r>
+              <a:rPr lang="en-US" altLang="zh-TW" sz="1600" dirty="0" smtClean="0">
+                <a:solidFill>
+                  <a:srgbClr val="000000"/>
+                </a:solidFill>
+                <a:latin typeface="Consolas" panose="020B0609020204030204" pitchFamily="49" charset="0"/>
+              </a:rPr>
+              <a:t>);</a:t>
+            </a:r>
+          </a:p>
+          <a:p>
+            <a:endParaRPr lang="en-US" altLang="zh-TW" sz="1600" dirty="0">
+              <a:solidFill>
+                <a:srgbClr val="000000"/>
+              </a:solidFill>
+              <a:latin typeface="Consolas" panose="020B0609020204030204" pitchFamily="49" charset="0"/>
+              <a:ea typeface="微軟正黑體" panose="020B0604030504040204" pitchFamily="34" charset="-120"/>
+            </a:endParaRPr>
+          </a:p>
+          <a:p>
+            <a:r>
+              <a:rPr lang="en-US" altLang="zh-TW" sz="1600" dirty="0">
+                <a:solidFill>
+                  <a:srgbClr val="0101FD"/>
+                </a:solidFill>
+                <a:latin typeface="Consolas" panose="020B0609020204030204" pitchFamily="49" charset="0"/>
+              </a:rPr>
+              <a:t>void</a:t>
+            </a:r>
+            <a:r>
+              <a:rPr lang="en-US" altLang="zh-TW" sz="1600" dirty="0">
+                <a:solidFill>
+                  <a:srgbClr val="000000"/>
+                </a:solidFill>
+                <a:latin typeface="Consolas" panose="020B0609020204030204" pitchFamily="49" charset="0"/>
+              </a:rPr>
+              <a:t> </a:t>
+            </a:r>
+            <a:r>
+              <a:rPr lang="en-US" altLang="zh-TW" sz="1600" dirty="0" err="1">
+                <a:solidFill>
+                  <a:srgbClr val="007D9A"/>
+                </a:solidFill>
+                <a:latin typeface="Consolas" panose="020B0609020204030204" pitchFamily="49" charset="0"/>
+              </a:rPr>
+              <a:t>ExFreeToNPagedLookasideList</a:t>
+            </a:r>
+            <a:r>
+              <a:rPr lang="en-US" altLang="zh-TW" sz="1600" dirty="0">
+                <a:solidFill>
+                  <a:srgbClr val="000000"/>
+                </a:solidFill>
+                <a:latin typeface="Consolas" panose="020B0609020204030204" pitchFamily="49" charset="0"/>
+              </a:rPr>
+              <a:t>( PNPAGED_LOOKASIDE_LIST Lookaside, PVOID Entry </a:t>
+            </a:r>
+            <a:r>
+              <a:rPr lang="en-US" altLang="zh-TW" sz="1600" dirty="0" smtClean="0">
+                <a:solidFill>
+                  <a:srgbClr val="000000"/>
+                </a:solidFill>
+                <a:latin typeface="Consolas" panose="020B0609020204030204" pitchFamily="49" charset="0"/>
+              </a:rPr>
+              <a:t>);</a:t>
+            </a:r>
+          </a:p>
+          <a:p>
+            <a:endParaRPr lang="en-US" altLang="zh-TW" sz="1600" dirty="0">
+              <a:solidFill>
+                <a:srgbClr val="000000"/>
+              </a:solidFill>
+              <a:latin typeface="Consolas" panose="020B0609020204030204" pitchFamily="49" charset="0"/>
+              <a:ea typeface="微軟正黑體" panose="020B0604030504040204" pitchFamily="34" charset="-120"/>
+            </a:endParaRPr>
+          </a:p>
+          <a:p>
+            <a:r>
+              <a:rPr lang="en-US" altLang="zh-TW" sz="1600" dirty="0">
+                <a:solidFill>
+                  <a:srgbClr val="0101FD"/>
+                </a:solidFill>
+                <a:latin typeface="Consolas" panose="020B0609020204030204" pitchFamily="49" charset="0"/>
+              </a:rPr>
+              <a:t>void</a:t>
+            </a:r>
+            <a:r>
+              <a:rPr lang="en-US" altLang="zh-TW" sz="1600" dirty="0">
+                <a:solidFill>
+                  <a:srgbClr val="000000"/>
+                </a:solidFill>
+                <a:latin typeface="Consolas" panose="020B0609020204030204" pitchFamily="49" charset="0"/>
+              </a:rPr>
+              <a:t> </a:t>
+            </a:r>
+            <a:r>
+              <a:rPr lang="en-US" altLang="zh-TW" sz="1600" dirty="0" err="1">
+                <a:solidFill>
+                  <a:srgbClr val="007D9A"/>
+                </a:solidFill>
+                <a:latin typeface="Consolas" panose="020B0609020204030204" pitchFamily="49" charset="0"/>
+              </a:rPr>
+              <a:t>ExDeletePagedLookasideList</a:t>
+            </a:r>
+            <a:r>
+              <a:rPr lang="en-US" altLang="zh-TW" sz="1600" dirty="0">
+                <a:solidFill>
+                  <a:srgbClr val="000000"/>
+                </a:solidFill>
+                <a:latin typeface="Consolas" panose="020B0609020204030204" pitchFamily="49" charset="0"/>
+              </a:rPr>
+              <a:t>( PPAGED_LOOKASIDE_LIST Lookaside </a:t>
+            </a:r>
+            <a:r>
+              <a:rPr lang="en-US" altLang="zh-TW" sz="1600" dirty="0" smtClean="0">
+                <a:solidFill>
+                  <a:srgbClr val="000000"/>
+                </a:solidFill>
+                <a:latin typeface="Consolas" panose="020B0609020204030204" pitchFamily="49" charset="0"/>
+              </a:rPr>
+              <a:t>);</a:t>
+            </a:r>
+          </a:p>
+          <a:p>
+            <a:endParaRPr lang="en-US" altLang="zh-TW" sz="1600" dirty="0">
+              <a:solidFill>
+                <a:srgbClr val="000000"/>
+              </a:solidFill>
+              <a:latin typeface="Consolas" panose="020B0609020204030204" pitchFamily="49" charset="0"/>
+              <a:ea typeface="微軟正黑體" panose="020B0604030504040204" pitchFamily="34" charset="-120"/>
+            </a:endParaRPr>
+          </a:p>
+          <a:p>
+            <a:r>
+              <a:rPr lang="en-US" altLang="zh-TW" sz="1600" dirty="0">
+                <a:solidFill>
+                  <a:srgbClr val="0101FD"/>
+                </a:solidFill>
+                <a:latin typeface="Consolas" panose="020B0609020204030204" pitchFamily="49" charset="0"/>
+              </a:rPr>
+              <a:t>void</a:t>
+            </a:r>
+            <a:r>
+              <a:rPr lang="en-US" altLang="zh-TW" sz="1600" dirty="0">
+                <a:solidFill>
+                  <a:srgbClr val="000000"/>
+                </a:solidFill>
+                <a:latin typeface="Consolas" panose="020B0609020204030204" pitchFamily="49" charset="0"/>
+              </a:rPr>
+              <a:t> </a:t>
+            </a:r>
+            <a:r>
+              <a:rPr lang="en-US" altLang="zh-TW" sz="1600" dirty="0" err="1">
+                <a:solidFill>
+                  <a:srgbClr val="007D9A"/>
+                </a:solidFill>
+                <a:latin typeface="Consolas" panose="020B0609020204030204" pitchFamily="49" charset="0"/>
+              </a:rPr>
+              <a:t>ExDeleteNPagedLookasideList</a:t>
+            </a:r>
+            <a:r>
+              <a:rPr lang="en-US" altLang="zh-TW" sz="1600" dirty="0">
+                <a:solidFill>
+                  <a:srgbClr val="000000"/>
+                </a:solidFill>
+                <a:latin typeface="Consolas" panose="020B0609020204030204" pitchFamily="49" charset="0"/>
+              </a:rPr>
+              <a:t>( PNPAGED_LOOKASIDE_LIST Lookaside );</a:t>
+            </a:r>
+            <a:endParaRPr lang="en-US" altLang="zh-TW" sz="1600" dirty="0" smtClean="0">
+              <a:solidFill>
+                <a:srgbClr val="000000"/>
+              </a:solidFill>
+              <a:latin typeface="Consolas" panose="020B0609020204030204" pitchFamily="49" charset="0"/>
+              <a:ea typeface="微軟正黑體" panose="020B0604030504040204" pitchFamily="34" charset="-120"/>
+            </a:endParaRPr>
+          </a:p>
+          <a:p>
+            <a:endParaRPr lang="en-US" altLang="zh-TW" sz="1600" dirty="0" smtClean="0">
+              <a:solidFill>
+                <a:schemeClr val="accent2">
+                  <a:lumMod val="75000"/>
+                </a:schemeClr>
+              </a:solidFill>
+              <a:latin typeface="微軟正黑體" panose="020B0604030504040204" pitchFamily="34" charset="-120"/>
+              <a:ea typeface="微軟正黑體" panose="020B0604030504040204" pitchFamily="34" charset="-120"/>
+            </a:endParaRPr>
+          </a:p>
+        </p:txBody>
+      </p:sp>
+    </p:spTree>
+    <p:extLst>
+      <p:ext uri="{BB962C8B-B14F-4D97-AF65-F5344CB8AC3E}">
+        <p14:creationId xmlns:p14="http://schemas.microsoft.com/office/powerpoint/2010/main" val="511947870"/>
+      </p:ext>
+    </p:extLst>
+  </p:cSld>
+  <p:clrMapOvr>
+    <a:masterClrMapping/>
+  </p:clrMapOvr>
+  <p:timing>
+    <p:tnLst>
+      <p:par>
+        <p:cTn id="1" dur="indefinite" restart="never" nodeType="tmRoot"/>
+      </p:par>
+    </p:tnLst>
+  </p:timing>
+</p:sld>
+</file>
+
+<file path=ppt/slides/slide47.xml><?xml version="1.0" encoding="utf-8"?>
+<p:sld xmlns:a="http://schemas.openxmlformats.org/drawingml/2006/main" xmlns:r="http://schemas.openxmlformats.org/officeDocument/2006/relationships" xmlns:p="http://schemas.openxmlformats.org/presentationml/2006/main">
+  <p:cSld>
+    <p:spTree>
+      <p:nvGrpSpPr>
+        <p:cNvPr id="1" name=""/>
+        <p:cNvGrpSpPr/>
+        <p:nvPr/>
+      </p:nvGrpSpPr>
+      <p:grpSpPr>
+        <a:xfrm>
+          <a:off x="0" y="0"/>
+          <a:ext cx="0" cy="0"/>
+          <a:chOff x="0" y="0"/>
+          <a:chExt cx="0" cy="0"/>
+        </a:xfrm>
+      </p:grpSpPr>
+      <p:sp>
+        <p:nvSpPr>
+          <p:cNvPr id="4" name="文字方塊 3"/>
+          <p:cNvSpPr txBox="1"/>
+          <p:nvPr/>
+        </p:nvSpPr>
+        <p:spPr>
+          <a:xfrm>
+            <a:off x="8560526" y="6334780"/>
+            <a:ext cx="3631474" cy="523220"/>
+          </a:xfrm>
+          <a:prstGeom prst="rect">
+            <a:avLst/>
+          </a:prstGeom>
+          <a:noFill/>
+        </p:spPr>
+        <p:txBody>
+          <a:bodyPr wrap="square" rtlCol="0">
+            <a:spAutoFit/>
+          </a:bodyPr>
+          <a:lstStyle/>
+          <a:p>
+            <a:r>
+              <a:rPr lang="en-US" altLang="zh-TW" sz="2800" b="1" dirty="0" smtClean="0">
+                <a:effectLst>
+                  <a:outerShdw blurRad="38100" dist="38100" dir="2700000" algn="tl">
+                    <a:srgbClr val="000000">
+                      <a:alpha val="43137"/>
+                    </a:srgbClr>
+                  </a:outerShdw>
+                </a:effectLst>
+                <a:latin typeface="微軟正黑體" panose="020B0604030504040204" pitchFamily="34" charset="-120"/>
+                <a:ea typeface="微軟正黑體" panose="020B0604030504040204" pitchFamily="34" charset="-120"/>
+              </a:rPr>
+              <a:t>Windows</a:t>
+            </a:r>
+            <a:r>
+              <a:rPr lang="zh-TW" altLang="en-US" sz="2800" b="1" dirty="0" smtClean="0">
+                <a:effectLst>
+                  <a:outerShdw blurRad="38100" dist="38100" dir="2700000" algn="tl">
+                    <a:srgbClr val="000000">
+                      <a:alpha val="43137"/>
+                    </a:srgbClr>
+                  </a:outerShdw>
+                </a:effectLst>
+                <a:latin typeface="微軟正黑體" panose="020B0604030504040204" pitchFamily="34" charset="-120"/>
+                <a:ea typeface="微軟正黑體" panose="020B0604030504040204" pitchFamily="34" charset="-120"/>
+              </a:rPr>
+              <a:t>記憶體管理</a:t>
+            </a:r>
+            <a:endParaRPr lang="zh-TW" altLang="en-US" sz="2800" b="1" dirty="0">
+              <a:effectLst>
+                <a:outerShdw blurRad="38100" dist="38100" dir="2700000" algn="tl">
+                  <a:srgbClr val="000000">
+                    <a:alpha val="43137"/>
+                  </a:srgbClr>
+                </a:outerShdw>
+              </a:effectLst>
+              <a:latin typeface="微軟正黑體" panose="020B0604030504040204" pitchFamily="34" charset="-120"/>
+              <a:ea typeface="微軟正黑體" panose="020B0604030504040204" pitchFamily="34" charset="-120"/>
+            </a:endParaRPr>
+          </a:p>
+        </p:txBody>
+      </p:sp>
+      <p:sp>
+        <p:nvSpPr>
+          <p:cNvPr id="8" name="文字方塊 7"/>
+          <p:cNvSpPr txBox="1"/>
+          <p:nvPr/>
+        </p:nvSpPr>
+        <p:spPr>
+          <a:xfrm>
+            <a:off x="182880" y="0"/>
+            <a:ext cx="4389120" cy="646331"/>
+          </a:xfrm>
+          <a:prstGeom prst="rect">
+            <a:avLst/>
+          </a:prstGeom>
+          <a:noFill/>
+        </p:spPr>
+        <p:txBody>
+          <a:bodyPr wrap="square" rtlCol="0">
+            <a:spAutoFit/>
+          </a:bodyPr>
+          <a:lstStyle/>
+          <a:p>
+            <a:r>
+              <a:rPr lang="en-US" altLang="zh-TW" sz="3600" dirty="0" smtClean="0">
+                <a:effectLst>
+                  <a:outerShdw blurRad="38100" dist="38100" dir="2700000" algn="tl">
+                    <a:srgbClr val="000000">
+                      <a:alpha val="43137"/>
+                    </a:srgbClr>
+                  </a:outerShdw>
+                </a:effectLst>
+                <a:latin typeface="微軟正黑體" panose="020B0604030504040204" pitchFamily="34" charset="-120"/>
+                <a:ea typeface="微軟正黑體" panose="020B0604030504040204" pitchFamily="34" charset="-120"/>
+              </a:rPr>
+              <a:t>Related</a:t>
+            </a:r>
+            <a:r>
+              <a:rPr lang="zh-TW" altLang="en-US" sz="3600" dirty="0" smtClean="0">
+                <a:effectLst>
+                  <a:outerShdw blurRad="38100" dist="38100" dir="2700000" algn="tl">
+                    <a:srgbClr val="000000">
+                      <a:alpha val="43137"/>
+                    </a:srgbClr>
+                  </a:outerShdw>
+                </a:effectLst>
+                <a:latin typeface="微軟正黑體" panose="020B0604030504040204" pitchFamily="34" charset="-120"/>
+                <a:ea typeface="微軟正黑體" panose="020B0604030504040204" pitchFamily="34" charset="-120"/>
+              </a:rPr>
+              <a:t> </a:t>
+            </a:r>
+            <a:r>
+              <a:rPr lang="en-US" altLang="zh-TW" sz="3600" dirty="0" smtClean="0">
+                <a:effectLst>
+                  <a:outerShdw blurRad="38100" dist="38100" dir="2700000" algn="tl">
+                    <a:srgbClr val="000000">
+                      <a:alpha val="43137"/>
+                    </a:srgbClr>
+                  </a:outerShdw>
+                </a:effectLst>
+                <a:latin typeface="微軟正黑體" panose="020B0604030504040204" pitchFamily="34" charset="-120"/>
+                <a:ea typeface="微軟正黑體" panose="020B0604030504040204" pitchFamily="34" charset="-120"/>
+              </a:rPr>
+              <a:t>APIs</a:t>
+            </a:r>
+          </a:p>
+        </p:txBody>
+      </p:sp>
+      <p:sp>
+        <p:nvSpPr>
+          <p:cNvPr id="6" name="文字方塊 5"/>
+          <p:cNvSpPr txBox="1"/>
+          <p:nvPr/>
+        </p:nvSpPr>
+        <p:spPr>
+          <a:xfrm>
+            <a:off x="161108" y="1097280"/>
+            <a:ext cx="11747864" cy="2339102"/>
+          </a:xfrm>
+          <a:prstGeom prst="rect">
+            <a:avLst/>
+          </a:prstGeom>
+          <a:noFill/>
+        </p:spPr>
+        <p:txBody>
+          <a:bodyPr wrap="square" rtlCol="0">
+            <a:spAutoFit/>
+          </a:bodyPr>
+          <a:lstStyle/>
+          <a:p>
+            <a:r>
+              <a:rPr lang="en-US" altLang="zh-TW" sz="1600" dirty="0">
+                <a:solidFill>
+                  <a:srgbClr val="0101FD"/>
+                </a:solidFill>
+                <a:latin typeface="Consolas" panose="020B0609020204030204" pitchFamily="49" charset="0"/>
+              </a:rPr>
+              <a:t>void</a:t>
+            </a:r>
+            <a:r>
+              <a:rPr lang="en-US" altLang="zh-TW" sz="1600" dirty="0">
+                <a:solidFill>
+                  <a:srgbClr val="000000"/>
+                </a:solidFill>
+                <a:latin typeface="Consolas" panose="020B0609020204030204" pitchFamily="49" charset="0"/>
+              </a:rPr>
+              <a:t> </a:t>
+            </a:r>
+            <a:r>
+              <a:rPr lang="en-US" altLang="zh-TW" sz="1600" dirty="0" err="1">
+                <a:solidFill>
+                  <a:srgbClr val="007D9A"/>
+                </a:solidFill>
+                <a:latin typeface="Consolas" panose="020B0609020204030204" pitchFamily="49" charset="0"/>
+              </a:rPr>
+              <a:t>RtlCopyMemory</a:t>
+            </a:r>
+            <a:r>
+              <a:rPr lang="en-US" altLang="zh-TW" sz="1600" dirty="0">
+                <a:solidFill>
+                  <a:srgbClr val="000000"/>
+                </a:solidFill>
+                <a:latin typeface="Consolas" panose="020B0609020204030204" pitchFamily="49" charset="0"/>
+              </a:rPr>
+              <a:t>( Destination, Source, Length </a:t>
+            </a:r>
+            <a:r>
+              <a:rPr lang="en-US" altLang="zh-TW" sz="1600" dirty="0" smtClean="0">
+                <a:solidFill>
+                  <a:srgbClr val="000000"/>
+                </a:solidFill>
+                <a:latin typeface="Consolas" panose="020B0609020204030204" pitchFamily="49" charset="0"/>
+              </a:rPr>
+              <a:t>);</a:t>
+            </a:r>
+          </a:p>
+          <a:p>
+            <a:endParaRPr lang="en-US" altLang="zh-TW" sz="1600" dirty="0">
+              <a:solidFill>
+                <a:srgbClr val="000000"/>
+              </a:solidFill>
+              <a:latin typeface="Consolas" panose="020B0609020204030204" pitchFamily="49" charset="0"/>
+              <a:ea typeface="微軟正黑體" panose="020B0604030504040204" pitchFamily="34" charset="-120"/>
+            </a:endParaRPr>
+          </a:p>
+          <a:p>
+            <a:r>
+              <a:rPr lang="en-US" altLang="zh-TW" sz="1600" dirty="0">
+                <a:solidFill>
+                  <a:srgbClr val="0101FD"/>
+                </a:solidFill>
+                <a:latin typeface="Consolas" panose="020B0609020204030204" pitchFamily="49" charset="0"/>
+              </a:rPr>
+              <a:t>void</a:t>
+            </a:r>
+            <a:r>
+              <a:rPr lang="en-US" altLang="zh-TW" sz="1600" dirty="0">
+                <a:solidFill>
+                  <a:srgbClr val="000000"/>
+                </a:solidFill>
+                <a:latin typeface="Consolas" panose="020B0609020204030204" pitchFamily="49" charset="0"/>
+              </a:rPr>
+              <a:t> </a:t>
+            </a:r>
+            <a:r>
+              <a:rPr lang="en-US" altLang="zh-TW" sz="1600" dirty="0" err="1">
+                <a:solidFill>
+                  <a:srgbClr val="007D9A"/>
+                </a:solidFill>
+                <a:latin typeface="Consolas" panose="020B0609020204030204" pitchFamily="49" charset="0"/>
+              </a:rPr>
+              <a:t>RtlMoveMemory</a:t>
+            </a:r>
+            <a:r>
+              <a:rPr lang="en-US" altLang="zh-TW" sz="1600" dirty="0">
+                <a:solidFill>
+                  <a:srgbClr val="000000"/>
+                </a:solidFill>
+                <a:latin typeface="Consolas" panose="020B0609020204030204" pitchFamily="49" charset="0"/>
+              </a:rPr>
+              <a:t>( Destination, Source, Length </a:t>
+            </a:r>
+            <a:r>
+              <a:rPr lang="en-US" altLang="zh-TW" sz="1600" dirty="0" smtClean="0">
+                <a:solidFill>
+                  <a:srgbClr val="000000"/>
+                </a:solidFill>
+                <a:latin typeface="Consolas" panose="020B0609020204030204" pitchFamily="49" charset="0"/>
+              </a:rPr>
+              <a:t>);</a:t>
+            </a:r>
+          </a:p>
+          <a:p>
+            <a:endParaRPr lang="en-US" altLang="zh-TW" sz="1600" dirty="0">
+              <a:solidFill>
+                <a:srgbClr val="000000"/>
+              </a:solidFill>
+              <a:latin typeface="Consolas" panose="020B0609020204030204" pitchFamily="49" charset="0"/>
+              <a:ea typeface="微軟正黑體" panose="020B0604030504040204" pitchFamily="34" charset="-120"/>
+            </a:endParaRPr>
+          </a:p>
+          <a:p>
+            <a:r>
+              <a:rPr lang="en-US" altLang="zh-TW" sz="1600" dirty="0">
+                <a:solidFill>
+                  <a:srgbClr val="0101FD"/>
+                </a:solidFill>
+                <a:latin typeface="Consolas" panose="020B0609020204030204" pitchFamily="49" charset="0"/>
+              </a:rPr>
+              <a:t>void</a:t>
+            </a:r>
+            <a:r>
+              <a:rPr lang="en-US" altLang="zh-TW" sz="1600" dirty="0">
+                <a:solidFill>
+                  <a:srgbClr val="000000"/>
+                </a:solidFill>
+                <a:latin typeface="Consolas" panose="020B0609020204030204" pitchFamily="49" charset="0"/>
+              </a:rPr>
+              <a:t> </a:t>
+            </a:r>
+            <a:r>
+              <a:rPr lang="en-US" altLang="zh-TW" sz="1600" dirty="0" err="1">
+                <a:solidFill>
+                  <a:srgbClr val="007D9A"/>
+                </a:solidFill>
+                <a:latin typeface="Consolas" panose="020B0609020204030204" pitchFamily="49" charset="0"/>
+              </a:rPr>
+              <a:t>RtlFillMemory</a:t>
+            </a:r>
+            <a:r>
+              <a:rPr lang="en-US" altLang="zh-TW" sz="1600" dirty="0">
+                <a:solidFill>
+                  <a:srgbClr val="000000"/>
+                </a:solidFill>
+                <a:latin typeface="Consolas" panose="020B0609020204030204" pitchFamily="49" charset="0"/>
+              </a:rPr>
+              <a:t>( Destination, Length, Fill </a:t>
+            </a:r>
+            <a:r>
+              <a:rPr lang="en-US" altLang="zh-TW" sz="1600" dirty="0" smtClean="0">
+                <a:solidFill>
+                  <a:srgbClr val="000000"/>
+                </a:solidFill>
+                <a:latin typeface="Consolas" panose="020B0609020204030204" pitchFamily="49" charset="0"/>
+              </a:rPr>
+              <a:t>);</a:t>
+            </a:r>
+          </a:p>
+          <a:p>
+            <a:endParaRPr lang="en-US" altLang="zh-TW" sz="1600" dirty="0">
+              <a:solidFill>
+                <a:srgbClr val="000000"/>
+              </a:solidFill>
+              <a:latin typeface="Consolas" panose="020B0609020204030204" pitchFamily="49" charset="0"/>
+              <a:ea typeface="微軟正黑體" panose="020B0604030504040204" pitchFamily="34" charset="-120"/>
+            </a:endParaRPr>
+          </a:p>
+          <a:p>
+            <a:r>
+              <a:rPr lang="en-US" altLang="zh-TW" sz="1600" dirty="0">
+                <a:solidFill>
+                  <a:srgbClr val="0101FD"/>
+                </a:solidFill>
+                <a:latin typeface="Consolas" panose="020B0609020204030204" pitchFamily="49" charset="0"/>
+              </a:rPr>
+              <a:t>void</a:t>
+            </a:r>
+            <a:r>
+              <a:rPr lang="en-US" altLang="zh-TW" sz="1600" dirty="0">
+                <a:solidFill>
+                  <a:srgbClr val="000000"/>
+                </a:solidFill>
+                <a:latin typeface="Consolas" panose="020B0609020204030204" pitchFamily="49" charset="0"/>
+              </a:rPr>
+              <a:t> </a:t>
+            </a:r>
+            <a:r>
+              <a:rPr lang="en-US" altLang="zh-TW" sz="1600" dirty="0" err="1">
+                <a:solidFill>
+                  <a:srgbClr val="007D9A"/>
+                </a:solidFill>
+                <a:latin typeface="Consolas" panose="020B0609020204030204" pitchFamily="49" charset="0"/>
+              </a:rPr>
+              <a:t>RtlZeroMemory</a:t>
+            </a:r>
+            <a:r>
+              <a:rPr lang="en-US" altLang="zh-TW" sz="1600" dirty="0">
+                <a:solidFill>
+                  <a:srgbClr val="000000"/>
+                </a:solidFill>
+                <a:latin typeface="Consolas" panose="020B0609020204030204" pitchFamily="49" charset="0"/>
+              </a:rPr>
+              <a:t>( Destination, Length </a:t>
+            </a:r>
+            <a:r>
+              <a:rPr lang="en-US" altLang="zh-TW" sz="1600" dirty="0" smtClean="0">
+                <a:solidFill>
+                  <a:srgbClr val="000000"/>
+                </a:solidFill>
+                <a:latin typeface="Consolas" panose="020B0609020204030204" pitchFamily="49" charset="0"/>
+              </a:rPr>
+              <a:t>);</a:t>
+            </a:r>
+          </a:p>
+          <a:p>
+            <a:endParaRPr lang="en-US" altLang="zh-TW" sz="1600" dirty="0">
+              <a:solidFill>
+                <a:srgbClr val="000000"/>
+              </a:solidFill>
+              <a:latin typeface="Consolas" panose="020B0609020204030204" pitchFamily="49" charset="0"/>
+              <a:ea typeface="微軟正黑體" panose="020B0604030504040204" pitchFamily="34" charset="-120"/>
+            </a:endParaRPr>
+          </a:p>
+          <a:p>
+            <a:r>
+              <a:rPr lang="en-US" altLang="zh-TW" sz="1600" dirty="0">
+                <a:solidFill>
+                  <a:srgbClr val="0101FD"/>
+                </a:solidFill>
+                <a:latin typeface="Consolas" panose="020B0609020204030204" pitchFamily="49" charset="0"/>
+              </a:rPr>
+              <a:t>void</a:t>
+            </a:r>
+            <a:r>
+              <a:rPr lang="en-US" altLang="zh-TW" sz="1600" dirty="0">
+                <a:solidFill>
+                  <a:srgbClr val="000000"/>
+                </a:solidFill>
+                <a:latin typeface="Consolas" panose="020B0609020204030204" pitchFamily="49" charset="0"/>
+              </a:rPr>
+              <a:t> </a:t>
+            </a:r>
+            <a:r>
+              <a:rPr lang="en-US" altLang="zh-TW" sz="1600" dirty="0" err="1">
+                <a:solidFill>
+                  <a:srgbClr val="007D9A"/>
+                </a:solidFill>
+                <a:latin typeface="Consolas" panose="020B0609020204030204" pitchFamily="49" charset="0"/>
+              </a:rPr>
+              <a:t>RtlEqualMemory</a:t>
+            </a:r>
+            <a:r>
+              <a:rPr lang="en-US" altLang="zh-TW" sz="1600" dirty="0">
+                <a:solidFill>
+                  <a:srgbClr val="000000"/>
+                </a:solidFill>
+                <a:latin typeface="Consolas" panose="020B0609020204030204" pitchFamily="49" charset="0"/>
+              </a:rPr>
+              <a:t>( Destination, Source, Length </a:t>
+            </a:r>
+            <a:r>
+              <a:rPr lang="en-US" altLang="zh-TW" sz="1600" dirty="0" smtClean="0">
+                <a:solidFill>
+                  <a:srgbClr val="000000"/>
+                </a:solidFill>
+                <a:latin typeface="Consolas" panose="020B0609020204030204" pitchFamily="49" charset="0"/>
+              </a:rPr>
+              <a:t>);</a:t>
+            </a:r>
+            <a:endParaRPr lang="en-US" altLang="zh-TW" sz="1600" dirty="0" smtClean="0">
+              <a:solidFill>
+                <a:schemeClr val="accent2">
+                  <a:lumMod val="75000"/>
+                </a:schemeClr>
+              </a:solidFill>
+              <a:latin typeface="微軟正黑體" panose="020B0604030504040204" pitchFamily="34" charset="-120"/>
+              <a:ea typeface="微軟正黑體" panose="020B0604030504040204" pitchFamily="34" charset="-120"/>
+            </a:endParaRPr>
+          </a:p>
+        </p:txBody>
+      </p:sp>
+    </p:spTree>
+    <p:extLst>
+      <p:ext uri="{BB962C8B-B14F-4D97-AF65-F5344CB8AC3E}">
+        <p14:creationId xmlns:p14="http://schemas.microsoft.com/office/powerpoint/2010/main" val="636527303"/>
+      </p:ext>
+    </p:extLst>
+  </p:cSld>
+  <p:clrMapOvr>
+    <a:masterClrMapping/>
+  </p:clrMapOvr>
+  <p:timing>
+    <p:tnLst>
+      <p:par>
+        <p:cTn id="1" dur="indefinite" restart="never" nodeType="tmRoot"/>
+      </p:par>
+    </p:tnLst>
+  </p:timing>
+</p:sld>
+</file>
+
+<file path=ppt/slides/slide48.xml><?xml version="1.0" encoding="utf-8"?>
+<p:sld xmlns:a="http://schemas.openxmlformats.org/drawingml/2006/main" xmlns:r="http://schemas.openxmlformats.org/officeDocument/2006/relationships" xmlns:p="http://schemas.openxmlformats.org/presentationml/2006/main">
+  <p:cSld>
+    <p:spTree>
+      <p:nvGrpSpPr>
+        <p:cNvPr id="1" name=""/>
+        <p:cNvGrpSpPr/>
+        <p:nvPr/>
+      </p:nvGrpSpPr>
+      <p:grpSpPr>
+        <a:xfrm>
+          <a:off x="0" y="0"/>
+          <a:ext cx="0" cy="0"/>
+          <a:chOff x="0" y="0"/>
+          <a:chExt cx="0" cy="0"/>
+        </a:xfrm>
+      </p:grpSpPr>
+      <p:sp>
+        <p:nvSpPr>
+          <p:cNvPr id="2" name="標題 1"/>
+          <p:cNvSpPr>
+            <a:spLocks noGrp="1"/>
+          </p:cNvSpPr>
+          <p:nvPr>
+            <p:ph type="title"/>
+          </p:nvPr>
+        </p:nvSpPr>
+        <p:spPr>
+          <a:xfrm>
+            <a:off x="5331460" y="2766218"/>
+            <a:ext cx="1760220" cy="1325563"/>
+          </a:xfrm>
+        </p:spPr>
+        <p:txBody>
+          <a:bodyPr/>
+          <a:lstStyle/>
+          <a:p>
+            <a:r>
+              <a:rPr lang="en-US" altLang="zh-TW" b="1" dirty="0" smtClean="0">
+                <a:effectLst>
+                  <a:outerShdw blurRad="38100" dist="38100" dir="2700000" algn="tl">
+                    <a:srgbClr val="000000">
+                      <a:alpha val="43137"/>
+                    </a:srgbClr>
+                  </a:outerShdw>
+                </a:effectLst>
+                <a:latin typeface="微軟正黑體" panose="020B0604030504040204" pitchFamily="34" charset="-120"/>
+                <a:ea typeface="微軟正黑體" panose="020B0604030504040204" pitchFamily="34" charset="-120"/>
+              </a:rPr>
+              <a:t>Q&amp;A</a:t>
+            </a:r>
+            <a:endParaRPr lang="zh-TW" altLang="en-US" b="1" dirty="0">
+              <a:effectLst>
+                <a:outerShdw blurRad="38100" dist="38100" dir="2700000" algn="tl">
+                  <a:srgbClr val="000000">
+                    <a:alpha val="43137"/>
+                  </a:srgbClr>
+                </a:outerShdw>
+              </a:effectLst>
+              <a:latin typeface="微軟正黑體" panose="020B0604030504040204" pitchFamily="34" charset="-120"/>
+              <a:ea typeface="微軟正黑體" panose="020B0604030504040204" pitchFamily="34" charset="-120"/>
+            </a:endParaRPr>
+          </a:p>
+        </p:txBody>
+      </p:sp>
+    </p:spTree>
+    <p:extLst>
+      <p:ext uri="{BB962C8B-B14F-4D97-AF65-F5344CB8AC3E}">
+        <p14:creationId xmlns:p14="http://schemas.microsoft.com/office/powerpoint/2010/main" val="1531412980"/>
       </p:ext>
     </p:extLst>
   </p:cSld>

</xml_diff>

<commit_message>
modify .pptx and add i/o driver code.
</commit_message>
<xml_diff>
--- a/WindowsDriver/Driver(Windows).pptx
+++ b/WindowsDriver/Driver(Windows).pptx
@@ -5,7 +5,7 @@
     <p:sldMasterId id="2147483648" r:id="rId1"/>
   </p:sldMasterIdLst>
   <p:notesMasterIdLst>
-    <p:notesMasterId r:id="rId81"/>
+    <p:notesMasterId r:id="rId88"/>
   </p:notesMasterIdLst>
   <p:sldIdLst>
     <p:sldId id="256" r:id="rId2"/>
@@ -86,7 +86,14 @@
     <p:sldId id="334" r:id="rId77"/>
     <p:sldId id="336" r:id="rId78"/>
     <p:sldId id="337" r:id="rId79"/>
-    <p:sldId id="274" r:id="rId80"/>
+    <p:sldId id="339" r:id="rId80"/>
+    <p:sldId id="340" r:id="rId81"/>
+    <p:sldId id="341" r:id="rId82"/>
+    <p:sldId id="342" r:id="rId83"/>
+    <p:sldId id="343" r:id="rId84"/>
+    <p:sldId id="344" r:id="rId85"/>
+    <p:sldId id="345" r:id="rId86"/>
+    <p:sldId id="274" r:id="rId87"/>
   </p:sldIdLst>
   <p:sldSz cx="12192000" cy="6858000"/>
   <p:notesSz cx="6858000" cy="9144000"/>
@@ -286,7 +293,7 @@
           <a:p>
             <a:fld id="{F355FBFC-5F72-40AF-AB81-0E702AE33AA7}" type="datetimeFigureOut">
               <a:rPr lang="zh-TW" altLang="en-US" smtClean="0"/>
-              <a:t>2019/1/18</a:t>
+              <a:t>2019/2/10</a:t>
             </a:fld>
             <a:endParaRPr lang="zh-TW" altLang="en-US"/>
           </a:p>
@@ -638,6 +645,426 @@
 </p:notes>
 </file>
 
+<file path=ppt/notesSlides/notesSlide2.xml><?xml version="1.0" encoding="utf-8"?>
+<p:notes xmlns:a="http://schemas.openxmlformats.org/drawingml/2006/main" xmlns:r="http://schemas.openxmlformats.org/officeDocument/2006/relationships" xmlns:p="http://schemas.openxmlformats.org/presentationml/2006/main">
+  <p:cSld>
+    <p:spTree>
+      <p:nvGrpSpPr>
+        <p:cNvPr id="1" name=""/>
+        <p:cNvGrpSpPr/>
+        <p:nvPr/>
+      </p:nvGrpSpPr>
+      <p:grpSpPr>
+        <a:xfrm>
+          <a:off x="0" y="0"/>
+          <a:ext cx="0" cy="0"/>
+          <a:chOff x="0" y="0"/>
+          <a:chExt cx="0" cy="0"/>
+        </a:xfrm>
+      </p:grpSpPr>
+      <p:sp>
+        <p:nvSpPr>
+          <p:cNvPr id="2" name="投影片圖像版面配置區 1"/>
+          <p:cNvSpPr>
+            <a:spLocks noGrp="1" noRot="1" noChangeAspect="1"/>
+          </p:cNvSpPr>
+          <p:nvPr>
+            <p:ph type="sldImg"/>
+          </p:nvPr>
+        </p:nvSpPr>
+        <p:spPr/>
+      </p:sp>
+      <p:sp>
+        <p:nvSpPr>
+          <p:cNvPr id="3" name="備忘稿版面配置區 2"/>
+          <p:cNvSpPr>
+            <a:spLocks noGrp="1"/>
+          </p:cNvSpPr>
+          <p:nvPr>
+            <p:ph type="body" idx="1"/>
+          </p:nvPr>
+        </p:nvSpPr>
+        <p:spPr/>
+        <p:txBody>
+          <a:bodyPr/>
+          <a:lstStyle/>
+          <a:p>
+            <a:endParaRPr lang="zh-TW" altLang="en-US" dirty="0"/>
+          </a:p>
+        </p:txBody>
+      </p:sp>
+      <p:sp>
+        <p:nvSpPr>
+          <p:cNvPr id="4" name="投影片編號版面配置區 3"/>
+          <p:cNvSpPr>
+            <a:spLocks noGrp="1"/>
+          </p:cNvSpPr>
+          <p:nvPr>
+            <p:ph type="sldNum" sz="quarter" idx="10"/>
+          </p:nvPr>
+        </p:nvSpPr>
+        <p:spPr/>
+        <p:txBody>
+          <a:bodyPr/>
+          <a:lstStyle/>
+          <a:p>
+            <a:fld id="{C1843F56-8659-4D71-8F18-460BBB5198C3}" type="slidenum">
+              <a:rPr lang="zh-TW" altLang="en-US" smtClean="0"/>
+              <a:t>80</a:t>
+            </a:fld>
+            <a:endParaRPr lang="zh-TW" altLang="en-US"/>
+          </a:p>
+        </p:txBody>
+      </p:sp>
+    </p:spTree>
+    <p:extLst>
+      <p:ext uri="{BB962C8B-B14F-4D97-AF65-F5344CB8AC3E}">
+        <p14:creationId xmlns:p14="http://schemas.microsoft.com/office/powerpoint/2010/main" val="4197228834"/>
+      </p:ext>
+    </p:extLst>
+  </p:cSld>
+  <p:clrMapOvr>
+    <a:masterClrMapping/>
+  </p:clrMapOvr>
+</p:notes>
+</file>
+
+<file path=ppt/notesSlides/notesSlide3.xml><?xml version="1.0" encoding="utf-8"?>
+<p:notes xmlns:a="http://schemas.openxmlformats.org/drawingml/2006/main" xmlns:r="http://schemas.openxmlformats.org/officeDocument/2006/relationships" xmlns:p="http://schemas.openxmlformats.org/presentationml/2006/main">
+  <p:cSld>
+    <p:spTree>
+      <p:nvGrpSpPr>
+        <p:cNvPr id="1" name=""/>
+        <p:cNvGrpSpPr/>
+        <p:nvPr/>
+      </p:nvGrpSpPr>
+      <p:grpSpPr>
+        <a:xfrm>
+          <a:off x="0" y="0"/>
+          <a:ext cx="0" cy="0"/>
+          <a:chOff x="0" y="0"/>
+          <a:chExt cx="0" cy="0"/>
+        </a:xfrm>
+      </p:grpSpPr>
+      <p:sp>
+        <p:nvSpPr>
+          <p:cNvPr id="2" name="投影片圖像版面配置區 1"/>
+          <p:cNvSpPr>
+            <a:spLocks noGrp="1" noRot="1" noChangeAspect="1"/>
+          </p:cNvSpPr>
+          <p:nvPr>
+            <p:ph type="sldImg"/>
+          </p:nvPr>
+        </p:nvSpPr>
+        <p:spPr/>
+      </p:sp>
+      <p:sp>
+        <p:nvSpPr>
+          <p:cNvPr id="3" name="備忘稿版面配置區 2"/>
+          <p:cNvSpPr>
+            <a:spLocks noGrp="1"/>
+          </p:cNvSpPr>
+          <p:nvPr>
+            <p:ph type="body" idx="1"/>
+          </p:nvPr>
+        </p:nvSpPr>
+        <p:spPr/>
+        <p:txBody>
+          <a:bodyPr/>
+          <a:lstStyle/>
+          <a:p>
+            <a:endParaRPr lang="zh-TW" altLang="en-US" dirty="0"/>
+          </a:p>
+        </p:txBody>
+      </p:sp>
+      <p:sp>
+        <p:nvSpPr>
+          <p:cNvPr id="4" name="投影片編號版面配置區 3"/>
+          <p:cNvSpPr>
+            <a:spLocks noGrp="1"/>
+          </p:cNvSpPr>
+          <p:nvPr>
+            <p:ph type="sldNum" sz="quarter" idx="10"/>
+          </p:nvPr>
+        </p:nvSpPr>
+        <p:spPr/>
+        <p:txBody>
+          <a:bodyPr/>
+          <a:lstStyle/>
+          <a:p>
+            <a:fld id="{C1843F56-8659-4D71-8F18-460BBB5198C3}" type="slidenum">
+              <a:rPr lang="zh-TW" altLang="en-US" smtClean="0"/>
+              <a:t>81</a:t>
+            </a:fld>
+            <a:endParaRPr lang="zh-TW" altLang="en-US"/>
+          </a:p>
+        </p:txBody>
+      </p:sp>
+    </p:spTree>
+    <p:extLst>
+      <p:ext uri="{BB962C8B-B14F-4D97-AF65-F5344CB8AC3E}">
+        <p14:creationId xmlns:p14="http://schemas.microsoft.com/office/powerpoint/2010/main" val="4134493210"/>
+      </p:ext>
+    </p:extLst>
+  </p:cSld>
+  <p:clrMapOvr>
+    <a:masterClrMapping/>
+  </p:clrMapOvr>
+</p:notes>
+</file>
+
+<file path=ppt/notesSlides/notesSlide4.xml><?xml version="1.0" encoding="utf-8"?>
+<p:notes xmlns:a="http://schemas.openxmlformats.org/drawingml/2006/main" xmlns:r="http://schemas.openxmlformats.org/officeDocument/2006/relationships" xmlns:p="http://schemas.openxmlformats.org/presentationml/2006/main">
+  <p:cSld>
+    <p:spTree>
+      <p:nvGrpSpPr>
+        <p:cNvPr id="1" name=""/>
+        <p:cNvGrpSpPr/>
+        <p:nvPr/>
+      </p:nvGrpSpPr>
+      <p:grpSpPr>
+        <a:xfrm>
+          <a:off x="0" y="0"/>
+          <a:ext cx="0" cy="0"/>
+          <a:chOff x="0" y="0"/>
+          <a:chExt cx="0" cy="0"/>
+        </a:xfrm>
+      </p:grpSpPr>
+      <p:sp>
+        <p:nvSpPr>
+          <p:cNvPr id="2" name="投影片圖像版面配置區 1"/>
+          <p:cNvSpPr>
+            <a:spLocks noGrp="1" noRot="1" noChangeAspect="1"/>
+          </p:cNvSpPr>
+          <p:nvPr>
+            <p:ph type="sldImg"/>
+          </p:nvPr>
+        </p:nvSpPr>
+        <p:spPr/>
+      </p:sp>
+      <p:sp>
+        <p:nvSpPr>
+          <p:cNvPr id="3" name="備忘稿版面配置區 2"/>
+          <p:cNvSpPr>
+            <a:spLocks noGrp="1"/>
+          </p:cNvSpPr>
+          <p:nvPr>
+            <p:ph type="body" idx="1"/>
+          </p:nvPr>
+        </p:nvSpPr>
+        <p:spPr/>
+        <p:txBody>
+          <a:bodyPr/>
+          <a:lstStyle/>
+          <a:p>
+            <a:endParaRPr lang="zh-TW" altLang="en-US" dirty="0"/>
+          </a:p>
+        </p:txBody>
+      </p:sp>
+      <p:sp>
+        <p:nvSpPr>
+          <p:cNvPr id="4" name="投影片編號版面配置區 3"/>
+          <p:cNvSpPr>
+            <a:spLocks noGrp="1"/>
+          </p:cNvSpPr>
+          <p:nvPr>
+            <p:ph type="sldNum" sz="quarter" idx="10"/>
+          </p:nvPr>
+        </p:nvSpPr>
+        <p:spPr/>
+        <p:txBody>
+          <a:bodyPr/>
+          <a:lstStyle/>
+          <a:p>
+            <a:fld id="{C1843F56-8659-4D71-8F18-460BBB5198C3}" type="slidenum">
+              <a:rPr lang="zh-TW" altLang="en-US" smtClean="0"/>
+              <a:t>82</a:t>
+            </a:fld>
+            <a:endParaRPr lang="zh-TW" altLang="en-US"/>
+          </a:p>
+        </p:txBody>
+      </p:sp>
+    </p:spTree>
+    <p:extLst>
+      <p:ext uri="{BB962C8B-B14F-4D97-AF65-F5344CB8AC3E}">
+        <p14:creationId xmlns:p14="http://schemas.microsoft.com/office/powerpoint/2010/main" val="1369809219"/>
+      </p:ext>
+    </p:extLst>
+  </p:cSld>
+  <p:clrMapOvr>
+    <a:masterClrMapping/>
+  </p:clrMapOvr>
+</p:notes>
+</file>
+
+<file path=ppt/notesSlides/notesSlide5.xml><?xml version="1.0" encoding="utf-8"?>
+<p:notes xmlns:a="http://schemas.openxmlformats.org/drawingml/2006/main" xmlns:r="http://schemas.openxmlformats.org/officeDocument/2006/relationships" xmlns:p="http://schemas.openxmlformats.org/presentationml/2006/main">
+  <p:cSld>
+    <p:spTree>
+      <p:nvGrpSpPr>
+        <p:cNvPr id="1" name=""/>
+        <p:cNvGrpSpPr/>
+        <p:nvPr/>
+      </p:nvGrpSpPr>
+      <p:grpSpPr>
+        <a:xfrm>
+          <a:off x="0" y="0"/>
+          <a:ext cx="0" cy="0"/>
+          <a:chOff x="0" y="0"/>
+          <a:chExt cx="0" cy="0"/>
+        </a:xfrm>
+      </p:grpSpPr>
+      <p:sp>
+        <p:nvSpPr>
+          <p:cNvPr id="2" name="投影片圖像版面配置區 1"/>
+          <p:cNvSpPr>
+            <a:spLocks noGrp="1" noRot="1" noChangeAspect="1"/>
+          </p:cNvSpPr>
+          <p:nvPr>
+            <p:ph type="sldImg"/>
+          </p:nvPr>
+        </p:nvSpPr>
+        <p:spPr/>
+      </p:sp>
+      <p:sp>
+        <p:nvSpPr>
+          <p:cNvPr id="3" name="備忘稿版面配置區 2"/>
+          <p:cNvSpPr>
+            <a:spLocks noGrp="1"/>
+          </p:cNvSpPr>
+          <p:nvPr>
+            <p:ph type="body" idx="1"/>
+          </p:nvPr>
+        </p:nvSpPr>
+        <p:spPr/>
+        <p:txBody>
+          <a:bodyPr/>
+          <a:lstStyle/>
+          <a:p>
+            <a:endParaRPr lang="zh-TW" altLang="en-US" dirty="0"/>
+          </a:p>
+        </p:txBody>
+      </p:sp>
+      <p:sp>
+        <p:nvSpPr>
+          <p:cNvPr id="4" name="投影片編號版面配置區 3"/>
+          <p:cNvSpPr>
+            <a:spLocks noGrp="1"/>
+          </p:cNvSpPr>
+          <p:nvPr>
+            <p:ph type="sldNum" sz="quarter" idx="10"/>
+          </p:nvPr>
+        </p:nvSpPr>
+        <p:spPr/>
+        <p:txBody>
+          <a:bodyPr/>
+          <a:lstStyle/>
+          <a:p>
+            <a:fld id="{C1843F56-8659-4D71-8F18-460BBB5198C3}" type="slidenum">
+              <a:rPr lang="zh-TW" altLang="en-US" smtClean="0"/>
+              <a:t>83</a:t>
+            </a:fld>
+            <a:endParaRPr lang="zh-TW" altLang="en-US"/>
+          </a:p>
+        </p:txBody>
+      </p:sp>
+    </p:spTree>
+    <p:extLst>
+      <p:ext uri="{BB962C8B-B14F-4D97-AF65-F5344CB8AC3E}">
+        <p14:creationId xmlns:p14="http://schemas.microsoft.com/office/powerpoint/2010/main" val="2797143016"/>
+      </p:ext>
+    </p:extLst>
+  </p:cSld>
+  <p:clrMapOvr>
+    <a:masterClrMapping/>
+  </p:clrMapOvr>
+</p:notes>
+</file>
+
+<file path=ppt/notesSlides/notesSlide6.xml><?xml version="1.0" encoding="utf-8"?>
+<p:notes xmlns:a="http://schemas.openxmlformats.org/drawingml/2006/main" xmlns:r="http://schemas.openxmlformats.org/officeDocument/2006/relationships" xmlns:p="http://schemas.openxmlformats.org/presentationml/2006/main">
+  <p:cSld>
+    <p:spTree>
+      <p:nvGrpSpPr>
+        <p:cNvPr id="1" name=""/>
+        <p:cNvGrpSpPr/>
+        <p:nvPr/>
+      </p:nvGrpSpPr>
+      <p:grpSpPr>
+        <a:xfrm>
+          <a:off x="0" y="0"/>
+          <a:ext cx="0" cy="0"/>
+          <a:chOff x="0" y="0"/>
+          <a:chExt cx="0" cy="0"/>
+        </a:xfrm>
+      </p:grpSpPr>
+      <p:sp>
+        <p:nvSpPr>
+          <p:cNvPr id="2" name="投影片圖像版面配置區 1"/>
+          <p:cNvSpPr>
+            <a:spLocks noGrp="1" noRot="1" noChangeAspect="1"/>
+          </p:cNvSpPr>
+          <p:nvPr>
+            <p:ph type="sldImg"/>
+          </p:nvPr>
+        </p:nvSpPr>
+        <p:spPr/>
+      </p:sp>
+      <p:sp>
+        <p:nvSpPr>
+          <p:cNvPr id="3" name="備忘稿版面配置區 2"/>
+          <p:cNvSpPr>
+            <a:spLocks noGrp="1"/>
+          </p:cNvSpPr>
+          <p:nvPr>
+            <p:ph type="body" idx="1"/>
+          </p:nvPr>
+        </p:nvSpPr>
+        <p:spPr/>
+        <p:txBody>
+          <a:bodyPr/>
+          <a:lstStyle/>
+          <a:p>
+            <a:endParaRPr lang="zh-TW" altLang="en-US" dirty="0"/>
+          </a:p>
+        </p:txBody>
+      </p:sp>
+      <p:sp>
+        <p:nvSpPr>
+          <p:cNvPr id="4" name="投影片編號版面配置區 3"/>
+          <p:cNvSpPr>
+            <a:spLocks noGrp="1"/>
+          </p:cNvSpPr>
+          <p:nvPr>
+            <p:ph type="sldNum" sz="quarter" idx="10"/>
+          </p:nvPr>
+        </p:nvSpPr>
+        <p:spPr/>
+        <p:txBody>
+          <a:bodyPr/>
+          <a:lstStyle/>
+          <a:p>
+            <a:fld id="{C1843F56-8659-4D71-8F18-460BBB5198C3}" type="slidenum">
+              <a:rPr lang="zh-TW" altLang="en-US" smtClean="0"/>
+              <a:t>85</a:t>
+            </a:fld>
+            <a:endParaRPr lang="zh-TW" altLang="en-US"/>
+          </a:p>
+        </p:txBody>
+      </p:sp>
+    </p:spTree>
+    <p:extLst>
+      <p:ext uri="{BB962C8B-B14F-4D97-AF65-F5344CB8AC3E}">
+        <p14:creationId xmlns:p14="http://schemas.microsoft.com/office/powerpoint/2010/main" val="3528572896"/>
+      </p:ext>
+    </p:extLst>
+  </p:cSld>
+  <p:clrMapOvr>
+    <a:masterClrMapping/>
+  </p:clrMapOvr>
+</p:notes>
+</file>
+
 <file path=ppt/slideLayouts/slideLayout1.xml><?xml version="1.0" encoding="utf-8"?>
 <p:sldLayout xmlns:a="http://schemas.openxmlformats.org/drawingml/2006/main" xmlns:r="http://schemas.openxmlformats.org/officeDocument/2006/relationships" xmlns:p="http://schemas.openxmlformats.org/presentationml/2006/main" type="title" preserve="1">
   <p:cSld name="標題投影片">
@@ -769,7 +1196,7 @@
           <a:p>
             <a:fld id="{2927ED23-458E-4D99-AAD7-7E25403CBF25}" type="datetimeFigureOut">
               <a:rPr lang="zh-TW" altLang="en-US" smtClean="0"/>
-              <a:t>2019/1/18</a:t>
+              <a:t>2019/2/10</a:t>
             </a:fld>
             <a:endParaRPr lang="zh-TW" altLang="en-US"/>
           </a:p>
@@ -939,7 +1366,7 @@
           <a:p>
             <a:fld id="{2927ED23-458E-4D99-AAD7-7E25403CBF25}" type="datetimeFigureOut">
               <a:rPr lang="zh-TW" altLang="en-US" smtClean="0"/>
-              <a:t>2019/1/18</a:t>
+              <a:t>2019/2/10</a:t>
             </a:fld>
             <a:endParaRPr lang="zh-TW" altLang="en-US"/>
           </a:p>
@@ -1119,7 +1546,7 @@
           <a:p>
             <a:fld id="{2927ED23-458E-4D99-AAD7-7E25403CBF25}" type="datetimeFigureOut">
               <a:rPr lang="zh-TW" altLang="en-US" smtClean="0"/>
-              <a:t>2019/1/18</a:t>
+              <a:t>2019/2/10</a:t>
             </a:fld>
             <a:endParaRPr lang="zh-TW" altLang="en-US"/>
           </a:p>
@@ -1289,7 +1716,7 @@
           <a:p>
             <a:fld id="{2927ED23-458E-4D99-AAD7-7E25403CBF25}" type="datetimeFigureOut">
               <a:rPr lang="zh-TW" altLang="en-US" smtClean="0"/>
-              <a:t>2019/1/18</a:t>
+              <a:t>2019/2/10</a:t>
             </a:fld>
             <a:endParaRPr lang="zh-TW" altLang="en-US"/>
           </a:p>
@@ -1535,7 +1962,7 @@
           <a:p>
             <a:fld id="{2927ED23-458E-4D99-AAD7-7E25403CBF25}" type="datetimeFigureOut">
               <a:rPr lang="zh-TW" altLang="en-US" smtClean="0"/>
-              <a:t>2019/1/18</a:t>
+              <a:t>2019/2/10</a:t>
             </a:fld>
             <a:endParaRPr lang="zh-TW" altLang="en-US"/>
           </a:p>
@@ -1767,7 +2194,7 @@
           <a:p>
             <a:fld id="{2927ED23-458E-4D99-AAD7-7E25403CBF25}" type="datetimeFigureOut">
               <a:rPr lang="zh-TW" altLang="en-US" smtClean="0"/>
-              <a:t>2019/1/18</a:t>
+              <a:t>2019/2/10</a:t>
             </a:fld>
             <a:endParaRPr lang="zh-TW" altLang="en-US"/>
           </a:p>
@@ -2134,7 +2561,7 @@
           <a:p>
             <a:fld id="{2927ED23-458E-4D99-AAD7-7E25403CBF25}" type="datetimeFigureOut">
               <a:rPr lang="zh-TW" altLang="en-US" smtClean="0"/>
-              <a:t>2019/1/18</a:t>
+              <a:t>2019/2/10</a:t>
             </a:fld>
             <a:endParaRPr lang="zh-TW" altLang="en-US"/>
           </a:p>
@@ -2252,7 +2679,7 @@
           <a:p>
             <a:fld id="{2927ED23-458E-4D99-AAD7-7E25403CBF25}" type="datetimeFigureOut">
               <a:rPr lang="zh-TW" altLang="en-US" smtClean="0"/>
-              <a:t>2019/1/18</a:t>
+              <a:t>2019/2/10</a:t>
             </a:fld>
             <a:endParaRPr lang="zh-TW" altLang="en-US"/>
           </a:p>
@@ -2347,7 +2774,7 @@
           <a:p>
             <a:fld id="{2927ED23-458E-4D99-AAD7-7E25403CBF25}" type="datetimeFigureOut">
               <a:rPr lang="zh-TW" altLang="en-US" smtClean="0"/>
-              <a:t>2019/1/18</a:t>
+              <a:t>2019/2/10</a:t>
             </a:fld>
             <a:endParaRPr lang="zh-TW" altLang="en-US"/>
           </a:p>
@@ -2624,7 +3051,7 @@
           <a:p>
             <a:fld id="{2927ED23-458E-4D99-AAD7-7E25403CBF25}" type="datetimeFigureOut">
               <a:rPr lang="zh-TW" altLang="en-US" smtClean="0"/>
-              <a:t>2019/1/18</a:t>
+              <a:t>2019/2/10</a:t>
             </a:fld>
             <a:endParaRPr lang="zh-TW" altLang="en-US"/>
           </a:p>
@@ -2877,7 +3304,7 @@
           <a:p>
             <a:fld id="{2927ED23-458E-4D99-AAD7-7E25403CBF25}" type="datetimeFigureOut">
               <a:rPr lang="zh-TW" altLang="en-US" smtClean="0"/>
-              <a:t>2019/1/18</a:t>
+              <a:t>2019/2/10</a:t>
             </a:fld>
             <a:endParaRPr lang="zh-TW" altLang="en-US"/>
           </a:p>
@@ -3090,7 +3517,7 @@
           <a:p>
             <a:fld id="{2927ED23-458E-4D99-AAD7-7E25403CBF25}" type="datetimeFigureOut">
               <a:rPr lang="zh-TW" altLang="en-US" smtClean="0"/>
-              <a:t>2019/1/18</a:t>
+              <a:t>2019/2/10</a:t>
             </a:fld>
             <a:endParaRPr lang="zh-TW" altLang="en-US"/>
           </a:p>
@@ -8993,7 +9420,9 @@
         </p:nvSpPr>
         <p:spPr/>
         <p:txBody>
-          <a:bodyPr/>
+          <a:bodyPr>
+            <a:normAutofit/>
+          </a:bodyPr>
           <a:lstStyle/>
           <a:p>
             <a:r>
@@ -9293,8 +9722,55 @@
                 <a:latin typeface="微軟正黑體" panose="020B0604030504040204" pitchFamily="34" charset="-120"/>
                 <a:ea typeface="微軟正黑體" panose="020B0604030504040204" pitchFamily="34" charset="-120"/>
               </a:rPr>
-              <a:t>派遣</a:t>
-            </a:r>
+              <a:t>派遣函式 </a:t>
+            </a:r>
+            <a:r>
+              <a:rPr lang="en-US" altLang="zh-TW" dirty="0">
+                <a:solidFill>
+                  <a:srgbClr val="FF0000"/>
+                </a:solidFill>
+                <a:effectLst>
+                  <a:outerShdw blurRad="38100" dist="38100" dir="2700000" algn="tl">
+                    <a:srgbClr val="000000">
+                      <a:alpha val="43137"/>
+                    </a:srgbClr>
+                  </a:outerShdw>
+                </a:effectLst>
+                <a:latin typeface="微軟正黑體" panose="020B0604030504040204" pitchFamily="34" charset="-120"/>
+                <a:ea typeface="微軟正黑體" panose="020B0604030504040204" pitchFamily="34" charset="-120"/>
+              </a:rPr>
+              <a:t>(</a:t>
+            </a:r>
+            <a:r>
+              <a:rPr lang="en-US" altLang="zh-TW" dirty="0" smtClean="0">
+                <a:solidFill>
+                  <a:srgbClr val="FF0000"/>
+                </a:solidFill>
+                <a:effectLst>
+                  <a:outerShdw blurRad="38100" dist="38100" dir="2700000" algn="tl">
+                    <a:srgbClr val="000000">
+                      <a:alpha val="43137"/>
+                    </a:srgbClr>
+                  </a:outerShdw>
+                </a:effectLst>
+                <a:latin typeface="微軟正黑體" panose="020B0604030504040204" pitchFamily="34" charset="-120"/>
+                <a:ea typeface="微軟正黑體" panose="020B0604030504040204" pitchFamily="34" charset="-120"/>
+              </a:rPr>
+              <a:t>2018/01/18)</a:t>
+            </a:r>
+            <a:endParaRPr lang="en-US" altLang="zh-TW" dirty="0" smtClean="0">
+              <a:effectLst>
+                <a:outerShdw blurRad="38100" dist="38100" dir="2700000" algn="tl">
+                  <a:srgbClr val="000000">
+                    <a:alpha val="43137"/>
+                  </a:srgbClr>
+                </a:outerShdw>
+              </a:effectLst>
+              <a:latin typeface="微軟正黑體" panose="020B0604030504040204" pitchFamily="34" charset="-120"/>
+              <a:ea typeface="微軟正黑體" panose="020B0604030504040204" pitchFamily="34" charset="-120"/>
+            </a:endParaRPr>
+          </a:p>
+          <a:p>
             <a:r>
               <a:rPr lang="zh-TW" altLang="en-US" dirty="0" smtClean="0">
                 <a:effectLst>
@@ -9307,7 +9783,34 @@
                 <a:latin typeface="微軟正黑體" panose="020B0604030504040204" pitchFamily="34" charset="-120"/>
                 <a:ea typeface="微軟正黑體" panose="020B0604030504040204" pitchFamily="34" charset="-120"/>
               </a:rPr>
-              <a:t>函</a:t>
+              <a:t>驅動程式的同步處理</a:t>
+            </a:r>
+            <a:endParaRPr lang="en-US" altLang="zh-TW" dirty="0" smtClean="0">
+              <a:effectLst>
+                <a:outerShdw blurRad="38100" dist="38100" dir="2700000" algn="tl">
+                  <a:srgbClr val="000000">
+                    <a:alpha val="43137"/>
+                  </a:srgbClr>
+                </a:outerShdw>
+              </a:effectLst>
+              <a:latin typeface="微軟正黑體" panose="020B0604030504040204" pitchFamily="34" charset="-120"/>
+              <a:ea typeface="微軟正黑體" panose="020B0604030504040204" pitchFamily="34" charset="-120"/>
+            </a:endParaRPr>
+          </a:p>
+          <a:p>
+            <a:r>
+              <a:rPr lang="zh-TW" altLang="en-US" dirty="0" smtClean="0">
+                <a:effectLst>
+                  <a:outerShdw blurRad="38100" dist="38100" dir="2700000" algn="tl">
+                    <a:srgbClr val="000000">
+                      <a:alpha val="43137"/>
+                    </a:srgbClr>
+                  </a:outerShdw>
+                </a:effectLst>
+                <a:latin typeface="微軟正黑體" panose="020B0604030504040204" pitchFamily="34" charset="-120"/>
+                <a:ea typeface="微軟正黑體" panose="020B0604030504040204" pitchFamily="34" charset="-120"/>
+              </a:rPr>
+              <a:t>計時</a:t>
             </a:r>
             <a:r>
               <a:rPr lang="zh-TW" altLang="en-US" dirty="0">
@@ -9321,7 +9824,7 @@
                 <a:latin typeface="微軟正黑體" panose="020B0604030504040204" pitchFamily="34" charset="-120"/>
                 <a:ea typeface="微軟正黑體" panose="020B0604030504040204" pitchFamily="34" charset="-120"/>
               </a:rPr>
-              <a:t>式</a:t>
+              <a:t>器</a:t>
             </a:r>
           </a:p>
         </p:txBody>
@@ -33471,17 +33974,6 @@
               </a:rPr>
               <a:t>Neither DO_BUFFERED_IO nor DO_DIRECT_IO</a:t>
             </a:r>
-            <a:endParaRPr lang="en-US" altLang="zh-TW" b="1" dirty="0">
-              <a:effectLst>
-                <a:outerShdw blurRad="38100" dist="38100" dir="2700000" algn="tl">
-                  <a:srgbClr val="000000">
-                    <a:alpha val="43137"/>
-                  </a:srgbClr>
-                </a:outerShdw>
-              </a:effectLst>
-              <a:latin typeface="微軟正黑體" panose="020B0604030504040204" pitchFamily="34" charset="-120"/>
-              <a:ea typeface="微軟正黑體" panose="020B0604030504040204" pitchFamily="34" charset="-120"/>
-            </a:endParaRPr>
           </a:p>
         </p:txBody>
       </p:sp>
@@ -33880,16 +34372,18 @@
         </p:nvSpPr>
         <p:spPr>
           <a:xfrm>
-            <a:off x="5331460" y="2766218"/>
-            <a:ext cx="1760220" cy="1325563"/>
+            <a:off x="3510950" y="2766218"/>
+            <a:ext cx="5633049" cy="1325563"/>
           </a:xfrm>
         </p:spPr>
         <p:txBody>
-          <a:bodyPr/>
+          <a:bodyPr>
+            <a:normAutofit/>
+          </a:bodyPr>
           <a:lstStyle/>
           <a:p>
             <a:r>
-              <a:rPr lang="en-US" altLang="zh-TW" b="1" dirty="0" smtClean="0">
+              <a:rPr lang="zh-TW" altLang="en-US" b="1" dirty="0" smtClean="0">
                 <a:effectLst>
                   <a:outerShdw blurRad="38100" dist="38100" dir="2700000" algn="tl">
                     <a:srgbClr val="000000">
@@ -33900,9 +34394,9 @@
                 <a:latin typeface="微軟正黑體" panose="020B0604030504040204" pitchFamily="34" charset="-120"/>
                 <a:ea typeface="微軟正黑體" panose="020B0604030504040204" pitchFamily="34" charset="-120"/>
               </a:rPr>
-              <a:t>Q&amp;A</a:t>
-            </a:r>
-            <a:endParaRPr lang="zh-TW" altLang="en-US" b="1" dirty="0">
+              <a:t>驅動程式的同步處理</a:t>
+            </a:r>
+            <a:endParaRPr lang="en-US" altLang="zh-TW" b="1" dirty="0">
               <a:effectLst>
                 <a:outerShdw blurRad="38100" dist="38100" dir="2700000" algn="tl">
                   <a:srgbClr val="000000">
@@ -33919,7 +34413,7 @@
     </p:spTree>
     <p:extLst>
       <p:ext uri="{BB962C8B-B14F-4D97-AF65-F5344CB8AC3E}">
-        <p14:creationId xmlns:p14="http://schemas.microsoft.com/office/powerpoint/2010/main" val="1531412980"/>
+        <p14:creationId xmlns:p14="http://schemas.microsoft.com/office/powerpoint/2010/main" val="1962700501"/>
       </p:ext>
     </p:extLst>
   </p:cSld>
@@ -34102,6 +34596,2955 @@
     <p:extLst>
       <p:ext uri="{BB962C8B-B14F-4D97-AF65-F5344CB8AC3E}">
         <p14:creationId xmlns:p14="http://schemas.microsoft.com/office/powerpoint/2010/main" val="2084064971"/>
+      </p:ext>
+    </p:extLst>
+  </p:cSld>
+  <p:clrMapOvr>
+    <a:masterClrMapping/>
+  </p:clrMapOvr>
+  <p:timing>
+    <p:tnLst>
+      <p:par>
+        <p:cTn id="1" dur="indefinite" restart="never" nodeType="tmRoot"/>
+      </p:par>
+    </p:tnLst>
+  </p:timing>
+</p:sld>
+</file>
+
+<file path=ppt/slides/slide80.xml><?xml version="1.0" encoding="utf-8"?>
+<p:sld xmlns:a="http://schemas.openxmlformats.org/drawingml/2006/main" xmlns:r="http://schemas.openxmlformats.org/officeDocument/2006/relationships" xmlns:p="http://schemas.openxmlformats.org/presentationml/2006/main">
+  <p:cSld>
+    <p:spTree>
+      <p:nvGrpSpPr>
+        <p:cNvPr id="1" name=""/>
+        <p:cNvGrpSpPr/>
+        <p:nvPr/>
+      </p:nvGrpSpPr>
+      <p:grpSpPr>
+        <a:xfrm>
+          <a:off x="0" y="0"/>
+          <a:ext cx="0" cy="0"/>
+          <a:chOff x="0" y="0"/>
+          <a:chExt cx="0" cy="0"/>
+        </a:xfrm>
+      </p:grpSpPr>
+      <p:sp>
+        <p:nvSpPr>
+          <p:cNvPr id="8" name="文字方塊 7"/>
+          <p:cNvSpPr txBox="1"/>
+          <p:nvPr/>
+        </p:nvSpPr>
+        <p:spPr>
+          <a:xfrm>
+            <a:off x="8626415" y="6334780"/>
+            <a:ext cx="3565585" cy="523220"/>
+          </a:xfrm>
+          <a:prstGeom prst="rect">
+            <a:avLst/>
+          </a:prstGeom>
+          <a:noFill/>
+        </p:spPr>
+        <p:txBody>
+          <a:bodyPr wrap="square" rtlCol="0">
+            <a:spAutoFit/>
+          </a:bodyPr>
+          <a:lstStyle/>
+          <a:p>
+            <a:r>
+              <a:rPr lang="zh-TW" altLang="en-US" sz="2800" b="1" dirty="0">
+                <a:effectLst>
+                  <a:outerShdw blurRad="38100" dist="38100" dir="2700000" algn="tl">
+                    <a:srgbClr val="000000">
+                      <a:alpha val="43137"/>
+                    </a:srgbClr>
+                  </a:outerShdw>
+                </a:effectLst>
+                <a:latin typeface="微軟正黑體" panose="020B0604030504040204" pitchFamily="34" charset="-120"/>
+                <a:ea typeface="微軟正黑體" panose="020B0604030504040204" pitchFamily="34" charset="-120"/>
+              </a:rPr>
+              <a:t>驅動程式的同步處理</a:t>
+            </a:r>
+          </a:p>
+        </p:txBody>
+      </p:sp>
+      <p:sp>
+        <p:nvSpPr>
+          <p:cNvPr id="5" name="文字方塊 4"/>
+          <p:cNvSpPr txBox="1"/>
+          <p:nvPr/>
+        </p:nvSpPr>
+        <p:spPr>
+          <a:xfrm>
+            <a:off x="4888385" y="2521059"/>
+            <a:ext cx="3125556" cy="1815882"/>
+          </a:xfrm>
+          <a:prstGeom prst="rect">
+            <a:avLst/>
+          </a:prstGeom>
+          <a:noFill/>
+        </p:spPr>
+        <p:txBody>
+          <a:bodyPr wrap="square" rtlCol="0">
+            <a:spAutoFit/>
+          </a:bodyPr>
+          <a:lstStyle/>
+          <a:p>
+            <a:pPr marL="285750" indent="-285750">
+              <a:buFont typeface="Arial" panose="020B0604020202020204" pitchFamily="34" charset="0"/>
+              <a:buChar char="•"/>
+            </a:pPr>
+            <a:r>
+              <a:rPr lang="en-US" altLang="zh-TW" sz="2800" b="1" dirty="0" smtClean="0">
+                <a:effectLst>
+                  <a:outerShdw blurRad="38100" dist="38100" dir="2700000" algn="tl">
+                    <a:srgbClr val="000000">
+                      <a:alpha val="43137"/>
+                    </a:srgbClr>
+                  </a:outerShdw>
+                </a:effectLst>
+                <a:latin typeface="微軟正黑體" panose="020B0604030504040204" pitchFamily="34" charset="-120"/>
+                <a:ea typeface="微軟正黑體" panose="020B0604030504040204" pitchFamily="34" charset="-120"/>
+              </a:rPr>
+              <a:t>Spin Lock</a:t>
+            </a:r>
+          </a:p>
+          <a:p>
+            <a:pPr marL="285750" indent="-285750">
+              <a:buFont typeface="Arial" panose="020B0604020202020204" pitchFamily="34" charset="0"/>
+              <a:buChar char="•"/>
+            </a:pPr>
+            <a:r>
+              <a:rPr lang="en-US" altLang="zh-TW" sz="2800" b="1" dirty="0" err="1" smtClean="0">
+                <a:effectLst>
+                  <a:outerShdw blurRad="38100" dist="38100" dir="2700000" algn="tl">
+                    <a:srgbClr val="000000">
+                      <a:alpha val="43137"/>
+                    </a:srgbClr>
+                  </a:outerShdw>
+                </a:effectLst>
+                <a:latin typeface="微軟正黑體" panose="020B0604030504040204" pitchFamily="34" charset="-120"/>
+                <a:ea typeface="微軟正黑體" panose="020B0604030504040204" pitchFamily="34" charset="-120"/>
+              </a:rPr>
+              <a:t>Mutex</a:t>
+            </a:r>
+            <a:endParaRPr lang="en-US" altLang="zh-TW" sz="2800" b="1" dirty="0" smtClean="0">
+              <a:effectLst>
+                <a:outerShdw blurRad="38100" dist="38100" dir="2700000" algn="tl">
+                  <a:srgbClr val="000000">
+                    <a:alpha val="43137"/>
+                  </a:srgbClr>
+                </a:outerShdw>
+              </a:effectLst>
+              <a:latin typeface="微軟正黑體" panose="020B0604030504040204" pitchFamily="34" charset="-120"/>
+              <a:ea typeface="微軟正黑體" panose="020B0604030504040204" pitchFamily="34" charset="-120"/>
+            </a:endParaRPr>
+          </a:p>
+          <a:p>
+            <a:pPr marL="285750" indent="-285750">
+              <a:buFont typeface="Arial" panose="020B0604020202020204" pitchFamily="34" charset="0"/>
+              <a:buChar char="•"/>
+            </a:pPr>
+            <a:r>
+              <a:rPr lang="en-US" altLang="zh-TW" sz="2800" b="1" dirty="0" smtClean="0">
+                <a:effectLst>
+                  <a:outerShdw blurRad="38100" dist="38100" dir="2700000" algn="tl">
+                    <a:srgbClr val="000000">
+                      <a:alpha val="43137"/>
+                    </a:srgbClr>
+                  </a:outerShdw>
+                </a:effectLst>
+                <a:latin typeface="微軟正黑體" panose="020B0604030504040204" pitchFamily="34" charset="-120"/>
+                <a:ea typeface="微軟正黑體" panose="020B0604030504040204" pitchFamily="34" charset="-120"/>
+              </a:rPr>
+              <a:t>Semaphore</a:t>
+            </a:r>
+          </a:p>
+          <a:p>
+            <a:pPr marL="285750" indent="-285750">
+              <a:buFont typeface="Arial" panose="020B0604020202020204" pitchFamily="34" charset="0"/>
+              <a:buChar char="•"/>
+            </a:pPr>
+            <a:r>
+              <a:rPr lang="en-US" altLang="zh-TW" sz="2800" b="1" dirty="0" smtClean="0">
+                <a:effectLst>
+                  <a:outerShdw blurRad="38100" dist="38100" dir="2700000" algn="tl">
+                    <a:srgbClr val="000000">
+                      <a:alpha val="43137"/>
+                    </a:srgbClr>
+                  </a:outerShdw>
+                </a:effectLst>
+                <a:latin typeface="微軟正黑體" panose="020B0604030504040204" pitchFamily="34" charset="-120"/>
+                <a:ea typeface="微軟正黑體" panose="020B0604030504040204" pitchFamily="34" charset="-120"/>
+              </a:rPr>
+              <a:t>Event</a:t>
+            </a:r>
+          </a:p>
+        </p:txBody>
+      </p:sp>
+    </p:spTree>
+    <p:extLst>
+      <p:ext uri="{BB962C8B-B14F-4D97-AF65-F5344CB8AC3E}">
+        <p14:creationId xmlns:p14="http://schemas.microsoft.com/office/powerpoint/2010/main" val="314028434"/>
+      </p:ext>
+    </p:extLst>
+  </p:cSld>
+  <p:clrMapOvr>
+    <a:masterClrMapping/>
+  </p:clrMapOvr>
+  <p:timing>
+    <p:tnLst>
+      <p:par>
+        <p:cTn id="1" dur="indefinite" restart="never" nodeType="tmRoot"/>
+      </p:par>
+    </p:tnLst>
+  </p:timing>
+</p:sld>
+</file>
+
+<file path=ppt/slides/slide81.xml><?xml version="1.0" encoding="utf-8"?>
+<p:sld xmlns:a="http://schemas.openxmlformats.org/drawingml/2006/main" xmlns:r="http://schemas.openxmlformats.org/officeDocument/2006/relationships" xmlns:p="http://schemas.openxmlformats.org/presentationml/2006/main">
+  <p:cSld>
+    <p:spTree>
+      <p:nvGrpSpPr>
+        <p:cNvPr id="1" name=""/>
+        <p:cNvGrpSpPr/>
+        <p:nvPr/>
+      </p:nvGrpSpPr>
+      <p:grpSpPr>
+        <a:xfrm>
+          <a:off x="0" y="0"/>
+          <a:ext cx="0" cy="0"/>
+          <a:chOff x="0" y="0"/>
+          <a:chExt cx="0" cy="0"/>
+        </a:xfrm>
+      </p:grpSpPr>
+      <p:sp>
+        <p:nvSpPr>
+          <p:cNvPr id="8" name="文字方塊 7"/>
+          <p:cNvSpPr txBox="1"/>
+          <p:nvPr/>
+        </p:nvSpPr>
+        <p:spPr>
+          <a:xfrm>
+            <a:off x="8626415" y="6334780"/>
+            <a:ext cx="3565585" cy="523220"/>
+          </a:xfrm>
+          <a:prstGeom prst="rect">
+            <a:avLst/>
+          </a:prstGeom>
+          <a:noFill/>
+        </p:spPr>
+        <p:txBody>
+          <a:bodyPr wrap="square" rtlCol="0">
+            <a:spAutoFit/>
+          </a:bodyPr>
+          <a:lstStyle/>
+          <a:p>
+            <a:r>
+              <a:rPr lang="zh-TW" altLang="en-US" sz="2800" b="1" dirty="0">
+                <a:effectLst>
+                  <a:outerShdw blurRad="38100" dist="38100" dir="2700000" algn="tl">
+                    <a:srgbClr val="000000">
+                      <a:alpha val="43137"/>
+                    </a:srgbClr>
+                  </a:outerShdw>
+                </a:effectLst>
+                <a:latin typeface="微軟正黑體" panose="020B0604030504040204" pitchFamily="34" charset="-120"/>
+                <a:ea typeface="微軟正黑體" panose="020B0604030504040204" pitchFamily="34" charset="-120"/>
+              </a:rPr>
+              <a:t>驅動程式的同步處理</a:t>
+            </a:r>
+          </a:p>
+        </p:txBody>
+      </p:sp>
+      <p:sp>
+        <p:nvSpPr>
+          <p:cNvPr id="5" name="文字方塊 4"/>
+          <p:cNvSpPr txBox="1"/>
+          <p:nvPr/>
+        </p:nvSpPr>
+        <p:spPr>
+          <a:xfrm>
+            <a:off x="0" y="640585"/>
+            <a:ext cx="11467298" cy="5539978"/>
+          </a:xfrm>
+          <a:prstGeom prst="rect">
+            <a:avLst/>
+          </a:prstGeom>
+          <a:noFill/>
+        </p:spPr>
+        <p:txBody>
+          <a:bodyPr wrap="square" rtlCol="0">
+            <a:spAutoFit/>
+          </a:bodyPr>
+          <a:lstStyle/>
+          <a:p>
+            <a:r>
+              <a:rPr lang="en-US" altLang="zh-TW" sz="1600" dirty="0">
+                <a:solidFill>
+                  <a:srgbClr val="0101FD"/>
+                </a:solidFill>
+                <a:latin typeface="Consolas" panose="020B0609020204030204" pitchFamily="49" charset="0"/>
+              </a:rPr>
+              <a:t>void</a:t>
+            </a:r>
+            <a:r>
+              <a:rPr lang="en-US" altLang="zh-TW" sz="1600" dirty="0">
+                <a:solidFill>
+                  <a:srgbClr val="000000"/>
+                </a:solidFill>
+                <a:latin typeface="Consolas" panose="020B0609020204030204" pitchFamily="49" charset="0"/>
+              </a:rPr>
+              <a:t> </a:t>
+            </a:r>
+            <a:r>
+              <a:rPr lang="en-US" altLang="zh-TW" sz="1600" dirty="0" err="1">
+                <a:solidFill>
+                  <a:srgbClr val="007D9A"/>
+                </a:solidFill>
+                <a:latin typeface="Consolas" panose="020B0609020204030204" pitchFamily="49" charset="0"/>
+              </a:rPr>
+              <a:t>KeInitializeSpinLock</a:t>
+            </a:r>
+            <a:r>
+              <a:rPr lang="en-US" altLang="zh-TW" sz="1600" dirty="0">
+                <a:solidFill>
+                  <a:srgbClr val="000000"/>
+                </a:solidFill>
+                <a:latin typeface="Consolas" panose="020B0609020204030204" pitchFamily="49" charset="0"/>
+              </a:rPr>
+              <a:t>( PKSPIN_LOCK </a:t>
+            </a:r>
+            <a:r>
+              <a:rPr lang="en-US" altLang="zh-TW" sz="1600" dirty="0" err="1">
+                <a:solidFill>
+                  <a:srgbClr val="000000"/>
+                </a:solidFill>
+                <a:latin typeface="Consolas" panose="020B0609020204030204" pitchFamily="49" charset="0"/>
+              </a:rPr>
+              <a:t>SpinLock</a:t>
+            </a:r>
+            <a:r>
+              <a:rPr lang="en-US" altLang="zh-TW" sz="1600" dirty="0">
+                <a:solidFill>
+                  <a:srgbClr val="000000"/>
+                </a:solidFill>
+                <a:latin typeface="Consolas" panose="020B0609020204030204" pitchFamily="49" charset="0"/>
+              </a:rPr>
+              <a:t> </a:t>
+            </a:r>
+            <a:r>
+              <a:rPr lang="en-US" altLang="zh-TW" sz="1600" dirty="0" smtClean="0">
+                <a:solidFill>
+                  <a:srgbClr val="000000"/>
+                </a:solidFill>
+                <a:latin typeface="Consolas" panose="020B0609020204030204" pitchFamily="49" charset="0"/>
+              </a:rPr>
+              <a:t>);</a:t>
+            </a:r>
+          </a:p>
+          <a:p>
+            <a:r>
+              <a:rPr lang="en-US" altLang="zh-TW" sz="1600" dirty="0">
+                <a:solidFill>
+                  <a:srgbClr val="0101FD"/>
+                </a:solidFill>
+                <a:latin typeface="Consolas" panose="020B0609020204030204" pitchFamily="49" charset="0"/>
+              </a:rPr>
+              <a:t>void</a:t>
+            </a:r>
+            <a:r>
+              <a:rPr lang="en-US" altLang="zh-TW" sz="1600" dirty="0">
+                <a:solidFill>
+                  <a:srgbClr val="000000"/>
+                </a:solidFill>
+                <a:latin typeface="Consolas" panose="020B0609020204030204" pitchFamily="49" charset="0"/>
+              </a:rPr>
+              <a:t> </a:t>
+            </a:r>
+            <a:r>
+              <a:rPr lang="en-US" altLang="zh-TW" sz="1600" dirty="0" err="1">
+                <a:solidFill>
+                  <a:srgbClr val="007D9A"/>
+                </a:solidFill>
+                <a:latin typeface="Consolas" panose="020B0609020204030204" pitchFamily="49" charset="0"/>
+              </a:rPr>
+              <a:t>KeAcquireSpinLock</a:t>
+            </a:r>
+            <a:r>
+              <a:rPr lang="en-US" altLang="zh-TW" sz="1600" dirty="0">
+                <a:solidFill>
+                  <a:srgbClr val="000000"/>
+                </a:solidFill>
+                <a:latin typeface="Consolas" panose="020B0609020204030204" pitchFamily="49" charset="0"/>
+              </a:rPr>
+              <a:t>( a, b </a:t>
+            </a:r>
+            <a:r>
+              <a:rPr lang="en-US" altLang="zh-TW" sz="1600" dirty="0" smtClean="0">
+                <a:solidFill>
+                  <a:srgbClr val="000000"/>
+                </a:solidFill>
+                <a:latin typeface="Consolas" panose="020B0609020204030204" pitchFamily="49" charset="0"/>
+              </a:rPr>
+              <a:t>);</a:t>
+            </a:r>
+          </a:p>
+          <a:p>
+            <a:r>
+              <a:rPr lang="en-US" altLang="zh-TW" sz="1600" dirty="0">
+                <a:solidFill>
+                  <a:srgbClr val="0101FD"/>
+                </a:solidFill>
+                <a:latin typeface="Consolas" panose="020B0609020204030204" pitchFamily="49" charset="0"/>
+              </a:rPr>
+              <a:t>void</a:t>
+            </a:r>
+            <a:r>
+              <a:rPr lang="en-US" altLang="zh-TW" sz="1600" dirty="0">
+                <a:solidFill>
+                  <a:srgbClr val="000000"/>
+                </a:solidFill>
+                <a:latin typeface="Consolas" panose="020B0609020204030204" pitchFamily="49" charset="0"/>
+              </a:rPr>
+              <a:t> </a:t>
+            </a:r>
+            <a:r>
+              <a:rPr lang="en-US" altLang="zh-TW" sz="1600" dirty="0" err="1">
+                <a:solidFill>
+                  <a:srgbClr val="007D9A"/>
+                </a:solidFill>
+                <a:latin typeface="Consolas" panose="020B0609020204030204" pitchFamily="49" charset="0"/>
+              </a:rPr>
+              <a:t>KeAcquireSpinLockAtDpcLevel</a:t>
+            </a:r>
+            <a:r>
+              <a:rPr lang="en-US" altLang="zh-TW" sz="1600" dirty="0">
+                <a:solidFill>
+                  <a:srgbClr val="000000"/>
+                </a:solidFill>
+                <a:latin typeface="Consolas" panose="020B0609020204030204" pitchFamily="49" charset="0"/>
+              </a:rPr>
+              <a:t>( a </a:t>
+            </a:r>
+            <a:r>
+              <a:rPr lang="en-US" altLang="zh-TW" sz="1600" dirty="0" smtClean="0">
+                <a:solidFill>
+                  <a:srgbClr val="000000"/>
+                </a:solidFill>
+                <a:latin typeface="Consolas" panose="020B0609020204030204" pitchFamily="49" charset="0"/>
+              </a:rPr>
+              <a:t>);</a:t>
+            </a:r>
+          </a:p>
+          <a:p>
+            <a:endParaRPr lang="en-US" altLang="zh-TW" sz="1600" b="1" dirty="0">
+              <a:solidFill>
+                <a:srgbClr val="000000"/>
+              </a:solidFill>
+              <a:effectLst>
+                <a:outerShdw blurRad="38100" dist="38100" dir="2700000" algn="tl">
+                  <a:srgbClr val="000000">
+                    <a:alpha val="43137"/>
+                  </a:srgbClr>
+                </a:outerShdw>
+              </a:effectLst>
+              <a:latin typeface="Consolas" panose="020B0609020204030204" pitchFamily="49" charset="0"/>
+              <a:ea typeface="微軟正黑體" panose="020B0604030504040204" pitchFamily="34" charset="-120"/>
+            </a:endParaRPr>
+          </a:p>
+          <a:p>
+            <a:r>
+              <a:rPr lang="en-US" altLang="zh-TW" sz="1600" dirty="0">
+                <a:solidFill>
+                  <a:srgbClr val="0101FD"/>
+                </a:solidFill>
+                <a:latin typeface="Consolas" panose="020B0609020204030204" pitchFamily="49" charset="0"/>
+              </a:rPr>
+              <a:t>void</a:t>
+            </a:r>
+            <a:r>
+              <a:rPr lang="en-US" altLang="zh-TW" sz="1600" dirty="0">
+                <a:solidFill>
+                  <a:srgbClr val="000000"/>
+                </a:solidFill>
+                <a:latin typeface="Consolas" panose="020B0609020204030204" pitchFamily="49" charset="0"/>
+              </a:rPr>
+              <a:t> </a:t>
+            </a:r>
+            <a:r>
+              <a:rPr lang="en-US" altLang="zh-TW" sz="1600" dirty="0" err="1">
+                <a:solidFill>
+                  <a:srgbClr val="007D9A"/>
+                </a:solidFill>
+                <a:latin typeface="Consolas" panose="020B0609020204030204" pitchFamily="49" charset="0"/>
+              </a:rPr>
+              <a:t>KeReleaseSpinLock</a:t>
+            </a:r>
+            <a:r>
+              <a:rPr lang="en-US" altLang="zh-TW" sz="1600" dirty="0">
+                <a:solidFill>
+                  <a:srgbClr val="000000"/>
+                </a:solidFill>
+                <a:latin typeface="Consolas" panose="020B0609020204030204" pitchFamily="49" charset="0"/>
+              </a:rPr>
+              <a:t>( a, b </a:t>
+            </a:r>
+            <a:r>
+              <a:rPr lang="en-US" altLang="zh-TW" sz="1600" dirty="0" smtClean="0">
+                <a:solidFill>
+                  <a:srgbClr val="000000"/>
+                </a:solidFill>
+                <a:latin typeface="Consolas" panose="020B0609020204030204" pitchFamily="49" charset="0"/>
+              </a:rPr>
+              <a:t>);</a:t>
+            </a:r>
+          </a:p>
+          <a:p>
+            <a:r>
+              <a:rPr lang="en-US" altLang="zh-TW" sz="1600" dirty="0">
+                <a:solidFill>
+                  <a:srgbClr val="0101FD"/>
+                </a:solidFill>
+                <a:latin typeface="Consolas" panose="020B0609020204030204" pitchFamily="49" charset="0"/>
+              </a:rPr>
+              <a:t>void</a:t>
+            </a:r>
+            <a:r>
+              <a:rPr lang="en-US" altLang="zh-TW" sz="1600" dirty="0">
+                <a:solidFill>
+                  <a:srgbClr val="000000"/>
+                </a:solidFill>
+                <a:latin typeface="Consolas" panose="020B0609020204030204" pitchFamily="49" charset="0"/>
+              </a:rPr>
+              <a:t> </a:t>
+            </a:r>
+            <a:r>
+              <a:rPr lang="en-US" altLang="zh-TW" sz="1600" dirty="0" err="1">
+                <a:solidFill>
+                  <a:srgbClr val="007D9A"/>
+                </a:solidFill>
+                <a:latin typeface="Consolas" panose="020B0609020204030204" pitchFamily="49" charset="0"/>
+              </a:rPr>
+              <a:t>KeReleaseSpinLockFromDpcLevel</a:t>
+            </a:r>
+            <a:r>
+              <a:rPr lang="en-US" altLang="zh-TW" sz="1600" dirty="0">
+                <a:solidFill>
+                  <a:srgbClr val="000000"/>
+                </a:solidFill>
+                <a:latin typeface="Consolas" panose="020B0609020204030204" pitchFamily="49" charset="0"/>
+              </a:rPr>
+              <a:t>( a </a:t>
+            </a:r>
+            <a:r>
+              <a:rPr lang="en-US" altLang="zh-TW" sz="1600" dirty="0" smtClean="0">
+                <a:solidFill>
+                  <a:srgbClr val="000000"/>
+                </a:solidFill>
+                <a:latin typeface="Consolas" panose="020B0609020204030204" pitchFamily="49" charset="0"/>
+              </a:rPr>
+              <a:t>);</a:t>
+            </a:r>
+          </a:p>
+          <a:p>
+            <a:endParaRPr lang="en-US" altLang="zh-TW" sz="1600" b="1" dirty="0">
+              <a:solidFill>
+                <a:srgbClr val="000000"/>
+              </a:solidFill>
+              <a:effectLst>
+                <a:outerShdw blurRad="38100" dist="38100" dir="2700000" algn="tl">
+                  <a:srgbClr val="000000">
+                    <a:alpha val="43137"/>
+                  </a:srgbClr>
+                </a:outerShdw>
+              </a:effectLst>
+              <a:latin typeface="Consolas" panose="020B0609020204030204" pitchFamily="49" charset="0"/>
+              <a:ea typeface="微軟正黑體" panose="020B0604030504040204" pitchFamily="34" charset="-120"/>
+            </a:endParaRPr>
+          </a:p>
+          <a:p>
+            <a:r>
+              <a:rPr lang="en-US" altLang="zh-TW" sz="1600" dirty="0">
+                <a:solidFill>
+                  <a:srgbClr val="0101FD"/>
+                </a:solidFill>
+                <a:latin typeface="Consolas" panose="020B0609020204030204" pitchFamily="49" charset="0"/>
+              </a:rPr>
+              <a:t>void</a:t>
+            </a:r>
+            <a:r>
+              <a:rPr lang="en-US" altLang="zh-TW" sz="1600" dirty="0">
+                <a:solidFill>
+                  <a:srgbClr val="000000"/>
+                </a:solidFill>
+                <a:latin typeface="Consolas" panose="020B0609020204030204" pitchFamily="49" charset="0"/>
+              </a:rPr>
+              <a:t> </a:t>
+            </a:r>
+            <a:r>
+              <a:rPr lang="en-US" altLang="zh-TW" sz="1600" dirty="0" err="1">
+                <a:solidFill>
+                  <a:srgbClr val="007D9A"/>
+                </a:solidFill>
+                <a:latin typeface="Consolas" panose="020B0609020204030204" pitchFamily="49" charset="0"/>
+              </a:rPr>
+              <a:t>KeInitializeMutex</a:t>
+            </a:r>
+            <a:r>
+              <a:rPr lang="en-US" altLang="zh-TW" sz="1600" dirty="0">
+                <a:solidFill>
+                  <a:srgbClr val="000000"/>
+                </a:solidFill>
+                <a:latin typeface="Consolas" panose="020B0609020204030204" pitchFamily="49" charset="0"/>
+              </a:rPr>
+              <a:t>( PRKMUTEX </a:t>
+            </a:r>
+            <a:r>
+              <a:rPr lang="en-US" altLang="zh-TW" sz="1600" dirty="0" err="1">
+                <a:solidFill>
+                  <a:srgbClr val="000000"/>
+                </a:solidFill>
+                <a:latin typeface="Consolas" panose="020B0609020204030204" pitchFamily="49" charset="0"/>
+              </a:rPr>
+              <a:t>Mutex</a:t>
+            </a:r>
+            <a:r>
+              <a:rPr lang="en-US" altLang="zh-TW" sz="1600" dirty="0">
+                <a:solidFill>
+                  <a:srgbClr val="000000"/>
+                </a:solidFill>
+                <a:latin typeface="Consolas" panose="020B0609020204030204" pitchFamily="49" charset="0"/>
+              </a:rPr>
+              <a:t>, ULONG Level </a:t>
+            </a:r>
+            <a:r>
+              <a:rPr lang="en-US" altLang="zh-TW" sz="1600" dirty="0" smtClean="0">
+                <a:solidFill>
+                  <a:srgbClr val="000000"/>
+                </a:solidFill>
+                <a:latin typeface="Consolas" panose="020B0609020204030204" pitchFamily="49" charset="0"/>
+              </a:rPr>
+              <a:t>);</a:t>
+            </a:r>
+          </a:p>
+          <a:p>
+            <a:r>
+              <a:rPr lang="en-US" altLang="zh-TW" sz="1600" dirty="0">
+                <a:solidFill>
+                  <a:srgbClr val="000000"/>
+                </a:solidFill>
+                <a:latin typeface="Consolas" panose="020B0609020204030204" pitchFamily="49" charset="0"/>
+              </a:rPr>
+              <a:t>LONG </a:t>
+            </a:r>
+            <a:r>
+              <a:rPr lang="en-US" altLang="zh-TW" sz="1600" dirty="0" err="1">
+                <a:solidFill>
+                  <a:srgbClr val="007D9A"/>
+                </a:solidFill>
+                <a:latin typeface="Consolas" panose="020B0609020204030204" pitchFamily="49" charset="0"/>
+              </a:rPr>
+              <a:t>KeReleaseMutex</a:t>
+            </a:r>
+            <a:r>
+              <a:rPr lang="en-US" altLang="zh-TW" sz="1600" dirty="0">
+                <a:solidFill>
+                  <a:srgbClr val="000000"/>
+                </a:solidFill>
+                <a:latin typeface="Consolas" panose="020B0609020204030204" pitchFamily="49" charset="0"/>
+              </a:rPr>
+              <a:t>( PRKMUTEX </a:t>
+            </a:r>
+            <a:r>
+              <a:rPr lang="en-US" altLang="zh-TW" sz="1600" dirty="0" err="1">
+                <a:solidFill>
+                  <a:srgbClr val="000000"/>
+                </a:solidFill>
+                <a:latin typeface="Consolas" panose="020B0609020204030204" pitchFamily="49" charset="0"/>
+              </a:rPr>
+              <a:t>Mutex</a:t>
+            </a:r>
+            <a:r>
+              <a:rPr lang="en-US" altLang="zh-TW" sz="1600" dirty="0">
+                <a:solidFill>
+                  <a:srgbClr val="000000"/>
+                </a:solidFill>
+                <a:latin typeface="Consolas" panose="020B0609020204030204" pitchFamily="49" charset="0"/>
+              </a:rPr>
+              <a:t>, BOOLEAN Wait </a:t>
+            </a:r>
+            <a:r>
+              <a:rPr lang="en-US" altLang="zh-TW" sz="1600" dirty="0" smtClean="0">
+                <a:solidFill>
+                  <a:srgbClr val="000000"/>
+                </a:solidFill>
+                <a:latin typeface="Consolas" panose="020B0609020204030204" pitchFamily="49" charset="0"/>
+              </a:rPr>
+              <a:t>);</a:t>
+            </a:r>
+          </a:p>
+          <a:p>
+            <a:endParaRPr lang="en-US" altLang="zh-TW" sz="1600" dirty="0">
+              <a:solidFill>
+                <a:srgbClr val="000000"/>
+              </a:solidFill>
+              <a:latin typeface="Consolas" panose="020B0609020204030204" pitchFamily="49" charset="0"/>
+            </a:endParaRPr>
+          </a:p>
+          <a:p>
+            <a:r>
+              <a:rPr lang="en-US" altLang="zh-TW" sz="1600" dirty="0">
+                <a:solidFill>
+                  <a:srgbClr val="0101FD"/>
+                </a:solidFill>
+                <a:latin typeface="Consolas" panose="020B0609020204030204" pitchFamily="49" charset="0"/>
+              </a:rPr>
+              <a:t>void</a:t>
+            </a:r>
+            <a:r>
+              <a:rPr lang="en-US" altLang="zh-TW" sz="1600" dirty="0">
+                <a:solidFill>
+                  <a:srgbClr val="000000"/>
+                </a:solidFill>
+                <a:latin typeface="Consolas" panose="020B0609020204030204" pitchFamily="49" charset="0"/>
+              </a:rPr>
+              <a:t> </a:t>
+            </a:r>
+            <a:r>
+              <a:rPr lang="en-US" altLang="zh-TW" sz="1600" dirty="0" err="1">
+                <a:solidFill>
+                  <a:srgbClr val="007D9A"/>
+                </a:solidFill>
+                <a:latin typeface="Consolas" panose="020B0609020204030204" pitchFamily="49" charset="0"/>
+              </a:rPr>
+              <a:t>KeInitializeSemaphore</a:t>
+            </a:r>
+            <a:r>
+              <a:rPr lang="en-US" altLang="zh-TW" sz="1600" dirty="0">
+                <a:solidFill>
+                  <a:srgbClr val="000000"/>
+                </a:solidFill>
+                <a:latin typeface="Consolas" panose="020B0609020204030204" pitchFamily="49" charset="0"/>
+              </a:rPr>
+              <a:t>( PRKSEMAPHORE Semaphore, LONG Count, LONG Limit </a:t>
+            </a:r>
+            <a:r>
+              <a:rPr lang="en-US" altLang="zh-TW" sz="1600" dirty="0" smtClean="0">
+                <a:solidFill>
+                  <a:srgbClr val="000000"/>
+                </a:solidFill>
+                <a:latin typeface="Consolas" panose="020B0609020204030204" pitchFamily="49" charset="0"/>
+              </a:rPr>
+              <a:t>);</a:t>
+            </a:r>
+          </a:p>
+          <a:p>
+            <a:r>
+              <a:rPr lang="en-US" altLang="zh-TW" sz="1600" dirty="0">
+                <a:solidFill>
+                  <a:srgbClr val="000000"/>
+                </a:solidFill>
+                <a:latin typeface="Consolas" panose="020B0609020204030204" pitchFamily="49" charset="0"/>
+              </a:rPr>
+              <a:t>LONG </a:t>
+            </a:r>
+            <a:r>
+              <a:rPr lang="en-US" altLang="zh-TW" sz="1600" dirty="0" err="1">
+                <a:solidFill>
+                  <a:srgbClr val="007D9A"/>
+                </a:solidFill>
+                <a:latin typeface="Consolas" panose="020B0609020204030204" pitchFamily="49" charset="0"/>
+              </a:rPr>
+              <a:t>KeReadStateSemaphore</a:t>
+            </a:r>
+            <a:r>
+              <a:rPr lang="en-US" altLang="zh-TW" sz="1600" dirty="0">
+                <a:solidFill>
+                  <a:srgbClr val="000000"/>
+                </a:solidFill>
+                <a:latin typeface="Consolas" panose="020B0609020204030204" pitchFamily="49" charset="0"/>
+              </a:rPr>
+              <a:t>( PRKSEMAPHORE Semaphore );</a:t>
+            </a:r>
+            <a:endParaRPr lang="en-US" altLang="zh-TW" sz="1600" dirty="0" smtClean="0">
+              <a:solidFill>
+                <a:srgbClr val="000000"/>
+              </a:solidFill>
+              <a:latin typeface="Consolas" panose="020B0609020204030204" pitchFamily="49" charset="0"/>
+            </a:endParaRPr>
+          </a:p>
+          <a:p>
+            <a:r>
+              <a:rPr lang="en-US" altLang="zh-TW" sz="1600" dirty="0">
+                <a:solidFill>
+                  <a:srgbClr val="000000"/>
+                </a:solidFill>
+                <a:latin typeface="Consolas" panose="020B0609020204030204" pitchFamily="49" charset="0"/>
+              </a:rPr>
+              <a:t>LONG </a:t>
+            </a:r>
+            <a:r>
+              <a:rPr lang="en-US" altLang="zh-TW" sz="1600" dirty="0" err="1">
+                <a:solidFill>
+                  <a:srgbClr val="007D9A"/>
+                </a:solidFill>
+                <a:latin typeface="Consolas" panose="020B0609020204030204" pitchFamily="49" charset="0"/>
+              </a:rPr>
+              <a:t>KeReleaseSemaphore</a:t>
+            </a:r>
+            <a:r>
+              <a:rPr lang="en-US" altLang="zh-TW" sz="1600" dirty="0">
+                <a:solidFill>
+                  <a:srgbClr val="000000"/>
+                </a:solidFill>
+                <a:latin typeface="Consolas" panose="020B0609020204030204" pitchFamily="49" charset="0"/>
+              </a:rPr>
+              <a:t>( PRKSEMAPHORE Semaphore, KPRIORITY Increment, LONG Adjustment, BOOLEAN Wait </a:t>
+            </a:r>
+            <a:r>
+              <a:rPr lang="en-US" altLang="zh-TW" sz="1600" dirty="0" smtClean="0">
+                <a:solidFill>
+                  <a:srgbClr val="000000"/>
+                </a:solidFill>
+                <a:latin typeface="Consolas" panose="020B0609020204030204" pitchFamily="49" charset="0"/>
+              </a:rPr>
+              <a:t>);</a:t>
+            </a:r>
+          </a:p>
+          <a:p>
+            <a:endParaRPr lang="en-US" altLang="zh-TW" sz="1600" dirty="0">
+              <a:solidFill>
+                <a:srgbClr val="000000"/>
+              </a:solidFill>
+              <a:latin typeface="Consolas" panose="020B0609020204030204" pitchFamily="49" charset="0"/>
+            </a:endParaRPr>
+          </a:p>
+          <a:p>
+            <a:r>
+              <a:rPr lang="en-US" altLang="zh-TW" sz="1600" dirty="0">
+                <a:solidFill>
+                  <a:srgbClr val="0101FD"/>
+                </a:solidFill>
+                <a:latin typeface="Consolas" panose="020B0609020204030204" pitchFamily="49" charset="0"/>
+              </a:rPr>
+              <a:t>void</a:t>
+            </a:r>
+            <a:r>
+              <a:rPr lang="en-US" altLang="zh-TW" sz="1600" dirty="0">
+                <a:solidFill>
+                  <a:srgbClr val="000000"/>
+                </a:solidFill>
+                <a:latin typeface="Consolas" panose="020B0609020204030204" pitchFamily="49" charset="0"/>
+              </a:rPr>
+              <a:t> </a:t>
+            </a:r>
+            <a:r>
+              <a:rPr lang="en-US" altLang="zh-TW" sz="1600" dirty="0" err="1">
+                <a:solidFill>
+                  <a:srgbClr val="007D9A"/>
+                </a:solidFill>
+                <a:latin typeface="Consolas" panose="020B0609020204030204" pitchFamily="49" charset="0"/>
+              </a:rPr>
+              <a:t>KeInitializeEvent</a:t>
+            </a:r>
+            <a:r>
+              <a:rPr lang="en-US" altLang="zh-TW" sz="1600" dirty="0">
+                <a:solidFill>
+                  <a:srgbClr val="000000"/>
+                </a:solidFill>
+                <a:latin typeface="Consolas" panose="020B0609020204030204" pitchFamily="49" charset="0"/>
+              </a:rPr>
+              <a:t>( PRKEVENT Event, EVENT_TYPE Type, BOOLEAN State );</a:t>
+            </a:r>
+          </a:p>
+          <a:p>
+            <a:r>
+              <a:rPr lang="en-US" altLang="zh-TW" sz="1600" dirty="0">
+                <a:solidFill>
+                  <a:srgbClr val="000000"/>
+                </a:solidFill>
+                <a:latin typeface="Consolas" panose="020B0609020204030204" pitchFamily="49" charset="0"/>
+              </a:rPr>
+              <a:t>LONG </a:t>
+            </a:r>
+            <a:r>
+              <a:rPr lang="en-US" altLang="zh-TW" sz="1600" dirty="0" err="1">
+                <a:solidFill>
+                  <a:srgbClr val="007D9A"/>
+                </a:solidFill>
+                <a:latin typeface="Consolas" panose="020B0609020204030204" pitchFamily="49" charset="0"/>
+              </a:rPr>
+              <a:t>KeSetEvent</a:t>
+            </a:r>
+            <a:r>
+              <a:rPr lang="en-US" altLang="zh-TW" sz="1600" dirty="0">
+                <a:solidFill>
+                  <a:srgbClr val="000000"/>
+                </a:solidFill>
+                <a:latin typeface="Consolas" panose="020B0609020204030204" pitchFamily="49" charset="0"/>
+              </a:rPr>
+              <a:t>( PRKEVENT Event, KPRIORITY Increment, BOOLEAN Wait );</a:t>
+            </a:r>
+          </a:p>
+          <a:p>
+            <a:r>
+              <a:rPr lang="en-US" altLang="zh-TW" sz="1600" dirty="0">
+                <a:solidFill>
+                  <a:srgbClr val="000000"/>
+                </a:solidFill>
+                <a:latin typeface="Consolas" panose="020B0609020204030204" pitchFamily="49" charset="0"/>
+              </a:rPr>
+              <a:t>LONG </a:t>
+            </a:r>
+            <a:r>
+              <a:rPr lang="en-US" altLang="zh-TW" sz="1600" dirty="0" err="1">
+                <a:solidFill>
+                  <a:srgbClr val="007D9A"/>
+                </a:solidFill>
+                <a:latin typeface="Consolas" panose="020B0609020204030204" pitchFamily="49" charset="0"/>
+              </a:rPr>
+              <a:t>KeResetEvent</a:t>
+            </a:r>
+            <a:r>
+              <a:rPr lang="en-US" altLang="zh-TW" sz="1600" dirty="0">
+                <a:solidFill>
+                  <a:srgbClr val="000000"/>
+                </a:solidFill>
+                <a:latin typeface="Consolas" panose="020B0609020204030204" pitchFamily="49" charset="0"/>
+              </a:rPr>
+              <a:t>( PRKEVENT Event </a:t>
+            </a:r>
+            <a:r>
+              <a:rPr lang="en-US" altLang="zh-TW" sz="1600" dirty="0" smtClean="0">
+                <a:solidFill>
+                  <a:srgbClr val="000000"/>
+                </a:solidFill>
+                <a:latin typeface="Consolas" panose="020B0609020204030204" pitchFamily="49" charset="0"/>
+              </a:rPr>
+              <a:t>);</a:t>
+            </a:r>
+          </a:p>
+          <a:p>
+            <a:endParaRPr lang="en-US" altLang="zh-TW" sz="1600" b="1" dirty="0">
+              <a:solidFill>
+                <a:srgbClr val="000000"/>
+              </a:solidFill>
+              <a:effectLst>
+                <a:outerShdw blurRad="38100" dist="38100" dir="2700000" algn="tl">
+                  <a:srgbClr val="000000">
+                    <a:alpha val="43137"/>
+                  </a:srgbClr>
+                </a:outerShdw>
+              </a:effectLst>
+              <a:latin typeface="Consolas" panose="020B0609020204030204" pitchFamily="49" charset="0"/>
+              <a:ea typeface="微軟正黑體" panose="020B0604030504040204" pitchFamily="34" charset="-120"/>
+            </a:endParaRPr>
+          </a:p>
+          <a:p>
+            <a:r>
+              <a:rPr lang="en-US" altLang="zh-TW" sz="1600" dirty="0">
+                <a:solidFill>
+                  <a:srgbClr val="000000"/>
+                </a:solidFill>
+                <a:latin typeface="Consolas" panose="020B0609020204030204" pitchFamily="49" charset="0"/>
+              </a:rPr>
+              <a:t>NTSTATUS </a:t>
+            </a:r>
+            <a:r>
+              <a:rPr lang="en-US" altLang="zh-TW" sz="1600" dirty="0" err="1">
+                <a:solidFill>
+                  <a:srgbClr val="007D9A"/>
+                </a:solidFill>
+                <a:latin typeface="Consolas" panose="020B0609020204030204" pitchFamily="49" charset="0"/>
+              </a:rPr>
+              <a:t>KeWaitForSingleObject</a:t>
+            </a:r>
+            <a:r>
+              <a:rPr lang="en-US" altLang="zh-TW" sz="1600" dirty="0">
+                <a:solidFill>
+                  <a:srgbClr val="000000"/>
+                </a:solidFill>
+                <a:latin typeface="Consolas" panose="020B0609020204030204" pitchFamily="49" charset="0"/>
+              </a:rPr>
+              <a:t>( PVOID Object, KWAIT_REASON </a:t>
+            </a:r>
+            <a:r>
+              <a:rPr lang="en-US" altLang="zh-TW" sz="1600" dirty="0" err="1">
+                <a:solidFill>
+                  <a:srgbClr val="000000"/>
+                </a:solidFill>
+                <a:latin typeface="Consolas" panose="020B0609020204030204" pitchFamily="49" charset="0"/>
+              </a:rPr>
+              <a:t>WaitReason</a:t>
+            </a:r>
+            <a:r>
+              <a:rPr lang="en-US" altLang="zh-TW" sz="1600" dirty="0">
+                <a:solidFill>
+                  <a:srgbClr val="000000"/>
+                </a:solidFill>
+                <a:latin typeface="Consolas" panose="020B0609020204030204" pitchFamily="49" charset="0"/>
+              </a:rPr>
+              <a:t>, __</a:t>
+            </a:r>
+            <a:r>
+              <a:rPr lang="en-US" altLang="zh-TW" sz="1600" dirty="0" err="1">
+                <a:solidFill>
+                  <a:srgbClr val="000000"/>
+                </a:solidFill>
+                <a:latin typeface="Consolas" panose="020B0609020204030204" pitchFamily="49" charset="0"/>
+              </a:rPr>
+              <a:t>drv_strictType</a:t>
+            </a:r>
+            <a:r>
+              <a:rPr lang="en-US" altLang="zh-TW" sz="1600" dirty="0">
+                <a:solidFill>
+                  <a:srgbClr val="000000"/>
+                </a:solidFill>
+                <a:latin typeface="Consolas" panose="020B0609020204030204" pitchFamily="49" charset="0"/>
+              </a:rPr>
+              <a:t>(KPROCESSOR_MODE / </a:t>
+            </a:r>
+            <a:r>
+              <a:rPr lang="en-US" altLang="zh-TW" sz="1600" dirty="0" err="1">
+                <a:solidFill>
+                  <a:srgbClr val="0101FD"/>
+                </a:solidFill>
+                <a:latin typeface="Consolas" panose="020B0609020204030204" pitchFamily="49" charset="0"/>
+              </a:rPr>
+              <a:t>enum</a:t>
+            </a:r>
+            <a:r>
+              <a:rPr lang="en-US" altLang="zh-TW" sz="1600" dirty="0">
+                <a:solidFill>
+                  <a:srgbClr val="000000"/>
+                </a:solidFill>
+                <a:latin typeface="Consolas" panose="020B0609020204030204" pitchFamily="49" charset="0"/>
+              </a:rPr>
+              <a:t> _MODE,__</a:t>
+            </a:r>
+            <a:r>
+              <a:rPr lang="en-US" altLang="zh-TW" sz="1600" dirty="0" err="1">
+                <a:solidFill>
+                  <a:srgbClr val="000000"/>
+                </a:solidFill>
+                <a:latin typeface="Consolas" panose="020B0609020204030204" pitchFamily="49" charset="0"/>
+              </a:rPr>
+              <a:t>drv_typeConst</a:t>
+            </a:r>
+            <a:r>
+              <a:rPr lang="en-US" altLang="zh-TW" sz="1600" dirty="0">
+                <a:solidFill>
+                  <a:srgbClr val="000000"/>
+                </a:solidFill>
+                <a:latin typeface="Consolas" panose="020B0609020204030204" pitchFamily="49" charset="0"/>
+              </a:rPr>
+              <a:t>)KPROCESSOR_MODE </a:t>
+            </a:r>
+            <a:r>
+              <a:rPr lang="en-US" altLang="zh-TW" sz="1600" dirty="0" err="1">
+                <a:solidFill>
+                  <a:srgbClr val="000000"/>
+                </a:solidFill>
+                <a:latin typeface="Consolas" panose="020B0609020204030204" pitchFamily="49" charset="0"/>
+              </a:rPr>
+              <a:t>WaitMode</a:t>
+            </a:r>
+            <a:r>
+              <a:rPr lang="en-US" altLang="zh-TW" sz="1600" dirty="0">
+                <a:solidFill>
+                  <a:srgbClr val="000000"/>
+                </a:solidFill>
+                <a:latin typeface="Consolas" panose="020B0609020204030204" pitchFamily="49" charset="0"/>
+              </a:rPr>
+              <a:t>, BOOLEAN </a:t>
+            </a:r>
+            <a:r>
+              <a:rPr lang="en-US" altLang="zh-TW" sz="1600" dirty="0" err="1">
+                <a:solidFill>
+                  <a:srgbClr val="000000"/>
+                </a:solidFill>
+                <a:latin typeface="Consolas" panose="020B0609020204030204" pitchFamily="49" charset="0"/>
+              </a:rPr>
+              <a:t>Alertable</a:t>
+            </a:r>
+            <a:r>
+              <a:rPr lang="en-US" altLang="zh-TW" sz="1600" dirty="0">
+                <a:solidFill>
+                  <a:srgbClr val="000000"/>
+                </a:solidFill>
+                <a:latin typeface="Consolas" panose="020B0609020204030204" pitchFamily="49" charset="0"/>
+              </a:rPr>
+              <a:t>, PLARGE_INTEGER Timeout );</a:t>
+            </a:r>
+          </a:p>
+          <a:p>
+            <a:endParaRPr lang="en-US" altLang="zh-TW" b="1" dirty="0" smtClean="0">
+              <a:effectLst>
+                <a:outerShdw blurRad="38100" dist="38100" dir="2700000" algn="tl">
+                  <a:srgbClr val="000000">
+                    <a:alpha val="43137"/>
+                  </a:srgbClr>
+                </a:outerShdw>
+              </a:effectLst>
+              <a:latin typeface="微軟正黑體" panose="020B0604030504040204" pitchFamily="34" charset="-120"/>
+              <a:ea typeface="微軟正黑體" panose="020B0604030504040204" pitchFamily="34" charset="-120"/>
+            </a:endParaRPr>
+          </a:p>
+        </p:txBody>
+      </p:sp>
+      <p:sp>
+        <p:nvSpPr>
+          <p:cNvPr id="4" name="文字方塊 3"/>
+          <p:cNvSpPr txBox="1"/>
+          <p:nvPr/>
+        </p:nvSpPr>
+        <p:spPr>
+          <a:xfrm>
+            <a:off x="0" y="112143"/>
+            <a:ext cx="3565585" cy="461665"/>
+          </a:xfrm>
+          <a:prstGeom prst="rect">
+            <a:avLst/>
+          </a:prstGeom>
+          <a:noFill/>
+        </p:spPr>
+        <p:txBody>
+          <a:bodyPr wrap="square" rtlCol="0">
+            <a:spAutoFit/>
+          </a:bodyPr>
+          <a:lstStyle/>
+          <a:p>
+            <a:r>
+              <a:rPr lang="en-US" altLang="zh-TW" sz="2400" b="1" dirty="0" smtClean="0">
+                <a:effectLst>
+                  <a:outerShdw blurRad="38100" dist="38100" dir="2700000" algn="tl">
+                    <a:srgbClr val="000000">
+                      <a:alpha val="43137"/>
+                    </a:srgbClr>
+                  </a:outerShdw>
+                </a:effectLst>
+                <a:latin typeface="微軟正黑體" panose="020B0604030504040204" pitchFamily="34" charset="-120"/>
+                <a:ea typeface="微軟正黑體" panose="020B0604030504040204" pitchFamily="34" charset="-120"/>
+              </a:rPr>
+              <a:t>Related APIs</a:t>
+            </a:r>
+            <a:endParaRPr lang="zh-TW" altLang="en-US" sz="2400" b="1" dirty="0">
+              <a:effectLst>
+                <a:outerShdw blurRad="38100" dist="38100" dir="2700000" algn="tl">
+                  <a:srgbClr val="000000">
+                    <a:alpha val="43137"/>
+                  </a:srgbClr>
+                </a:outerShdw>
+              </a:effectLst>
+              <a:latin typeface="微軟正黑體" panose="020B0604030504040204" pitchFamily="34" charset="-120"/>
+              <a:ea typeface="微軟正黑體" panose="020B0604030504040204" pitchFamily="34" charset="-120"/>
+            </a:endParaRPr>
+          </a:p>
+        </p:txBody>
+      </p:sp>
+    </p:spTree>
+    <p:extLst>
+      <p:ext uri="{BB962C8B-B14F-4D97-AF65-F5344CB8AC3E}">
+        <p14:creationId xmlns:p14="http://schemas.microsoft.com/office/powerpoint/2010/main" val="2465924551"/>
+      </p:ext>
+    </p:extLst>
+  </p:cSld>
+  <p:clrMapOvr>
+    <a:masterClrMapping/>
+  </p:clrMapOvr>
+  <p:timing>
+    <p:tnLst>
+      <p:par>
+        <p:cTn id="1" dur="indefinite" restart="never" nodeType="tmRoot"/>
+      </p:par>
+    </p:tnLst>
+  </p:timing>
+</p:sld>
+</file>
+
+<file path=ppt/slides/slide82.xml><?xml version="1.0" encoding="utf-8"?>
+<p:sld xmlns:a="http://schemas.openxmlformats.org/drawingml/2006/main" xmlns:r="http://schemas.openxmlformats.org/officeDocument/2006/relationships" xmlns:p="http://schemas.openxmlformats.org/presentationml/2006/main">
+  <p:cSld>
+    <p:spTree>
+      <p:nvGrpSpPr>
+        <p:cNvPr id="1" name=""/>
+        <p:cNvGrpSpPr/>
+        <p:nvPr/>
+      </p:nvGrpSpPr>
+      <p:grpSpPr>
+        <a:xfrm>
+          <a:off x="0" y="0"/>
+          <a:ext cx="0" cy="0"/>
+          <a:chOff x="0" y="0"/>
+          <a:chExt cx="0" cy="0"/>
+        </a:xfrm>
+      </p:grpSpPr>
+      <p:sp>
+        <p:nvSpPr>
+          <p:cNvPr id="8" name="文字方塊 7"/>
+          <p:cNvSpPr txBox="1"/>
+          <p:nvPr/>
+        </p:nvSpPr>
+        <p:spPr>
+          <a:xfrm>
+            <a:off x="8626415" y="6334780"/>
+            <a:ext cx="3565585" cy="523220"/>
+          </a:xfrm>
+          <a:prstGeom prst="rect">
+            <a:avLst/>
+          </a:prstGeom>
+          <a:noFill/>
+        </p:spPr>
+        <p:txBody>
+          <a:bodyPr wrap="square" rtlCol="0">
+            <a:spAutoFit/>
+          </a:bodyPr>
+          <a:lstStyle/>
+          <a:p>
+            <a:r>
+              <a:rPr lang="zh-TW" altLang="en-US" sz="2800" b="1" dirty="0">
+                <a:effectLst>
+                  <a:outerShdw blurRad="38100" dist="38100" dir="2700000" algn="tl">
+                    <a:srgbClr val="000000">
+                      <a:alpha val="43137"/>
+                    </a:srgbClr>
+                  </a:outerShdw>
+                </a:effectLst>
+                <a:latin typeface="微軟正黑體" panose="020B0604030504040204" pitchFamily="34" charset="-120"/>
+                <a:ea typeface="微軟正黑體" panose="020B0604030504040204" pitchFamily="34" charset="-120"/>
+              </a:rPr>
+              <a:t>驅動程式的同步處理</a:t>
+            </a:r>
+          </a:p>
+        </p:txBody>
+      </p:sp>
+      <p:sp>
+        <p:nvSpPr>
+          <p:cNvPr id="5" name="文字方塊 4"/>
+          <p:cNvSpPr txBox="1"/>
+          <p:nvPr/>
+        </p:nvSpPr>
+        <p:spPr>
+          <a:xfrm>
+            <a:off x="0" y="726851"/>
+            <a:ext cx="11467298" cy="923330"/>
+          </a:xfrm>
+          <a:prstGeom prst="rect">
+            <a:avLst/>
+          </a:prstGeom>
+          <a:noFill/>
+        </p:spPr>
+        <p:txBody>
+          <a:bodyPr wrap="square" rtlCol="0">
+            <a:spAutoFit/>
+          </a:bodyPr>
+          <a:lstStyle/>
+          <a:p>
+            <a:r>
+              <a:rPr lang="en-US" altLang="zh-TW" dirty="0">
+                <a:solidFill>
+                  <a:srgbClr val="000000"/>
+                </a:solidFill>
+                <a:latin typeface="Consolas" panose="020B0609020204030204" pitchFamily="49" charset="0"/>
+              </a:rPr>
+              <a:t>NTSTATUS </a:t>
+            </a:r>
+            <a:r>
+              <a:rPr lang="en-US" altLang="zh-TW" dirty="0" err="1">
+                <a:solidFill>
+                  <a:srgbClr val="007D9A"/>
+                </a:solidFill>
+                <a:latin typeface="Consolas" panose="020B0609020204030204" pitchFamily="49" charset="0"/>
+              </a:rPr>
+              <a:t>ObReferenceObjectByHandle</a:t>
+            </a:r>
+            <a:r>
+              <a:rPr lang="en-US" altLang="zh-TW" dirty="0">
+                <a:solidFill>
+                  <a:srgbClr val="000000"/>
+                </a:solidFill>
+                <a:latin typeface="Consolas" panose="020B0609020204030204" pitchFamily="49" charset="0"/>
+              </a:rPr>
+              <a:t>( HANDLE </a:t>
+            </a:r>
+            <a:r>
+              <a:rPr lang="en-US" altLang="zh-TW" dirty="0" err="1">
+                <a:solidFill>
+                  <a:srgbClr val="000000"/>
+                </a:solidFill>
+                <a:latin typeface="Consolas" panose="020B0609020204030204" pitchFamily="49" charset="0"/>
+              </a:rPr>
+              <a:t>Handle</a:t>
+            </a:r>
+            <a:r>
+              <a:rPr lang="en-US" altLang="zh-TW" dirty="0">
+                <a:solidFill>
+                  <a:srgbClr val="000000"/>
+                </a:solidFill>
+                <a:latin typeface="Consolas" panose="020B0609020204030204" pitchFamily="49" charset="0"/>
+              </a:rPr>
+              <a:t>, ACCESS_MASK </a:t>
+            </a:r>
+            <a:r>
+              <a:rPr lang="en-US" altLang="zh-TW" dirty="0" err="1">
+                <a:solidFill>
+                  <a:srgbClr val="000000"/>
+                </a:solidFill>
+                <a:latin typeface="Consolas" panose="020B0609020204030204" pitchFamily="49" charset="0"/>
+              </a:rPr>
+              <a:t>DesiredAccess</a:t>
+            </a:r>
+            <a:r>
+              <a:rPr lang="en-US" altLang="zh-TW" dirty="0">
+                <a:solidFill>
+                  <a:srgbClr val="000000"/>
+                </a:solidFill>
+                <a:latin typeface="Consolas" panose="020B0609020204030204" pitchFamily="49" charset="0"/>
+              </a:rPr>
+              <a:t>, POBJECT_TYPE </a:t>
+            </a:r>
+            <a:r>
+              <a:rPr lang="en-US" altLang="zh-TW" dirty="0" err="1">
+                <a:solidFill>
+                  <a:srgbClr val="000000"/>
+                </a:solidFill>
+                <a:latin typeface="Consolas" panose="020B0609020204030204" pitchFamily="49" charset="0"/>
+              </a:rPr>
+              <a:t>ObjectType</a:t>
+            </a:r>
+            <a:r>
+              <a:rPr lang="en-US" altLang="zh-TW" dirty="0">
+                <a:solidFill>
+                  <a:srgbClr val="000000"/>
+                </a:solidFill>
+                <a:latin typeface="Consolas" panose="020B0609020204030204" pitchFamily="49" charset="0"/>
+              </a:rPr>
+              <a:t>, KPROCESSOR_MODE </a:t>
+            </a:r>
+            <a:r>
+              <a:rPr lang="en-US" altLang="zh-TW" dirty="0" err="1">
+                <a:solidFill>
+                  <a:srgbClr val="000000"/>
+                </a:solidFill>
+                <a:latin typeface="Consolas" panose="020B0609020204030204" pitchFamily="49" charset="0"/>
+              </a:rPr>
+              <a:t>AccessMode</a:t>
+            </a:r>
+            <a:r>
+              <a:rPr lang="en-US" altLang="zh-TW" dirty="0">
+                <a:solidFill>
+                  <a:srgbClr val="000000"/>
+                </a:solidFill>
+                <a:latin typeface="Consolas" panose="020B0609020204030204" pitchFamily="49" charset="0"/>
+              </a:rPr>
+              <a:t>, PVOID *Object, POBJECT_HANDLE_INFORMATION </a:t>
+            </a:r>
+            <a:r>
+              <a:rPr lang="en-US" altLang="zh-TW" dirty="0" err="1">
+                <a:solidFill>
+                  <a:srgbClr val="000000"/>
+                </a:solidFill>
+                <a:latin typeface="Consolas" panose="020B0609020204030204" pitchFamily="49" charset="0"/>
+              </a:rPr>
+              <a:t>HandleInformation</a:t>
+            </a:r>
+            <a:r>
+              <a:rPr lang="en-US" altLang="zh-TW" dirty="0">
+                <a:solidFill>
+                  <a:srgbClr val="000000"/>
+                </a:solidFill>
+                <a:latin typeface="Consolas" panose="020B0609020204030204" pitchFamily="49" charset="0"/>
+              </a:rPr>
+              <a:t> );</a:t>
+            </a:r>
+            <a:endParaRPr lang="en-US" altLang="zh-TW" b="1" dirty="0" smtClean="0">
+              <a:effectLst>
+                <a:outerShdw blurRad="38100" dist="38100" dir="2700000" algn="tl">
+                  <a:srgbClr val="000000">
+                    <a:alpha val="43137"/>
+                  </a:srgbClr>
+                </a:outerShdw>
+              </a:effectLst>
+              <a:latin typeface="微軟正黑體" panose="020B0604030504040204" pitchFamily="34" charset="-120"/>
+              <a:ea typeface="微軟正黑體" panose="020B0604030504040204" pitchFamily="34" charset="-120"/>
+            </a:endParaRPr>
+          </a:p>
+        </p:txBody>
+      </p:sp>
+      <p:sp>
+        <p:nvSpPr>
+          <p:cNvPr id="4" name="文字方塊 3"/>
+          <p:cNvSpPr txBox="1"/>
+          <p:nvPr/>
+        </p:nvSpPr>
+        <p:spPr>
+          <a:xfrm>
+            <a:off x="0" y="123109"/>
+            <a:ext cx="5124091" cy="461665"/>
+          </a:xfrm>
+          <a:prstGeom prst="rect">
+            <a:avLst/>
+          </a:prstGeom>
+          <a:noFill/>
+        </p:spPr>
+        <p:txBody>
+          <a:bodyPr wrap="square" rtlCol="0">
+            <a:spAutoFit/>
+          </a:bodyPr>
+          <a:lstStyle/>
+          <a:p>
+            <a:r>
+              <a:rPr lang="en-US" altLang="zh-TW" sz="2400" b="1" dirty="0" smtClean="0">
+                <a:effectLst>
+                  <a:outerShdw blurRad="38100" dist="38100" dir="2700000" algn="tl">
+                    <a:srgbClr val="000000">
+                      <a:alpha val="43137"/>
+                    </a:srgbClr>
+                  </a:outerShdw>
+                </a:effectLst>
+                <a:latin typeface="微軟正黑體" panose="020B0604030504040204" pitchFamily="34" charset="-120"/>
+                <a:ea typeface="微軟正黑體" panose="020B0604030504040204" pitchFamily="34" charset="-120"/>
+              </a:rPr>
+              <a:t>Synchronize With Application </a:t>
+            </a:r>
+            <a:endParaRPr lang="zh-TW" altLang="en-US" sz="2400" b="1" dirty="0">
+              <a:effectLst>
+                <a:outerShdw blurRad="38100" dist="38100" dir="2700000" algn="tl">
+                  <a:srgbClr val="000000">
+                    <a:alpha val="43137"/>
+                  </a:srgbClr>
+                </a:outerShdw>
+              </a:effectLst>
+              <a:latin typeface="微軟正黑體" panose="020B0604030504040204" pitchFamily="34" charset="-120"/>
+              <a:ea typeface="微軟正黑體" panose="020B0604030504040204" pitchFamily="34" charset="-120"/>
+            </a:endParaRPr>
+          </a:p>
+        </p:txBody>
+      </p:sp>
+      <p:pic>
+        <p:nvPicPr>
+          <p:cNvPr id="2" name="圖片 1"/>
+          <p:cNvPicPr>
+            <a:picLocks noChangeAspect="1"/>
+          </p:cNvPicPr>
+          <p:nvPr/>
+        </p:nvPicPr>
+        <p:blipFill>
+          <a:blip r:embed="rId3"/>
+          <a:stretch>
+            <a:fillRect/>
+          </a:stretch>
+        </p:blipFill>
+        <p:spPr>
+          <a:xfrm>
+            <a:off x="150732" y="2774731"/>
+            <a:ext cx="5302383" cy="2999262"/>
+          </a:xfrm>
+          <a:prstGeom prst="rect">
+            <a:avLst/>
+          </a:prstGeom>
+          <a:noFill/>
+          <a:ln w="50800">
+            <a:solidFill>
+              <a:schemeClr val="accent4"/>
+            </a:solidFill>
+          </a:ln>
+        </p:spPr>
+      </p:pic>
+    </p:spTree>
+    <p:extLst>
+      <p:ext uri="{BB962C8B-B14F-4D97-AF65-F5344CB8AC3E}">
+        <p14:creationId xmlns:p14="http://schemas.microsoft.com/office/powerpoint/2010/main" val="213289017"/>
+      </p:ext>
+    </p:extLst>
+  </p:cSld>
+  <p:clrMapOvr>
+    <a:masterClrMapping/>
+  </p:clrMapOvr>
+  <p:timing>
+    <p:tnLst>
+      <p:par>
+        <p:cTn id="1" dur="indefinite" restart="never" nodeType="tmRoot"/>
+      </p:par>
+    </p:tnLst>
+  </p:timing>
+</p:sld>
+</file>
+
+<file path=ppt/slides/slide83.xml><?xml version="1.0" encoding="utf-8"?>
+<p:sld xmlns:a="http://schemas.openxmlformats.org/drawingml/2006/main" xmlns:r="http://schemas.openxmlformats.org/officeDocument/2006/relationships" xmlns:p="http://schemas.openxmlformats.org/presentationml/2006/main">
+  <p:cSld>
+    <p:spTree>
+      <p:nvGrpSpPr>
+        <p:cNvPr id="1" name=""/>
+        <p:cNvGrpSpPr/>
+        <p:nvPr/>
+      </p:nvGrpSpPr>
+      <p:grpSpPr>
+        <a:xfrm>
+          <a:off x="0" y="0"/>
+          <a:ext cx="0" cy="0"/>
+          <a:chOff x="0" y="0"/>
+          <a:chExt cx="0" cy="0"/>
+        </a:xfrm>
+      </p:grpSpPr>
+      <p:sp>
+        <p:nvSpPr>
+          <p:cNvPr id="8" name="文字方塊 7"/>
+          <p:cNvSpPr txBox="1"/>
+          <p:nvPr/>
+        </p:nvSpPr>
+        <p:spPr>
+          <a:xfrm>
+            <a:off x="8626415" y="6334780"/>
+            <a:ext cx="3565585" cy="523220"/>
+          </a:xfrm>
+          <a:prstGeom prst="rect">
+            <a:avLst/>
+          </a:prstGeom>
+          <a:noFill/>
+        </p:spPr>
+        <p:txBody>
+          <a:bodyPr wrap="square" rtlCol="0">
+            <a:spAutoFit/>
+          </a:bodyPr>
+          <a:lstStyle/>
+          <a:p>
+            <a:r>
+              <a:rPr lang="zh-TW" altLang="en-US" sz="2800" b="1" dirty="0">
+                <a:effectLst>
+                  <a:outerShdw blurRad="38100" dist="38100" dir="2700000" algn="tl">
+                    <a:srgbClr val="000000">
+                      <a:alpha val="43137"/>
+                    </a:srgbClr>
+                  </a:outerShdw>
+                </a:effectLst>
+                <a:latin typeface="微軟正黑體" panose="020B0604030504040204" pitchFamily="34" charset="-120"/>
+                <a:ea typeface="微軟正黑體" panose="020B0604030504040204" pitchFamily="34" charset="-120"/>
+              </a:rPr>
+              <a:t>驅動程式的同步處理</a:t>
+            </a:r>
+          </a:p>
+        </p:txBody>
+      </p:sp>
+      <p:sp>
+        <p:nvSpPr>
+          <p:cNvPr id="5" name="文字方塊 4"/>
+          <p:cNvSpPr txBox="1"/>
+          <p:nvPr/>
+        </p:nvSpPr>
+        <p:spPr>
+          <a:xfrm>
+            <a:off x="0" y="726851"/>
+            <a:ext cx="11467298" cy="923330"/>
+          </a:xfrm>
+          <a:prstGeom prst="rect">
+            <a:avLst/>
+          </a:prstGeom>
+          <a:noFill/>
+        </p:spPr>
+        <p:txBody>
+          <a:bodyPr wrap="square" rtlCol="0">
+            <a:spAutoFit/>
+          </a:bodyPr>
+          <a:lstStyle/>
+          <a:p>
+            <a:r>
+              <a:rPr lang="en-US" altLang="zh-TW" dirty="0">
+                <a:solidFill>
+                  <a:srgbClr val="000000"/>
+                </a:solidFill>
+                <a:latin typeface="Consolas" panose="020B0609020204030204" pitchFamily="49" charset="0"/>
+              </a:rPr>
+              <a:t>NTSTATUS </a:t>
+            </a:r>
+            <a:r>
+              <a:rPr lang="en-US" altLang="zh-TW" dirty="0" err="1">
+                <a:solidFill>
+                  <a:srgbClr val="007D9A"/>
+                </a:solidFill>
+                <a:latin typeface="Consolas" panose="020B0609020204030204" pitchFamily="49" charset="0"/>
+              </a:rPr>
+              <a:t>ObReferenceObjectByHandle</a:t>
+            </a:r>
+            <a:r>
+              <a:rPr lang="en-US" altLang="zh-TW" dirty="0">
+                <a:solidFill>
+                  <a:srgbClr val="000000"/>
+                </a:solidFill>
+                <a:latin typeface="Consolas" panose="020B0609020204030204" pitchFamily="49" charset="0"/>
+              </a:rPr>
+              <a:t>( HANDLE </a:t>
+            </a:r>
+            <a:r>
+              <a:rPr lang="en-US" altLang="zh-TW" dirty="0" err="1">
+                <a:solidFill>
+                  <a:srgbClr val="000000"/>
+                </a:solidFill>
+                <a:latin typeface="Consolas" panose="020B0609020204030204" pitchFamily="49" charset="0"/>
+              </a:rPr>
+              <a:t>Handle</a:t>
+            </a:r>
+            <a:r>
+              <a:rPr lang="en-US" altLang="zh-TW" dirty="0">
+                <a:solidFill>
+                  <a:srgbClr val="000000"/>
+                </a:solidFill>
+                <a:latin typeface="Consolas" panose="020B0609020204030204" pitchFamily="49" charset="0"/>
+              </a:rPr>
+              <a:t>, ACCESS_MASK </a:t>
+            </a:r>
+            <a:r>
+              <a:rPr lang="en-US" altLang="zh-TW" dirty="0" err="1">
+                <a:solidFill>
+                  <a:srgbClr val="000000"/>
+                </a:solidFill>
+                <a:latin typeface="Consolas" panose="020B0609020204030204" pitchFamily="49" charset="0"/>
+              </a:rPr>
+              <a:t>DesiredAccess</a:t>
+            </a:r>
+            <a:r>
+              <a:rPr lang="en-US" altLang="zh-TW" dirty="0">
+                <a:solidFill>
+                  <a:srgbClr val="000000"/>
+                </a:solidFill>
+                <a:latin typeface="Consolas" panose="020B0609020204030204" pitchFamily="49" charset="0"/>
+              </a:rPr>
+              <a:t>, POBJECT_TYPE </a:t>
+            </a:r>
+            <a:r>
+              <a:rPr lang="en-US" altLang="zh-TW" dirty="0" err="1">
+                <a:solidFill>
+                  <a:srgbClr val="000000"/>
+                </a:solidFill>
+                <a:latin typeface="Consolas" panose="020B0609020204030204" pitchFamily="49" charset="0"/>
+              </a:rPr>
+              <a:t>ObjectType</a:t>
+            </a:r>
+            <a:r>
+              <a:rPr lang="en-US" altLang="zh-TW" dirty="0">
+                <a:solidFill>
+                  <a:srgbClr val="000000"/>
+                </a:solidFill>
+                <a:latin typeface="Consolas" panose="020B0609020204030204" pitchFamily="49" charset="0"/>
+              </a:rPr>
+              <a:t>, KPROCESSOR_MODE </a:t>
+            </a:r>
+            <a:r>
+              <a:rPr lang="en-US" altLang="zh-TW" dirty="0" err="1">
+                <a:solidFill>
+                  <a:srgbClr val="000000"/>
+                </a:solidFill>
+                <a:latin typeface="Consolas" panose="020B0609020204030204" pitchFamily="49" charset="0"/>
+              </a:rPr>
+              <a:t>AccessMode</a:t>
+            </a:r>
+            <a:r>
+              <a:rPr lang="en-US" altLang="zh-TW" dirty="0">
+                <a:solidFill>
+                  <a:srgbClr val="000000"/>
+                </a:solidFill>
+                <a:latin typeface="Consolas" panose="020B0609020204030204" pitchFamily="49" charset="0"/>
+              </a:rPr>
+              <a:t>, PVOID *Object, POBJECT_HANDLE_INFORMATION </a:t>
+            </a:r>
+            <a:r>
+              <a:rPr lang="en-US" altLang="zh-TW" dirty="0" err="1">
+                <a:solidFill>
+                  <a:srgbClr val="000000"/>
+                </a:solidFill>
+                <a:latin typeface="Consolas" panose="020B0609020204030204" pitchFamily="49" charset="0"/>
+              </a:rPr>
+              <a:t>HandleInformation</a:t>
+            </a:r>
+            <a:r>
+              <a:rPr lang="en-US" altLang="zh-TW" dirty="0">
+                <a:solidFill>
+                  <a:srgbClr val="000000"/>
+                </a:solidFill>
+                <a:latin typeface="Consolas" panose="020B0609020204030204" pitchFamily="49" charset="0"/>
+              </a:rPr>
+              <a:t> );</a:t>
+            </a:r>
+            <a:endParaRPr lang="en-US" altLang="zh-TW" b="1" dirty="0" smtClean="0">
+              <a:effectLst>
+                <a:outerShdw blurRad="38100" dist="38100" dir="2700000" algn="tl">
+                  <a:srgbClr val="000000">
+                    <a:alpha val="43137"/>
+                  </a:srgbClr>
+                </a:outerShdw>
+              </a:effectLst>
+              <a:latin typeface="微軟正黑體" panose="020B0604030504040204" pitchFamily="34" charset="-120"/>
+              <a:ea typeface="微軟正黑體" panose="020B0604030504040204" pitchFamily="34" charset="-120"/>
+            </a:endParaRPr>
+          </a:p>
+        </p:txBody>
+      </p:sp>
+      <p:sp>
+        <p:nvSpPr>
+          <p:cNvPr id="4" name="文字方塊 3"/>
+          <p:cNvSpPr txBox="1"/>
+          <p:nvPr/>
+        </p:nvSpPr>
+        <p:spPr>
+          <a:xfrm>
+            <a:off x="0" y="123109"/>
+            <a:ext cx="5124091" cy="461665"/>
+          </a:xfrm>
+          <a:prstGeom prst="rect">
+            <a:avLst/>
+          </a:prstGeom>
+          <a:noFill/>
+        </p:spPr>
+        <p:txBody>
+          <a:bodyPr wrap="square" rtlCol="0">
+            <a:spAutoFit/>
+          </a:bodyPr>
+          <a:lstStyle/>
+          <a:p>
+            <a:r>
+              <a:rPr lang="en-US" altLang="zh-TW" sz="2400" b="1" dirty="0" smtClean="0">
+                <a:effectLst>
+                  <a:outerShdw blurRad="38100" dist="38100" dir="2700000" algn="tl">
+                    <a:srgbClr val="000000">
+                      <a:alpha val="43137"/>
+                    </a:srgbClr>
+                  </a:outerShdw>
+                </a:effectLst>
+                <a:latin typeface="微軟正黑體" panose="020B0604030504040204" pitchFamily="34" charset="-120"/>
+                <a:ea typeface="微軟正黑體" panose="020B0604030504040204" pitchFamily="34" charset="-120"/>
+              </a:rPr>
+              <a:t>Synchronize With Application </a:t>
+            </a:r>
+            <a:endParaRPr lang="zh-TW" altLang="en-US" sz="2400" b="1" dirty="0">
+              <a:effectLst>
+                <a:outerShdw blurRad="38100" dist="38100" dir="2700000" algn="tl">
+                  <a:srgbClr val="000000">
+                    <a:alpha val="43137"/>
+                  </a:srgbClr>
+                </a:outerShdw>
+              </a:effectLst>
+              <a:latin typeface="微軟正黑體" panose="020B0604030504040204" pitchFamily="34" charset="-120"/>
+              <a:ea typeface="微軟正黑體" panose="020B0604030504040204" pitchFamily="34" charset="-120"/>
+            </a:endParaRPr>
+          </a:p>
+        </p:txBody>
+      </p:sp>
+      <p:pic>
+        <p:nvPicPr>
+          <p:cNvPr id="2" name="圖片 1"/>
+          <p:cNvPicPr>
+            <a:picLocks noChangeAspect="1"/>
+          </p:cNvPicPr>
+          <p:nvPr/>
+        </p:nvPicPr>
+        <p:blipFill>
+          <a:blip r:embed="rId3"/>
+          <a:stretch>
+            <a:fillRect/>
+          </a:stretch>
+        </p:blipFill>
+        <p:spPr>
+          <a:xfrm>
+            <a:off x="150732" y="2774731"/>
+            <a:ext cx="5302383" cy="2999262"/>
+          </a:xfrm>
+          <a:prstGeom prst="rect">
+            <a:avLst/>
+          </a:prstGeom>
+          <a:noFill/>
+          <a:ln w="50800">
+            <a:solidFill>
+              <a:schemeClr val="accent4"/>
+            </a:solidFill>
+          </a:ln>
+        </p:spPr>
+      </p:pic>
+      <p:pic>
+        <p:nvPicPr>
+          <p:cNvPr id="3" name="圖片 2"/>
+          <p:cNvPicPr>
+            <a:picLocks noChangeAspect="1"/>
+          </p:cNvPicPr>
+          <p:nvPr/>
+        </p:nvPicPr>
+        <p:blipFill>
+          <a:blip r:embed="rId4"/>
+          <a:stretch>
+            <a:fillRect/>
+          </a:stretch>
+        </p:blipFill>
+        <p:spPr>
+          <a:xfrm>
+            <a:off x="5662614" y="3765690"/>
+            <a:ext cx="6434497" cy="1986817"/>
+          </a:xfrm>
+          <a:prstGeom prst="rect">
+            <a:avLst/>
+          </a:prstGeom>
+          <a:ln w="50800">
+            <a:solidFill>
+              <a:schemeClr val="accent4"/>
+            </a:solidFill>
+          </a:ln>
+        </p:spPr>
+      </p:pic>
+    </p:spTree>
+    <p:extLst>
+      <p:ext uri="{BB962C8B-B14F-4D97-AF65-F5344CB8AC3E}">
+        <p14:creationId xmlns:p14="http://schemas.microsoft.com/office/powerpoint/2010/main" val="4256650866"/>
+      </p:ext>
+    </p:extLst>
+  </p:cSld>
+  <p:clrMapOvr>
+    <a:masterClrMapping/>
+  </p:clrMapOvr>
+  <p:timing>
+    <p:tnLst>
+      <p:par>
+        <p:cTn id="1" dur="indefinite" restart="never" nodeType="tmRoot"/>
+      </p:par>
+    </p:tnLst>
+  </p:timing>
+</p:sld>
+</file>
+
+<file path=ppt/slides/slide84.xml><?xml version="1.0" encoding="utf-8"?>
+<p:sld xmlns:a="http://schemas.openxmlformats.org/drawingml/2006/main" xmlns:r="http://schemas.openxmlformats.org/officeDocument/2006/relationships" xmlns:p="http://schemas.openxmlformats.org/presentationml/2006/main">
+  <p:cSld>
+    <p:spTree>
+      <p:nvGrpSpPr>
+        <p:cNvPr id="1" name=""/>
+        <p:cNvGrpSpPr/>
+        <p:nvPr/>
+      </p:nvGrpSpPr>
+      <p:grpSpPr>
+        <a:xfrm>
+          <a:off x="0" y="0"/>
+          <a:ext cx="0" cy="0"/>
+          <a:chOff x="0" y="0"/>
+          <a:chExt cx="0" cy="0"/>
+        </a:xfrm>
+      </p:grpSpPr>
+      <p:sp>
+        <p:nvSpPr>
+          <p:cNvPr id="2" name="標題 1"/>
+          <p:cNvSpPr>
+            <a:spLocks noGrp="1"/>
+          </p:cNvSpPr>
+          <p:nvPr>
+            <p:ph type="title"/>
+          </p:nvPr>
+        </p:nvSpPr>
+        <p:spPr>
+          <a:xfrm>
+            <a:off x="5115463" y="2766218"/>
+            <a:ext cx="2130725" cy="1325563"/>
+          </a:xfrm>
+        </p:spPr>
+        <p:txBody>
+          <a:bodyPr>
+            <a:normAutofit/>
+          </a:bodyPr>
+          <a:lstStyle/>
+          <a:p>
+            <a:r>
+              <a:rPr lang="zh-TW" altLang="en-US" b="1" dirty="0" smtClean="0">
+                <a:effectLst>
+                  <a:outerShdw blurRad="38100" dist="38100" dir="2700000" algn="tl">
+                    <a:srgbClr val="000000">
+                      <a:alpha val="43137"/>
+                    </a:srgbClr>
+                  </a:outerShdw>
+                </a:effectLst>
+                <a:latin typeface="微軟正黑體" panose="020B0604030504040204" pitchFamily="34" charset="-120"/>
+                <a:ea typeface="微軟正黑體" panose="020B0604030504040204" pitchFamily="34" charset="-120"/>
+              </a:rPr>
+              <a:t>計時器</a:t>
+            </a:r>
+            <a:endParaRPr lang="en-US" altLang="zh-TW" b="1" dirty="0">
+              <a:effectLst>
+                <a:outerShdw blurRad="38100" dist="38100" dir="2700000" algn="tl">
+                  <a:srgbClr val="000000">
+                    <a:alpha val="43137"/>
+                  </a:srgbClr>
+                </a:outerShdw>
+              </a:effectLst>
+              <a:latin typeface="微軟正黑體" panose="020B0604030504040204" pitchFamily="34" charset="-120"/>
+              <a:ea typeface="微軟正黑體" panose="020B0604030504040204" pitchFamily="34" charset="-120"/>
+            </a:endParaRPr>
+          </a:p>
+        </p:txBody>
+      </p:sp>
+    </p:spTree>
+    <p:extLst>
+      <p:ext uri="{BB962C8B-B14F-4D97-AF65-F5344CB8AC3E}">
+        <p14:creationId xmlns:p14="http://schemas.microsoft.com/office/powerpoint/2010/main" val="1210871230"/>
+      </p:ext>
+    </p:extLst>
+  </p:cSld>
+  <p:clrMapOvr>
+    <a:masterClrMapping/>
+  </p:clrMapOvr>
+  <p:timing>
+    <p:tnLst>
+      <p:par>
+        <p:cTn id="1" dur="indefinite" restart="never" nodeType="tmRoot"/>
+      </p:par>
+    </p:tnLst>
+  </p:timing>
+</p:sld>
+</file>
+
+<file path=ppt/slides/slide85.xml><?xml version="1.0" encoding="utf-8"?>
+<p:sld xmlns:a="http://schemas.openxmlformats.org/drawingml/2006/main" xmlns:r="http://schemas.openxmlformats.org/officeDocument/2006/relationships" xmlns:p="http://schemas.openxmlformats.org/presentationml/2006/main">
+  <p:cSld>
+    <p:spTree>
+      <p:nvGrpSpPr>
+        <p:cNvPr id="1" name=""/>
+        <p:cNvGrpSpPr/>
+        <p:nvPr/>
+      </p:nvGrpSpPr>
+      <p:grpSpPr>
+        <a:xfrm>
+          <a:off x="0" y="0"/>
+          <a:ext cx="0" cy="0"/>
+          <a:chOff x="0" y="0"/>
+          <a:chExt cx="0" cy="0"/>
+        </a:xfrm>
+      </p:grpSpPr>
+      <p:sp>
+        <p:nvSpPr>
+          <p:cNvPr id="8" name="文字方塊 7"/>
+          <p:cNvSpPr txBox="1"/>
+          <p:nvPr/>
+        </p:nvSpPr>
+        <p:spPr>
+          <a:xfrm>
+            <a:off x="10869283" y="6334780"/>
+            <a:ext cx="1322717" cy="523220"/>
+          </a:xfrm>
+          <a:prstGeom prst="rect">
+            <a:avLst/>
+          </a:prstGeom>
+          <a:noFill/>
+        </p:spPr>
+        <p:txBody>
+          <a:bodyPr wrap="square" rtlCol="0">
+            <a:spAutoFit/>
+          </a:bodyPr>
+          <a:lstStyle/>
+          <a:p>
+            <a:r>
+              <a:rPr lang="zh-TW" altLang="en-US" sz="2800" b="1" dirty="0" smtClean="0">
+                <a:effectLst>
+                  <a:outerShdw blurRad="38100" dist="38100" dir="2700000" algn="tl">
+                    <a:srgbClr val="000000">
+                      <a:alpha val="43137"/>
+                    </a:srgbClr>
+                  </a:outerShdw>
+                </a:effectLst>
+                <a:latin typeface="微軟正黑體" panose="020B0604030504040204" pitchFamily="34" charset="-120"/>
+                <a:ea typeface="微軟正黑體" panose="020B0604030504040204" pitchFamily="34" charset="-120"/>
+              </a:rPr>
+              <a:t>計時器</a:t>
+            </a:r>
+            <a:endParaRPr lang="zh-TW" altLang="en-US" sz="2800" b="1" dirty="0">
+              <a:effectLst>
+                <a:outerShdw blurRad="38100" dist="38100" dir="2700000" algn="tl">
+                  <a:srgbClr val="000000">
+                    <a:alpha val="43137"/>
+                  </a:srgbClr>
+                </a:outerShdw>
+              </a:effectLst>
+              <a:latin typeface="微軟正黑體" panose="020B0604030504040204" pitchFamily="34" charset="-120"/>
+              <a:ea typeface="微軟正黑體" panose="020B0604030504040204" pitchFamily="34" charset="-120"/>
+            </a:endParaRPr>
+          </a:p>
+        </p:txBody>
+      </p:sp>
+      <p:sp>
+        <p:nvSpPr>
+          <p:cNvPr id="5" name="文字方塊 4"/>
+          <p:cNvSpPr txBox="1"/>
+          <p:nvPr/>
+        </p:nvSpPr>
+        <p:spPr>
+          <a:xfrm>
+            <a:off x="0" y="640585"/>
+            <a:ext cx="11467298" cy="4770537"/>
+          </a:xfrm>
+          <a:prstGeom prst="rect">
+            <a:avLst/>
+          </a:prstGeom>
+          <a:noFill/>
+        </p:spPr>
+        <p:txBody>
+          <a:bodyPr wrap="square" rtlCol="0">
+            <a:spAutoFit/>
+          </a:bodyPr>
+          <a:lstStyle/>
+          <a:p>
+            <a:r>
+              <a:rPr lang="en-US" altLang="zh-TW" sz="1600" dirty="0">
+                <a:solidFill>
+                  <a:srgbClr val="000000"/>
+                </a:solidFill>
+                <a:latin typeface="Consolas" panose="020B0609020204030204" pitchFamily="49" charset="0"/>
+              </a:rPr>
+              <a:t>NTSTATUS </a:t>
+            </a:r>
+            <a:r>
+              <a:rPr lang="en-US" altLang="zh-TW" sz="1600" dirty="0" err="1">
+                <a:solidFill>
+                  <a:srgbClr val="007D9A"/>
+                </a:solidFill>
+                <a:latin typeface="Consolas" panose="020B0609020204030204" pitchFamily="49" charset="0"/>
+              </a:rPr>
+              <a:t>IoInitializeTimer</a:t>
+            </a:r>
+            <a:r>
+              <a:rPr lang="en-US" altLang="zh-TW" sz="1600" dirty="0">
+                <a:solidFill>
+                  <a:srgbClr val="000000"/>
+                </a:solidFill>
+                <a:latin typeface="Consolas" panose="020B0609020204030204" pitchFamily="49" charset="0"/>
+              </a:rPr>
+              <a:t>( PDEVICE_OBJECT </a:t>
+            </a:r>
+            <a:r>
+              <a:rPr lang="en-US" altLang="zh-TW" sz="1600" dirty="0" err="1">
+                <a:solidFill>
+                  <a:srgbClr val="000000"/>
+                </a:solidFill>
+                <a:latin typeface="Consolas" panose="020B0609020204030204" pitchFamily="49" charset="0"/>
+              </a:rPr>
+              <a:t>DeviceObject</a:t>
+            </a:r>
+            <a:r>
+              <a:rPr lang="en-US" altLang="zh-TW" sz="1600" dirty="0">
+                <a:solidFill>
+                  <a:srgbClr val="000000"/>
+                </a:solidFill>
+                <a:latin typeface="Consolas" panose="020B0609020204030204" pitchFamily="49" charset="0"/>
+              </a:rPr>
+              <a:t>, PIO_TIMER_ROUTINE </a:t>
+            </a:r>
+            <a:r>
+              <a:rPr lang="en-US" altLang="zh-TW" sz="1600" dirty="0" err="1">
+                <a:solidFill>
+                  <a:srgbClr val="000000"/>
+                </a:solidFill>
+                <a:latin typeface="Consolas" panose="020B0609020204030204" pitchFamily="49" charset="0"/>
+              </a:rPr>
+              <a:t>TimerRoutine</a:t>
+            </a:r>
+            <a:r>
+              <a:rPr lang="en-US" altLang="zh-TW" sz="1600" dirty="0">
+                <a:solidFill>
+                  <a:srgbClr val="000000"/>
+                </a:solidFill>
+                <a:latin typeface="Consolas" panose="020B0609020204030204" pitchFamily="49" charset="0"/>
+              </a:rPr>
+              <a:t>, __</a:t>
+            </a:r>
+            <a:r>
+              <a:rPr lang="en-US" altLang="zh-TW" sz="1600" dirty="0" err="1">
+                <a:solidFill>
+                  <a:srgbClr val="000000"/>
+                </a:solidFill>
+                <a:latin typeface="Consolas" panose="020B0609020204030204" pitchFamily="49" charset="0"/>
+              </a:rPr>
+              <a:t>drv_aliasesMem</a:t>
+            </a:r>
+            <a:r>
+              <a:rPr lang="en-US" altLang="zh-TW" sz="1600" dirty="0">
+                <a:solidFill>
+                  <a:srgbClr val="000000"/>
+                </a:solidFill>
+                <a:latin typeface="Consolas" panose="020B0609020204030204" pitchFamily="49" charset="0"/>
+              </a:rPr>
+              <a:t> PVOID Context </a:t>
+            </a:r>
+            <a:r>
+              <a:rPr lang="en-US" altLang="zh-TW" sz="1600" dirty="0" smtClean="0">
+                <a:solidFill>
+                  <a:srgbClr val="000000"/>
+                </a:solidFill>
+                <a:latin typeface="Consolas" panose="020B0609020204030204" pitchFamily="49" charset="0"/>
+              </a:rPr>
+              <a:t>);</a:t>
+            </a:r>
+          </a:p>
+          <a:p>
+            <a:r>
+              <a:rPr lang="en-US" altLang="zh-TW" sz="1600" dirty="0">
+                <a:solidFill>
+                  <a:srgbClr val="0101FD"/>
+                </a:solidFill>
+                <a:latin typeface="Consolas" panose="020B0609020204030204" pitchFamily="49" charset="0"/>
+              </a:rPr>
+              <a:t>void</a:t>
+            </a:r>
+            <a:r>
+              <a:rPr lang="en-US" altLang="zh-TW" sz="1600" dirty="0">
+                <a:solidFill>
+                  <a:srgbClr val="000000"/>
+                </a:solidFill>
+                <a:latin typeface="Consolas" panose="020B0609020204030204" pitchFamily="49" charset="0"/>
+              </a:rPr>
+              <a:t> </a:t>
+            </a:r>
+            <a:r>
+              <a:rPr lang="en-US" altLang="zh-TW" sz="1600" dirty="0" err="1">
+                <a:solidFill>
+                  <a:srgbClr val="007D9A"/>
+                </a:solidFill>
+                <a:latin typeface="Consolas" panose="020B0609020204030204" pitchFamily="49" charset="0"/>
+              </a:rPr>
+              <a:t>IoStartTimer</a:t>
+            </a:r>
+            <a:r>
+              <a:rPr lang="en-US" altLang="zh-TW" sz="1600" dirty="0">
+                <a:solidFill>
+                  <a:srgbClr val="000000"/>
+                </a:solidFill>
+                <a:latin typeface="Consolas" panose="020B0609020204030204" pitchFamily="49" charset="0"/>
+              </a:rPr>
+              <a:t>( PDEVICE_OBJECT </a:t>
+            </a:r>
+            <a:r>
+              <a:rPr lang="en-US" altLang="zh-TW" sz="1600" dirty="0" err="1">
+                <a:solidFill>
+                  <a:srgbClr val="000000"/>
+                </a:solidFill>
+                <a:latin typeface="Consolas" panose="020B0609020204030204" pitchFamily="49" charset="0"/>
+              </a:rPr>
+              <a:t>DeviceObject</a:t>
+            </a:r>
+            <a:r>
+              <a:rPr lang="en-US" altLang="zh-TW" sz="1600" dirty="0">
+                <a:solidFill>
+                  <a:srgbClr val="000000"/>
+                </a:solidFill>
+                <a:latin typeface="Consolas" panose="020B0609020204030204" pitchFamily="49" charset="0"/>
+              </a:rPr>
+              <a:t> </a:t>
+            </a:r>
+            <a:r>
+              <a:rPr lang="en-US" altLang="zh-TW" sz="1600" dirty="0" smtClean="0">
+                <a:solidFill>
+                  <a:srgbClr val="000000"/>
+                </a:solidFill>
+                <a:latin typeface="Consolas" panose="020B0609020204030204" pitchFamily="49" charset="0"/>
+              </a:rPr>
+              <a:t>);</a:t>
+            </a:r>
+          </a:p>
+          <a:p>
+            <a:r>
+              <a:rPr lang="en-US" altLang="zh-TW" sz="1600" dirty="0">
+                <a:solidFill>
+                  <a:srgbClr val="0101FD"/>
+                </a:solidFill>
+                <a:latin typeface="Consolas" panose="020B0609020204030204" pitchFamily="49" charset="0"/>
+              </a:rPr>
+              <a:t>void</a:t>
+            </a:r>
+            <a:r>
+              <a:rPr lang="en-US" altLang="zh-TW" sz="1600" dirty="0">
+                <a:solidFill>
+                  <a:srgbClr val="000000"/>
+                </a:solidFill>
+                <a:latin typeface="Consolas" panose="020B0609020204030204" pitchFamily="49" charset="0"/>
+              </a:rPr>
+              <a:t> </a:t>
+            </a:r>
+            <a:r>
+              <a:rPr lang="en-US" altLang="zh-TW" sz="1600" dirty="0" err="1">
+                <a:solidFill>
+                  <a:srgbClr val="007D9A"/>
+                </a:solidFill>
+                <a:latin typeface="Consolas" panose="020B0609020204030204" pitchFamily="49" charset="0"/>
+              </a:rPr>
+              <a:t>IoStopTimer</a:t>
+            </a:r>
+            <a:r>
+              <a:rPr lang="en-US" altLang="zh-TW" sz="1600" dirty="0">
+                <a:solidFill>
+                  <a:srgbClr val="000000"/>
+                </a:solidFill>
+                <a:latin typeface="Consolas" panose="020B0609020204030204" pitchFamily="49" charset="0"/>
+              </a:rPr>
+              <a:t>( PDEVICE_OBJECT </a:t>
+            </a:r>
+            <a:r>
+              <a:rPr lang="en-US" altLang="zh-TW" sz="1600" dirty="0" err="1">
+                <a:solidFill>
+                  <a:srgbClr val="000000"/>
+                </a:solidFill>
+                <a:latin typeface="Consolas" panose="020B0609020204030204" pitchFamily="49" charset="0"/>
+              </a:rPr>
+              <a:t>DeviceObject</a:t>
+            </a:r>
+            <a:r>
+              <a:rPr lang="en-US" altLang="zh-TW" sz="1600" dirty="0">
+                <a:solidFill>
+                  <a:srgbClr val="000000"/>
+                </a:solidFill>
+                <a:latin typeface="Consolas" panose="020B0609020204030204" pitchFamily="49" charset="0"/>
+              </a:rPr>
+              <a:t> </a:t>
+            </a:r>
+            <a:r>
+              <a:rPr lang="en-US" altLang="zh-TW" sz="1600" dirty="0" smtClean="0">
+                <a:solidFill>
+                  <a:srgbClr val="000000"/>
+                </a:solidFill>
+                <a:latin typeface="Consolas" panose="020B0609020204030204" pitchFamily="49" charset="0"/>
+              </a:rPr>
+              <a:t>);</a:t>
+            </a:r>
+          </a:p>
+          <a:p>
+            <a:endParaRPr lang="en-US" altLang="zh-TW" sz="1600" b="1" dirty="0">
+              <a:solidFill>
+                <a:srgbClr val="000000"/>
+              </a:solidFill>
+              <a:effectLst>
+                <a:outerShdw blurRad="38100" dist="38100" dir="2700000" algn="tl">
+                  <a:srgbClr val="000000">
+                    <a:alpha val="43137"/>
+                  </a:srgbClr>
+                </a:outerShdw>
+              </a:effectLst>
+              <a:latin typeface="Consolas" panose="020B0609020204030204" pitchFamily="49" charset="0"/>
+              <a:ea typeface="微軟正黑體" panose="020B0604030504040204" pitchFamily="34" charset="-120"/>
+            </a:endParaRPr>
+          </a:p>
+          <a:p>
+            <a:endParaRPr lang="en-US" altLang="zh-TW" sz="1600" b="1" dirty="0">
+              <a:solidFill>
+                <a:srgbClr val="000000"/>
+              </a:solidFill>
+              <a:effectLst>
+                <a:outerShdw blurRad="38100" dist="38100" dir="2700000" algn="tl">
+                  <a:srgbClr val="000000">
+                    <a:alpha val="43137"/>
+                  </a:srgbClr>
+                </a:outerShdw>
+              </a:effectLst>
+              <a:latin typeface="Consolas" panose="020B0609020204030204" pitchFamily="49" charset="0"/>
+              <a:ea typeface="微軟正黑體" panose="020B0604030504040204" pitchFamily="34" charset="-120"/>
+            </a:endParaRPr>
+          </a:p>
+          <a:p>
+            <a:r>
+              <a:rPr lang="en-US" altLang="zh-TW" sz="1600" dirty="0">
+                <a:solidFill>
+                  <a:srgbClr val="0101FD"/>
+                </a:solidFill>
+                <a:latin typeface="Consolas" panose="020B0609020204030204" pitchFamily="49" charset="0"/>
+              </a:rPr>
+              <a:t>void</a:t>
+            </a:r>
+            <a:r>
+              <a:rPr lang="en-US" altLang="zh-TW" sz="1600" dirty="0">
+                <a:solidFill>
+                  <a:srgbClr val="000000"/>
+                </a:solidFill>
+                <a:latin typeface="Consolas" panose="020B0609020204030204" pitchFamily="49" charset="0"/>
+              </a:rPr>
+              <a:t> </a:t>
+            </a:r>
+            <a:r>
+              <a:rPr lang="en-US" altLang="zh-TW" sz="1600" dirty="0" err="1">
+                <a:solidFill>
+                  <a:srgbClr val="007D9A"/>
+                </a:solidFill>
+                <a:latin typeface="Consolas" panose="020B0609020204030204" pitchFamily="49" charset="0"/>
+              </a:rPr>
+              <a:t>KeInitializeTimer</a:t>
+            </a:r>
+            <a:r>
+              <a:rPr lang="en-US" altLang="zh-TW" sz="1600" dirty="0">
+                <a:solidFill>
+                  <a:srgbClr val="000000"/>
+                </a:solidFill>
+                <a:latin typeface="Consolas" panose="020B0609020204030204" pitchFamily="49" charset="0"/>
+              </a:rPr>
+              <a:t>( PKTIMER Timer </a:t>
+            </a:r>
+            <a:r>
+              <a:rPr lang="en-US" altLang="zh-TW" sz="1600" dirty="0" smtClean="0">
+                <a:solidFill>
+                  <a:srgbClr val="000000"/>
+                </a:solidFill>
+                <a:latin typeface="Consolas" panose="020B0609020204030204" pitchFamily="49" charset="0"/>
+              </a:rPr>
+              <a:t>);</a:t>
+            </a:r>
+          </a:p>
+          <a:p>
+            <a:r>
+              <a:rPr lang="en-US" altLang="zh-TW" sz="1600" dirty="0">
+                <a:solidFill>
+                  <a:srgbClr val="0101FD"/>
+                </a:solidFill>
+                <a:latin typeface="Consolas" panose="020B0609020204030204" pitchFamily="49" charset="0"/>
+              </a:rPr>
+              <a:t>void</a:t>
+            </a:r>
+            <a:r>
+              <a:rPr lang="en-US" altLang="zh-TW" sz="1600" dirty="0">
+                <a:solidFill>
+                  <a:srgbClr val="000000"/>
+                </a:solidFill>
+                <a:latin typeface="Consolas" panose="020B0609020204030204" pitchFamily="49" charset="0"/>
+              </a:rPr>
+              <a:t> </a:t>
+            </a:r>
+            <a:r>
+              <a:rPr lang="en-US" altLang="zh-TW" sz="1600" dirty="0" err="1">
+                <a:solidFill>
+                  <a:srgbClr val="007D9A"/>
+                </a:solidFill>
+                <a:latin typeface="Consolas" panose="020B0609020204030204" pitchFamily="49" charset="0"/>
+              </a:rPr>
+              <a:t>KeInitializeDpc</a:t>
+            </a:r>
+            <a:r>
+              <a:rPr lang="en-US" altLang="zh-TW" sz="1600" dirty="0">
+                <a:solidFill>
+                  <a:srgbClr val="000000"/>
+                </a:solidFill>
+                <a:latin typeface="Consolas" panose="020B0609020204030204" pitchFamily="49" charset="0"/>
+              </a:rPr>
+              <a:t>( __</a:t>
+            </a:r>
+            <a:r>
+              <a:rPr lang="en-US" altLang="zh-TW" sz="1600" dirty="0" err="1">
+                <a:solidFill>
+                  <a:srgbClr val="000000"/>
+                </a:solidFill>
+                <a:latin typeface="Consolas" panose="020B0609020204030204" pitchFamily="49" charset="0"/>
+              </a:rPr>
+              <a:t>drv_aliasesMem</a:t>
+            </a:r>
+            <a:r>
+              <a:rPr lang="en-US" altLang="zh-TW" sz="1600" dirty="0">
+                <a:solidFill>
+                  <a:srgbClr val="000000"/>
+                </a:solidFill>
+                <a:latin typeface="Consolas" panose="020B0609020204030204" pitchFamily="49" charset="0"/>
+              </a:rPr>
+              <a:t> PRKDPC </a:t>
+            </a:r>
+            <a:r>
+              <a:rPr lang="en-US" altLang="zh-TW" sz="1600" dirty="0" err="1">
+                <a:solidFill>
+                  <a:srgbClr val="000000"/>
+                </a:solidFill>
+                <a:latin typeface="Consolas" panose="020B0609020204030204" pitchFamily="49" charset="0"/>
+              </a:rPr>
+              <a:t>Dpc</a:t>
+            </a:r>
+            <a:r>
+              <a:rPr lang="en-US" altLang="zh-TW" sz="1600" dirty="0">
+                <a:solidFill>
+                  <a:srgbClr val="000000"/>
+                </a:solidFill>
+                <a:latin typeface="Consolas" panose="020B0609020204030204" pitchFamily="49" charset="0"/>
+              </a:rPr>
+              <a:t>, PKDEFERRED_ROUTINE </a:t>
+            </a:r>
+            <a:r>
+              <a:rPr lang="en-US" altLang="zh-TW" sz="1600" dirty="0" err="1">
+                <a:solidFill>
+                  <a:srgbClr val="000000"/>
+                </a:solidFill>
+                <a:latin typeface="Consolas" panose="020B0609020204030204" pitchFamily="49" charset="0"/>
+              </a:rPr>
+              <a:t>DeferredRoutine</a:t>
+            </a:r>
+            <a:r>
+              <a:rPr lang="en-US" altLang="zh-TW" sz="1600" dirty="0">
+                <a:solidFill>
+                  <a:srgbClr val="000000"/>
+                </a:solidFill>
+                <a:latin typeface="Consolas" panose="020B0609020204030204" pitchFamily="49" charset="0"/>
+              </a:rPr>
+              <a:t>, __</a:t>
+            </a:r>
+            <a:r>
+              <a:rPr lang="en-US" altLang="zh-TW" sz="1600" dirty="0" err="1">
+                <a:solidFill>
+                  <a:srgbClr val="000000"/>
+                </a:solidFill>
+                <a:latin typeface="Consolas" panose="020B0609020204030204" pitchFamily="49" charset="0"/>
+              </a:rPr>
+              <a:t>drv_aliasesMem</a:t>
+            </a:r>
+            <a:r>
+              <a:rPr lang="en-US" altLang="zh-TW" sz="1600" dirty="0">
+                <a:solidFill>
+                  <a:srgbClr val="000000"/>
+                </a:solidFill>
+                <a:latin typeface="Consolas" panose="020B0609020204030204" pitchFamily="49" charset="0"/>
+              </a:rPr>
+              <a:t> PVOID </a:t>
+            </a:r>
+            <a:r>
+              <a:rPr lang="en-US" altLang="zh-TW" sz="1600" dirty="0" err="1">
+                <a:solidFill>
+                  <a:srgbClr val="000000"/>
+                </a:solidFill>
+                <a:latin typeface="Consolas" panose="020B0609020204030204" pitchFamily="49" charset="0"/>
+              </a:rPr>
+              <a:t>DeferredContext</a:t>
+            </a:r>
+            <a:r>
+              <a:rPr lang="en-US" altLang="zh-TW" sz="1600" dirty="0">
+                <a:solidFill>
+                  <a:srgbClr val="000000"/>
+                </a:solidFill>
+                <a:latin typeface="Consolas" panose="020B0609020204030204" pitchFamily="49" charset="0"/>
+              </a:rPr>
+              <a:t> );</a:t>
+            </a:r>
+            <a:endParaRPr lang="en-US" altLang="zh-TW" sz="1600" dirty="0" smtClean="0">
+              <a:solidFill>
+                <a:srgbClr val="000000"/>
+              </a:solidFill>
+              <a:latin typeface="Consolas" panose="020B0609020204030204" pitchFamily="49" charset="0"/>
+            </a:endParaRPr>
+          </a:p>
+          <a:p>
+            <a:r>
+              <a:rPr lang="en-US" altLang="zh-TW" sz="1600" dirty="0">
+                <a:solidFill>
+                  <a:srgbClr val="000000"/>
+                </a:solidFill>
+                <a:latin typeface="Consolas" panose="020B0609020204030204" pitchFamily="49" charset="0"/>
+              </a:rPr>
+              <a:t>BOOLEAN </a:t>
+            </a:r>
+            <a:r>
+              <a:rPr lang="en-US" altLang="zh-TW" sz="1600" dirty="0" err="1">
+                <a:solidFill>
+                  <a:srgbClr val="007D9A"/>
+                </a:solidFill>
+                <a:latin typeface="Consolas" panose="020B0609020204030204" pitchFamily="49" charset="0"/>
+              </a:rPr>
+              <a:t>KeSetTimer</a:t>
+            </a:r>
+            <a:r>
+              <a:rPr lang="en-US" altLang="zh-TW" sz="1600" dirty="0">
+                <a:solidFill>
+                  <a:srgbClr val="000000"/>
+                </a:solidFill>
+                <a:latin typeface="Consolas" panose="020B0609020204030204" pitchFamily="49" charset="0"/>
+              </a:rPr>
+              <a:t>( PKTIMER Timer, LARGE_INTEGER </a:t>
+            </a:r>
+            <a:r>
+              <a:rPr lang="en-US" altLang="zh-TW" sz="1600" dirty="0" err="1">
+                <a:solidFill>
+                  <a:srgbClr val="000000"/>
+                </a:solidFill>
+                <a:latin typeface="Consolas" panose="020B0609020204030204" pitchFamily="49" charset="0"/>
+              </a:rPr>
+              <a:t>DueTime</a:t>
+            </a:r>
+            <a:r>
+              <a:rPr lang="en-US" altLang="zh-TW" sz="1600" dirty="0">
+                <a:solidFill>
+                  <a:srgbClr val="000000"/>
+                </a:solidFill>
+                <a:latin typeface="Consolas" panose="020B0609020204030204" pitchFamily="49" charset="0"/>
+              </a:rPr>
+              <a:t>, PKDPC </a:t>
+            </a:r>
+            <a:r>
+              <a:rPr lang="en-US" altLang="zh-TW" sz="1600" dirty="0" err="1">
+                <a:solidFill>
+                  <a:srgbClr val="000000"/>
+                </a:solidFill>
+                <a:latin typeface="Consolas" panose="020B0609020204030204" pitchFamily="49" charset="0"/>
+              </a:rPr>
+              <a:t>Dpc</a:t>
+            </a:r>
+            <a:r>
+              <a:rPr lang="en-US" altLang="zh-TW" sz="1600" dirty="0">
+                <a:solidFill>
+                  <a:srgbClr val="000000"/>
+                </a:solidFill>
+                <a:latin typeface="Consolas" panose="020B0609020204030204" pitchFamily="49" charset="0"/>
+              </a:rPr>
+              <a:t> </a:t>
+            </a:r>
+            <a:r>
+              <a:rPr lang="en-US" altLang="zh-TW" sz="1600" dirty="0" smtClean="0">
+                <a:solidFill>
+                  <a:srgbClr val="000000"/>
+                </a:solidFill>
+                <a:latin typeface="Consolas" panose="020B0609020204030204" pitchFamily="49" charset="0"/>
+              </a:rPr>
+              <a:t>);</a:t>
+            </a:r>
+          </a:p>
+          <a:p>
+            <a:r>
+              <a:rPr lang="en-US" altLang="zh-TW" sz="1600" dirty="0">
+                <a:solidFill>
+                  <a:srgbClr val="000000"/>
+                </a:solidFill>
+                <a:latin typeface="Consolas" panose="020B0609020204030204" pitchFamily="49" charset="0"/>
+              </a:rPr>
+              <a:t>BOOLEAN </a:t>
+            </a:r>
+            <a:r>
+              <a:rPr lang="en-US" altLang="zh-TW" sz="1600" dirty="0" err="1">
+                <a:solidFill>
+                  <a:srgbClr val="007D9A"/>
+                </a:solidFill>
+                <a:latin typeface="Consolas" panose="020B0609020204030204" pitchFamily="49" charset="0"/>
+              </a:rPr>
+              <a:t>KeSetTimerEx</a:t>
+            </a:r>
+            <a:r>
+              <a:rPr lang="en-US" altLang="zh-TW" sz="1600" dirty="0">
+                <a:solidFill>
+                  <a:srgbClr val="000000"/>
+                </a:solidFill>
+                <a:latin typeface="Consolas" panose="020B0609020204030204" pitchFamily="49" charset="0"/>
+              </a:rPr>
+              <a:t>( PKTIMER Timer, LARGE_INTEGER </a:t>
+            </a:r>
+            <a:r>
+              <a:rPr lang="en-US" altLang="zh-TW" sz="1600" dirty="0" err="1">
+                <a:solidFill>
+                  <a:srgbClr val="000000"/>
+                </a:solidFill>
+                <a:latin typeface="Consolas" panose="020B0609020204030204" pitchFamily="49" charset="0"/>
+              </a:rPr>
+              <a:t>DueTime</a:t>
+            </a:r>
+            <a:r>
+              <a:rPr lang="en-US" altLang="zh-TW" sz="1600" dirty="0">
+                <a:solidFill>
+                  <a:srgbClr val="000000"/>
+                </a:solidFill>
+                <a:latin typeface="Consolas" panose="020B0609020204030204" pitchFamily="49" charset="0"/>
+              </a:rPr>
+              <a:t>, LONG Period, PKDPC </a:t>
+            </a:r>
+            <a:r>
+              <a:rPr lang="en-US" altLang="zh-TW" sz="1600" dirty="0" err="1">
+                <a:solidFill>
+                  <a:srgbClr val="000000"/>
+                </a:solidFill>
+                <a:latin typeface="Consolas" panose="020B0609020204030204" pitchFamily="49" charset="0"/>
+              </a:rPr>
+              <a:t>Dpc</a:t>
+            </a:r>
+            <a:r>
+              <a:rPr lang="en-US" altLang="zh-TW" sz="1600" dirty="0">
+                <a:solidFill>
+                  <a:srgbClr val="000000"/>
+                </a:solidFill>
+                <a:latin typeface="Consolas" panose="020B0609020204030204" pitchFamily="49" charset="0"/>
+              </a:rPr>
+              <a:t> </a:t>
+            </a:r>
+            <a:r>
+              <a:rPr lang="en-US" altLang="zh-TW" sz="1600" dirty="0" smtClean="0">
+                <a:solidFill>
+                  <a:srgbClr val="000000"/>
+                </a:solidFill>
+                <a:latin typeface="Consolas" panose="020B0609020204030204" pitchFamily="49" charset="0"/>
+              </a:rPr>
+              <a:t>);</a:t>
+            </a:r>
+          </a:p>
+          <a:p>
+            <a:r>
+              <a:rPr lang="en-US" altLang="zh-TW" sz="1600" dirty="0">
+                <a:solidFill>
+                  <a:srgbClr val="000000"/>
+                </a:solidFill>
+                <a:latin typeface="Consolas" panose="020B0609020204030204" pitchFamily="49" charset="0"/>
+              </a:rPr>
+              <a:t>BOOLEAN </a:t>
+            </a:r>
+            <a:r>
+              <a:rPr lang="en-US" altLang="zh-TW" sz="1600" dirty="0" err="1">
+                <a:solidFill>
+                  <a:srgbClr val="007D9A"/>
+                </a:solidFill>
+                <a:latin typeface="Consolas" panose="020B0609020204030204" pitchFamily="49" charset="0"/>
+              </a:rPr>
+              <a:t>KeCancelTimer</a:t>
+            </a:r>
+            <a:r>
+              <a:rPr lang="en-US" altLang="zh-TW" sz="1600" dirty="0">
+                <a:solidFill>
+                  <a:srgbClr val="000000"/>
+                </a:solidFill>
+                <a:latin typeface="Consolas" panose="020B0609020204030204" pitchFamily="49" charset="0"/>
+              </a:rPr>
+              <a:t>( PKTIMER Arg1 </a:t>
+            </a:r>
+            <a:r>
+              <a:rPr lang="en-US" altLang="zh-TW" sz="1600" dirty="0" smtClean="0">
+                <a:solidFill>
+                  <a:srgbClr val="000000"/>
+                </a:solidFill>
+                <a:latin typeface="Consolas" panose="020B0609020204030204" pitchFamily="49" charset="0"/>
+              </a:rPr>
+              <a:t>);</a:t>
+            </a:r>
+          </a:p>
+          <a:p>
+            <a:r>
+              <a:rPr lang="en-US" altLang="zh-TW" sz="1600" dirty="0">
+                <a:solidFill>
+                  <a:srgbClr val="0101FD"/>
+                </a:solidFill>
+                <a:latin typeface="Consolas" panose="020B0609020204030204" pitchFamily="49" charset="0"/>
+              </a:rPr>
+              <a:t>void</a:t>
+            </a:r>
+            <a:r>
+              <a:rPr lang="en-US" altLang="zh-TW" sz="1600" dirty="0">
+                <a:solidFill>
+                  <a:srgbClr val="000000"/>
+                </a:solidFill>
+                <a:latin typeface="Consolas" panose="020B0609020204030204" pitchFamily="49" charset="0"/>
+              </a:rPr>
+              <a:t> </a:t>
+            </a:r>
+            <a:r>
+              <a:rPr lang="en-US" altLang="zh-TW" sz="1600" dirty="0" err="1">
+                <a:solidFill>
+                  <a:srgbClr val="007D9A"/>
+                </a:solidFill>
+                <a:latin typeface="Consolas" panose="020B0609020204030204" pitchFamily="49" charset="0"/>
+              </a:rPr>
+              <a:t>KeFlushQueuedDpcs</a:t>
+            </a:r>
+            <a:r>
+              <a:rPr lang="en-US" altLang="zh-TW" sz="1600" dirty="0">
+                <a:solidFill>
+                  <a:srgbClr val="000000"/>
+                </a:solidFill>
+                <a:latin typeface="Consolas" panose="020B0609020204030204" pitchFamily="49" charset="0"/>
+              </a:rPr>
+              <a:t>( </a:t>
+            </a:r>
+            <a:r>
+              <a:rPr lang="en-US" altLang="zh-TW" sz="1600" dirty="0" smtClean="0">
+                <a:solidFill>
+                  <a:srgbClr val="000000"/>
+                </a:solidFill>
+                <a:latin typeface="Consolas" panose="020B0609020204030204" pitchFamily="49" charset="0"/>
+              </a:rPr>
+              <a:t>);</a:t>
+            </a:r>
+          </a:p>
+          <a:p>
+            <a:endParaRPr lang="en-US" altLang="zh-TW" sz="1600" dirty="0" smtClean="0">
+              <a:solidFill>
+                <a:srgbClr val="000000"/>
+              </a:solidFill>
+              <a:latin typeface="Consolas" panose="020B0609020204030204" pitchFamily="49" charset="0"/>
+            </a:endParaRPr>
+          </a:p>
+          <a:p>
+            <a:endParaRPr lang="en-US" altLang="zh-TW" sz="1600" dirty="0">
+              <a:solidFill>
+                <a:srgbClr val="000000"/>
+              </a:solidFill>
+              <a:latin typeface="Consolas" panose="020B0609020204030204" pitchFamily="49" charset="0"/>
+            </a:endParaRPr>
+          </a:p>
+          <a:p>
+            <a:r>
+              <a:rPr lang="en-US" altLang="zh-TW" sz="1600" dirty="0">
+                <a:solidFill>
+                  <a:srgbClr val="000000"/>
+                </a:solidFill>
+                <a:latin typeface="Consolas" panose="020B0609020204030204" pitchFamily="49" charset="0"/>
+              </a:rPr>
+              <a:t>NTSTATUS </a:t>
+            </a:r>
+            <a:r>
+              <a:rPr lang="en-US" altLang="zh-TW" sz="1600" dirty="0" err="1">
+                <a:solidFill>
+                  <a:srgbClr val="007D9A"/>
+                </a:solidFill>
+                <a:latin typeface="Consolas" panose="020B0609020204030204" pitchFamily="49" charset="0"/>
+              </a:rPr>
+              <a:t>KeDelayExecutionThread</a:t>
+            </a:r>
+            <a:r>
+              <a:rPr lang="en-US" altLang="zh-TW" sz="1600" dirty="0">
+                <a:solidFill>
+                  <a:srgbClr val="000000"/>
+                </a:solidFill>
+                <a:latin typeface="Consolas" panose="020B0609020204030204" pitchFamily="49" charset="0"/>
+              </a:rPr>
+              <a:t>( KPROCESSOR_MODE </a:t>
+            </a:r>
+            <a:r>
+              <a:rPr lang="en-US" altLang="zh-TW" sz="1600" dirty="0" err="1">
+                <a:solidFill>
+                  <a:srgbClr val="000000"/>
+                </a:solidFill>
+                <a:latin typeface="Consolas" panose="020B0609020204030204" pitchFamily="49" charset="0"/>
+              </a:rPr>
+              <a:t>WaitMode</a:t>
+            </a:r>
+            <a:r>
+              <a:rPr lang="en-US" altLang="zh-TW" sz="1600" dirty="0">
+                <a:solidFill>
+                  <a:srgbClr val="000000"/>
+                </a:solidFill>
+                <a:latin typeface="Consolas" panose="020B0609020204030204" pitchFamily="49" charset="0"/>
+              </a:rPr>
+              <a:t>, BOOLEAN </a:t>
+            </a:r>
+            <a:r>
+              <a:rPr lang="en-US" altLang="zh-TW" sz="1600" dirty="0" err="1">
+                <a:solidFill>
+                  <a:srgbClr val="000000"/>
+                </a:solidFill>
+                <a:latin typeface="Consolas" panose="020B0609020204030204" pitchFamily="49" charset="0"/>
+              </a:rPr>
+              <a:t>Alertable</a:t>
+            </a:r>
+            <a:r>
+              <a:rPr lang="en-US" altLang="zh-TW" sz="1600" dirty="0">
+                <a:solidFill>
+                  <a:srgbClr val="000000"/>
+                </a:solidFill>
+                <a:latin typeface="Consolas" panose="020B0609020204030204" pitchFamily="49" charset="0"/>
+              </a:rPr>
+              <a:t>, PLARGE_INTEGER Interval );</a:t>
+            </a:r>
+          </a:p>
+          <a:p>
+            <a:r>
+              <a:rPr lang="en-US" altLang="zh-TW" sz="1600" dirty="0">
+                <a:solidFill>
+                  <a:srgbClr val="000000"/>
+                </a:solidFill>
+                <a:latin typeface="Consolas" panose="020B0609020204030204" pitchFamily="49" charset="0"/>
+              </a:rPr>
+              <a:t>NTHALAPI VOID </a:t>
+            </a:r>
+            <a:r>
+              <a:rPr lang="en-US" altLang="zh-TW" sz="1600" dirty="0" err="1">
+                <a:solidFill>
+                  <a:srgbClr val="007D9A"/>
+                </a:solidFill>
+                <a:latin typeface="Consolas" panose="020B0609020204030204" pitchFamily="49" charset="0"/>
+              </a:rPr>
+              <a:t>KeStallExecutionProcessor</a:t>
+            </a:r>
+            <a:r>
+              <a:rPr lang="en-US" altLang="zh-TW" sz="1600" dirty="0">
+                <a:solidFill>
+                  <a:srgbClr val="000000"/>
+                </a:solidFill>
+                <a:latin typeface="Consolas" panose="020B0609020204030204" pitchFamily="49" charset="0"/>
+              </a:rPr>
+              <a:t>( ULONG </a:t>
+            </a:r>
+            <a:r>
+              <a:rPr lang="en-US" altLang="zh-TW" sz="1600" dirty="0" err="1">
+                <a:solidFill>
+                  <a:srgbClr val="000000"/>
+                </a:solidFill>
+                <a:latin typeface="Consolas" panose="020B0609020204030204" pitchFamily="49" charset="0"/>
+              </a:rPr>
+              <a:t>MicroSeconds</a:t>
+            </a:r>
+            <a:r>
+              <a:rPr lang="en-US" altLang="zh-TW" sz="1600" dirty="0">
+                <a:solidFill>
+                  <a:srgbClr val="000000"/>
+                </a:solidFill>
+                <a:latin typeface="Consolas" panose="020B0609020204030204" pitchFamily="49" charset="0"/>
+              </a:rPr>
+              <a:t> );</a:t>
+            </a:r>
+          </a:p>
+          <a:p>
+            <a:endParaRPr lang="en-US" altLang="zh-TW" sz="1600" dirty="0" smtClean="0">
+              <a:solidFill>
+                <a:srgbClr val="000000"/>
+              </a:solidFill>
+              <a:latin typeface="Consolas" panose="020B0609020204030204" pitchFamily="49" charset="0"/>
+            </a:endParaRPr>
+          </a:p>
+        </p:txBody>
+      </p:sp>
+      <p:sp>
+        <p:nvSpPr>
+          <p:cNvPr id="4" name="文字方塊 3"/>
+          <p:cNvSpPr txBox="1"/>
+          <p:nvPr/>
+        </p:nvSpPr>
+        <p:spPr>
+          <a:xfrm>
+            <a:off x="0" y="112143"/>
+            <a:ext cx="3565585" cy="461665"/>
+          </a:xfrm>
+          <a:prstGeom prst="rect">
+            <a:avLst/>
+          </a:prstGeom>
+          <a:noFill/>
+        </p:spPr>
+        <p:txBody>
+          <a:bodyPr wrap="square" rtlCol="0">
+            <a:spAutoFit/>
+          </a:bodyPr>
+          <a:lstStyle/>
+          <a:p>
+            <a:r>
+              <a:rPr lang="en-US" altLang="zh-TW" sz="2400" b="1" dirty="0" smtClean="0">
+                <a:effectLst>
+                  <a:outerShdw blurRad="38100" dist="38100" dir="2700000" algn="tl">
+                    <a:srgbClr val="000000">
+                      <a:alpha val="43137"/>
+                    </a:srgbClr>
+                  </a:outerShdw>
+                </a:effectLst>
+                <a:latin typeface="微軟正黑體" panose="020B0604030504040204" pitchFamily="34" charset="-120"/>
+                <a:ea typeface="微軟正黑體" panose="020B0604030504040204" pitchFamily="34" charset="-120"/>
+              </a:rPr>
+              <a:t>Related </a:t>
+            </a:r>
+            <a:r>
+              <a:rPr lang="en-US" altLang="zh-TW" sz="2400" b="1" dirty="0" smtClean="0">
+                <a:effectLst>
+                  <a:outerShdw blurRad="38100" dist="38100" dir="2700000" algn="tl">
+                    <a:srgbClr val="000000">
+                      <a:alpha val="43137"/>
+                    </a:srgbClr>
+                  </a:outerShdw>
+                </a:effectLst>
+                <a:latin typeface="微軟正黑體" panose="020B0604030504040204" pitchFamily="34" charset="-120"/>
+                <a:ea typeface="微軟正黑體" panose="020B0604030504040204" pitchFamily="34" charset="-120"/>
+              </a:rPr>
+              <a:t>APIs</a:t>
+            </a:r>
+            <a:endParaRPr lang="zh-TW" altLang="en-US" sz="2400" b="1" dirty="0">
+              <a:effectLst>
+                <a:outerShdw blurRad="38100" dist="38100" dir="2700000" algn="tl">
+                  <a:srgbClr val="000000">
+                    <a:alpha val="43137"/>
+                  </a:srgbClr>
+                </a:outerShdw>
+              </a:effectLst>
+              <a:latin typeface="微軟正黑體" panose="020B0604030504040204" pitchFamily="34" charset="-120"/>
+              <a:ea typeface="微軟正黑體" panose="020B0604030504040204" pitchFamily="34" charset="-120"/>
+            </a:endParaRPr>
+          </a:p>
+        </p:txBody>
+      </p:sp>
+    </p:spTree>
+    <p:extLst>
+      <p:ext uri="{BB962C8B-B14F-4D97-AF65-F5344CB8AC3E}">
+        <p14:creationId xmlns:p14="http://schemas.microsoft.com/office/powerpoint/2010/main" val="412883224"/>
+      </p:ext>
+    </p:extLst>
+  </p:cSld>
+  <p:clrMapOvr>
+    <a:masterClrMapping/>
+  </p:clrMapOvr>
+  <p:timing>
+    <p:tnLst>
+      <p:par>
+        <p:cTn id="1" dur="indefinite" restart="never" nodeType="tmRoot"/>
+      </p:par>
+    </p:tnLst>
+  </p:timing>
+</p:sld>
+</file>
+
+<file path=ppt/slides/slide86.xml><?xml version="1.0" encoding="utf-8"?>
+<p:sld xmlns:a="http://schemas.openxmlformats.org/drawingml/2006/main" xmlns:r="http://schemas.openxmlformats.org/officeDocument/2006/relationships" xmlns:p="http://schemas.openxmlformats.org/presentationml/2006/main">
+  <p:cSld>
+    <p:spTree>
+      <p:nvGrpSpPr>
+        <p:cNvPr id="1" name=""/>
+        <p:cNvGrpSpPr/>
+        <p:nvPr/>
+      </p:nvGrpSpPr>
+      <p:grpSpPr>
+        <a:xfrm>
+          <a:off x="0" y="0"/>
+          <a:ext cx="0" cy="0"/>
+          <a:chOff x="0" y="0"/>
+          <a:chExt cx="0" cy="0"/>
+        </a:xfrm>
+      </p:grpSpPr>
+      <p:sp>
+        <p:nvSpPr>
+          <p:cNvPr id="2" name="標題 1"/>
+          <p:cNvSpPr>
+            <a:spLocks noGrp="1"/>
+          </p:cNvSpPr>
+          <p:nvPr>
+            <p:ph type="title"/>
+          </p:nvPr>
+        </p:nvSpPr>
+        <p:spPr>
+          <a:xfrm>
+            <a:off x="5331460" y="2766218"/>
+            <a:ext cx="1760220" cy="1325563"/>
+          </a:xfrm>
+        </p:spPr>
+        <p:txBody>
+          <a:bodyPr/>
+          <a:lstStyle/>
+          <a:p>
+            <a:r>
+              <a:rPr lang="en-US" altLang="zh-TW" b="1" dirty="0" smtClean="0">
+                <a:effectLst>
+                  <a:outerShdw blurRad="38100" dist="38100" dir="2700000" algn="tl">
+                    <a:srgbClr val="000000">
+                      <a:alpha val="43137"/>
+                    </a:srgbClr>
+                  </a:outerShdw>
+                </a:effectLst>
+                <a:latin typeface="微軟正黑體" panose="020B0604030504040204" pitchFamily="34" charset="-120"/>
+                <a:ea typeface="微軟正黑體" panose="020B0604030504040204" pitchFamily="34" charset="-120"/>
+              </a:rPr>
+              <a:t>Q&amp;A</a:t>
+            </a:r>
+            <a:endParaRPr lang="zh-TW" altLang="en-US" b="1" dirty="0">
+              <a:effectLst>
+                <a:outerShdw blurRad="38100" dist="38100" dir="2700000" algn="tl">
+                  <a:srgbClr val="000000">
+                    <a:alpha val="43137"/>
+                  </a:srgbClr>
+                </a:outerShdw>
+              </a:effectLst>
+              <a:latin typeface="微軟正黑體" panose="020B0604030504040204" pitchFamily="34" charset="-120"/>
+              <a:ea typeface="微軟正黑體" panose="020B0604030504040204" pitchFamily="34" charset="-120"/>
+            </a:endParaRPr>
+          </a:p>
+        </p:txBody>
+      </p:sp>
+    </p:spTree>
+    <p:extLst>
+      <p:ext uri="{BB962C8B-B14F-4D97-AF65-F5344CB8AC3E}">
+        <p14:creationId xmlns:p14="http://schemas.microsoft.com/office/powerpoint/2010/main" val="1531412980"/>
       </p:ext>
     </p:extLst>
   </p:cSld>

</xml_diff>